<commit_message>
update the signal HMI introduction.
</commit_message>
<xml_diff>
--- a/OT_System_Attack_Case_Study/Railway_HMI_Usage/img/designDoc.pptx
+++ b/OT_System_Attack_Case_Study/Railway_HMI_Usage/img/designDoc.pptx
@@ -5,11 +5,12 @@
     <p:sldMasterId id="2147483648" r:id="rId1"/>
   </p:sldMasterIdLst>
   <p:notesMasterIdLst>
-    <p:notesMasterId r:id="rId4"/>
+    <p:notesMasterId r:id="rId5"/>
   </p:notesMasterIdLst>
   <p:sldIdLst>
     <p:sldId id="256" r:id="rId2"/>
     <p:sldId id="257" r:id="rId3"/>
+    <p:sldId id="277" r:id="rId4"/>
   </p:sldIdLst>
   <p:sldSz cx="12192000" cy="6858000"/>
   <p:notesSz cx="6858000" cy="9144000"/>
@@ -198,7 +199,7 @@
           <a:p>
             <a:fld id="{7F927686-0639-4705-A5BA-AA7EDAB93D84}" type="datetimeFigureOut">
               <a:rPr lang="en-SG" smtClean="0"/>
-              <a:t>20/6/2025</a:t>
+              <a:t>21/6/2025</a:t>
             </a:fld>
             <a:endParaRPr lang="en-SG"/>
           </a:p>
@@ -699,7 +700,7 @@
           <a:p>
             <a:fld id="{87D5F1AA-6CA2-4487-AEBF-1827FADC72BF}" type="datetimeFigureOut">
               <a:rPr lang="en-SG" smtClean="0"/>
-              <a:t>20/6/2025</a:t>
+              <a:t>21/6/2025</a:t>
             </a:fld>
             <a:endParaRPr lang="en-SG"/>
           </a:p>
@@ -899,7 +900,7 @@
           <a:p>
             <a:fld id="{87D5F1AA-6CA2-4487-AEBF-1827FADC72BF}" type="datetimeFigureOut">
               <a:rPr lang="en-SG" smtClean="0"/>
-              <a:t>20/6/2025</a:t>
+              <a:t>21/6/2025</a:t>
             </a:fld>
             <a:endParaRPr lang="en-SG"/>
           </a:p>
@@ -1109,7 +1110,7 @@
           <a:p>
             <a:fld id="{87D5F1AA-6CA2-4487-AEBF-1827FADC72BF}" type="datetimeFigureOut">
               <a:rPr lang="en-SG" smtClean="0"/>
-              <a:t>20/6/2025</a:t>
+              <a:t>21/6/2025</a:t>
             </a:fld>
             <a:endParaRPr lang="en-SG"/>
           </a:p>
@@ -1309,7 +1310,7 @@
           <a:p>
             <a:fld id="{87D5F1AA-6CA2-4487-AEBF-1827FADC72BF}" type="datetimeFigureOut">
               <a:rPr lang="en-SG" smtClean="0"/>
-              <a:t>20/6/2025</a:t>
+              <a:t>21/6/2025</a:t>
             </a:fld>
             <a:endParaRPr lang="en-SG"/>
           </a:p>
@@ -1585,7 +1586,7 @@
           <a:p>
             <a:fld id="{87D5F1AA-6CA2-4487-AEBF-1827FADC72BF}" type="datetimeFigureOut">
               <a:rPr lang="en-SG" smtClean="0"/>
-              <a:t>20/6/2025</a:t>
+              <a:t>21/6/2025</a:t>
             </a:fld>
             <a:endParaRPr lang="en-SG"/>
           </a:p>
@@ -1853,7 +1854,7 @@
           <a:p>
             <a:fld id="{87D5F1AA-6CA2-4487-AEBF-1827FADC72BF}" type="datetimeFigureOut">
               <a:rPr lang="en-SG" smtClean="0"/>
-              <a:t>20/6/2025</a:t>
+              <a:t>21/6/2025</a:t>
             </a:fld>
             <a:endParaRPr lang="en-SG"/>
           </a:p>
@@ -2268,7 +2269,7 @@
           <a:p>
             <a:fld id="{87D5F1AA-6CA2-4487-AEBF-1827FADC72BF}" type="datetimeFigureOut">
               <a:rPr lang="en-SG" smtClean="0"/>
-              <a:t>20/6/2025</a:t>
+              <a:t>21/6/2025</a:t>
             </a:fld>
             <a:endParaRPr lang="en-SG"/>
           </a:p>
@@ -2410,7 +2411,7 @@
           <a:p>
             <a:fld id="{87D5F1AA-6CA2-4487-AEBF-1827FADC72BF}" type="datetimeFigureOut">
               <a:rPr lang="en-SG" smtClean="0"/>
-              <a:t>20/6/2025</a:t>
+              <a:t>21/6/2025</a:t>
             </a:fld>
             <a:endParaRPr lang="en-SG"/>
           </a:p>
@@ -2523,7 +2524,7 @@
           <a:p>
             <a:fld id="{87D5F1AA-6CA2-4487-AEBF-1827FADC72BF}" type="datetimeFigureOut">
               <a:rPr lang="en-SG" smtClean="0"/>
-              <a:t>20/6/2025</a:t>
+              <a:t>21/6/2025</a:t>
             </a:fld>
             <a:endParaRPr lang="en-SG"/>
           </a:p>
@@ -2836,7 +2837,7 @@
           <a:p>
             <a:fld id="{87D5F1AA-6CA2-4487-AEBF-1827FADC72BF}" type="datetimeFigureOut">
               <a:rPr lang="en-SG" smtClean="0"/>
-              <a:t>20/6/2025</a:t>
+              <a:t>21/6/2025</a:t>
             </a:fld>
             <a:endParaRPr lang="en-SG"/>
           </a:p>
@@ -3125,7 +3126,7 @@
           <a:p>
             <a:fld id="{87D5F1AA-6CA2-4487-AEBF-1827FADC72BF}" type="datetimeFigureOut">
               <a:rPr lang="en-SG" smtClean="0"/>
-              <a:t>20/6/2025</a:t>
+              <a:t>21/6/2025</a:t>
             </a:fld>
             <a:endParaRPr lang="en-SG"/>
           </a:p>
@@ -3368,7 +3369,7 @@
           <a:p>
             <a:fld id="{87D5F1AA-6CA2-4487-AEBF-1827FADC72BF}" type="datetimeFigureOut">
               <a:rPr lang="en-SG" smtClean="0"/>
-              <a:t>20/6/2025</a:t>
+              <a:t>21/6/2025</a:t>
             </a:fld>
             <a:endParaRPr lang="en-SG"/>
           </a:p>
@@ -10207,6 +10208,2066 @@
     <p:extLst>
       <p:ext uri="{BB962C8B-B14F-4D97-AF65-F5344CB8AC3E}">
         <p14:creationId xmlns:p14="http://schemas.microsoft.com/office/powerpoint/2010/main" val="3691679039"/>
+      </p:ext>
+    </p:extLst>
+  </p:cSld>
+  <p:clrMapOvr>
+    <a:masterClrMapping/>
+  </p:clrMapOvr>
+</p:sld>
+</file>
+
+<file path=ppt/slides/slide3.xml><?xml version="1.0" encoding="utf-8"?>
+<p:sld xmlns:a="http://schemas.openxmlformats.org/drawingml/2006/main" xmlns:r="http://schemas.openxmlformats.org/officeDocument/2006/relationships" xmlns:p="http://schemas.openxmlformats.org/presentationml/2006/main">
+  <p:cSld>
+    <p:spTree>
+      <p:nvGrpSpPr>
+        <p:cNvPr id="1" name=""/>
+        <p:cNvGrpSpPr/>
+        <p:nvPr/>
+      </p:nvGrpSpPr>
+      <p:grpSpPr>
+        <a:xfrm>
+          <a:off x="0" y="0"/>
+          <a:ext cx="0" cy="0"/>
+          <a:chOff x="0" y="0"/>
+          <a:chExt cx="0" cy="0"/>
+        </a:xfrm>
+      </p:grpSpPr>
+      <p:pic>
+        <p:nvPicPr>
+          <p:cNvPr id="28" name="Picture 27" descr="A screenshot of a computer&#10;&#10;AI-generated content may be incorrect.">
+            <a:extLst>
+              <a:ext uri="{FF2B5EF4-FFF2-40B4-BE49-F238E27FC236}">
+                <a16:creationId xmlns:a16="http://schemas.microsoft.com/office/drawing/2014/main" id="{D98637F3-56E1-3432-E655-9A5208025072}"/>
+              </a:ext>
+            </a:extLst>
+          </p:cNvPr>
+          <p:cNvPicPr>
+            <a:picLocks noChangeAspect="1"/>
+          </p:cNvPicPr>
+          <p:nvPr/>
+        </p:nvPicPr>
+        <p:blipFill>
+          <a:blip r:embed="rId2">
+            <a:extLst>
+              <a:ext uri="{28A0092B-C50C-407E-A947-70E740481C1C}">
+                <a14:useLocalDpi xmlns:a14="http://schemas.microsoft.com/office/drawing/2010/main" val="0"/>
+              </a:ext>
+            </a:extLst>
+          </a:blip>
+          <a:stretch>
+            <a:fillRect/>
+          </a:stretch>
+        </p:blipFill>
+        <p:spPr>
+          <a:xfrm>
+            <a:off x="721171" y="564991"/>
+            <a:ext cx="9927791" cy="5686523"/>
+          </a:xfrm>
+          <a:prstGeom prst="rect">
+            <a:avLst/>
+          </a:prstGeom>
+        </p:spPr>
+      </p:pic>
+      <p:cxnSp>
+        <p:nvCxnSpPr>
+          <p:cNvPr id="6" name="Straight Arrow Connector 5">
+            <a:extLst>
+              <a:ext uri="{FF2B5EF4-FFF2-40B4-BE49-F238E27FC236}">
+                <a16:creationId xmlns:a16="http://schemas.microsoft.com/office/drawing/2014/main" id="{559E8AF7-A5AB-E7F6-16A1-7B37B1B66AF3}"/>
+              </a:ext>
+            </a:extLst>
+          </p:cNvPr>
+          <p:cNvCxnSpPr>
+            <a:cxnSpLocks/>
+          </p:cNvCxnSpPr>
+          <p:nvPr/>
+        </p:nvCxnSpPr>
+        <p:spPr>
+          <a:xfrm>
+            <a:off x="8255426" y="402127"/>
+            <a:ext cx="0" cy="1618373"/>
+          </a:xfrm>
+          <a:prstGeom prst="straightConnector1">
+            <a:avLst/>
+          </a:prstGeom>
+          <a:ln w="19050">
+            <a:solidFill>
+              <a:schemeClr val="tx2">
+                <a:lumMod val="50000"/>
+                <a:lumOff val="50000"/>
+              </a:schemeClr>
+            </a:solidFill>
+            <a:prstDash val="sysDash"/>
+            <a:tailEnd type="triangle"/>
+          </a:ln>
+        </p:spPr>
+        <p:style>
+          <a:lnRef idx="1">
+            <a:schemeClr val="accent5"/>
+          </a:lnRef>
+          <a:fillRef idx="0">
+            <a:schemeClr val="accent5"/>
+          </a:fillRef>
+          <a:effectRef idx="0">
+            <a:schemeClr val="accent5"/>
+          </a:effectRef>
+          <a:fontRef idx="minor">
+            <a:schemeClr val="tx1"/>
+          </a:fontRef>
+        </p:style>
+      </p:cxnSp>
+      <p:sp>
+        <p:nvSpPr>
+          <p:cNvPr id="7" name="TextBox 6">
+            <a:extLst>
+              <a:ext uri="{FF2B5EF4-FFF2-40B4-BE49-F238E27FC236}">
+                <a16:creationId xmlns:a16="http://schemas.microsoft.com/office/drawing/2014/main" id="{E8FD3633-E891-3662-771F-3007E87ECCFA}"/>
+              </a:ext>
+            </a:extLst>
+          </p:cNvPr>
+          <p:cNvSpPr txBox="1"/>
+          <p:nvPr/>
+        </p:nvSpPr>
+        <p:spPr>
+          <a:xfrm>
+            <a:off x="7457609" y="24243"/>
+            <a:ext cx="1909535" cy="430887"/>
+          </a:xfrm>
+          <a:prstGeom prst="rect">
+            <a:avLst/>
+          </a:prstGeom>
+          <a:noFill/>
+        </p:spPr>
+        <p:txBody>
+          <a:bodyPr wrap="square" rtlCol="0">
+            <a:spAutoFit/>
+          </a:bodyPr>
+          <a:lstStyle/>
+          <a:p>
+            <a:r>
+              <a:rPr lang="en-US" sz="1100" b="1" dirty="0"/>
+              <a:t>Junction block sensor link </a:t>
+            </a:r>
+          </a:p>
+          <a:p>
+            <a:r>
+              <a:rPr lang="en-US" sz="1100" b="1" dirty="0"/>
+              <a:t>[</a:t>
+            </a:r>
+            <a:r>
+              <a:rPr lang="en-US" sz="1100" b="1" dirty="0">
+                <a:solidFill>
+                  <a:srgbClr val="C00000"/>
+                </a:solidFill>
+              </a:rPr>
+              <a:t>Red dash line</a:t>
+            </a:r>
+            <a:r>
+              <a:rPr lang="en-US" sz="1100" b="1" dirty="0"/>
+              <a:t>] </a:t>
+            </a:r>
+            <a:endParaRPr lang="en-SG" sz="1100" b="1" dirty="0"/>
+          </a:p>
+        </p:txBody>
+      </p:sp>
+      <p:cxnSp>
+        <p:nvCxnSpPr>
+          <p:cNvPr id="9" name="Straight Arrow Connector 8">
+            <a:extLst>
+              <a:ext uri="{FF2B5EF4-FFF2-40B4-BE49-F238E27FC236}">
+                <a16:creationId xmlns:a16="http://schemas.microsoft.com/office/drawing/2014/main" id="{D0D63071-D909-96D4-7745-58E103626F36}"/>
+              </a:ext>
+            </a:extLst>
+          </p:cNvPr>
+          <p:cNvCxnSpPr>
+            <a:cxnSpLocks/>
+          </p:cNvCxnSpPr>
+          <p:nvPr/>
+        </p:nvCxnSpPr>
+        <p:spPr>
+          <a:xfrm>
+            <a:off x="9924207" y="434727"/>
+            <a:ext cx="0" cy="1088004"/>
+          </a:xfrm>
+          <a:prstGeom prst="straightConnector1">
+            <a:avLst/>
+          </a:prstGeom>
+          <a:ln w="19050">
+            <a:solidFill>
+              <a:schemeClr val="tx2">
+                <a:lumMod val="50000"/>
+                <a:lumOff val="50000"/>
+              </a:schemeClr>
+            </a:solidFill>
+            <a:prstDash val="sysDash"/>
+            <a:tailEnd type="triangle"/>
+          </a:ln>
+        </p:spPr>
+        <p:style>
+          <a:lnRef idx="1">
+            <a:schemeClr val="accent5"/>
+          </a:lnRef>
+          <a:fillRef idx="0">
+            <a:schemeClr val="accent5"/>
+          </a:fillRef>
+          <a:effectRef idx="0">
+            <a:schemeClr val="accent5"/>
+          </a:effectRef>
+          <a:fontRef idx="minor">
+            <a:schemeClr val="tx1"/>
+          </a:fontRef>
+        </p:style>
+      </p:cxnSp>
+      <p:sp>
+        <p:nvSpPr>
+          <p:cNvPr id="10" name="TextBox 9">
+            <a:extLst>
+              <a:ext uri="{FF2B5EF4-FFF2-40B4-BE49-F238E27FC236}">
+                <a16:creationId xmlns:a16="http://schemas.microsoft.com/office/drawing/2014/main" id="{FEF9993F-8920-0DF1-66F1-4BE0EC0F86AC}"/>
+              </a:ext>
+            </a:extLst>
+          </p:cNvPr>
+          <p:cNvSpPr txBox="1"/>
+          <p:nvPr/>
+        </p:nvSpPr>
+        <p:spPr>
+          <a:xfrm>
+            <a:off x="10714918" y="1124529"/>
+            <a:ext cx="1401122" cy="600164"/>
+          </a:xfrm>
+          <a:prstGeom prst="rect">
+            <a:avLst/>
+          </a:prstGeom>
+          <a:noFill/>
+        </p:spPr>
+        <p:txBody>
+          <a:bodyPr wrap="square" rtlCol="0">
+            <a:spAutoFit/>
+          </a:bodyPr>
+          <a:lstStyle/>
+          <a:p>
+            <a:r>
+              <a:rPr lang="en-US" sz="1100" b="1" dirty="0"/>
+              <a:t>Junction release sensor link  </a:t>
+            </a:r>
+          </a:p>
+          <a:p>
+            <a:r>
+              <a:rPr lang="en-US" sz="1100" b="1" dirty="0"/>
+              <a:t>[</a:t>
+            </a:r>
+            <a:r>
+              <a:rPr lang="en-US" sz="1100" b="1" dirty="0">
+                <a:solidFill>
+                  <a:schemeClr val="accent6">
+                    <a:lumMod val="75000"/>
+                  </a:schemeClr>
+                </a:solidFill>
+              </a:rPr>
+              <a:t>Green dash line</a:t>
+            </a:r>
+            <a:r>
+              <a:rPr lang="en-US" sz="1100" b="1" dirty="0"/>
+              <a:t>] </a:t>
+            </a:r>
+            <a:endParaRPr lang="en-SG" sz="1100" b="1" dirty="0"/>
+          </a:p>
+        </p:txBody>
+      </p:sp>
+      <p:cxnSp>
+        <p:nvCxnSpPr>
+          <p:cNvPr id="13" name="Straight Arrow Connector 12">
+            <a:extLst>
+              <a:ext uri="{FF2B5EF4-FFF2-40B4-BE49-F238E27FC236}">
+                <a16:creationId xmlns:a16="http://schemas.microsoft.com/office/drawing/2014/main" id="{1D0FE3C1-E8BF-2180-B192-E49C4FE9598B}"/>
+              </a:ext>
+            </a:extLst>
+          </p:cNvPr>
+          <p:cNvCxnSpPr>
+            <a:cxnSpLocks/>
+          </p:cNvCxnSpPr>
+          <p:nvPr/>
+        </p:nvCxnSpPr>
+        <p:spPr>
+          <a:xfrm>
+            <a:off x="3093752" y="472288"/>
+            <a:ext cx="0" cy="1123982"/>
+          </a:xfrm>
+          <a:prstGeom prst="straightConnector1">
+            <a:avLst/>
+          </a:prstGeom>
+          <a:ln w="19050">
+            <a:solidFill>
+              <a:schemeClr val="tx2">
+                <a:lumMod val="50000"/>
+                <a:lumOff val="50000"/>
+              </a:schemeClr>
+            </a:solidFill>
+            <a:prstDash val="sysDash"/>
+            <a:tailEnd type="triangle"/>
+          </a:ln>
+        </p:spPr>
+        <p:style>
+          <a:lnRef idx="1">
+            <a:schemeClr val="accent5"/>
+          </a:lnRef>
+          <a:fillRef idx="0">
+            <a:schemeClr val="accent5"/>
+          </a:fillRef>
+          <a:effectRef idx="0">
+            <a:schemeClr val="accent5"/>
+          </a:effectRef>
+          <a:fontRef idx="minor">
+            <a:schemeClr val="tx1"/>
+          </a:fontRef>
+        </p:style>
+      </p:cxnSp>
+      <p:sp>
+        <p:nvSpPr>
+          <p:cNvPr id="14" name="TextBox 13">
+            <a:extLst>
+              <a:ext uri="{FF2B5EF4-FFF2-40B4-BE49-F238E27FC236}">
+                <a16:creationId xmlns:a16="http://schemas.microsoft.com/office/drawing/2014/main" id="{3A3E0A93-A7F4-8648-3F21-C3D8030A214F}"/>
+              </a:ext>
+            </a:extLst>
+          </p:cNvPr>
+          <p:cNvSpPr txBox="1"/>
+          <p:nvPr/>
+        </p:nvSpPr>
+        <p:spPr>
+          <a:xfrm>
+            <a:off x="5843539" y="41400"/>
+            <a:ext cx="1535350" cy="430887"/>
+          </a:xfrm>
+          <a:prstGeom prst="rect">
+            <a:avLst/>
+          </a:prstGeom>
+          <a:noFill/>
+        </p:spPr>
+        <p:txBody>
+          <a:bodyPr wrap="square" rtlCol="0">
+            <a:spAutoFit/>
+          </a:bodyPr>
+          <a:lstStyle/>
+          <a:p>
+            <a:r>
+              <a:rPr lang="en-US" sz="1100" b="1" dirty="0"/>
+              <a:t>Junction block signal [</a:t>
+            </a:r>
+            <a:r>
+              <a:rPr lang="en-US" sz="1100" b="1" dirty="0">
+                <a:solidFill>
+                  <a:srgbClr val="FF0000"/>
+                </a:solidFill>
+              </a:rPr>
+              <a:t>Red: Block</a:t>
+            </a:r>
+            <a:r>
+              <a:rPr lang="en-US" sz="1100" b="1" dirty="0"/>
+              <a:t>] </a:t>
+            </a:r>
+            <a:endParaRPr lang="en-SG" sz="1100" b="1" dirty="0"/>
+          </a:p>
+        </p:txBody>
+      </p:sp>
+      <p:cxnSp>
+        <p:nvCxnSpPr>
+          <p:cNvPr id="15" name="Straight Arrow Connector 14">
+            <a:extLst>
+              <a:ext uri="{FF2B5EF4-FFF2-40B4-BE49-F238E27FC236}">
+                <a16:creationId xmlns:a16="http://schemas.microsoft.com/office/drawing/2014/main" id="{25272B9E-4F21-1965-6F04-A98C448D16BC}"/>
+              </a:ext>
+            </a:extLst>
+          </p:cNvPr>
+          <p:cNvCxnSpPr>
+            <a:cxnSpLocks/>
+          </p:cNvCxnSpPr>
+          <p:nvPr/>
+        </p:nvCxnSpPr>
+        <p:spPr>
+          <a:xfrm>
+            <a:off x="6434038" y="413121"/>
+            <a:ext cx="0" cy="1131217"/>
+          </a:xfrm>
+          <a:prstGeom prst="straightConnector1">
+            <a:avLst/>
+          </a:prstGeom>
+          <a:ln w="19050">
+            <a:solidFill>
+              <a:schemeClr val="tx2">
+                <a:lumMod val="50000"/>
+                <a:lumOff val="50000"/>
+              </a:schemeClr>
+            </a:solidFill>
+            <a:prstDash val="sysDash"/>
+            <a:tailEnd type="triangle"/>
+          </a:ln>
+        </p:spPr>
+        <p:style>
+          <a:lnRef idx="1">
+            <a:schemeClr val="accent5"/>
+          </a:lnRef>
+          <a:fillRef idx="0">
+            <a:schemeClr val="accent5"/>
+          </a:fillRef>
+          <a:effectRef idx="0">
+            <a:schemeClr val="accent5"/>
+          </a:effectRef>
+          <a:fontRef idx="minor">
+            <a:schemeClr val="tx1"/>
+          </a:fontRef>
+        </p:style>
+      </p:cxnSp>
+      <p:sp>
+        <p:nvSpPr>
+          <p:cNvPr id="16" name="TextBox 15">
+            <a:extLst>
+              <a:ext uri="{FF2B5EF4-FFF2-40B4-BE49-F238E27FC236}">
+                <a16:creationId xmlns:a16="http://schemas.microsoft.com/office/drawing/2014/main" id="{0FDE8DE0-F005-C79E-FE86-3064C3FDC412}"/>
+              </a:ext>
+            </a:extLst>
+          </p:cNvPr>
+          <p:cNvSpPr txBox="1"/>
+          <p:nvPr/>
+        </p:nvSpPr>
+        <p:spPr>
+          <a:xfrm>
+            <a:off x="2649038" y="58812"/>
+            <a:ext cx="1686758" cy="430887"/>
+          </a:xfrm>
+          <a:prstGeom prst="rect">
+            <a:avLst/>
+          </a:prstGeom>
+          <a:noFill/>
+        </p:spPr>
+        <p:txBody>
+          <a:bodyPr wrap="square" rtlCol="0">
+            <a:spAutoFit/>
+          </a:bodyPr>
+          <a:lstStyle/>
+          <a:p>
+            <a:r>
+              <a:rPr lang="en-US" sz="1100" b="1" dirty="0"/>
+              <a:t>Junction block signal [</a:t>
+            </a:r>
+            <a:r>
+              <a:rPr lang="en-US" sz="1100" b="1" dirty="0">
+                <a:solidFill>
+                  <a:schemeClr val="accent6">
+                    <a:lumMod val="75000"/>
+                  </a:schemeClr>
+                </a:solidFill>
+              </a:rPr>
+              <a:t>Green: Release</a:t>
+            </a:r>
+            <a:r>
+              <a:rPr lang="en-US" sz="1100" b="1" dirty="0"/>
+              <a:t>] </a:t>
+            </a:r>
+            <a:endParaRPr lang="en-SG" sz="1100" b="1" dirty="0"/>
+          </a:p>
+        </p:txBody>
+      </p:sp>
+      <p:cxnSp>
+        <p:nvCxnSpPr>
+          <p:cNvPr id="17" name="Straight Arrow Connector 16">
+            <a:extLst>
+              <a:ext uri="{FF2B5EF4-FFF2-40B4-BE49-F238E27FC236}">
+                <a16:creationId xmlns:a16="http://schemas.microsoft.com/office/drawing/2014/main" id="{F12109AA-6230-E39E-755E-DB4FE9F5D16F}"/>
+              </a:ext>
+            </a:extLst>
+          </p:cNvPr>
+          <p:cNvCxnSpPr>
+            <a:cxnSpLocks/>
+          </p:cNvCxnSpPr>
+          <p:nvPr/>
+        </p:nvCxnSpPr>
+        <p:spPr>
+          <a:xfrm>
+            <a:off x="4773007" y="489699"/>
+            <a:ext cx="0" cy="2785256"/>
+          </a:xfrm>
+          <a:prstGeom prst="straightConnector1">
+            <a:avLst/>
+          </a:prstGeom>
+          <a:ln w="19050">
+            <a:solidFill>
+              <a:schemeClr val="tx2">
+                <a:lumMod val="50000"/>
+                <a:lumOff val="50000"/>
+              </a:schemeClr>
+            </a:solidFill>
+            <a:prstDash val="sysDash"/>
+            <a:tailEnd type="triangle"/>
+          </a:ln>
+        </p:spPr>
+        <p:style>
+          <a:lnRef idx="1">
+            <a:schemeClr val="accent5"/>
+          </a:lnRef>
+          <a:fillRef idx="0">
+            <a:schemeClr val="accent5"/>
+          </a:fillRef>
+          <a:effectRef idx="0">
+            <a:schemeClr val="accent5"/>
+          </a:effectRef>
+          <a:fontRef idx="minor">
+            <a:schemeClr val="tx1"/>
+          </a:fontRef>
+        </p:style>
+      </p:cxnSp>
+      <p:sp>
+        <p:nvSpPr>
+          <p:cNvPr id="18" name="TextBox 17">
+            <a:extLst>
+              <a:ext uri="{FF2B5EF4-FFF2-40B4-BE49-F238E27FC236}">
+                <a16:creationId xmlns:a16="http://schemas.microsoft.com/office/drawing/2014/main" id="{11E77651-6560-899F-473D-16594506AE15}"/>
+              </a:ext>
+            </a:extLst>
+          </p:cNvPr>
+          <p:cNvSpPr txBox="1"/>
+          <p:nvPr/>
+        </p:nvSpPr>
+        <p:spPr>
+          <a:xfrm>
+            <a:off x="4183817" y="46438"/>
+            <a:ext cx="2245351" cy="430887"/>
+          </a:xfrm>
+          <a:prstGeom prst="rect">
+            <a:avLst/>
+          </a:prstGeom>
+          <a:noFill/>
+        </p:spPr>
+        <p:txBody>
+          <a:bodyPr wrap="square" rtlCol="0">
+            <a:spAutoFit/>
+          </a:bodyPr>
+          <a:lstStyle/>
+          <a:p>
+            <a:r>
+              <a:rPr lang="en-US" sz="1100" b="1" dirty="0"/>
+              <a:t>Junction release sensor </a:t>
+            </a:r>
+          </a:p>
+          <a:p>
+            <a:r>
+              <a:rPr lang="en-US" sz="1100" b="1" dirty="0"/>
+              <a:t>[</a:t>
+            </a:r>
+            <a:r>
+              <a:rPr lang="en-US" sz="1100" b="1" dirty="0">
+                <a:solidFill>
+                  <a:schemeClr val="tx2">
+                    <a:lumMod val="75000"/>
+                    <a:lumOff val="25000"/>
+                  </a:schemeClr>
+                </a:solidFill>
+              </a:rPr>
+              <a:t>Blue: triggered</a:t>
+            </a:r>
+            <a:r>
+              <a:rPr lang="en-US" sz="1100" b="1" dirty="0"/>
+              <a:t>] </a:t>
+            </a:r>
+            <a:endParaRPr lang="en-SG" sz="1100" b="1" dirty="0"/>
+          </a:p>
+        </p:txBody>
+      </p:sp>
+      <p:sp>
+        <p:nvSpPr>
+          <p:cNvPr id="23" name="TextBox 22">
+            <a:extLst>
+              <a:ext uri="{FF2B5EF4-FFF2-40B4-BE49-F238E27FC236}">
+                <a16:creationId xmlns:a16="http://schemas.microsoft.com/office/drawing/2014/main" id="{C10593CE-CCCA-5EEB-FF8C-946C164FE0E5}"/>
+              </a:ext>
+            </a:extLst>
+          </p:cNvPr>
+          <p:cNvSpPr txBox="1"/>
+          <p:nvPr/>
+        </p:nvSpPr>
+        <p:spPr>
+          <a:xfrm>
+            <a:off x="10749722" y="2080321"/>
+            <a:ext cx="1366318" cy="600164"/>
+          </a:xfrm>
+          <a:prstGeom prst="rect">
+            <a:avLst/>
+          </a:prstGeom>
+          <a:noFill/>
+        </p:spPr>
+        <p:txBody>
+          <a:bodyPr wrap="square" rtlCol="0">
+            <a:spAutoFit/>
+          </a:bodyPr>
+          <a:lstStyle/>
+          <a:p>
+            <a:r>
+              <a:rPr lang="en-US" sz="1100" b="1" dirty="0"/>
+              <a:t>Junction block sensor</a:t>
+            </a:r>
+          </a:p>
+          <a:p>
+            <a:r>
+              <a:rPr lang="en-US" sz="1100" b="1" dirty="0"/>
+              <a:t>[</a:t>
+            </a:r>
+            <a:r>
+              <a:rPr lang="en-US" sz="1100" b="1" dirty="0">
+                <a:solidFill>
+                  <a:schemeClr val="tx2">
+                    <a:lumMod val="75000"/>
+                    <a:lumOff val="25000"/>
+                  </a:schemeClr>
+                </a:solidFill>
+              </a:rPr>
+              <a:t>Blue: triggered</a:t>
+            </a:r>
+            <a:r>
+              <a:rPr lang="en-US" sz="1100" b="1" dirty="0"/>
+              <a:t>] </a:t>
+            </a:r>
+            <a:endParaRPr lang="en-SG" sz="1100" b="1" dirty="0"/>
+          </a:p>
+        </p:txBody>
+      </p:sp>
+      <p:cxnSp>
+        <p:nvCxnSpPr>
+          <p:cNvPr id="24" name="Straight Arrow Connector 23">
+            <a:extLst>
+              <a:ext uri="{FF2B5EF4-FFF2-40B4-BE49-F238E27FC236}">
+                <a16:creationId xmlns:a16="http://schemas.microsoft.com/office/drawing/2014/main" id="{AFA248A4-3E8F-52D0-598A-022E85231B94}"/>
+              </a:ext>
+            </a:extLst>
+          </p:cNvPr>
+          <p:cNvCxnSpPr>
+            <a:cxnSpLocks/>
+          </p:cNvCxnSpPr>
+          <p:nvPr/>
+        </p:nvCxnSpPr>
+        <p:spPr>
+          <a:xfrm>
+            <a:off x="1596362" y="477802"/>
+            <a:ext cx="0" cy="1066536"/>
+          </a:xfrm>
+          <a:prstGeom prst="straightConnector1">
+            <a:avLst/>
+          </a:prstGeom>
+          <a:ln w="19050">
+            <a:solidFill>
+              <a:schemeClr val="tx2">
+                <a:lumMod val="50000"/>
+                <a:lumOff val="50000"/>
+              </a:schemeClr>
+            </a:solidFill>
+            <a:prstDash val="sysDash"/>
+            <a:tailEnd type="triangle"/>
+          </a:ln>
+        </p:spPr>
+        <p:style>
+          <a:lnRef idx="1">
+            <a:schemeClr val="accent5"/>
+          </a:lnRef>
+          <a:fillRef idx="0">
+            <a:schemeClr val="accent5"/>
+          </a:fillRef>
+          <a:effectRef idx="0">
+            <a:schemeClr val="accent5"/>
+          </a:effectRef>
+          <a:fontRef idx="minor">
+            <a:schemeClr val="tx1"/>
+          </a:fontRef>
+        </p:style>
+      </p:cxnSp>
+      <p:sp>
+        <p:nvSpPr>
+          <p:cNvPr id="25" name="TextBox 24">
+            <a:extLst>
+              <a:ext uri="{FF2B5EF4-FFF2-40B4-BE49-F238E27FC236}">
+                <a16:creationId xmlns:a16="http://schemas.microsoft.com/office/drawing/2014/main" id="{A18CD37A-4D37-80FB-A5FE-6F8FA3411B67}"/>
+              </a:ext>
+            </a:extLst>
+          </p:cNvPr>
+          <p:cNvSpPr txBox="1"/>
+          <p:nvPr/>
+        </p:nvSpPr>
+        <p:spPr>
+          <a:xfrm>
+            <a:off x="684613" y="41401"/>
+            <a:ext cx="1974501" cy="430887"/>
+          </a:xfrm>
+          <a:prstGeom prst="rect">
+            <a:avLst/>
+          </a:prstGeom>
+          <a:noFill/>
+        </p:spPr>
+        <p:txBody>
+          <a:bodyPr wrap="square" rtlCol="0">
+            <a:spAutoFit/>
+          </a:bodyPr>
+          <a:lstStyle/>
+          <a:p>
+            <a:r>
+              <a:rPr lang="en-US" sz="1100" b="1" dirty="0"/>
+              <a:t>Train station docking sensor [</a:t>
+            </a:r>
+            <a:r>
+              <a:rPr lang="en-US" sz="1100" b="1" dirty="0">
+                <a:solidFill>
+                  <a:schemeClr val="tx1">
+                    <a:lumMod val="50000"/>
+                    <a:lumOff val="50000"/>
+                  </a:schemeClr>
+                </a:solidFill>
+              </a:rPr>
+              <a:t>Gray: not triggered</a:t>
+            </a:r>
+            <a:r>
+              <a:rPr lang="en-US" sz="1100" b="1" dirty="0"/>
+              <a:t>] </a:t>
+            </a:r>
+            <a:endParaRPr lang="en-SG" sz="1100" b="1" dirty="0"/>
+          </a:p>
+        </p:txBody>
+      </p:sp>
+      <p:sp>
+        <p:nvSpPr>
+          <p:cNvPr id="27" name="TextBox 26">
+            <a:extLst>
+              <a:ext uri="{FF2B5EF4-FFF2-40B4-BE49-F238E27FC236}">
+                <a16:creationId xmlns:a16="http://schemas.microsoft.com/office/drawing/2014/main" id="{26DE6CE7-3EE4-B40A-FD35-5799F8776F93}"/>
+              </a:ext>
+            </a:extLst>
+          </p:cNvPr>
+          <p:cNvSpPr txBox="1"/>
+          <p:nvPr/>
+        </p:nvSpPr>
+        <p:spPr>
+          <a:xfrm>
+            <a:off x="10699108" y="3014934"/>
+            <a:ext cx="1543442" cy="600164"/>
+          </a:xfrm>
+          <a:prstGeom prst="rect">
+            <a:avLst/>
+          </a:prstGeom>
+          <a:noFill/>
+        </p:spPr>
+        <p:txBody>
+          <a:bodyPr wrap="square" rtlCol="0">
+            <a:spAutoFit/>
+          </a:bodyPr>
+          <a:lstStyle/>
+          <a:p>
+            <a:r>
+              <a:rPr lang="en-US" sz="1100" b="1" dirty="0"/>
+              <a:t>Train station docking sensor triggered  [</a:t>
+            </a:r>
+            <a:r>
+              <a:rPr lang="en-US" sz="1100" b="1" dirty="0">
+                <a:solidFill>
+                  <a:schemeClr val="tx2">
+                    <a:lumMod val="75000"/>
+                    <a:lumOff val="25000"/>
+                  </a:schemeClr>
+                </a:solidFill>
+              </a:rPr>
+              <a:t>Blue: triggered</a:t>
+            </a:r>
+            <a:r>
+              <a:rPr lang="en-US" sz="1100" b="1" dirty="0"/>
+              <a:t>] ] </a:t>
+            </a:r>
+            <a:endParaRPr lang="en-SG" sz="1100" b="1" dirty="0"/>
+          </a:p>
+        </p:txBody>
+      </p:sp>
+      <p:cxnSp>
+        <p:nvCxnSpPr>
+          <p:cNvPr id="30" name="Straight Arrow Connector 29">
+            <a:extLst>
+              <a:ext uri="{FF2B5EF4-FFF2-40B4-BE49-F238E27FC236}">
+                <a16:creationId xmlns:a16="http://schemas.microsoft.com/office/drawing/2014/main" id="{8C87F444-B0E0-7E4B-9654-4CE433D71263}"/>
+              </a:ext>
+            </a:extLst>
+          </p:cNvPr>
+          <p:cNvCxnSpPr>
+            <a:cxnSpLocks/>
+          </p:cNvCxnSpPr>
+          <p:nvPr/>
+        </p:nvCxnSpPr>
+        <p:spPr>
+          <a:xfrm flipH="1">
+            <a:off x="10222619" y="4124732"/>
+            <a:ext cx="527103" cy="0"/>
+          </a:xfrm>
+          <a:prstGeom prst="straightConnector1">
+            <a:avLst/>
+          </a:prstGeom>
+          <a:ln w="19050">
+            <a:solidFill>
+              <a:schemeClr val="tx2">
+                <a:lumMod val="50000"/>
+                <a:lumOff val="50000"/>
+              </a:schemeClr>
+            </a:solidFill>
+            <a:prstDash val="sysDash"/>
+            <a:tailEnd type="triangle"/>
+          </a:ln>
+        </p:spPr>
+        <p:style>
+          <a:lnRef idx="1">
+            <a:schemeClr val="accent5"/>
+          </a:lnRef>
+          <a:fillRef idx="0">
+            <a:schemeClr val="accent5"/>
+          </a:fillRef>
+          <a:effectRef idx="0">
+            <a:schemeClr val="accent5"/>
+          </a:effectRef>
+          <a:fontRef idx="minor">
+            <a:schemeClr val="tx1"/>
+          </a:fontRef>
+        </p:style>
+      </p:cxnSp>
+      <p:sp>
+        <p:nvSpPr>
+          <p:cNvPr id="32" name="TextBox 31">
+            <a:extLst>
+              <a:ext uri="{FF2B5EF4-FFF2-40B4-BE49-F238E27FC236}">
+                <a16:creationId xmlns:a16="http://schemas.microsoft.com/office/drawing/2014/main" id="{73890307-BC4C-CFD0-5588-2D208F235E8D}"/>
+              </a:ext>
+            </a:extLst>
+          </p:cNvPr>
+          <p:cNvSpPr txBox="1"/>
+          <p:nvPr/>
+        </p:nvSpPr>
+        <p:spPr>
+          <a:xfrm>
+            <a:off x="9354828" y="35283"/>
+            <a:ext cx="1858930" cy="430887"/>
+          </a:xfrm>
+          <a:prstGeom prst="rect">
+            <a:avLst/>
+          </a:prstGeom>
+          <a:noFill/>
+        </p:spPr>
+        <p:txBody>
+          <a:bodyPr wrap="square" rtlCol="0">
+            <a:spAutoFit/>
+          </a:bodyPr>
+          <a:lstStyle/>
+          <a:p>
+            <a:r>
+              <a:rPr lang="en-US" sz="1100" b="1" dirty="0"/>
+              <a:t>Train station signal [</a:t>
+            </a:r>
+            <a:r>
+              <a:rPr lang="en-US" sz="1100" b="1" dirty="0">
+                <a:solidFill>
+                  <a:schemeClr val="accent6">
+                    <a:lumMod val="75000"/>
+                  </a:schemeClr>
+                </a:solidFill>
+              </a:rPr>
+              <a:t>Green: Signal off </a:t>
+            </a:r>
+            <a:r>
+              <a:rPr lang="en-US" sz="1100" b="1" dirty="0"/>
+              <a:t>] </a:t>
+            </a:r>
+            <a:endParaRPr lang="en-SG" sz="1100" b="1" dirty="0"/>
+          </a:p>
+        </p:txBody>
+      </p:sp>
+      <p:sp>
+        <p:nvSpPr>
+          <p:cNvPr id="36" name="TextBox 35">
+            <a:extLst>
+              <a:ext uri="{FF2B5EF4-FFF2-40B4-BE49-F238E27FC236}">
+                <a16:creationId xmlns:a16="http://schemas.microsoft.com/office/drawing/2014/main" id="{4523233D-A8A2-13B4-41B5-8A6AE70D3470}"/>
+              </a:ext>
+            </a:extLst>
+          </p:cNvPr>
+          <p:cNvSpPr txBox="1"/>
+          <p:nvPr/>
+        </p:nvSpPr>
+        <p:spPr>
+          <a:xfrm>
+            <a:off x="10749722" y="3975553"/>
+            <a:ext cx="1216075" cy="261610"/>
+          </a:xfrm>
+          <a:prstGeom prst="rect">
+            <a:avLst/>
+          </a:prstGeom>
+          <a:noFill/>
+        </p:spPr>
+        <p:txBody>
+          <a:bodyPr wrap="square" rtlCol="0">
+            <a:spAutoFit/>
+          </a:bodyPr>
+          <a:lstStyle/>
+          <a:p>
+            <a:r>
+              <a:rPr lang="en-US" sz="1100" b="1" dirty="0"/>
+              <a:t>PLC information </a:t>
+            </a:r>
+            <a:endParaRPr lang="en-SG" sz="1100" b="1" dirty="0"/>
+          </a:p>
+        </p:txBody>
+      </p:sp>
+      <p:sp>
+        <p:nvSpPr>
+          <p:cNvPr id="41" name="TextBox 40">
+            <a:extLst>
+              <a:ext uri="{FF2B5EF4-FFF2-40B4-BE49-F238E27FC236}">
+                <a16:creationId xmlns:a16="http://schemas.microsoft.com/office/drawing/2014/main" id="{7A8C39CA-2AEC-2C79-5CD2-0276BE4791ED}"/>
+              </a:ext>
+            </a:extLst>
+          </p:cNvPr>
+          <p:cNvSpPr txBox="1"/>
+          <p:nvPr/>
+        </p:nvSpPr>
+        <p:spPr>
+          <a:xfrm>
+            <a:off x="10732802" y="4888179"/>
+            <a:ext cx="1287991" cy="461665"/>
+          </a:xfrm>
+          <a:prstGeom prst="rect">
+            <a:avLst/>
+          </a:prstGeom>
+          <a:noFill/>
+        </p:spPr>
+        <p:txBody>
+          <a:bodyPr wrap="square" rtlCol="0">
+            <a:spAutoFit/>
+          </a:bodyPr>
+          <a:lstStyle/>
+          <a:p>
+            <a:r>
+              <a:rPr lang="en-US" sz="1100" b="1" dirty="0"/>
+              <a:t>PLC coil state </a:t>
+            </a:r>
+          </a:p>
+          <a:p>
+            <a:r>
+              <a:rPr lang="en-US" sz="1100" b="1" dirty="0"/>
+              <a:t>[ voltage high</a:t>
+            </a:r>
+            <a:r>
+              <a:rPr lang="en-US" sz="1200" b="1" dirty="0"/>
+              <a:t>]</a:t>
+            </a:r>
+            <a:endParaRPr lang="en-SG" sz="1200" b="1" dirty="0"/>
+          </a:p>
+        </p:txBody>
+      </p:sp>
+      <p:cxnSp>
+        <p:nvCxnSpPr>
+          <p:cNvPr id="43" name="Straight Arrow Connector 42">
+            <a:extLst>
+              <a:ext uri="{FF2B5EF4-FFF2-40B4-BE49-F238E27FC236}">
+                <a16:creationId xmlns:a16="http://schemas.microsoft.com/office/drawing/2014/main" id="{1C759319-84F2-F165-5E5B-E09420087BBB}"/>
+              </a:ext>
+            </a:extLst>
+          </p:cNvPr>
+          <p:cNvCxnSpPr>
+            <a:cxnSpLocks/>
+          </p:cNvCxnSpPr>
+          <p:nvPr/>
+        </p:nvCxnSpPr>
+        <p:spPr>
+          <a:xfrm flipH="1">
+            <a:off x="10191677" y="4543837"/>
+            <a:ext cx="558045" cy="1"/>
+          </a:xfrm>
+          <a:prstGeom prst="straightConnector1">
+            <a:avLst/>
+          </a:prstGeom>
+          <a:ln w="19050">
+            <a:solidFill>
+              <a:schemeClr val="tx2">
+                <a:lumMod val="50000"/>
+                <a:lumOff val="50000"/>
+              </a:schemeClr>
+            </a:solidFill>
+            <a:prstDash val="sysDash"/>
+            <a:tailEnd type="triangle"/>
+          </a:ln>
+        </p:spPr>
+        <p:style>
+          <a:lnRef idx="1">
+            <a:schemeClr val="accent5"/>
+          </a:lnRef>
+          <a:fillRef idx="0">
+            <a:schemeClr val="accent5"/>
+          </a:fillRef>
+          <a:effectRef idx="0">
+            <a:schemeClr val="accent5"/>
+          </a:effectRef>
+          <a:fontRef idx="minor">
+            <a:schemeClr val="tx1"/>
+          </a:fontRef>
+        </p:style>
+      </p:cxnSp>
+      <p:sp>
+        <p:nvSpPr>
+          <p:cNvPr id="44" name="TextBox 43">
+            <a:extLst>
+              <a:ext uri="{FF2B5EF4-FFF2-40B4-BE49-F238E27FC236}">
+                <a16:creationId xmlns:a16="http://schemas.microsoft.com/office/drawing/2014/main" id="{2EB1A829-31E0-2798-DD5D-348A9178427C}"/>
+              </a:ext>
+            </a:extLst>
+          </p:cNvPr>
+          <p:cNvSpPr txBox="1"/>
+          <p:nvPr/>
+        </p:nvSpPr>
+        <p:spPr>
+          <a:xfrm>
+            <a:off x="10761644" y="4362078"/>
+            <a:ext cx="1288442" cy="430887"/>
+          </a:xfrm>
+          <a:prstGeom prst="rect">
+            <a:avLst/>
+          </a:prstGeom>
+          <a:noFill/>
+        </p:spPr>
+        <p:txBody>
+          <a:bodyPr wrap="square" rtlCol="0">
+            <a:spAutoFit/>
+          </a:bodyPr>
+          <a:lstStyle/>
+          <a:p>
+            <a:r>
+              <a:rPr lang="en-US" sz="1100" b="1" dirty="0"/>
+              <a:t>PLC coil state </a:t>
+            </a:r>
+          </a:p>
+          <a:p>
+            <a:r>
+              <a:rPr lang="en-US" sz="1100" b="1" dirty="0"/>
+              <a:t>[ voltage low]</a:t>
+            </a:r>
+            <a:endParaRPr lang="en-SG" sz="1100" b="1" dirty="0"/>
+          </a:p>
+        </p:txBody>
+      </p:sp>
+      <p:sp>
+        <p:nvSpPr>
+          <p:cNvPr id="49" name="TextBox 48">
+            <a:extLst>
+              <a:ext uri="{FF2B5EF4-FFF2-40B4-BE49-F238E27FC236}">
+                <a16:creationId xmlns:a16="http://schemas.microsoft.com/office/drawing/2014/main" id="{A0AFCDAC-D6B4-6859-0CB4-9A6EA1B4EDEA}"/>
+              </a:ext>
+            </a:extLst>
+          </p:cNvPr>
+          <p:cNvSpPr txBox="1"/>
+          <p:nvPr/>
+        </p:nvSpPr>
+        <p:spPr>
+          <a:xfrm>
+            <a:off x="1425202" y="6274046"/>
+            <a:ext cx="1908838" cy="430887"/>
+          </a:xfrm>
+          <a:prstGeom prst="rect">
+            <a:avLst/>
+          </a:prstGeom>
+          <a:noFill/>
+        </p:spPr>
+        <p:txBody>
+          <a:bodyPr wrap="square" rtlCol="0">
+            <a:spAutoFit/>
+          </a:bodyPr>
+          <a:lstStyle/>
+          <a:p>
+            <a:r>
+              <a:rPr lang="en-US" sz="1100" b="1" dirty="0"/>
+              <a:t>PLC Contact input [Physical World Sensor ID]</a:t>
+            </a:r>
+            <a:endParaRPr lang="en-SG" sz="1100" b="1" dirty="0"/>
+          </a:p>
+        </p:txBody>
+      </p:sp>
+      <p:sp>
+        <p:nvSpPr>
+          <p:cNvPr id="52" name="TextBox 51">
+            <a:extLst>
+              <a:ext uri="{FF2B5EF4-FFF2-40B4-BE49-F238E27FC236}">
+                <a16:creationId xmlns:a16="http://schemas.microsoft.com/office/drawing/2014/main" id="{28F48971-C00D-2E27-6C3B-8D6C2CA5557C}"/>
+              </a:ext>
+            </a:extLst>
+          </p:cNvPr>
+          <p:cNvSpPr txBox="1"/>
+          <p:nvPr/>
+        </p:nvSpPr>
+        <p:spPr>
+          <a:xfrm>
+            <a:off x="3222702" y="6282845"/>
+            <a:ext cx="1735042" cy="430887"/>
+          </a:xfrm>
+          <a:prstGeom prst="rect">
+            <a:avLst/>
+          </a:prstGeom>
+          <a:noFill/>
+        </p:spPr>
+        <p:txBody>
+          <a:bodyPr wrap="square" rtlCol="0">
+            <a:spAutoFit/>
+          </a:bodyPr>
+          <a:lstStyle/>
+          <a:p>
+            <a:r>
+              <a:rPr lang="en-US" sz="1100" b="1" dirty="0"/>
+              <a:t>PLC Contact input [empty]</a:t>
+            </a:r>
+            <a:endParaRPr lang="en-SG" sz="1100" b="1" dirty="0"/>
+          </a:p>
+        </p:txBody>
+      </p:sp>
+      <p:sp>
+        <p:nvSpPr>
+          <p:cNvPr id="55" name="TextBox 54">
+            <a:extLst>
+              <a:ext uri="{FF2B5EF4-FFF2-40B4-BE49-F238E27FC236}">
+                <a16:creationId xmlns:a16="http://schemas.microsoft.com/office/drawing/2014/main" id="{8E6A0C99-E9F0-5C41-AA83-18D6A82886C0}"/>
+              </a:ext>
+            </a:extLst>
+          </p:cNvPr>
+          <p:cNvSpPr txBox="1"/>
+          <p:nvPr/>
+        </p:nvSpPr>
+        <p:spPr>
+          <a:xfrm>
+            <a:off x="5136039" y="6251514"/>
+            <a:ext cx="2165025" cy="461665"/>
+          </a:xfrm>
+          <a:prstGeom prst="rect">
+            <a:avLst/>
+          </a:prstGeom>
+          <a:noFill/>
+        </p:spPr>
+        <p:txBody>
+          <a:bodyPr wrap="square" rtlCol="0">
+            <a:spAutoFit/>
+          </a:bodyPr>
+          <a:lstStyle/>
+          <a:p>
+            <a:r>
+              <a:rPr lang="en-US" sz="1200" b="1" dirty="0"/>
+              <a:t>PLC register state </a:t>
+            </a:r>
+          </a:p>
+          <a:p>
+            <a:r>
+              <a:rPr lang="en-US" sz="1200" b="1" dirty="0"/>
+              <a:t>[ </a:t>
+            </a:r>
+            <a:r>
+              <a:rPr lang="en-US" sz="1200" b="1" dirty="0">
+                <a:solidFill>
+                  <a:schemeClr val="accent6">
+                    <a:lumMod val="75000"/>
+                  </a:schemeClr>
+                </a:solidFill>
+              </a:rPr>
+              <a:t>Green: set</a:t>
+            </a:r>
+            <a:r>
+              <a:rPr lang="en-US" sz="1200" b="1" dirty="0"/>
+              <a:t>]</a:t>
+            </a:r>
+            <a:endParaRPr lang="en-SG" sz="1200" b="1" dirty="0"/>
+          </a:p>
+        </p:txBody>
+      </p:sp>
+      <p:sp>
+        <p:nvSpPr>
+          <p:cNvPr id="57" name="TextBox 56">
+            <a:extLst>
+              <a:ext uri="{FF2B5EF4-FFF2-40B4-BE49-F238E27FC236}">
+                <a16:creationId xmlns:a16="http://schemas.microsoft.com/office/drawing/2014/main" id="{F2B08E00-E46C-47D6-2612-DCAE6F1B7D6A}"/>
+              </a:ext>
+            </a:extLst>
+          </p:cNvPr>
+          <p:cNvSpPr txBox="1"/>
+          <p:nvPr/>
+        </p:nvSpPr>
+        <p:spPr>
+          <a:xfrm>
+            <a:off x="6525614" y="6258657"/>
+            <a:ext cx="1465693" cy="461665"/>
+          </a:xfrm>
+          <a:prstGeom prst="rect">
+            <a:avLst/>
+          </a:prstGeom>
+          <a:noFill/>
+        </p:spPr>
+        <p:txBody>
+          <a:bodyPr wrap="square" rtlCol="0">
+            <a:spAutoFit/>
+          </a:bodyPr>
+          <a:lstStyle/>
+          <a:p>
+            <a:r>
+              <a:rPr lang="en-US" sz="1200" b="1" dirty="0"/>
+              <a:t>PLC register state </a:t>
+            </a:r>
+          </a:p>
+          <a:p>
+            <a:r>
+              <a:rPr lang="en-US" sz="1200" b="1" dirty="0"/>
+              <a:t>[ </a:t>
+            </a:r>
+            <a:r>
+              <a:rPr lang="en-US" sz="1200" b="1" dirty="0">
+                <a:solidFill>
+                  <a:schemeClr val="tx1">
+                    <a:lumMod val="50000"/>
+                    <a:lumOff val="50000"/>
+                  </a:schemeClr>
+                </a:solidFill>
+              </a:rPr>
+              <a:t>Gray: clear</a:t>
+            </a:r>
+            <a:r>
+              <a:rPr lang="en-US" sz="1200" b="1" dirty="0"/>
+              <a:t>]</a:t>
+            </a:r>
+            <a:endParaRPr lang="en-SG" sz="1200" b="1" dirty="0"/>
+          </a:p>
+        </p:txBody>
+      </p:sp>
+      <p:cxnSp>
+        <p:nvCxnSpPr>
+          <p:cNvPr id="58" name="Straight Arrow Connector 57">
+            <a:extLst>
+              <a:ext uri="{FF2B5EF4-FFF2-40B4-BE49-F238E27FC236}">
+                <a16:creationId xmlns:a16="http://schemas.microsoft.com/office/drawing/2014/main" id="{BC61AC87-B003-88F2-E291-F711A672573A}"/>
+              </a:ext>
+            </a:extLst>
+          </p:cNvPr>
+          <p:cNvCxnSpPr>
+            <a:cxnSpLocks/>
+          </p:cNvCxnSpPr>
+          <p:nvPr/>
+        </p:nvCxnSpPr>
+        <p:spPr>
+          <a:xfrm flipH="1" flipV="1">
+            <a:off x="8790874" y="5263784"/>
+            <a:ext cx="1" cy="1035987"/>
+          </a:xfrm>
+          <a:prstGeom prst="straightConnector1">
+            <a:avLst/>
+          </a:prstGeom>
+          <a:ln w="19050">
+            <a:solidFill>
+              <a:schemeClr val="tx2">
+                <a:lumMod val="50000"/>
+                <a:lumOff val="50000"/>
+              </a:schemeClr>
+            </a:solidFill>
+            <a:prstDash val="sysDash"/>
+            <a:tailEnd type="triangle"/>
+          </a:ln>
+        </p:spPr>
+        <p:style>
+          <a:lnRef idx="1">
+            <a:schemeClr val="accent5"/>
+          </a:lnRef>
+          <a:fillRef idx="0">
+            <a:schemeClr val="accent5"/>
+          </a:fillRef>
+          <a:effectRef idx="0">
+            <a:schemeClr val="accent5"/>
+          </a:effectRef>
+          <a:fontRef idx="minor">
+            <a:schemeClr val="tx1"/>
+          </a:fontRef>
+        </p:style>
+      </p:cxnSp>
+      <p:sp>
+        <p:nvSpPr>
+          <p:cNvPr id="61" name="TextBox 60">
+            <a:extLst>
+              <a:ext uri="{FF2B5EF4-FFF2-40B4-BE49-F238E27FC236}">
+                <a16:creationId xmlns:a16="http://schemas.microsoft.com/office/drawing/2014/main" id="{5C0945E9-C7FA-D6DB-434B-6BA3170FAEA0}"/>
+              </a:ext>
+            </a:extLst>
+          </p:cNvPr>
+          <p:cNvSpPr txBox="1"/>
+          <p:nvPr/>
+        </p:nvSpPr>
+        <p:spPr>
+          <a:xfrm>
+            <a:off x="10775606" y="5471047"/>
+            <a:ext cx="1164305" cy="446276"/>
+          </a:xfrm>
+          <a:prstGeom prst="rect">
+            <a:avLst/>
+          </a:prstGeom>
+          <a:noFill/>
+        </p:spPr>
+        <p:txBody>
+          <a:bodyPr wrap="square" rtlCol="0">
+            <a:spAutoFit/>
+          </a:bodyPr>
+          <a:lstStyle/>
+          <a:p>
+            <a:r>
+              <a:rPr lang="en-US" sz="1100" b="1" dirty="0"/>
+              <a:t>PLC coil output [empty</a:t>
+            </a:r>
+            <a:r>
+              <a:rPr lang="en-US" sz="1200" b="1" dirty="0"/>
+              <a:t>]</a:t>
+            </a:r>
+            <a:endParaRPr lang="en-SG" sz="1200" b="1" dirty="0"/>
+          </a:p>
+        </p:txBody>
+      </p:sp>
+      <p:cxnSp>
+        <p:nvCxnSpPr>
+          <p:cNvPr id="11" name="Connector: Elbow 10">
+            <a:extLst>
+              <a:ext uri="{FF2B5EF4-FFF2-40B4-BE49-F238E27FC236}">
+                <a16:creationId xmlns:a16="http://schemas.microsoft.com/office/drawing/2014/main" id="{76CE4372-DC01-32D0-01CD-0778A3F6C234}"/>
+              </a:ext>
+            </a:extLst>
+          </p:cNvPr>
+          <p:cNvCxnSpPr>
+            <a:cxnSpLocks/>
+            <a:stCxn id="10" idx="2"/>
+          </p:cNvCxnSpPr>
+          <p:nvPr/>
+        </p:nvCxnSpPr>
+        <p:spPr>
+          <a:xfrm rot="5400000">
+            <a:off x="10523153" y="1055959"/>
+            <a:ext cx="223593" cy="1561061"/>
+          </a:xfrm>
+          <a:prstGeom prst="bentConnector2">
+            <a:avLst/>
+          </a:prstGeom>
+          <a:ln>
+            <a:solidFill>
+              <a:schemeClr val="tx2">
+                <a:lumMod val="50000"/>
+                <a:lumOff val="50000"/>
+              </a:schemeClr>
+            </a:solidFill>
+            <a:prstDash val="sysDash"/>
+            <a:tailEnd type="triangle"/>
+          </a:ln>
+        </p:spPr>
+        <p:style>
+          <a:lnRef idx="2">
+            <a:schemeClr val="accent1"/>
+          </a:lnRef>
+          <a:fillRef idx="0">
+            <a:schemeClr val="accent1"/>
+          </a:fillRef>
+          <a:effectRef idx="1">
+            <a:schemeClr val="accent1"/>
+          </a:effectRef>
+          <a:fontRef idx="minor">
+            <a:schemeClr val="tx1"/>
+          </a:fontRef>
+        </p:style>
+      </p:cxnSp>
+      <p:cxnSp>
+        <p:nvCxnSpPr>
+          <p:cNvPr id="40" name="Connector: Elbow 39">
+            <a:extLst>
+              <a:ext uri="{FF2B5EF4-FFF2-40B4-BE49-F238E27FC236}">
+                <a16:creationId xmlns:a16="http://schemas.microsoft.com/office/drawing/2014/main" id="{956C986D-A98D-7C07-0A2E-CBE1B1C5F213}"/>
+              </a:ext>
+            </a:extLst>
+          </p:cNvPr>
+          <p:cNvCxnSpPr>
+            <a:cxnSpLocks/>
+            <a:stCxn id="23" idx="2"/>
+          </p:cNvCxnSpPr>
+          <p:nvPr/>
+        </p:nvCxnSpPr>
+        <p:spPr>
+          <a:xfrm rot="5400000" flipH="1">
+            <a:off x="8321197" y="-431199"/>
+            <a:ext cx="96980" cy="6126389"/>
+          </a:xfrm>
+          <a:prstGeom prst="bentConnector4">
+            <a:avLst>
+              <a:gd name="adj1" fmla="val -235719"/>
+              <a:gd name="adj2" fmla="val 100042"/>
+            </a:avLst>
+          </a:prstGeom>
+          <a:ln>
+            <a:solidFill>
+              <a:schemeClr val="tx2">
+                <a:lumMod val="50000"/>
+                <a:lumOff val="50000"/>
+              </a:schemeClr>
+            </a:solidFill>
+            <a:prstDash val="sysDash"/>
+            <a:tailEnd type="triangle"/>
+          </a:ln>
+        </p:spPr>
+        <p:style>
+          <a:lnRef idx="2">
+            <a:schemeClr val="accent1"/>
+          </a:lnRef>
+          <a:fillRef idx="0">
+            <a:schemeClr val="accent1"/>
+          </a:fillRef>
+          <a:effectRef idx="1">
+            <a:schemeClr val="accent1"/>
+          </a:effectRef>
+          <a:fontRef idx="minor">
+            <a:schemeClr val="tx1"/>
+          </a:fontRef>
+        </p:style>
+      </p:cxnSp>
+      <p:cxnSp>
+        <p:nvCxnSpPr>
+          <p:cNvPr id="54" name="Connector: Elbow 53">
+            <a:extLst>
+              <a:ext uri="{FF2B5EF4-FFF2-40B4-BE49-F238E27FC236}">
+                <a16:creationId xmlns:a16="http://schemas.microsoft.com/office/drawing/2014/main" id="{1D6D3FCE-9DCD-7D2B-D398-13911B546396}"/>
+              </a:ext>
+            </a:extLst>
+          </p:cNvPr>
+          <p:cNvCxnSpPr>
+            <a:cxnSpLocks/>
+            <a:stCxn id="27" idx="2"/>
+          </p:cNvCxnSpPr>
+          <p:nvPr/>
+        </p:nvCxnSpPr>
+        <p:spPr>
+          <a:xfrm rot="5400000" flipH="1">
+            <a:off x="6689692" y="-1166038"/>
+            <a:ext cx="1901445" cy="7660829"/>
+          </a:xfrm>
+          <a:prstGeom prst="bentConnector4">
+            <a:avLst>
+              <a:gd name="adj1" fmla="val -2003"/>
+              <a:gd name="adj2" fmla="val 99797"/>
+            </a:avLst>
+          </a:prstGeom>
+          <a:ln>
+            <a:solidFill>
+              <a:schemeClr val="tx2">
+                <a:lumMod val="50000"/>
+                <a:lumOff val="50000"/>
+              </a:schemeClr>
+            </a:solidFill>
+            <a:prstDash val="sysDash"/>
+            <a:tailEnd type="triangle"/>
+          </a:ln>
+        </p:spPr>
+        <p:style>
+          <a:lnRef idx="2">
+            <a:schemeClr val="accent1"/>
+          </a:lnRef>
+          <a:fillRef idx="0">
+            <a:schemeClr val="accent1"/>
+          </a:fillRef>
+          <a:effectRef idx="1">
+            <a:schemeClr val="accent1"/>
+          </a:effectRef>
+          <a:fontRef idx="minor">
+            <a:schemeClr val="tx1"/>
+          </a:fontRef>
+        </p:style>
+      </p:cxnSp>
+      <p:cxnSp>
+        <p:nvCxnSpPr>
+          <p:cNvPr id="69" name="Connector: Elbow 68">
+            <a:extLst>
+              <a:ext uri="{FF2B5EF4-FFF2-40B4-BE49-F238E27FC236}">
+                <a16:creationId xmlns:a16="http://schemas.microsoft.com/office/drawing/2014/main" id="{561A1AD8-06D9-31A5-FF7A-94B7D46979B9}"/>
+              </a:ext>
+            </a:extLst>
+          </p:cNvPr>
+          <p:cNvCxnSpPr>
+            <a:cxnSpLocks/>
+            <a:stCxn id="41" idx="1"/>
+          </p:cNvCxnSpPr>
+          <p:nvPr/>
+        </p:nvCxnSpPr>
+        <p:spPr>
+          <a:xfrm rot="10800000">
+            <a:off x="6868698" y="4780992"/>
+            <a:ext cx="3864105" cy="338020"/>
+          </a:xfrm>
+          <a:prstGeom prst="bentConnector3">
+            <a:avLst>
+              <a:gd name="adj1" fmla="val 99793"/>
+            </a:avLst>
+          </a:prstGeom>
+          <a:ln>
+            <a:solidFill>
+              <a:schemeClr val="tx2">
+                <a:lumMod val="75000"/>
+                <a:lumOff val="25000"/>
+              </a:schemeClr>
+            </a:solidFill>
+            <a:prstDash val="sysDash"/>
+            <a:tailEnd type="triangle"/>
+          </a:ln>
+        </p:spPr>
+        <p:style>
+          <a:lnRef idx="2">
+            <a:schemeClr val="accent1"/>
+          </a:lnRef>
+          <a:fillRef idx="0">
+            <a:schemeClr val="accent1"/>
+          </a:fillRef>
+          <a:effectRef idx="1">
+            <a:schemeClr val="accent1"/>
+          </a:effectRef>
+          <a:fontRef idx="minor">
+            <a:schemeClr val="tx1"/>
+          </a:fontRef>
+        </p:style>
+      </p:cxnSp>
+      <p:cxnSp>
+        <p:nvCxnSpPr>
+          <p:cNvPr id="74" name="Connector: Elbow 73">
+            <a:extLst>
+              <a:ext uri="{FF2B5EF4-FFF2-40B4-BE49-F238E27FC236}">
+                <a16:creationId xmlns:a16="http://schemas.microsoft.com/office/drawing/2014/main" id="{4EFF1649-C2D2-3FFA-53F1-A03E657FD9B6}"/>
+              </a:ext>
+            </a:extLst>
+          </p:cNvPr>
+          <p:cNvCxnSpPr>
+            <a:cxnSpLocks/>
+            <a:stCxn id="61" idx="1"/>
+          </p:cNvCxnSpPr>
+          <p:nvPr/>
+        </p:nvCxnSpPr>
+        <p:spPr>
+          <a:xfrm rot="10800000">
+            <a:off x="10284294" y="5280821"/>
+            <a:ext cx="491313" cy="413364"/>
+          </a:xfrm>
+          <a:prstGeom prst="bentConnector3">
+            <a:avLst>
+              <a:gd name="adj1" fmla="val 102345"/>
+            </a:avLst>
+          </a:prstGeom>
+          <a:ln>
+            <a:solidFill>
+              <a:schemeClr val="tx2">
+                <a:lumMod val="50000"/>
+                <a:lumOff val="50000"/>
+              </a:schemeClr>
+            </a:solidFill>
+            <a:prstDash val="sysDash"/>
+            <a:tailEnd type="triangle"/>
+          </a:ln>
+        </p:spPr>
+        <p:style>
+          <a:lnRef idx="2">
+            <a:schemeClr val="accent1"/>
+          </a:lnRef>
+          <a:fillRef idx="0">
+            <a:schemeClr val="accent1"/>
+          </a:fillRef>
+          <a:effectRef idx="1">
+            <a:schemeClr val="accent1"/>
+          </a:effectRef>
+          <a:fontRef idx="minor">
+            <a:schemeClr val="tx1"/>
+          </a:fontRef>
+        </p:style>
+      </p:cxnSp>
+      <p:sp>
+        <p:nvSpPr>
+          <p:cNvPr id="81" name="TextBox 80">
+            <a:extLst>
+              <a:ext uri="{FF2B5EF4-FFF2-40B4-BE49-F238E27FC236}">
+                <a16:creationId xmlns:a16="http://schemas.microsoft.com/office/drawing/2014/main" id="{A0408637-022E-D565-8EC9-7E74D9C3A3F1}"/>
+              </a:ext>
+            </a:extLst>
+          </p:cNvPr>
+          <p:cNvSpPr txBox="1"/>
+          <p:nvPr/>
+        </p:nvSpPr>
+        <p:spPr>
+          <a:xfrm>
+            <a:off x="8605432" y="6274046"/>
+            <a:ext cx="3360365" cy="261610"/>
+          </a:xfrm>
+          <a:prstGeom prst="rect">
+            <a:avLst/>
+          </a:prstGeom>
+          <a:noFill/>
+        </p:spPr>
+        <p:txBody>
+          <a:bodyPr wrap="square" rtlCol="0">
+            <a:spAutoFit/>
+          </a:bodyPr>
+          <a:lstStyle/>
+          <a:p>
+            <a:r>
+              <a:rPr lang="en-US" sz="1100" b="1" dirty="0"/>
+              <a:t>PLC coil output [Physical World Signal ID]</a:t>
+            </a:r>
+            <a:endParaRPr lang="en-SG" sz="1100" b="1" dirty="0"/>
+          </a:p>
+        </p:txBody>
+      </p:sp>
+      <p:sp>
+        <p:nvSpPr>
+          <p:cNvPr id="83" name="TextBox 82">
+            <a:extLst>
+              <a:ext uri="{FF2B5EF4-FFF2-40B4-BE49-F238E27FC236}">
+                <a16:creationId xmlns:a16="http://schemas.microsoft.com/office/drawing/2014/main" id="{2C4989D6-15E4-A218-A419-19EE116D7F18}"/>
+              </a:ext>
+            </a:extLst>
+          </p:cNvPr>
+          <p:cNvSpPr txBox="1"/>
+          <p:nvPr/>
+        </p:nvSpPr>
+        <p:spPr>
+          <a:xfrm>
+            <a:off x="7943709" y="6258657"/>
+            <a:ext cx="678503" cy="276999"/>
+          </a:xfrm>
+          <a:prstGeom prst="rect">
+            <a:avLst/>
+          </a:prstGeom>
+          <a:noFill/>
+        </p:spPr>
+        <p:txBody>
+          <a:bodyPr wrap="square" rtlCol="0">
+            <a:spAutoFit/>
+          </a:bodyPr>
+          <a:lstStyle/>
+          <a:p>
+            <a:r>
+              <a:rPr lang="en-US" sz="1200" b="1" dirty="0"/>
+              <a:t>Coil ID</a:t>
+            </a:r>
+          </a:p>
+        </p:txBody>
+      </p:sp>
+      <p:cxnSp>
+        <p:nvCxnSpPr>
+          <p:cNvPr id="84" name="Straight Arrow Connector 83">
+            <a:extLst>
+              <a:ext uri="{FF2B5EF4-FFF2-40B4-BE49-F238E27FC236}">
+                <a16:creationId xmlns:a16="http://schemas.microsoft.com/office/drawing/2014/main" id="{8DE62D85-E854-C1D9-80D0-972A3890D403}"/>
+              </a:ext>
+            </a:extLst>
+          </p:cNvPr>
+          <p:cNvCxnSpPr>
+            <a:cxnSpLocks/>
+          </p:cNvCxnSpPr>
+          <p:nvPr/>
+        </p:nvCxnSpPr>
+        <p:spPr>
+          <a:xfrm flipH="1" flipV="1">
+            <a:off x="8100839" y="5263784"/>
+            <a:ext cx="1" cy="1035987"/>
+          </a:xfrm>
+          <a:prstGeom prst="straightConnector1">
+            <a:avLst/>
+          </a:prstGeom>
+          <a:ln w="19050">
+            <a:solidFill>
+              <a:schemeClr val="tx2">
+                <a:lumMod val="50000"/>
+                <a:lumOff val="50000"/>
+              </a:schemeClr>
+            </a:solidFill>
+            <a:prstDash val="sysDash"/>
+            <a:tailEnd type="triangle"/>
+          </a:ln>
+        </p:spPr>
+        <p:style>
+          <a:lnRef idx="1">
+            <a:schemeClr val="accent5"/>
+          </a:lnRef>
+          <a:fillRef idx="0">
+            <a:schemeClr val="accent5"/>
+          </a:fillRef>
+          <a:effectRef idx="0">
+            <a:schemeClr val="accent5"/>
+          </a:effectRef>
+          <a:fontRef idx="minor">
+            <a:schemeClr val="tx1"/>
+          </a:fontRef>
+        </p:style>
+      </p:cxnSp>
+      <p:cxnSp>
+        <p:nvCxnSpPr>
+          <p:cNvPr id="92" name="Connector: Elbow 91">
+            <a:extLst>
+              <a:ext uri="{FF2B5EF4-FFF2-40B4-BE49-F238E27FC236}">
+                <a16:creationId xmlns:a16="http://schemas.microsoft.com/office/drawing/2014/main" id="{5C95DC7E-755B-3920-3C9B-1623CAB3A1C6}"/>
+              </a:ext>
+            </a:extLst>
+          </p:cNvPr>
+          <p:cNvCxnSpPr>
+            <a:cxnSpLocks/>
+          </p:cNvCxnSpPr>
+          <p:nvPr/>
+        </p:nvCxnSpPr>
+        <p:spPr>
+          <a:xfrm rot="16200000" flipV="1">
+            <a:off x="6202970" y="5528840"/>
+            <a:ext cx="847402" cy="612232"/>
+          </a:xfrm>
+          <a:prstGeom prst="bentConnector3">
+            <a:avLst>
+              <a:gd name="adj1" fmla="val 98333"/>
+            </a:avLst>
+          </a:prstGeom>
+          <a:ln>
+            <a:solidFill>
+              <a:schemeClr val="tx2">
+                <a:lumMod val="50000"/>
+                <a:lumOff val="50000"/>
+              </a:schemeClr>
+            </a:solidFill>
+            <a:prstDash val="sysDash"/>
+            <a:tailEnd type="triangle"/>
+          </a:ln>
+        </p:spPr>
+        <p:style>
+          <a:lnRef idx="2">
+            <a:schemeClr val="accent1"/>
+          </a:lnRef>
+          <a:fillRef idx="0">
+            <a:schemeClr val="accent1"/>
+          </a:fillRef>
+          <a:effectRef idx="1">
+            <a:schemeClr val="accent1"/>
+          </a:effectRef>
+          <a:fontRef idx="minor">
+            <a:schemeClr val="tx1"/>
+          </a:fontRef>
+        </p:style>
+      </p:cxnSp>
+      <p:cxnSp>
+        <p:nvCxnSpPr>
+          <p:cNvPr id="98" name="Connector: Elbow 97">
+            <a:extLst>
+              <a:ext uri="{FF2B5EF4-FFF2-40B4-BE49-F238E27FC236}">
+                <a16:creationId xmlns:a16="http://schemas.microsoft.com/office/drawing/2014/main" id="{28379D59-ECF8-34A6-2190-D62D354614D4}"/>
+              </a:ext>
+            </a:extLst>
+          </p:cNvPr>
+          <p:cNvCxnSpPr>
+            <a:cxnSpLocks/>
+            <a:stCxn id="55" idx="1"/>
+          </p:cNvCxnSpPr>
+          <p:nvPr/>
+        </p:nvCxnSpPr>
+        <p:spPr>
+          <a:xfrm rot="10800000">
+            <a:off x="4600125" y="4577521"/>
+            <a:ext cx="535915" cy="1904826"/>
+          </a:xfrm>
+          <a:prstGeom prst="bentConnector2">
+            <a:avLst/>
+          </a:prstGeom>
+          <a:ln>
+            <a:solidFill>
+              <a:schemeClr val="tx2">
+                <a:lumMod val="50000"/>
+                <a:lumOff val="50000"/>
+              </a:schemeClr>
+            </a:solidFill>
+            <a:prstDash val="sysDash"/>
+            <a:tailEnd type="triangle"/>
+          </a:ln>
+        </p:spPr>
+        <p:style>
+          <a:lnRef idx="2">
+            <a:schemeClr val="accent1"/>
+          </a:lnRef>
+          <a:fillRef idx="0">
+            <a:schemeClr val="accent1"/>
+          </a:fillRef>
+          <a:effectRef idx="1">
+            <a:schemeClr val="accent1"/>
+          </a:effectRef>
+          <a:fontRef idx="minor">
+            <a:schemeClr val="tx1"/>
+          </a:fontRef>
+        </p:style>
+      </p:cxnSp>
+      <p:cxnSp>
+        <p:nvCxnSpPr>
+          <p:cNvPr id="102" name="Connector: Elbow 101">
+            <a:extLst>
+              <a:ext uri="{FF2B5EF4-FFF2-40B4-BE49-F238E27FC236}">
+                <a16:creationId xmlns:a16="http://schemas.microsoft.com/office/drawing/2014/main" id="{1F5D3039-67CD-74DD-ADD9-478CDCF3DD71}"/>
+              </a:ext>
+            </a:extLst>
+          </p:cNvPr>
+          <p:cNvCxnSpPr>
+            <a:cxnSpLocks/>
+            <a:stCxn id="52" idx="0"/>
+          </p:cNvCxnSpPr>
+          <p:nvPr/>
+        </p:nvCxnSpPr>
+        <p:spPr>
+          <a:xfrm rot="16200000" flipV="1">
+            <a:off x="3195300" y="5387921"/>
+            <a:ext cx="439091" cy="1350757"/>
+          </a:xfrm>
+          <a:prstGeom prst="bentConnector2">
+            <a:avLst/>
+          </a:prstGeom>
+          <a:ln>
+            <a:solidFill>
+              <a:schemeClr val="tx2">
+                <a:lumMod val="50000"/>
+                <a:lumOff val="50000"/>
+              </a:schemeClr>
+            </a:solidFill>
+            <a:prstDash val="sysDash"/>
+            <a:tailEnd type="triangle"/>
+          </a:ln>
+        </p:spPr>
+        <p:style>
+          <a:lnRef idx="2">
+            <a:schemeClr val="accent1"/>
+          </a:lnRef>
+          <a:fillRef idx="0">
+            <a:schemeClr val="accent1"/>
+          </a:fillRef>
+          <a:effectRef idx="1">
+            <a:schemeClr val="accent1"/>
+          </a:effectRef>
+          <a:fontRef idx="minor">
+            <a:schemeClr val="tx1"/>
+          </a:fontRef>
+        </p:style>
+      </p:cxnSp>
+      <p:cxnSp>
+        <p:nvCxnSpPr>
+          <p:cNvPr id="105" name="Connector: Elbow 104">
+            <a:extLst>
+              <a:ext uri="{FF2B5EF4-FFF2-40B4-BE49-F238E27FC236}">
+                <a16:creationId xmlns:a16="http://schemas.microsoft.com/office/drawing/2014/main" id="{00EA64DE-E4B1-A9E6-A58D-1AFFC532CE08}"/>
+              </a:ext>
+            </a:extLst>
+          </p:cNvPr>
+          <p:cNvCxnSpPr>
+            <a:cxnSpLocks/>
+            <a:stCxn id="49" idx="0"/>
+          </p:cNvCxnSpPr>
+          <p:nvPr/>
+        </p:nvCxnSpPr>
+        <p:spPr>
+          <a:xfrm rot="16200000" flipV="1">
+            <a:off x="1532546" y="5426971"/>
+            <a:ext cx="430293" cy="1263858"/>
+          </a:xfrm>
+          <a:prstGeom prst="bentConnector2">
+            <a:avLst/>
+          </a:prstGeom>
+          <a:ln>
+            <a:solidFill>
+              <a:schemeClr val="tx2">
+                <a:lumMod val="50000"/>
+                <a:lumOff val="50000"/>
+              </a:schemeClr>
+            </a:solidFill>
+            <a:prstDash val="sysDash"/>
+            <a:tailEnd type="triangle"/>
+          </a:ln>
+        </p:spPr>
+        <p:style>
+          <a:lnRef idx="2">
+            <a:schemeClr val="accent1"/>
+          </a:lnRef>
+          <a:fillRef idx="0">
+            <a:schemeClr val="accent1"/>
+          </a:fillRef>
+          <a:effectRef idx="1">
+            <a:schemeClr val="accent1"/>
+          </a:effectRef>
+          <a:fontRef idx="minor">
+            <a:schemeClr val="tx1"/>
+          </a:fontRef>
+        </p:style>
+      </p:cxnSp>
+      <p:sp>
+        <p:nvSpPr>
+          <p:cNvPr id="110" name="TextBox 109">
+            <a:extLst>
+              <a:ext uri="{FF2B5EF4-FFF2-40B4-BE49-F238E27FC236}">
+                <a16:creationId xmlns:a16="http://schemas.microsoft.com/office/drawing/2014/main" id="{10F2A7DB-A160-AE51-D11A-3DC917E68BBA}"/>
+              </a:ext>
+            </a:extLst>
+          </p:cNvPr>
+          <p:cNvSpPr txBox="1"/>
+          <p:nvPr/>
+        </p:nvSpPr>
+        <p:spPr>
+          <a:xfrm>
+            <a:off x="10799033" y="373433"/>
+            <a:ext cx="1267698" cy="430887"/>
+          </a:xfrm>
+          <a:prstGeom prst="rect">
+            <a:avLst/>
+          </a:prstGeom>
+          <a:noFill/>
+        </p:spPr>
+        <p:txBody>
+          <a:bodyPr wrap="square" rtlCol="0">
+            <a:spAutoFit/>
+          </a:bodyPr>
+          <a:lstStyle/>
+          <a:p>
+            <a:r>
+              <a:rPr lang="en-US" sz="1100" b="1" dirty="0"/>
+              <a:t>Date &amp; Time Indicator </a:t>
+            </a:r>
+            <a:endParaRPr lang="en-SG" sz="1100" b="1" dirty="0"/>
+          </a:p>
+        </p:txBody>
+      </p:sp>
+      <p:cxnSp>
+        <p:nvCxnSpPr>
+          <p:cNvPr id="111" name="Connector: Elbow 110">
+            <a:extLst>
+              <a:ext uri="{FF2B5EF4-FFF2-40B4-BE49-F238E27FC236}">
+                <a16:creationId xmlns:a16="http://schemas.microsoft.com/office/drawing/2014/main" id="{36F0C9C6-0A0B-6D51-8DE4-7714335DBA3E}"/>
+              </a:ext>
+            </a:extLst>
+          </p:cNvPr>
+          <p:cNvCxnSpPr>
+            <a:cxnSpLocks/>
+            <a:stCxn id="110" idx="2"/>
+          </p:cNvCxnSpPr>
+          <p:nvPr/>
+        </p:nvCxnSpPr>
+        <p:spPr>
+          <a:xfrm rot="5400000">
+            <a:off x="10702383" y="408269"/>
+            <a:ext cx="334448" cy="1126550"/>
+          </a:xfrm>
+          <a:prstGeom prst="bentConnector2">
+            <a:avLst/>
+          </a:prstGeom>
+          <a:ln>
+            <a:solidFill>
+              <a:schemeClr val="tx2">
+                <a:lumMod val="50000"/>
+                <a:lumOff val="50000"/>
+              </a:schemeClr>
+            </a:solidFill>
+            <a:prstDash val="sysDash"/>
+            <a:tailEnd type="triangle"/>
+          </a:ln>
+        </p:spPr>
+        <p:style>
+          <a:lnRef idx="2">
+            <a:schemeClr val="accent1"/>
+          </a:lnRef>
+          <a:fillRef idx="0">
+            <a:schemeClr val="accent1"/>
+          </a:fillRef>
+          <a:effectRef idx="1">
+            <a:schemeClr val="accent1"/>
+          </a:effectRef>
+          <a:fontRef idx="minor">
+            <a:schemeClr val="tx1"/>
+          </a:fontRef>
+        </p:style>
+      </p:cxnSp>
+      <p:sp>
+        <p:nvSpPr>
+          <p:cNvPr id="115" name="TextBox 114">
+            <a:extLst>
+              <a:ext uri="{FF2B5EF4-FFF2-40B4-BE49-F238E27FC236}">
+                <a16:creationId xmlns:a16="http://schemas.microsoft.com/office/drawing/2014/main" id="{019510B1-92EF-1ADA-04DE-9793D0676676}"/>
+              </a:ext>
+            </a:extLst>
+          </p:cNvPr>
+          <p:cNvSpPr txBox="1"/>
+          <p:nvPr/>
+        </p:nvSpPr>
+        <p:spPr>
+          <a:xfrm>
+            <a:off x="562701" y="6404851"/>
+            <a:ext cx="927343" cy="261610"/>
+          </a:xfrm>
+          <a:prstGeom prst="rect">
+            <a:avLst/>
+          </a:prstGeom>
+          <a:noFill/>
+        </p:spPr>
+        <p:txBody>
+          <a:bodyPr wrap="square" rtlCol="0">
+            <a:spAutoFit/>
+          </a:bodyPr>
+          <a:lstStyle/>
+          <a:p>
+            <a:r>
+              <a:rPr lang="en-US" sz="1100" b="1" dirty="0"/>
+              <a:t>Mode state</a:t>
+            </a:r>
+          </a:p>
+        </p:txBody>
+      </p:sp>
+      <p:cxnSp>
+        <p:nvCxnSpPr>
+          <p:cNvPr id="116" name="Straight Arrow Connector 115">
+            <a:extLst>
+              <a:ext uri="{FF2B5EF4-FFF2-40B4-BE49-F238E27FC236}">
+                <a16:creationId xmlns:a16="http://schemas.microsoft.com/office/drawing/2014/main" id="{263FBC5A-64EA-1D52-10E1-7E03BBF7648D}"/>
+              </a:ext>
+            </a:extLst>
+          </p:cNvPr>
+          <p:cNvCxnSpPr>
+            <a:cxnSpLocks/>
+          </p:cNvCxnSpPr>
+          <p:nvPr/>
+        </p:nvCxnSpPr>
+        <p:spPr>
+          <a:xfrm flipV="1">
+            <a:off x="854521" y="6251514"/>
+            <a:ext cx="0" cy="193139"/>
+          </a:xfrm>
+          <a:prstGeom prst="straightConnector1">
+            <a:avLst/>
+          </a:prstGeom>
+          <a:ln w="19050">
+            <a:solidFill>
+              <a:schemeClr val="tx2">
+                <a:lumMod val="50000"/>
+                <a:lumOff val="50000"/>
+              </a:schemeClr>
+            </a:solidFill>
+            <a:prstDash val="sysDash"/>
+            <a:tailEnd type="triangle"/>
+          </a:ln>
+        </p:spPr>
+        <p:style>
+          <a:lnRef idx="1">
+            <a:schemeClr val="accent5"/>
+          </a:lnRef>
+          <a:fillRef idx="0">
+            <a:schemeClr val="accent5"/>
+          </a:fillRef>
+          <a:effectRef idx="0">
+            <a:schemeClr val="accent5"/>
+          </a:effectRef>
+          <a:fontRef idx="minor">
+            <a:schemeClr val="tx1"/>
+          </a:fontRef>
+        </p:style>
+      </p:cxnSp>
+    </p:spTree>
+    <p:extLst>
+      <p:ext uri="{BB962C8B-B14F-4D97-AF65-F5344CB8AC3E}">
+        <p14:creationId xmlns:p14="http://schemas.microsoft.com/office/powerpoint/2010/main" val="3264311212"/>
       </p:ext>
     </p:extLst>
   </p:cSld>

</xml_diff>

<commit_message>
update the HMI UI introduction section.
</commit_message>
<xml_diff>
--- a/OT_System_Attack_Case_Study/Railway_HMI_Usage/img/designDoc.pptx
+++ b/OT_System_Attack_Case_Study/Railway_HMI_Usage/img/designDoc.pptx
@@ -5,12 +5,14 @@
     <p:sldMasterId id="2147483648" r:id="rId1"/>
   </p:sldMasterIdLst>
   <p:notesMasterIdLst>
-    <p:notesMasterId r:id="rId5"/>
+    <p:notesMasterId r:id="rId7"/>
   </p:notesMasterIdLst>
   <p:sldIdLst>
     <p:sldId id="256" r:id="rId2"/>
     <p:sldId id="257" r:id="rId3"/>
     <p:sldId id="277" r:id="rId4"/>
+    <p:sldId id="305" r:id="rId5"/>
+    <p:sldId id="306" r:id="rId6"/>
   </p:sldIdLst>
   <p:sldSz cx="12192000" cy="6858000"/>
   <p:notesSz cx="6858000" cy="9144000"/>
@@ -11339,7 +11341,7 @@
         <p:spPr>
           <a:xfrm>
             <a:off x="5136039" y="6251514"/>
-            <a:ext cx="2165025" cy="461665"/>
+            <a:ext cx="2165025" cy="430887"/>
           </a:xfrm>
           <a:prstGeom prst="rect">
             <a:avLst/>
@@ -11353,17 +11355,17 @@
           <a:lstStyle/>
           <a:p>
             <a:r>
-              <a:rPr lang="en-US" sz="1200" b="1" dirty="0"/>
+              <a:rPr lang="en-US" sz="1100" b="1" dirty="0"/>
               <a:t>PLC register state </a:t>
             </a:r>
           </a:p>
           <a:p>
             <a:r>
-              <a:rPr lang="en-US" sz="1200" b="1" dirty="0"/>
+              <a:rPr lang="en-US" sz="1100" b="1" dirty="0"/>
               <a:t>[ </a:t>
             </a:r>
             <a:r>
-              <a:rPr lang="en-US" sz="1200" b="1" dirty="0">
+              <a:rPr lang="en-US" sz="1100" b="1" dirty="0">
                 <a:solidFill>
                   <a:schemeClr val="accent6">
                     <a:lumMod val="75000"/>
@@ -11373,10 +11375,10 @@
               <a:t>Green: set</a:t>
             </a:r>
             <a:r>
-              <a:rPr lang="en-US" sz="1200" b="1" dirty="0"/>
+              <a:rPr lang="en-US" sz="1100" b="1" dirty="0"/>
               <a:t>]</a:t>
             </a:r>
-            <a:endParaRPr lang="en-SG" sz="1200" b="1" dirty="0"/>
+            <a:endParaRPr lang="en-SG" sz="1100" b="1" dirty="0"/>
           </a:p>
         </p:txBody>
       </p:sp>
@@ -11395,7 +11397,7 @@
         <p:spPr>
           <a:xfrm>
             <a:off x="6525614" y="6258657"/>
-            <a:ext cx="1465693" cy="461665"/>
+            <a:ext cx="1465693" cy="430887"/>
           </a:xfrm>
           <a:prstGeom prst="rect">
             <a:avLst/>
@@ -11409,17 +11411,17 @@
           <a:lstStyle/>
           <a:p>
             <a:r>
-              <a:rPr lang="en-US" sz="1200" b="1" dirty="0"/>
+              <a:rPr lang="en-US" sz="1100" b="1" dirty="0"/>
               <a:t>PLC register state </a:t>
             </a:r>
           </a:p>
           <a:p>
             <a:r>
-              <a:rPr lang="en-US" sz="1200" b="1" dirty="0"/>
+              <a:rPr lang="en-US" sz="1100" b="1" dirty="0"/>
               <a:t>[ </a:t>
             </a:r>
             <a:r>
-              <a:rPr lang="en-US" sz="1200" b="1" dirty="0">
+              <a:rPr lang="en-US" sz="1100" b="1" dirty="0">
                 <a:solidFill>
                   <a:schemeClr val="tx1">
                     <a:lumMod val="50000"/>
@@ -11430,10 +11432,10 @@
               <a:t>Gray: clear</a:t>
             </a:r>
             <a:r>
-              <a:rPr lang="en-US" sz="1200" b="1" dirty="0"/>
+              <a:rPr lang="en-US" sz="1100" b="1" dirty="0"/>
               <a:t>]</a:t>
             </a:r>
-            <a:endParaRPr lang="en-SG" sz="1200" b="1" dirty="0"/>
+            <a:endParaRPr lang="en-SG" sz="1100" b="1" dirty="0"/>
           </a:p>
         </p:txBody>
       </p:sp>
@@ -11831,7 +11833,7 @@
         <p:spPr>
           <a:xfrm>
             <a:off x="7943709" y="6258657"/>
-            <a:ext cx="678503" cy="276999"/>
+            <a:ext cx="678503" cy="261610"/>
           </a:xfrm>
           <a:prstGeom prst="rect">
             <a:avLst/>
@@ -11845,7 +11847,7 @@
           <a:lstStyle/>
           <a:p>
             <a:r>
-              <a:rPr lang="en-US" sz="1200" b="1" dirty="0"/>
+              <a:rPr lang="en-US" sz="1100" b="1" dirty="0"/>
               <a:t>Coil ID</a:t>
             </a:r>
           </a:p>
@@ -11966,8 +11968,8 @@
         </p:nvCxnSpPr>
         <p:spPr>
           <a:xfrm rot="10800000">
-            <a:off x="4600125" y="4577521"/>
-            <a:ext cx="535915" cy="1904826"/>
+            <a:off x="4600127" y="4577522"/>
+            <a:ext cx="535913" cy="1889437"/>
           </a:xfrm>
           <a:prstGeom prst="bentConnector2">
             <a:avLst/>
@@ -12268,6 +12270,3643 @@
     <p:extLst>
       <p:ext uri="{BB962C8B-B14F-4D97-AF65-F5344CB8AC3E}">
         <p14:creationId xmlns:p14="http://schemas.microsoft.com/office/powerpoint/2010/main" val="3264311212"/>
+      </p:ext>
+    </p:extLst>
+  </p:cSld>
+  <p:clrMapOvr>
+    <a:masterClrMapping/>
+  </p:clrMapOvr>
+</p:sld>
+</file>
+
+<file path=ppt/slides/slide4.xml><?xml version="1.0" encoding="utf-8"?>
+<p:sld xmlns:a="http://schemas.openxmlformats.org/drawingml/2006/main" xmlns:r="http://schemas.openxmlformats.org/officeDocument/2006/relationships" xmlns:p="http://schemas.openxmlformats.org/presentationml/2006/main">
+  <p:cSld>
+    <p:spTree>
+      <p:nvGrpSpPr>
+        <p:cNvPr id="1" name=""/>
+        <p:cNvGrpSpPr/>
+        <p:nvPr/>
+      </p:nvGrpSpPr>
+      <p:grpSpPr>
+        <a:xfrm>
+          <a:off x="0" y="0"/>
+          <a:ext cx="0" cy="0"/>
+          <a:chOff x="0" y="0"/>
+          <a:chExt cx="0" cy="0"/>
+        </a:xfrm>
+      </p:grpSpPr>
+      <p:pic>
+        <p:nvPicPr>
+          <p:cNvPr id="5" name="Picture 4">
+            <a:extLst>
+              <a:ext uri="{FF2B5EF4-FFF2-40B4-BE49-F238E27FC236}">
+                <a16:creationId xmlns:a16="http://schemas.microsoft.com/office/drawing/2014/main" id="{7E97F894-9164-8A14-B90C-7A6A37E181CE}"/>
+              </a:ext>
+            </a:extLst>
+          </p:cNvPr>
+          <p:cNvPicPr>
+            <a:picLocks noChangeAspect="1"/>
+          </p:cNvPicPr>
+          <p:nvPr/>
+        </p:nvPicPr>
+        <p:blipFill>
+          <a:blip r:embed="rId2"/>
+          <a:stretch>
+            <a:fillRect/>
+          </a:stretch>
+        </p:blipFill>
+        <p:spPr>
+          <a:xfrm>
+            <a:off x="920202" y="568892"/>
+            <a:ext cx="9986612" cy="5720215"/>
+          </a:xfrm>
+          <a:prstGeom prst="rect">
+            <a:avLst/>
+          </a:prstGeom>
+        </p:spPr>
+      </p:pic>
+      <p:cxnSp>
+        <p:nvCxnSpPr>
+          <p:cNvPr id="6" name="Straight Arrow Connector 5">
+            <a:extLst>
+              <a:ext uri="{FF2B5EF4-FFF2-40B4-BE49-F238E27FC236}">
+                <a16:creationId xmlns:a16="http://schemas.microsoft.com/office/drawing/2014/main" id="{DBDBA6CE-059D-4C6C-F369-74925E804C8F}"/>
+              </a:ext>
+            </a:extLst>
+          </p:cNvPr>
+          <p:cNvCxnSpPr>
+            <a:cxnSpLocks/>
+          </p:cNvCxnSpPr>
+          <p:nvPr/>
+        </p:nvCxnSpPr>
+        <p:spPr>
+          <a:xfrm>
+            <a:off x="1709975" y="509839"/>
+            <a:ext cx="0" cy="997017"/>
+          </a:xfrm>
+          <a:prstGeom prst="straightConnector1">
+            <a:avLst/>
+          </a:prstGeom>
+          <a:ln w="19050">
+            <a:solidFill>
+              <a:srgbClr val="00B0F0"/>
+            </a:solidFill>
+            <a:prstDash val="sysDash"/>
+            <a:tailEnd type="triangle"/>
+          </a:ln>
+        </p:spPr>
+        <p:style>
+          <a:lnRef idx="1">
+            <a:schemeClr val="accent5"/>
+          </a:lnRef>
+          <a:fillRef idx="0">
+            <a:schemeClr val="accent5"/>
+          </a:fillRef>
+          <a:effectRef idx="0">
+            <a:schemeClr val="accent5"/>
+          </a:effectRef>
+          <a:fontRef idx="minor">
+            <a:schemeClr val="tx1"/>
+          </a:fontRef>
+        </p:style>
+      </p:cxnSp>
+      <p:sp>
+        <p:nvSpPr>
+          <p:cNvPr id="7" name="TextBox 6">
+            <a:extLst>
+              <a:ext uri="{FF2B5EF4-FFF2-40B4-BE49-F238E27FC236}">
+                <a16:creationId xmlns:a16="http://schemas.microsoft.com/office/drawing/2014/main" id="{AA81E23D-4566-812D-74B6-CCB4FB6796ED}"/>
+              </a:ext>
+            </a:extLst>
+          </p:cNvPr>
+          <p:cNvSpPr txBox="1"/>
+          <p:nvPr/>
+        </p:nvSpPr>
+        <p:spPr>
+          <a:xfrm>
+            <a:off x="944112" y="133816"/>
+            <a:ext cx="2259408" cy="430887"/>
+          </a:xfrm>
+          <a:prstGeom prst="rect">
+            <a:avLst/>
+          </a:prstGeom>
+          <a:noFill/>
+        </p:spPr>
+        <p:txBody>
+          <a:bodyPr wrap="square" rtlCol="0">
+            <a:spAutoFit/>
+          </a:bodyPr>
+          <a:lstStyle/>
+          <a:p>
+            <a:r>
+              <a:rPr lang="en-US" sz="1100" b="1" dirty="0"/>
+              <a:t>Station block entrance sensor</a:t>
+            </a:r>
+          </a:p>
+          <a:p>
+            <a:r>
+              <a:rPr lang="en-US" sz="1100" b="1" dirty="0"/>
+              <a:t>[</a:t>
+            </a:r>
+            <a:r>
+              <a:rPr lang="en-US" sz="1100" b="1" dirty="0">
+                <a:solidFill>
+                  <a:schemeClr val="tx1">
+                    <a:lumMod val="50000"/>
+                    <a:lumOff val="50000"/>
+                  </a:schemeClr>
+                </a:solidFill>
+              </a:rPr>
+              <a:t>Gray: not triggered</a:t>
+            </a:r>
+            <a:r>
+              <a:rPr lang="en-US" sz="1100" b="1" dirty="0"/>
+              <a:t>] </a:t>
+            </a:r>
+            <a:endParaRPr lang="en-SG" sz="1100" b="1" dirty="0"/>
+          </a:p>
+        </p:txBody>
+      </p:sp>
+      <p:sp>
+        <p:nvSpPr>
+          <p:cNvPr id="52" name="TextBox 51">
+            <a:extLst>
+              <a:ext uri="{FF2B5EF4-FFF2-40B4-BE49-F238E27FC236}">
+                <a16:creationId xmlns:a16="http://schemas.microsoft.com/office/drawing/2014/main" id="{F55B3258-09BE-5EB5-9AE3-C4FE95B52908}"/>
+              </a:ext>
+            </a:extLst>
+          </p:cNvPr>
+          <p:cNvSpPr txBox="1"/>
+          <p:nvPr/>
+        </p:nvSpPr>
+        <p:spPr>
+          <a:xfrm>
+            <a:off x="4571986" y="6329774"/>
+            <a:ext cx="2340877" cy="430887"/>
+          </a:xfrm>
+          <a:prstGeom prst="rect">
+            <a:avLst/>
+          </a:prstGeom>
+          <a:noFill/>
+        </p:spPr>
+        <p:txBody>
+          <a:bodyPr wrap="square" rtlCol="0">
+            <a:spAutoFit/>
+          </a:bodyPr>
+          <a:lstStyle/>
+          <a:p>
+            <a:r>
+              <a:rPr lang="en-US" sz="1100" b="1" dirty="0"/>
+              <a:t>Block override control check box [disabled ]</a:t>
+            </a:r>
+            <a:endParaRPr lang="en-SG" sz="1100" b="1" dirty="0"/>
+          </a:p>
+        </p:txBody>
+      </p:sp>
+      <p:sp>
+        <p:nvSpPr>
+          <p:cNvPr id="3" name="TextBox 2">
+            <a:extLst>
+              <a:ext uri="{FF2B5EF4-FFF2-40B4-BE49-F238E27FC236}">
+                <a16:creationId xmlns:a16="http://schemas.microsoft.com/office/drawing/2014/main" id="{32FE0320-BE6D-92EC-2FC0-420131FD8EF2}"/>
+              </a:ext>
+            </a:extLst>
+          </p:cNvPr>
+          <p:cNvSpPr txBox="1"/>
+          <p:nvPr/>
+        </p:nvSpPr>
+        <p:spPr>
+          <a:xfrm>
+            <a:off x="4783804" y="70196"/>
+            <a:ext cx="2259408" cy="430887"/>
+          </a:xfrm>
+          <a:prstGeom prst="rect">
+            <a:avLst/>
+          </a:prstGeom>
+          <a:noFill/>
+        </p:spPr>
+        <p:txBody>
+          <a:bodyPr wrap="square" rtlCol="0">
+            <a:spAutoFit/>
+          </a:bodyPr>
+          <a:lstStyle/>
+          <a:p>
+            <a:r>
+              <a:rPr lang="en-US" sz="1100" b="1" dirty="0"/>
+              <a:t>Station block entrance signal </a:t>
+            </a:r>
+          </a:p>
+          <a:p>
+            <a:r>
+              <a:rPr lang="en-US" sz="1100" b="1" dirty="0"/>
+              <a:t>[</a:t>
+            </a:r>
+            <a:r>
+              <a:rPr lang="en-US" sz="1100" b="1" dirty="0">
+                <a:solidFill>
+                  <a:schemeClr val="accent6">
+                    <a:lumMod val="75000"/>
+                  </a:schemeClr>
+                </a:solidFill>
+              </a:rPr>
+              <a:t>Green: allow dock</a:t>
+            </a:r>
+            <a:r>
+              <a:rPr lang="en-US" sz="1100" b="1" dirty="0"/>
+              <a:t>] </a:t>
+            </a:r>
+            <a:endParaRPr lang="en-SG" sz="1100" b="1" dirty="0"/>
+          </a:p>
+        </p:txBody>
+      </p:sp>
+      <p:cxnSp>
+        <p:nvCxnSpPr>
+          <p:cNvPr id="8" name="Straight Arrow Connector 7">
+            <a:extLst>
+              <a:ext uri="{FF2B5EF4-FFF2-40B4-BE49-F238E27FC236}">
+                <a16:creationId xmlns:a16="http://schemas.microsoft.com/office/drawing/2014/main" id="{6393672D-D181-B12B-DA4B-1758F9503F57}"/>
+              </a:ext>
+            </a:extLst>
+          </p:cNvPr>
+          <p:cNvCxnSpPr>
+            <a:cxnSpLocks/>
+          </p:cNvCxnSpPr>
+          <p:nvPr/>
+        </p:nvCxnSpPr>
+        <p:spPr>
+          <a:xfrm>
+            <a:off x="3594142" y="497005"/>
+            <a:ext cx="0" cy="1073235"/>
+          </a:xfrm>
+          <a:prstGeom prst="straightConnector1">
+            <a:avLst/>
+          </a:prstGeom>
+          <a:ln w="19050">
+            <a:solidFill>
+              <a:srgbClr val="00B0F0"/>
+            </a:solidFill>
+            <a:prstDash val="sysDash"/>
+            <a:tailEnd type="triangle"/>
+          </a:ln>
+        </p:spPr>
+        <p:style>
+          <a:lnRef idx="1">
+            <a:schemeClr val="accent5"/>
+          </a:lnRef>
+          <a:fillRef idx="0">
+            <a:schemeClr val="accent5"/>
+          </a:fillRef>
+          <a:effectRef idx="0">
+            <a:schemeClr val="accent5"/>
+          </a:effectRef>
+          <a:fontRef idx="minor">
+            <a:schemeClr val="tx1"/>
+          </a:fontRef>
+        </p:style>
+      </p:cxnSp>
+      <p:sp>
+        <p:nvSpPr>
+          <p:cNvPr id="10" name="TextBox 9">
+            <a:extLst>
+              <a:ext uri="{FF2B5EF4-FFF2-40B4-BE49-F238E27FC236}">
+                <a16:creationId xmlns:a16="http://schemas.microsoft.com/office/drawing/2014/main" id="{30F49E03-E4AA-D2F8-0B5A-0D3C5EE8523F}"/>
+              </a:ext>
+            </a:extLst>
+          </p:cNvPr>
+          <p:cNvSpPr txBox="1"/>
+          <p:nvPr/>
+        </p:nvSpPr>
+        <p:spPr>
+          <a:xfrm>
+            <a:off x="8113655" y="91828"/>
+            <a:ext cx="1375652" cy="430887"/>
+          </a:xfrm>
+          <a:prstGeom prst="rect">
+            <a:avLst/>
+          </a:prstGeom>
+          <a:noFill/>
+        </p:spPr>
+        <p:txBody>
+          <a:bodyPr wrap="square" rtlCol="0">
+            <a:spAutoFit/>
+          </a:bodyPr>
+          <a:lstStyle/>
+          <a:p>
+            <a:r>
+              <a:rPr lang="en-US" sz="1100" b="1" dirty="0"/>
+              <a:t>Block release sensor </a:t>
+            </a:r>
+          </a:p>
+        </p:txBody>
+      </p:sp>
+      <p:cxnSp>
+        <p:nvCxnSpPr>
+          <p:cNvPr id="13" name="Straight Arrow Connector 12">
+            <a:extLst>
+              <a:ext uri="{FF2B5EF4-FFF2-40B4-BE49-F238E27FC236}">
+                <a16:creationId xmlns:a16="http://schemas.microsoft.com/office/drawing/2014/main" id="{8CCF0199-04DD-C1ED-90DD-7C69259411EA}"/>
+              </a:ext>
+            </a:extLst>
+          </p:cNvPr>
+          <p:cNvCxnSpPr>
+            <a:cxnSpLocks/>
+          </p:cNvCxnSpPr>
+          <p:nvPr/>
+        </p:nvCxnSpPr>
+        <p:spPr>
+          <a:xfrm>
+            <a:off x="8394656" y="497005"/>
+            <a:ext cx="0" cy="1091642"/>
+          </a:xfrm>
+          <a:prstGeom prst="straightConnector1">
+            <a:avLst/>
+          </a:prstGeom>
+          <a:ln w="19050">
+            <a:solidFill>
+              <a:srgbClr val="00B0F0"/>
+            </a:solidFill>
+            <a:prstDash val="sysDash"/>
+            <a:tailEnd type="triangle"/>
+          </a:ln>
+        </p:spPr>
+        <p:style>
+          <a:lnRef idx="1">
+            <a:schemeClr val="accent5"/>
+          </a:lnRef>
+          <a:fillRef idx="0">
+            <a:schemeClr val="accent5"/>
+          </a:fillRef>
+          <a:effectRef idx="0">
+            <a:schemeClr val="accent5"/>
+          </a:effectRef>
+          <a:fontRef idx="minor">
+            <a:schemeClr val="tx1"/>
+          </a:fontRef>
+        </p:style>
+      </p:cxnSp>
+      <p:cxnSp>
+        <p:nvCxnSpPr>
+          <p:cNvPr id="18" name="Straight Arrow Connector 17">
+            <a:extLst>
+              <a:ext uri="{FF2B5EF4-FFF2-40B4-BE49-F238E27FC236}">
+                <a16:creationId xmlns:a16="http://schemas.microsoft.com/office/drawing/2014/main" id="{2B693CBB-8930-7868-C77A-177B96E5AE6C}"/>
+              </a:ext>
+            </a:extLst>
+          </p:cNvPr>
+          <p:cNvCxnSpPr>
+            <a:cxnSpLocks/>
+          </p:cNvCxnSpPr>
+          <p:nvPr/>
+        </p:nvCxnSpPr>
+        <p:spPr>
+          <a:xfrm>
+            <a:off x="5282648" y="462526"/>
+            <a:ext cx="0" cy="1091642"/>
+          </a:xfrm>
+          <a:prstGeom prst="straightConnector1">
+            <a:avLst/>
+          </a:prstGeom>
+          <a:ln w="19050">
+            <a:solidFill>
+              <a:srgbClr val="00B0F0"/>
+            </a:solidFill>
+            <a:prstDash val="sysDash"/>
+            <a:tailEnd type="triangle"/>
+          </a:ln>
+        </p:spPr>
+        <p:style>
+          <a:lnRef idx="1">
+            <a:schemeClr val="accent5"/>
+          </a:lnRef>
+          <a:fillRef idx="0">
+            <a:schemeClr val="accent5"/>
+          </a:fillRef>
+          <a:effectRef idx="0">
+            <a:schemeClr val="accent5"/>
+          </a:effectRef>
+          <a:fontRef idx="minor">
+            <a:schemeClr val="tx1"/>
+          </a:fontRef>
+        </p:style>
+      </p:cxnSp>
+      <p:sp>
+        <p:nvSpPr>
+          <p:cNvPr id="19" name="TextBox 18">
+            <a:extLst>
+              <a:ext uri="{FF2B5EF4-FFF2-40B4-BE49-F238E27FC236}">
+                <a16:creationId xmlns:a16="http://schemas.microsoft.com/office/drawing/2014/main" id="{628C51BB-866F-2F51-13D0-172283E47D72}"/>
+              </a:ext>
+            </a:extLst>
+          </p:cNvPr>
+          <p:cNvSpPr txBox="1"/>
+          <p:nvPr/>
+        </p:nvSpPr>
+        <p:spPr>
+          <a:xfrm>
+            <a:off x="3281557" y="153655"/>
+            <a:ext cx="1540426" cy="430887"/>
+          </a:xfrm>
+          <a:prstGeom prst="rect">
+            <a:avLst/>
+          </a:prstGeom>
+          <a:noFill/>
+        </p:spPr>
+        <p:txBody>
+          <a:bodyPr wrap="square" rtlCol="0">
+            <a:spAutoFit/>
+          </a:bodyPr>
+          <a:lstStyle/>
+          <a:p>
+            <a:r>
+              <a:rPr lang="en-US" sz="1100" b="1" dirty="0"/>
+              <a:t>Block freeze </a:t>
+            </a:r>
+          </a:p>
+          <a:p>
+            <a:r>
+              <a:rPr lang="en-US" sz="1100" b="1" dirty="0"/>
+              <a:t>sensor </a:t>
+            </a:r>
+          </a:p>
+        </p:txBody>
+      </p:sp>
+      <p:cxnSp>
+        <p:nvCxnSpPr>
+          <p:cNvPr id="34" name="Straight Arrow Connector 33">
+            <a:extLst>
+              <a:ext uri="{FF2B5EF4-FFF2-40B4-BE49-F238E27FC236}">
+                <a16:creationId xmlns:a16="http://schemas.microsoft.com/office/drawing/2014/main" id="{3808F8DB-DA65-CD7A-B94A-40DA0A871A6E}"/>
+              </a:ext>
+            </a:extLst>
+          </p:cNvPr>
+          <p:cNvCxnSpPr>
+            <a:cxnSpLocks/>
+          </p:cNvCxnSpPr>
+          <p:nvPr/>
+        </p:nvCxnSpPr>
+        <p:spPr>
+          <a:xfrm>
+            <a:off x="7329050" y="441785"/>
+            <a:ext cx="0" cy="1073235"/>
+          </a:xfrm>
+          <a:prstGeom prst="straightConnector1">
+            <a:avLst/>
+          </a:prstGeom>
+          <a:ln w="19050">
+            <a:solidFill>
+              <a:srgbClr val="00B0F0"/>
+            </a:solidFill>
+            <a:prstDash val="sysDash"/>
+            <a:tailEnd type="triangle"/>
+          </a:ln>
+        </p:spPr>
+        <p:style>
+          <a:lnRef idx="1">
+            <a:schemeClr val="accent5"/>
+          </a:lnRef>
+          <a:fillRef idx="0">
+            <a:schemeClr val="accent5"/>
+          </a:fillRef>
+          <a:effectRef idx="0">
+            <a:schemeClr val="accent5"/>
+          </a:effectRef>
+          <a:fontRef idx="minor">
+            <a:schemeClr val="tx1"/>
+          </a:fontRef>
+        </p:style>
+      </p:cxnSp>
+      <p:sp>
+        <p:nvSpPr>
+          <p:cNvPr id="35" name="TextBox 34">
+            <a:extLst>
+              <a:ext uri="{FF2B5EF4-FFF2-40B4-BE49-F238E27FC236}">
+                <a16:creationId xmlns:a16="http://schemas.microsoft.com/office/drawing/2014/main" id="{FEBEBAA8-1FC4-A0D0-34E0-1EBBCED03B3C}"/>
+              </a:ext>
+            </a:extLst>
+          </p:cNvPr>
+          <p:cNvSpPr txBox="1"/>
+          <p:nvPr/>
+        </p:nvSpPr>
+        <p:spPr>
+          <a:xfrm>
+            <a:off x="7016465" y="98435"/>
+            <a:ext cx="1092348" cy="430887"/>
+          </a:xfrm>
+          <a:prstGeom prst="rect">
+            <a:avLst/>
+          </a:prstGeom>
+          <a:noFill/>
+        </p:spPr>
+        <p:txBody>
+          <a:bodyPr wrap="square" rtlCol="0">
+            <a:spAutoFit/>
+          </a:bodyPr>
+          <a:lstStyle/>
+          <a:p>
+            <a:r>
+              <a:rPr lang="en-US" sz="1100" b="1" dirty="0"/>
+              <a:t>Block control</a:t>
+            </a:r>
+          </a:p>
+          <a:p>
+            <a:r>
+              <a:rPr lang="en-US" sz="1100" b="1" dirty="0"/>
+              <a:t>signal </a:t>
+            </a:r>
+          </a:p>
+        </p:txBody>
+      </p:sp>
+      <p:sp>
+        <p:nvSpPr>
+          <p:cNvPr id="36" name="TextBox 35">
+            <a:extLst>
+              <a:ext uri="{FF2B5EF4-FFF2-40B4-BE49-F238E27FC236}">
+                <a16:creationId xmlns:a16="http://schemas.microsoft.com/office/drawing/2014/main" id="{BF437870-DF19-85CD-0CED-233C439F093A}"/>
+              </a:ext>
+            </a:extLst>
+          </p:cNvPr>
+          <p:cNvSpPr txBox="1"/>
+          <p:nvPr/>
+        </p:nvSpPr>
+        <p:spPr>
+          <a:xfrm>
+            <a:off x="9431784" y="113496"/>
+            <a:ext cx="1267698" cy="430887"/>
+          </a:xfrm>
+          <a:prstGeom prst="rect">
+            <a:avLst/>
+          </a:prstGeom>
+          <a:noFill/>
+        </p:spPr>
+        <p:txBody>
+          <a:bodyPr wrap="square" rtlCol="0">
+            <a:spAutoFit/>
+          </a:bodyPr>
+          <a:lstStyle/>
+          <a:p>
+            <a:r>
+              <a:rPr lang="en-US" sz="1100" b="1" dirty="0"/>
+              <a:t>Date &amp; Time Indicator </a:t>
+            </a:r>
+            <a:endParaRPr lang="en-SG" sz="1100" b="1" dirty="0"/>
+          </a:p>
+        </p:txBody>
+      </p:sp>
+      <p:cxnSp>
+        <p:nvCxnSpPr>
+          <p:cNvPr id="38" name="Straight Arrow Connector 37">
+            <a:extLst>
+              <a:ext uri="{FF2B5EF4-FFF2-40B4-BE49-F238E27FC236}">
+                <a16:creationId xmlns:a16="http://schemas.microsoft.com/office/drawing/2014/main" id="{5A394F31-9355-9327-296A-6629014D726B}"/>
+              </a:ext>
+            </a:extLst>
+          </p:cNvPr>
+          <p:cNvCxnSpPr>
+            <a:cxnSpLocks/>
+          </p:cNvCxnSpPr>
+          <p:nvPr/>
+        </p:nvCxnSpPr>
+        <p:spPr>
+          <a:xfrm>
+            <a:off x="9732335" y="466935"/>
+            <a:ext cx="7005" cy="575891"/>
+          </a:xfrm>
+          <a:prstGeom prst="straightConnector1">
+            <a:avLst/>
+          </a:prstGeom>
+          <a:ln w="19050">
+            <a:solidFill>
+              <a:srgbClr val="00B0F0"/>
+            </a:solidFill>
+            <a:prstDash val="sysDash"/>
+            <a:tailEnd type="triangle"/>
+          </a:ln>
+        </p:spPr>
+        <p:style>
+          <a:lnRef idx="1">
+            <a:schemeClr val="accent5"/>
+          </a:lnRef>
+          <a:fillRef idx="0">
+            <a:schemeClr val="accent5"/>
+          </a:fillRef>
+          <a:effectRef idx="0">
+            <a:schemeClr val="accent5"/>
+          </a:effectRef>
+          <a:fontRef idx="minor">
+            <a:schemeClr val="tx1"/>
+          </a:fontRef>
+        </p:style>
+      </p:cxnSp>
+      <p:cxnSp>
+        <p:nvCxnSpPr>
+          <p:cNvPr id="40" name="Straight Arrow Connector 39">
+            <a:extLst>
+              <a:ext uri="{FF2B5EF4-FFF2-40B4-BE49-F238E27FC236}">
+                <a16:creationId xmlns:a16="http://schemas.microsoft.com/office/drawing/2014/main" id="{8742FA44-0DD5-33A0-9B6D-CDDCFF3E3E99}"/>
+              </a:ext>
+            </a:extLst>
+          </p:cNvPr>
+          <p:cNvCxnSpPr>
+            <a:cxnSpLocks/>
+          </p:cNvCxnSpPr>
+          <p:nvPr/>
+        </p:nvCxnSpPr>
+        <p:spPr>
+          <a:xfrm flipH="1">
+            <a:off x="9957443" y="4024062"/>
+            <a:ext cx="307331" cy="0"/>
+          </a:xfrm>
+          <a:prstGeom prst="straightConnector1">
+            <a:avLst/>
+          </a:prstGeom>
+          <a:ln w="19050">
+            <a:solidFill>
+              <a:schemeClr val="tx2">
+                <a:lumMod val="50000"/>
+                <a:lumOff val="50000"/>
+              </a:schemeClr>
+            </a:solidFill>
+            <a:prstDash val="sysDash"/>
+            <a:tailEnd type="triangle"/>
+          </a:ln>
+        </p:spPr>
+        <p:style>
+          <a:lnRef idx="1">
+            <a:schemeClr val="accent5"/>
+          </a:lnRef>
+          <a:fillRef idx="0">
+            <a:schemeClr val="accent5"/>
+          </a:fillRef>
+          <a:effectRef idx="0">
+            <a:schemeClr val="accent5"/>
+          </a:effectRef>
+          <a:fontRef idx="minor">
+            <a:schemeClr val="tx1"/>
+          </a:fontRef>
+        </p:style>
+      </p:cxnSp>
+      <p:sp>
+        <p:nvSpPr>
+          <p:cNvPr id="41" name="TextBox 40">
+            <a:extLst>
+              <a:ext uri="{FF2B5EF4-FFF2-40B4-BE49-F238E27FC236}">
+                <a16:creationId xmlns:a16="http://schemas.microsoft.com/office/drawing/2014/main" id="{BACF8D19-0B3F-2340-9729-66193A0C4FDD}"/>
+              </a:ext>
+            </a:extLst>
+          </p:cNvPr>
+          <p:cNvSpPr txBox="1"/>
+          <p:nvPr/>
+        </p:nvSpPr>
+        <p:spPr>
+          <a:xfrm>
+            <a:off x="10273918" y="3871531"/>
+            <a:ext cx="1216075" cy="261610"/>
+          </a:xfrm>
+          <a:prstGeom prst="rect">
+            <a:avLst/>
+          </a:prstGeom>
+          <a:noFill/>
+        </p:spPr>
+        <p:txBody>
+          <a:bodyPr wrap="square" rtlCol="0">
+            <a:spAutoFit/>
+          </a:bodyPr>
+          <a:lstStyle/>
+          <a:p>
+            <a:r>
+              <a:rPr lang="en-US" sz="1100" b="1" dirty="0"/>
+              <a:t>PLC information </a:t>
+            </a:r>
+            <a:endParaRPr lang="en-SG" sz="1100" b="1" dirty="0"/>
+          </a:p>
+        </p:txBody>
+      </p:sp>
+      <p:cxnSp>
+        <p:nvCxnSpPr>
+          <p:cNvPr id="43" name="Straight Arrow Connector 42">
+            <a:extLst>
+              <a:ext uri="{FF2B5EF4-FFF2-40B4-BE49-F238E27FC236}">
+                <a16:creationId xmlns:a16="http://schemas.microsoft.com/office/drawing/2014/main" id="{7A0C101A-D7AF-587D-5C52-236163C6391E}"/>
+              </a:ext>
+            </a:extLst>
+          </p:cNvPr>
+          <p:cNvCxnSpPr>
+            <a:cxnSpLocks/>
+          </p:cNvCxnSpPr>
+          <p:nvPr/>
+        </p:nvCxnSpPr>
+        <p:spPr>
+          <a:xfrm flipH="1">
+            <a:off x="9728547" y="4439300"/>
+            <a:ext cx="613317" cy="4498"/>
+          </a:xfrm>
+          <a:prstGeom prst="straightConnector1">
+            <a:avLst/>
+          </a:prstGeom>
+          <a:ln w="19050">
+            <a:solidFill>
+              <a:schemeClr val="tx2">
+                <a:lumMod val="50000"/>
+                <a:lumOff val="50000"/>
+              </a:schemeClr>
+            </a:solidFill>
+            <a:prstDash val="sysDash"/>
+            <a:tailEnd type="triangle"/>
+          </a:ln>
+        </p:spPr>
+        <p:style>
+          <a:lnRef idx="1">
+            <a:schemeClr val="accent5"/>
+          </a:lnRef>
+          <a:fillRef idx="0">
+            <a:schemeClr val="accent5"/>
+          </a:fillRef>
+          <a:effectRef idx="0">
+            <a:schemeClr val="accent5"/>
+          </a:effectRef>
+          <a:fontRef idx="minor">
+            <a:schemeClr val="tx1"/>
+          </a:fontRef>
+        </p:style>
+      </p:cxnSp>
+      <p:sp>
+        <p:nvSpPr>
+          <p:cNvPr id="44" name="TextBox 43">
+            <a:extLst>
+              <a:ext uri="{FF2B5EF4-FFF2-40B4-BE49-F238E27FC236}">
+                <a16:creationId xmlns:a16="http://schemas.microsoft.com/office/drawing/2014/main" id="{1D57B0E0-3053-06DB-F64B-3768DAB135D6}"/>
+              </a:ext>
+            </a:extLst>
+          </p:cNvPr>
+          <p:cNvSpPr txBox="1"/>
+          <p:nvPr/>
+        </p:nvSpPr>
+        <p:spPr>
+          <a:xfrm>
+            <a:off x="10341864" y="4243744"/>
+            <a:ext cx="1288442" cy="430887"/>
+          </a:xfrm>
+          <a:prstGeom prst="rect">
+            <a:avLst/>
+          </a:prstGeom>
+          <a:noFill/>
+        </p:spPr>
+        <p:txBody>
+          <a:bodyPr wrap="square" rtlCol="0">
+            <a:spAutoFit/>
+          </a:bodyPr>
+          <a:lstStyle/>
+          <a:p>
+            <a:r>
+              <a:rPr lang="en-US" sz="1100" b="1" dirty="0"/>
+              <a:t>PLC coil state </a:t>
+            </a:r>
+          </a:p>
+          <a:p>
+            <a:r>
+              <a:rPr lang="en-US" sz="1100" b="1" dirty="0"/>
+              <a:t>[ voltage low]</a:t>
+            </a:r>
+            <a:endParaRPr lang="en-SG" sz="1100" b="1" dirty="0"/>
+          </a:p>
+        </p:txBody>
+      </p:sp>
+      <p:sp>
+        <p:nvSpPr>
+          <p:cNvPr id="46" name="TextBox 45">
+            <a:extLst>
+              <a:ext uri="{FF2B5EF4-FFF2-40B4-BE49-F238E27FC236}">
+                <a16:creationId xmlns:a16="http://schemas.microsoft.com/office/drawing/2014/main" id="{58E998CC-B672-72DB-868A-2E1977EE0A71}"/>
+              </a:ext>
+            </a:extLst>
+          </p:cNvPr>
+          <p:cNvSpPr txBox="1"/>
+          <p:nvPr/>
+        </p:nvSpPr>
+        <p:spPr>
+          <a:xfrm>
+            <a:off x="10329953" y="5391037"/>
+            <a:ext cx="1164305" cy="446276"/>
+          </a:xfrm>
+          <a:prstGeom prst="rect">
+            <a:avLst/>
+          </a:prstGeom>
+          <a:noFill/>
+        </p:spPr>
+        <p:txBody>
+          <a:bodyPr wrap="square" rtlCol="0">
+            <a:spAutoFit/>
+          </a:bodyPr>
+          <a:lstStyle/>
+          <a:p>
+            <a:r>
+              <a:rPr lang="en-US" sz="1100" b="1" dirty="0"/>
+              <a:t>PLC coil output [empty</a:t>
+            </a:r>
+            <a:r>
+              <a:rPr lang="en-US" sz="1200" b="1" dirty="0"/>
+              <a:t>]</a:t>
+            </a:r>
+            <a:endParaRPr lang="en-SG" sz="1200" b="1" dirty="0"/>
+          </a:p>
+        </p:txBody>
+      </p:sp>
+      <p:sp>
+        <p:nvSpPr>
+          <p:cNvPr id="48" name="TextBox 47">
+            <a:extLst>
+              <a:ext uri="{FF2B5EF4-FFF2-40B4-BE49-F238E27FC236}">
+                <a16:creationId xmlns:a16="http://schemas.microsoft.com/office/drawing/2014/main" id="{BF8115B7-43C8-C9DA-9423-4372E5C9D574}"/>
+              </a:ext>
+            </a:extLst>
+          </p:cNvPr>
+          <p:cNvSpPr txBox="1"/>
+          <p:nvPr/>
+        </p:nvSpPr>
+        <p:spPr>
+          <a:xfrm>
+            <a:off x="10306453" y="4749957"/>
+            <a:ext cx="1833962" cy="600164"/>
+          </a:xfrm>
+          <a:prstGeom prst="rect">
+            <a:avLst/>
+          </a:prstGeom>
+          <a:noFill/>
+        </p:spPr>
+        <p:txBody>
+          <a:bodyPr wrap="square" rtlCol="0">
+            <a:spAutoFit/>
+          </a:bodyPr>
+          <a:lstStyle/>
+          <a:p>
+            <a:r>
+              <a:rPr lang="en-US" sz="1100" b="1" dirty="0"/>
+              <a:t>PLC coil output </a:t>
+            </a:r>
+          </a:p>
+          <a:p>
+            <a:r>
+              <a:rPr lang="en-US" sz="1100" b="1" dirty="0"/>
+              <a:t>[Physical World </a:t>
+            </a:r>
+          </a:p>
+          <a:p>
+            <a:r>
+              <a:rPr lang="en-US" sz="1100" b="1" dirty="0"/>
+              <a:t>Signal ID]</a:t>
+            </a:r>
+            <a:endParaRPr lang="en-SG" sz="1100" b="1" dirty="0"/>
+          </a:p>
+        </p:txBody>
+      </p:sp>
+      <p:cxnSp>
+        <p:nvCxnSpPr>
+          <p:cNvPr id="58" name="Straight Arrow Connector 57">
+            <a:extLst>
+              <a:ext uri="{FF2B5EF4-FFF2-40B4-BE49-F238E27FC236}">
+                <a16:creationId xmlns:a16="http://schemas.microsoft.com/office/drawing/2014/main" id="{76D390E2-FC2F-480F-21E8-4CA90EE6AD81}"/>
+              </a:ext>
+            </a:extLst>
+          </p:cNvPr>
+          <p:cNvCxnSpPr>
+            <a:cxnSpLocks/>
+          </p:cNvCxnSpPr>
+          <p:nvPr/>
+        </p:nvCxnSpPr>
+        <p:spPr>
+          <a:xfrm flipH="1">
+            <a:off x="9957443" y="5050039"/>
+            <a:ext cx="349010" cy="0"/>
+          </a:xfrm>
+          <a:prstGeom prst="straightConnector1">
+            <a:avLst/>
+          </a:prstGeom>
+          <a:ln w="19050">
+            <a:solidFill>
+              <a:srgbClr val="00B0F0"/>
+            </a:solidFill>
+            <a:prstDash val="sysDash"/>
+            <a:tailEnd type="triangle"/>
+          </a:ln>
+        </p:spPr>
+        <p:style>
+          <a:lnRef idx="1">
+            <a:schemeClr val="accent5"/>
+          </a:lnRef>
+          <a:fillRef idx="0">
+            <a:schemeClr val="accent5"/>
+          </a:fillRef>
+          <a:effectRef idx="0">
+            <a:schemeClr val="accent5"/>
+          </a:effectRef>
+          <a:fontRef idx="minor">
+            <a:schemeClr val="tx1"/>
+          </a:fontRef>
+        </p:style>
+      </p:cxnSp>
+      <p:cxnSp>
+        <p:nvCxnSpPr>
+          <p:cNvPr id="61" name="Connector: Elbow 60">
+            <a:extLst>
+              <a:ext uri="{FF2B5EF4-FFF2-40B4-BE49-F238E27FC236}">
+                <a16:creationId xmlns:a16="http://schemas.microsoft.com/office/drawing/2014/main" id="{C9E6DBD2-DFEA-EC4E-0554-4AB971198A3B}"/>
+              </a:ext>
+            </a:extLst>
+          </p:cNvPr>
+          <p:cNvCxnSpPr>
+            <a:cxnSpLocks/>
+          </p:cNvCxnSpPr>
+          <p:nvPr/>
+        </p:nvCxnSpPr>
+        <p:spPr>
+          <a:xfrm rot="10800000">
+            <a:off x="9825450" y="5307081"/>
+            <a:ext cx="448468" cy="343122"/>
+          </a:xfrm>
+          <a:prstGeom prst="bentConnector3">
+            <a:avLst>
+              <a:gd name="adj1" fmla="val 98935"/>
+            </a:avLst>
+          </a:prstGeom>
+          <a:ln>
+            <a:solidFill>
+              <a:schemeClr val="tx2">
+                <a:lumMod val="50000"/>
+                <a:lumOff val="50000"/>
+              </a:schemeClr>
+            </a:solidFill>
+            <a:prstDash val="sysDash"/>
+            <a:tailEnd type="triangle"/>
+          </a:ln>
+        </p:spPr>
+        <p:style>
+          <a:lnRef idx="2">
+            <a:schemeClr val="accent1"/>
+          </a:lnRef>
+          <a:fillRef idx="0">
+            <a:schemeClr val="accent1"/>
+          </a:fillRef>
+          <a:effectRef idx="1">
+            <a:schemeClr val="accent1"/>
+          </a:effectRef>
+          <a:fontRef idx="minor">
+            <a:schemeClr val="tx1"/>
+          </a:fontRef>
+        </p:style>
+      </p:cxnSp>
+      <p:sp>
+        <p:nvSpPr>
+          <p:cNvPr id="62" name="TextBox 61">
+            <a:extLst>
+              <a:ext uri="{FF2B5EF4-FFF2-40B4-BE49-F238E27FC236}">
+                <a16:creationId xmlns:a16="http://schemas.microsoft.com/office/drawing/2014/main" id="{449521D6-D71A-B8E3-54F6-7E5653D2153D}"/>
+              </a:ext>
+            </a:extLst>
+          </p:cNvPr>
+          <p:cNvSpPr txBox="1"/>
+          <p:nvPr/>
+        </p:nvSpPr>
+        <p:spPr>
+          <a:xfrm>
+            <a:off x="8462550" y="6317381"/>
+            <a:ext cx="3729450" cy="261610"/>
+          </a:xfrm>
+          <a:prstGeom prst="rect">
+            <a:avLst/>
+          </a:prstGeom>
+          <a:noFill/>
+        </p:spPr>
+        <p:txBody>
+          <a:bodyPr wrap="square" rtlCol="0">
+            <a:spAutoFit/>
+          </a:bodyPr>
+          <a:lstStyle/>
+          <a:p>
+            <a:r>
+              <a:rPr lang="en-US" sz="1100" b="1" dirty="0"/>
+              <a:t>PLC Contact input [Physical World Sensor ID]</a:t>
+            </a:r>
+            <a:endParaRPr lang="en-SG" sz="1100" b="1" dirty="0"/>
+          </a:p>
+        </p:txBody>
+      </p:sp>
+      <p:sp>
+        <p:nvSpPr>
+          <p:cNvPr id="63" name="TextBox 62">
+            <a:extLst>
+              <a:ext uri="{FF2B5EF4-FFF2-40B4-BE49-F238E27FC236}">
+                <a16:creationId xmlns:a16="http://schemas.microsoft.com/office/drawing/2014/main" id="{8EFFCFD0-5D38-EF4D-849E-13B4C7546AAC}"/>
+              </a:ext>
+            </a:extLst>
+          </p:cNvPr>
+          <p:cNvSpPr txBox="1"/>
+          <p:nvPr/>
+        </p:nvSpPr>
+        <p:spPr>
+          <a:xfrm>
+            <a:off x="10354811" y="5847994"/>
+            <a:ext cx="1216075" cy="430887"/>
+          </a:xfrm>
+          <a:prstGeom prst="rect">
+            <a:avLst/>
+          </a:prstGeom>
+          <a:noFill/>
+        </p:spPr>
+        <p:txBody>
+          <a:bodyPr wrap="square" rtlCol="0">
+            <a:spAutoFit/>
+          </a:bodyPr>
+          <a:lstStyle/>
+          <a:p>
+            <a:r>
+              <a:rPr lang="en-US" sz="1100" b="1" dirty="0"/>
+              <a:t>PLC Contact input [empty]</a:t>
+            </a:r>
+            <a:endParaRPr lang="en-SG" sz="1100" b="1" dirty="0"/>
+          </a:p>
+        </p:txBody>
+      </p:sp>
+      <p:cxnSp>
+        <p:nvCxnSpPr>
+          <p:cNvPr id="66" name="Straight Arrow Connector 65">
+            <a:extLst>
+              <a:ext uri="{FF2B5EF4-FFF2-40B4-BE49-F238E27FC236}">
+                <a16:creationId xmlns:a16="http://schemas.microsoft.com/office/drawing/2014/main" id="{17C49F64-1C1B-9094-D9E0-499026773C58}"/>
+              </a:ext>
+            </a:extLst>
+          </p:cNvPr>
+          <p:cNvCxnSpPr>
+            <a:cxnSpLocks/>
+          </p:cNvCxnSpPr>
+          <p:nvPr/>
+        </p:nvCxnSpPr>
+        <p:spPr>
+          <a:xfrm flipH="1">
+            <a:off x="8746617" y="6000033"/>
+            <a:ext cx="1595247" cy="0"/>
+          </a:xfrm>
+          <a:prstGeom prst="straightConnector1">
+            <a:avLst/>
+          </a:prstGeom>
+          <a:ln w="19050">
+            <a:solidFill>
+              <a:srgbClr val="00B0F0"/>
+            </a:solidFill>
+            <a:prstDash val="sysDash"/>
+            <a:tailEnd type="triangle"/>
+          </a:ln>
+        </p:spPr>
+        <p:style>
+          <a:lnRef idx="1">
+            <a:schemeClr val="accent5"/>
+          </a:lnRef>
+          <a:fillRef idx="0">
+            <a:schemeClr val="accent5"/>
+          </a:fillRef>
+          <a:effectRef idx="0">
+            <a:schemeClr val="accent5"/>
+          </a:effectRef>
+          <a:fontRef idx="minor">
+            <a:schemeClr val="tx1"/>
+          </a:fontRef>
+        </p:style>
+      </p:cxnSp>
+      <p:cxnSp>
+        <p:nvCxnSpPr>
+          <p:cNvPr id="69" name="Straight Arrow Connector 68">
+            <a:extLst>
+              <a:ext uri="{FF2B5EF4-FFF2-40B4-BE49-F238E27FC236}">
+                <a16:creationId xmlns:a16="http://schemas.microsoft.com/office/drawing/2014/main" id="{BDDB579C-C109-AAA2-7098-681F7DF89F17}"/>
+              </a:ext>
+            </a:extLst>
+          </p:cNvPr>
+          <p:cNvCxnSpPr>
+            <a:cxnSpLocks/>
+          </p:cNvCxnSpPr>
+          <p:nvPr/>
+        </p:nvCxnSpPr>
+        <p:spPr>
+          <a:xfrm flipV="1">
+            <a:off x="8582191" y="5837313"/>
+            <a:ext cx="0" cy="490515"/>
+          </a:xfrm>
+          <a:prstGeom prst="straightConnector1">
+            <a:avLst/>
+          </a:prstGeom>
+          <a:ln w="19050">
+            <a:solidFill>
+              <a:srgbClr val="00B0F0"/>
+            </a:solidFill>
+            <a:prstDash val="sysDash"/>
+            <a:tailEnd type="triangle"/>
+          </a:ln>
+        </p:spPr>
+        <p:style>
+          <a:lnRef idx="1">
+            <a:schemeClr val="accent5"/>
+          </a:lnRef>
+          <a:fillRef idx="0">
+            <a:schemeClr val="accent5"/>
+          </a:fillRef>
+          <a:effectRef idx="0">
+            <a:schemeClr val="accent5"/>
+          </a:effectRef>
+          <a:fontRef idx="minor">
+            <a:schemeClr val="tx1"/>
+          </a:fontRef>
+        </p:style>
+      </p:cxnSp>
+      <p:sp>
+        <p:nvSpPr>
+          <p:cNvPr id="73" name="TextBox 72">
+            <a:extLst>
+              <a:ext uri="{FF2B5EF4-FFF2-40B4-BE49-F238E27FC236}">
+                <a16:creationId xmlns:a16="http://schemas.microsoft.com/office/drawing/2014/main" id="{B1A8659A-2284-1BBC-109E-EC6959F9CB3F}"/>
+              </a:ext>
+            </a:extLst>
+          </p:cNvPr>
+          <p:cNvSpPr txBox="1"/>
+          <p:nvPr/>
+        </p:nvSpPr>
+        <p:spPr>
+          <a:xfrm>
+            <a:off x="1028901" y="6316554"/>
+            <a:ext cx="927343" cy="261610"/>
+          </a:xfrm>
+          <a:prstGeom prst="rect">
+            <a:avLst/>
+          </a:prstGeom>
+          <a:noFill/>
+        </p:spPr>
+        <p:txBody>
+          <a:bodyPr wrap="square" rtlCol="0">
+            <a:spAutoFit/>
+          </a:bodyPr>
+          <a:lstStyle/>
+          <a:p>
+            <a:r>
+              <a:rPr lang="en-US" sz="1100" b="1" dirty="0"/>
+              <a:t>Mode state</a:t>
+            </a:r>
+          </a:p>
+        </p:txBody>
+      </p:sp>
+      <p:cxnSp>
+        <p:nvCxnSpPr>
+          <p:cNvPr id="74" name="Straight Arrow Connector 73">
+            <a:extLst>
+              <a:ext uri="{FF2B5EF4-FFF2-40B4-BE49-F238E27FC236}">
+                <a16:creationId xmlns:a16="http://schemas.microsoft.com/office/drawing/2014/main" id="{6585C4F4-8880-3CB2-4034-2041239C0F9B}"/>
+              </a:ext>
+            </a:extLst>
+          </p:cNvPr>
+          <p:cNvCxnSpPr>
+            <a:cxnSpLocks/>
+          </p:cNvCxnSpPr>
+          <p:nvPr/>
+        </p:nvCxnSpPr>
+        <p:spPr>
+          <a:xfrm flipV="1">
+            <a:off x="1074452" y="6263977"/>
+            <a:ext cx="0" cy="193139"/>
+          </a:xfrm>
+          <a:prstGeom prst="straightConnector1">
+            <a:avLst/>
+          </a:prstGeom>
+          <a:ln w="19050">
+            <a:solidFill>
+              <a:schemeClr val="tx2">
+                <a:lumMod val="50000"/>
+                <a:lumOff val="50000"/>
+              </a:schemeClr>
+            </a:solidFill>
+            <a:prstDash val="sysDash"/>
+            <a:tailEnd type="triangle"/>
+          </a:ln>
+        </p:spPr>
+        <p:style>
+          <a:lnRef idx="1">
+            <a:schemeClr val="accent5"/>
+          </a:lnRef>
+          <a:fillRef idx="0">
+            <a:schemeClr val="accent5"/>
+          </a:fillRef>
+          <a:effectRef idx="0">
+            <a:schemeClr val="accent5"/>
+          </a:effectRef>
+          <a:fontRef idx="minor">
+            <a:schemeClr val="tx1"/>
+          </a:fontRef>
+        </p:style>
+      </p:cxnSp>
+      <p:sp>
+        <p:nvSpPr>
+          <p:cNvPr id="75" name="TextBox 74">
+            <a:extLst>
+              <a:ext uri="{FF2B5EF4-FFF2-40B4-BE49-F238E27FC236}">
+                <a16:creationId xmlns:a16="http://schemas.microsoft.com/office/drawing/2014/main" id="{A23B8392-4AA0-4B14-7A64-018FC58671C9}"/>
+              </a:ext>
+            </a:extLst>
+          </p:cNvPr>
+          <p:cNvSpPr txBox="1"/>
+          <p:nvPr/>
+        </p:nvSpPr>
+        <p:spPr>
+          <a:xfrm>
+            <a:off x="7026300" y="6313616"/>
+            <a:ext cx="2165025" cy="430887"/>
+          </a:xfrm>
+          <a:prstGeom prst="rect">
+            <a:avLst/>
+          </a:prstGeom>
+          <a:noFill/>
+        </p:spPr>
+        <p:txBody>
+          <a:bodyPr wrap="square" rtlCol="0">
+            <a:spAutoFit/>
+          </a:bodyPr>
+          <a:lstStyle/>
+          <a:p>
+            <a:r>
+              <a:rPr lang="en-US" sz="1100" b="1" dirty="0"/>
+              <a:t>PLC register state </a:t>
+            </a:r>
+          </a:p>
+          <a:p>
+            <a:r>
+              <a:rPr lang="en-US" sz="1100" b="1" dirty="0"/>
+              <a:t>[ </a:t>
+            </a:r>
+            <a:r>
+              <a:rPr lang="en-US" sz="1100" b="1" dirty="0">
+                <a:solidFill>
+                  <a:schemeClr val="accent6">
+                    <a:lumMod val="75000"/>
+                  </a:schemeClr>
+                </a:solidFill>
+              </a:rPr>
+              <a:t>Green: set</a:t>
+            </a:r>
+            <a:r>
+              <a:rPr lang="en-US" sz="1100" b="1" dirty="0"/>
+              <a:t>]</a:t>
+            </a:r>
+            <a:endParaRPr lang="en-SG" sz="1100" b="1" dirty="0"/>
+          </a:p>
+        </p:txBody>
+      </p:sp>
+      <p:cxnSp>
+        <p:nvCxnSpPr>
+          <p:cNvPr id="76" name="Straight Arrow Connector 75">
+            <a:extLst>
+              <a:ext uri="{FF2B5EF4-FFF2-40B4-BE49-F238E27FC236}">
+                <a16:creationId xmlns:a16="http://schemas.microsoft.com/office/drawing/2014/main" id="{3F60C58F-3302-3583-6E1D-1DD9CB9F8F14}"/>
+              </a:ext>
+            </a:extLst>
+          </p:cNvPr>
+          <p:cNvCxnSpPr>
+            <a:cxnSpLocks/>
+          </p:cNvCxnSpPr>
+          <p:nvPr/>
+        </p:nvCxnSpPr>
+        <p:spPr>
+          <a:xfrm flipV="1">
+            <a:off x="7329050" y="6114312"/>
+            <a:ext cx="0" cy="174795"/>
+          </a:xfrm>
+          <a:prstGeom prst="straightConnector1">
+            <a:avLst/>
+          </a:prstGeom>
+          <a:ln w="19050">
+            <a:solidFill>
+              <a:srgbClr val="00B0F0"/>
+            </a:solidFill>
+            <a:prstDash val="sysDash"/>
+            <a:tailEnd type="triangle"/>
+          </a:ln>
+        </p:spPr>
+        <p:style>
+          <a:lnRef idx="1">
+            <a:schemeClr val="accent5"/>
+          </a:lnRef>
+          <a:fillRef idx="0">
+            <a:schemeClr val="accent5"/>
+          </a:fillRef>
+          <a:effectRef idx="0">
+            <a:schemeClr val="accent5"/>
+          </a:effectRef>
+          <a:fontRef idx="minor">
+            <a:schemeClr val="tx1"/>
+          </a:fontRef>
+        </p:style>
+      </p:cxnSp>
+      <p:cxnSp>
+        <p:nvCxnSpPr>
+          <p:cNvPr id="78" name="Straight Arrow Connector 77">
+            <a:extLst>
+              <a:ext uri="{FF2B5EF4-FFF2-40B4-BE49-F238E27FC236}">
+                <a16:creationId xmlns:a16="http://schemas.microsoft.com/office/drawing/2014/main" id="{44F93570-DCE3-A7E8-0BB2-DAB647FED11B}"/>
+              </a:ext>
+            </a:extLst>
+          </p:cNvPr>
+          <p:cNvCxnSpPr>
+            <a:cxnSpLocks/>
+          </p:cNvCxnSpPr>
+          <p:nvPr/>
+        </p:nvCxnSpPr>
+        <p:spPr>
+          <a:xfrm flipV="1">
+            <a:off x="4957706" y="5478642"/>
+            <a:ext cx="0" cy="881904"/>
+          </a:xfrm>
+          <a:prstGeom prst="straightConnector1">
+            <a:avLst/>
+          </a:prstGeom>
+          <a:ln w="19050">
+            <a:solidFill>
+              <a:srgbClr val="00B0F0"/>
+            </a:solidFill>
+            <a:prstDash val="sysDash"/>
+            <a:tailEnd type="triangle"/>
+          </a:ln>
+        </p:spPr>
+        <p:style>
+          <a:lnRef idx="1">
+            <a:schemeClr val="accent5"/>
+          </a:lnRef>
+          <a:fillRef idx="0">
+            <a:schemeClr val="accent5"/>
+          </a:fillRef>
+          <a:effectRef idx="0">
+            <a:schemeClr val="accent5"/>
+          </a:effectRef>
+          <a:fontRef idx="minor">
+            <a:schemeClr val="tx1"/>
+          </a:fontRef>
+        </p:style>
+      </p:cxnSp>
+      <p:sp>
+        <p:nvSpPr>
+          <p:cNvPr id="81" name="TextBox 80">
+            <a:extLst>
+              <a:ext uri="{FF2B5EF4-FFF2-40B4-BE49-F238E27FC236}">
+                <a16:creationId xmlns:a16="http://schemas.microsoft.com/office/drawing/2014/main" id="{10F58B76-6B88-DD13-E870-2ECB581FCF00}"/>
+              </a:ext>
+            </a:extLst>
+          </p:cNvPr>
+          <p:cNvSpPr txBox="1"/>
+          <p:nvPr/>
+        </p:nvSpPr>
+        <p:spPr>
+          <a:xfrm>
+            <a:off x="2231109" y="6289107"/>
+            <a:ext cx="2340877" cy="430887"/>
+          </a:xfrm>
+          <a:prstGeom prst="rect">
+            <a:avLst/>
+          </a:prstGeom>
+          <a:noFill/>
+        </p:spPr>
+        <p:txBody>
+          <a:bodyPr wrap="square" rtlCol="0">
+            <a:spAutoFit/>
+          </a:bodyPr>
+          <a:lstStyle/>
+          <a:p>
+            <a:r>
+              <a:rPr lang="en-US" sz="1100" b="1" dirty="0"/>
+              <a:t>Block override control check box [enabled ]</a:t>
+            </a:r>
+            <a:endParaRPr lang="en-SG" sz="1100" b="1" dirty="0"/>
+          </a:p>
+        </p:txBody>
+      </p:sp>
+      <p:cxnSp>
+        <p:nvCxnSpPr>
+          <p:cNvPr id="82" name="Straight Arrow Connector 81">
+            <a:extLst>
+              <a:ext uri="{FF2B5EF4-FFF2-40B4-BE49-F238E27FC236}">
+                <a16:creationId xmlns:a16="http://schemas.microsoft.com/office/drawing/2014/main" id="{4AC9C2A8-06D7-F838-C9E6-0D0EBBEA5797}"/>
+              </a:ext>
+            </a:extLst>
+          </p:cNvPr>
+          <p:cNvCxnSpPr>
+            <a:cxnSpLocks/>
+          </p:cNvCxnSpPr>
+          <p:nvPr/>
+        </p:nvCxnSpPr>
+        <p:spPr>
+          <a:xfrm flipV="1">
+            <a:off x="3281557" y="5733703"/>
+            <a:ext cx="0" cy="545178"/>
+          </a:xfrm>
+          <a:prstGeom prst="straightConnector1">
+            <a:avLst/>
+          </a:prstGeom>
+          <a:ln w="19050">
+            <a:solidFill>
+              <a:srgbClr val="00B0F0"/>
+            </a:solidFill>
+            <a:prstDash val="sysDash"/>
+            <a:tailEnd type="triangle"/>
+          </a:ln>
+        </p:spPr>
+        <p:style>
+          <a:lnRef idx="1">
+            <a:schemeClr val="accent5"/>
+          </a:lnRef>
+          <a:fillRef idx="0">
+            <a:schemeClr val="accent5"/>
+          </a:fillRef>
+          <a:effectRef idx="0">
+            <a:schemeClr val="accent5"/>
+          </a:effectRef>
+          <a:fontRef idx="minor">
+            <a:schemeClr val="tx1"/>
+          </a:fontRef>
+        </p:style>
+      </p:cxnSp>
+    </p:spTree>
+    <p:extLst>
+      <p:ext uri="{BB962C8B-B14F-4D97-AF65-F5344CB8AC3E}">
+        <p14:creationId xmlns:p14="http://schemas.microsoft.com/office/powerpoint/2010/main" val="1572021829"/>
+      </p:ext>
+    </p:extLst>
+  </p:cSld>
+  <p:clrMapOvr>
+    <a:masterClrMapping/>
+  </p:clrMapOvr>
+</p:sld>
+</file>
+
+<file path=ppt/slides/slide5.xml><?xml version="1.0" encoding="utf-8"?>
+<p:sld xmlns:a="http://schemas.openxmlformats.org/drawingml/2006/main" xmlns:r="http://schemas.openxmlformats.org/officeDocument/2006/relationships" xmlns:p="http://schemas.openxmlformats.org/presentationml/2006/main">
+  <p:cSld>
+    <p:spTree>
+      <p:nvGrpSpPr>
+        <p:cNvPr id="1" name=""/>
+        <p:cNvGrpSpPr/>
+        <p:nvPr/>
+      </p:nvGrpSpPr>
+      <p:grpSpPr>
+        <a:xfrm>
+          <a:off x="0" y="0"/>
+          <a:ext cx="0" cy="0"/>
+          <a:chOff x="0" y="0"/>
+          <a:chExt cx="0" cy="0"/>
+        </a:xfrm>
+      </p:grpSpPr>
+      <p:pic>
+        <p:nvPicPr>
+          <p:cNvPr id="5" name="Picture 4" descr="A screenshot of a computer&#10;&#10;AI-generated content may be incorrect.">
+            <a:extLst>
+              <a:ext uri="{FF2B5EF4-FFF2-40B4-BE49-F238E27FC236}">
+                <a16:creationId xmlns:a16="http://schemas.microsoft.com/office/drawing/2014/main" id="{2338347C-42DD-B3C1-CD6F-BEF65ADB4155}"/>
+              </a:ext>
+            </a:extLst>
+          </p:cNvPr>
+          <p:cNvPicPr>
+            <a:picLocks noChangeAspect="1"/>
+          </p:cNvPicPr>
+          <p:nvPr/>
+        </p:nvPicPr>
+        <p:blipFill>
+          <a:blip r:embed="rId2">
+            <a:extLst>
+              <a:ext uri="{28A0092B-C50C-407E-A947-70E740481C1C}">
+                <a14:useLocalDpi xmlns:a14="http://schemas.microsoft.com/office/drawing/2010/main" val="0"/>
+              </a:ext>
+            </a:extLst>
+          </a:blip>
+          <a:stretch>
+            <a:fillRect/>
+          </a:stretch>
+        </p:blipFill>
+        <p:spPr>
+          <a:xfrm>
+            <a:off x="479659" y="684429"/>
+            <a:ext cx="10204384" cy="5489141"/>
+          </a:xfrm>
+          <a:prstGeom prst="rect">
+            <a:avLst/>
+          </a:prstGeom>
+        </p:spPr>
+      </p:pic>
+      <p:cxnSp>
+        <p:nvCxnSpPr>
+          <p:cNvPr id="6" name="Straight Arrow Connector 5">
+            <a:extLst>
+              <a:ext uri="{FF2B5EF4-FFF2-40B4-BE49-F238E27FC236}">
+                <a16:creationId xmlns:a16="http://schemas.microsoft.com/office/drawing/2014/main" id="{0807B5F2-328B-CDD7-C98A-69D562FCE699}"/>
+              </a:ext>
+            </a:extLst>
+          </p:cNvPr>
+          <p:cNvCxnSpPr>
+            <a:cxnSpLocks/>
+          </p:cNvCxnSpPr>
+          <p:nvPr/>
+        </p:nvCxnSpPr>
+        <p:spPr>
+          <a:xfrm>
+            <a:off x="791690" y="612648"/>
+            <a:ext cx="0" cy="566928"/>
+          </a:xfrm>
+          <a:prstGeom prst="straightConnector1">
+            <a:avLst/>
+          </a:prstGeom>
+          <a:ln w="19050">
+            <a:solidFill>
+              <a:schemeClr val="tx2">
+                <a:lumMod val="50000"/>
+                <a:lumOff val="50000"/>
+              </a:schemeClr>
+            </a:solidFill>
+            <a:prstDash val="sysDash"/>
+            <a:tailEnd type="triangle"/>
+          </a:ln>
+        </p:spPr>
+        <p:style>
+          <a:lnRef idx="1">
+            <a:schemeClr val="accent5"/>
+          </a:lnRef>
+          <a:fillRef idx="0">
+            <a:schemeClr val="accent5"/>
+          </a:fillRef>
+          <a:effectRef idx="0">
+            <a:schemeClr val="accent5"/>
+          </a:effectRef>
+          <a:fontRef idx="minor">
+            <a:schemeClr val="tx1"/>
+          </a:fontRef>
+        </p:style>
+      </p:cxnSp>
+      <p:sp>
+        <p:nvSpPr>
+          <p:cNvPr id="7" name="TextBox 6">
+            <a:extLst>
+              <a:ext uri="{FF2B5EF4-FFF2-40B4-BE49-F238E27FC236}">
+                <a16:creationId xmlns:a16="http://schemas.microsoft.com/office/drawing/2014/main" id="{49BC4760-27DD-F627-2FEE-4C12D73667E2}"/>
+              </a:ext>
+            </a:extLst>
+          </p:cNvPr>
+          <p:cNvSpPr txBox="1"/>
+          <p:nvPr/>
+        </p:nvSpPr>
+        <p:spPr>
+          <a:xfrm>
+            <a:off x="479659" y="351038"/>
+            <a:ext cx="672485" cy="261610"/>
+          </a:xfrm>
+          <a:prstGeom prst="rect">
+            <a:avLst/>
+          </a:prstGeom>
+          <a:noFill/>
+        </p:spPr>
+        <p:txBody>
+          <a:bodyPr wrap="square" rtlCol="0">
+            <a:spAutoFit/>
+          </a:bodyPr>
+          <a:lstStyle/>
+          <a:p>
+            <a:r>
+              <a:rPr lang="en-SG" sz="1100" b="1" dirty="0"/>
+              <a:t>Train ID</a:t>
+            </a:r>
+          </a:p>
+        </p:txBody>
+      </p:sp>
+      <p:cxnSp>
+        <p:nvCxnSpPr>
+          <p:cNvPr id="11" name="Straight Arrow Connector 10">
+            <a:extLst>
+              <a:ext uri="{FF2B5EF4-FFF2-40B4-BE49-F238E27FC236}">
+                <a16:creationId xmlns:a16="http://schemas.microsoft.com/office/drawing/2014/main" id="{02A58EDE-68D9-826B-1FE4-E33102B7E067}"/>
+              </a:ext>
+            </a:extLst>
+          </p:cNvPr>
+          <p:cNvCxnSpPr>
+            <a:cxnSpLocks/>
+          </p:cNvCxnSpPr>
+          <p:nvPr/>
+        </p:nvCxnSpPr>
+        <p:spPr>
+          <a:xfrm>
+            <a:off x="5269202" y="580797"/>
+            <a:ext cx="0" cy="723747"/>
+          </a:xfrm>
+          <a:prstGeom prst="straightConnector1">
+            <a:avLst/>
+          </a:prstGeom>
+          <a:ln w="19050">
+            <a:solidFill>
+              <a:schemeClr val="tx2">
+                <a:lumMod val="50000"/>
+                <a:lumOff val="50000"/>
+              </a:schemeClr>
+            </a:solidFill>
+            <a:prstDash val="sysDash"/>
+            <a:tailEnd type="triangle"/>
+          </a:ln>
+        </p:spPr>
+        <p:style>
+          <a:lnRef idx="1">
+            <a:schemeClr val="accent5"/>
+          </a:lnRef>
+          <a:fillRef idx="0">
+            <a:schemeClr val="accent5"/>
+          </a:fillRef>
+          <a:effectRef idx="0">
+            <a:schemeClr val="accent5"/>
+          </a:effectRef>
+          <a:fontRef idx="minor">
+            <a:schemeClr val="tx1"/>
+          </a:fontRef>
+        </p:style>
+      </p:cxnSp>
+      <p:sp>
+        <p:nvSpPr>
+          <p:cNvPr id="13" name="TextBox 12">
+            <a:extLst>
+              <a:ext uri="{FF2B5EF4-FFF2-40B4-BE49-F238E27FC236}">
+                <a16:creationId xmlns:a16="http://schemas.microsoft.com/office/drawing/2014/main" id="{2D4DFB98-F29C-A95C-EA9E-0192DF629C58}"/>
+              </a:ext>
+            </a:extLst>
+          </p:cNvPr>
+          <p:cNvSpPr txBox="1"/>
+          <p:nvPr/>
+        </p:nvSpPr>
+        <p:spPr>
+          <a:xfrm>
+            <a:off x="4791458" y="181760"/>
+            <a:ext cx="1580785" cy="430887"/>
+          </a:xfrm>
+          <a:prstGeom prst="rect">
+            <a:avLst/>
+          </a:prstGeom>
+          <a:noFill/>
+        </p:spPr>
+        <p:txBody>
+          <a:bodyPr wrap="square" rtlCol="0">
+            <a:spAutoFit/>
+          </a:bodyPr>
+          <a:lstStyle/>
+          <a:p>
+            <a:r>
+              <a:rPr lang="en-SG" sz="1100" b="1" dirty="0"/>
+              <a:t>Trains 3</a:t>
+            </a:r>
+            <a:r>
+              <a:rPr lang="en-SG" sz="1100" b="1" baseline="30000" dirty="0"/>
+              <a:t>rd</a:t>
+            </a:r>
+            <a:r>
+              <a:rPr lang="en-SG" sz="1100" b="1" dirty="0"/>
+              <a:t> track Power </a:t>
+            </a:r>
+            <a:r>
+              <a:rPr lang="en-US" sz="1100" b="1" dirty="0"/>
+              <a:t>[</a:t>
+            </a:r>
+            <a:r>
+              <a:rPr lang="en-US" sz="1100" b="1" dirty="0">
+                <a:solidFill>
+                  <a:srgbClr val="FF0000"/>
+                </a:solidFill>
+              </a:rPr>
+              <a:t>Red: supply off</a:t>
+            </a:r>
+            <a:r>
+              <a:rPr lang="en-US" sz="1100" b="1" dirty="0"/>
+              <a:t>] </a:t>
+            </a:r>
+            <a:endParaRPr lang="en-SG" sz="1100" b="1" dirty="0"/>
+          </a:p>
+        </p:txBody>
+      </p:sp>
+      <p:sp>
+        <p:nvSpPr>
+          <p:cNvPr id="15" name="TextBox 14">
+            <a:extLst>
+              <a:ext uri="{FF2B5EF4-FFF2-40B4-BE49-F238E27FC236}">
+                <a16:creationId xmlns:a16="http://schemas.microsoft.com/office/drawing/2014/main" id="{FAB21A99-1E18-B11A-9363-8820882A04D8}"/>
+              </a:ext>
+            </a:extLst>
+          </p:cNvPr>
+          <p:cNvSpPr txBox="1"/>
+          <p:nvPr/>
+        </p:nvSpPr>
+        <p:spPr>
+          <a:xfrm>
+            <a:off x="1152144" y="201726"/>
+            <a:ext cx="1580785" cy="430887"/>
+          </a:xfrm>
+          <a:prstGeom prst="rect">
+            <a:avLst/>
+          </a:prstGeom>
+          <a:noFill/>
+        </p:spPr>
+        <p:txBody>
+          <a:bodyPr wrap="square" rtlCol="0">
+            <a:spAutoFit/>
+          </a:bodyPr>
+          <a:lstStyle/>
+          <a:p>
+            <a:r>
+              <a:rPr lang="en-SG" sz="1100" b="1" dirty="0"/>
+              <a:t>Train 3</a:t>
+            </a:r>
+            <a:r>
+              <a:rPr lang="en-SG" sz="1100" b="1" baseline="30000" dirty="0"/>
+              <a:t>rd</a:t>
+            </a:r>
+            <a:r>
+              <a:rPr lang="en-SG" sz="1100" b="1" dirty="0"/>
+              <a:t> track Power </a:t>
+            </a:r>
+            <a:r>
+              <a:rPr lang="en-US" sz="1100" b="1" dirty="0"/>
+              <a:t>[</a:t>
+            </a:r>
+            <a:r>
+              <a:rPr lang="en-US" sz="1100" b="1" dirty="0">
+                <a:solidFill>
+                  <a:schemeClr val="accent6">
+                    <a:lumMod val="75000"/>
+                  </a:schemeClr>
+                </a:solidFill>
+              </a:rPr>
+              <a:t>Green: supply on</a:t>
+            </a:r>
+            <a:r>
+              <a:rPr lang="en-US" sz="1100" b="1" dirty="0"/>
+              <a:t>] </a:t>
+            </a:r>
+            <a:endParaRPr lang="en-SG" sz="1100" b="1" dirty="0"/>
+          </a:p>
+        </p:txBody>
+      </p:sp>
+      <p:cxnSp>
+        <p:nvCxnSpPr>
+          <p:cNvPr id="16" name="Straight Arrow Connector 15">
+            <a:extLst>
+              <a:ext uri="{FF2B5EF4-FFF2-40B4-BE49-F238E27FC236}">
+                <a16:creationId xmlns:a16="http://schemas.microsoft.com/office/drawing/2014/main" id="{24F36DE9-BFE9-5F2C-B143-513D3563EBCB}"/>
+              </a:ext>
+            </a:extLst>
+          </p:cNvPr>
+          <p:cNvCxnSpPr>
+            <a:cxnSpLocks/>
+          </p:cNvCxnSpPr>
+          <p:nvPr/>
+        </p:nvCxnSpPr>
+        <p:spPr>
+          <a:xfrm>
+            <a:off x="1935650" y="632613"/>
+            <a:ext cx="0" cy="757275"/>
+          </a:xfrm>
+          <a:prstGeom prst="straightConnector1">
+            <a:avLst/>
+          </a:prstGeom>
+          <a:ln w="19050">
+            <a:solidFill>
+              <a:schemeClr val="tx2">
+                <a:lumMod val="50000"/>
+                <a:lumOff val="50000"/>
+              </a:schemeClr>
+            </a:solidFill>
+            <a:prstDash val="sysDash"/>
+            <a:tailEnd type="triangle"/>
+          </a:ln>
+        </p:spPr>
+        <p:style>
+          <a:lnRef idx="1">
+            <a:schemeClr val="accent5"/>
+          </a:lnRef>
+          <a:fillRef idx="0">
+            <a:schemeClr val="accent5"/>
+          </a:fillRef>
+          <a:effectRef idx="0">
+            <a:schemeClr val="accent5"/>
+          </a:effectRef>
+          <a:fontRef idx="minor">
+            <a:schemeClr val="tx1"/>
+          </a:fontRef>
+        </p:style>
+      </p:cxnSp>
+      <p:sp>
+        <p:nvSpPr>
+          <p:cNvPr id="18" name="TextBox 17">
+            <a:extLst>
+              <a:ext uri="{FF2B5EF4-FFF2-40B4-BE49-F238E27FC236}">
+                <a16:creationId xmlns:a16="http://schemas.microsoft.com/office/drawing/2014/main" id="{CE4095F9-16C2-2D52-85EA-EF68821754F5}"/>
+              </a:ext>
+            </a:extLst>
+          </p:cNvPr>
+          <p:cNvSpPr txBox="1"/>
+          <p:nvPr/>
+        </p:nvSpPr>
+        <p:spPr>
+          <a:xfrm>
+            <a:off x="2636752" y="181761"/>
+            <a:ext cx="1198990" cy="430887"/>
+          </a:xfrm>
+          <a:prstGeom prst="rect">
+            <a:avLst/>
+          </a:prstGeom>
+          <a:noFill/>
+        </p:spPr>
+        <p:txBody>
+          <a:bodyPr wrap="square" rtlCol="0">
+            <a:spAutoFit/>
+          </a:bodyPr>
+          <a:lstStyle/>
+          <a:p>
+            <a:r>
+              <a:rPr lang="en-SG" sz="1100" b="1" dirty="0"/>
+              <a:t>Train current speed gauge </a:t>
+            </a:r>
+          </a:p>
+        </p:txBody>
+      </p:sp>
+      <p:cxnSp>
+        <p:nvCxnSpPr>
+          <p:cNvPr id="19" name="Straight Arrow Connector 18">
+            <a:extLst>
+              <a:ext uri="{FF2B5EF4-FFF2-40B4-BE49-F238E27FC236}">
+                <a16:creationId xmlns:a16="http://schemas.microsoft.com/office/drawing/2014/main" id="{DEFC3874-AC75-75AE-ED10-71A22313D6E3}"/>
+              </a:ext>
+            </a:extLst>
+          </p:cNvPr>
+          <p:cNvCxnSpPr>
+            <a:cxnSpLocks/>
+          </p:cNvCxnSpPr>
+          <p:nvPr/>
+        </p:nvCxnSpPr>
+        <p:spPr>
+          <a:xfrm flipH="1">
+            <a:off x="2896730" y="623597"/>
+            <a:ext cx="13772" cy="903579"/>
+          </a:xfrm>
+          <a:prstGeom prst="straightConnector1">
+            <a:avLst/>
+          </a:prstGeom>
+          <a:ln w="19050">
+            <a:solidFill>
+              <a:schemeClr val="tx2">
+                <a:lumMod val="50000"/>
+                <a:lumOff val="50000"/>
+              </a:schemeClr>
+            </a:solidFill>
+            <a:prstDash val="sysDash"/>
+            <a:tailEnd type="triangle"/>
+          </a:ln>
+        </p:spPr>
+        <p:style>
+          <a:lnRef idx="1">
+            <a:schemeClr val="accent5"/>
+          </a:lnRef>
+          <a:fillRef idx="0">
+            <a:schemeClr val="accent5"/>
+          </a:fillRef>
+          <a:effectRef idx="0">
+            <a:schemeClr val="accent5"/>
+          </a:effectRef>
+          <a:fontRef idx="minor">
+            <a:schemeClr val="tx1"/>
+          </a:fontRef>
+        </p:style>
+      </p:cxnSp>
+      <p:sp>
+        <p:nvSpPr>
+          <p:cNvPr id="21" name="TextBox 20">
+            <a:extLst>
+              <a:ext uri="{FF2B5EF4-FFF2-40B4-BE49-F238E27FC236}">
+                <a16:creationId xmlns:a16="http://schemas.microsoft.com/office/drawing/2014/main" id="{FB326C36-F6F8-B051-48E6-F6A42AA11165}"/>
+              </a:ext>
+            </a:extLst>
+          </p:cNvPr>
+          <p:cNvSpPr txBox="1"/>
+          <p:nvPr/>
+        </p:nvSpPr>
+        <p:spPr>
+          <a:xfrm>
+            <a:off x="3766537" y="193139"/>
+            <a:ext cx="1198990" cy="430887"/>
+          </a:xfrm>
+          <a:prstGeom prst="rect">
+            <a:avLst/>
+          </a:prstGeom>
+          <a:noFill/>
+        </p:spPr>
+        <p:txBody>
+          <a:bodyPr wrap="square" rtlCol="0">
+            <a:spAutoFit/>
+          </a:bodyPr>
+          <a:lstStyle/>
+          <a:p>
+            <a:r>
+              <a:rPr lang="en-SG" sz="1100" b="1" dirty="0"/>
+              <a:t>Train DC Current value</a:t>
+            </a:r>
+          </a:p>
+        </p:txBody>
+      </p:sp>
+      <p:cxnSp>
+        <p:nvCxnSpPr>
+          <p:cNvPr id="25" name="Connector: Elbow 24">
+            <a:extLst>
+              <a:ext uri="{FF2B5EF4-FFF2-40B4-BE49-F238E27FC236}">
+                <a16:creationId xmlns:a16="http://schemas.microsoft.com/office/drawing/2014/main" id="{D0AAE9EC-B089-EEB6-4911-B6DA00727685}"/>
+              </a:ext>
+            </a:extLst>
+          </p:cNvPr>
+          <p:cNvCxnSpPr>
+            <a:cxnSpLocks/>
+          </p:cNvCxnSpPr>
+          <p:nvPr/>
+        </p:nvCxnSpPr>
+        <p:spPr>
+          <a:xfrm rot="5400000">
+            <a:off x="3502979" y="992199"/>
+            <a:ext cx="1122907" cy="385702"/>
+          </a:xfrm>
+          <a:prstGeom prst="bentConnector3">
+            <a:avLst>
+              <a:gd name="adj1" fmla="val 99673"/>
+            </a:avLst>
+          </a:prstGeom>
+          <a:ln>
+            <a:solidFill>
+              <a:schemeClr val="tx2">
+                <a:lumMod val="75000"/>
+                <a:lumOff val="25000"/>
+              </a:schemeClr>
+            </a:solidFill>
+            <a:prstDash val="sysDash"/>
+            <a:tailEnd type="triangle"/>
+          </a:ln>
+        </p:spPr>
+        <p:style>
+          <a:lnRef idx="2">
+            <a:schemeClr val="accent1"/>
+          </a:lnRef>
+          <a:fillRef idx="0">
+            <a:schemeClr val="accent1"/>
+          </a:fillRef>
+          <a:effectRef idx="1">
+            <a:schemeClr val="accent1"/>
+          </a:effectRef>
+          <a:fontRef idx="minor">
+            <a:schemeClr val="tx1"/>
+          </a:fontRef>
+        </p:style>
+      </p:cxnSp>
+      <p:sp>
+        <p:nvSpPr>
+          <p:cNvPr id="28" name="TextBox 27">
+            <a:extLst>
+              <a:ext uri="{FF2B5EF4-FFF2-40B4-BE49-F238E27FC236}">
+                <a16:creationId xmlns:a16="http://schemas.microsoft.com/office/drawing/2014/main" id="{4409BB97-394F-ADBE-5ECF-DD2D4486506F}"/>
+              </a:ext>
+            </a:extLst>
+          </p:cNvPr>
+          <p:cNvSpPr txBox="1"/>
+          <p:nvPr/>
+        </p:nvSpPr>
+        <p:spPr>
+          <a:xfrm>
+            <a:off x="6323304" y="170381"/>
+            <a:ext cx="1198990" cy="430887"/>
+          </a:xfrm>
+          <a:prstGeom prst="rect">
+            <a:avLst/>
+          </a:prstGeom>
+          <a:noFill/>
+        </p:spPr>
+        <p:txBody>
+          <a:bodyPr wrap="square" rtlCol="0">
+            <a:spAutoFit/>
+          </a:bodyPr>
+          <a:lstStyle/>
+          <a:p>
+            <a:r>
+              <a:rPr lang="en-SG" sz="1100" b="1" dirty="0"/>
+              <a:t>Train DC voltage value</a:t>
+            </a:r>
+          </a:p>
+        </p:txBody>
+      </p:sp>
+      <p:cxnSp>
+        <p:nvCxnSpPr>
+          <p:cNvPr id="29" name="Connector: Elbow 28">
+            <a:extLst>
+              <a:ext uri="{FF2B5EF4-FFF2-40B4-BE49-F238E27FC236}">
+                <a16:creationId xmlns:a16="http://schemas.microsoft.com/office/drawing/2014/main" id="{40D7408B-903F-C103-47CB-35898311A42D}"/>
+              </a:ext>
+            </a:extLst>
+          </p:cNvPr>
+          <p:cNvCxnSpPr>
+            <a:cxnSpLocks/>
+          </p:cNvCxnSpPr>
+          <p:nvPr/>
+        </p:nvCxnSpPr>
+        <p:spPr>
+          <a:xfrm rot="16200000" flipH="1">
+            <a:off x="5850845" y="1172971"/>
+            <a:ext cx="1551177" cy="290837"/>
+          </a:xfrm>
+          <a:prstGeom prst="bentConnector3">
+            <a:avLst>
+              <a:gd name="adj1" fmla="val 99517"/>
+            </a:avLst>
+          </a:prstGeom>
+          <a:ln>
+            <a:solidFill>
+              <a:schemeClr val="tx2">
+                <a:lumMod val="75000"/>
+                <a:lumOff val="25000"/>
+              </a:schemeClr>
+            </a:solidFill>
+            <a:prstDash val="sysDash"/>
+            <a:tailEnd type="triangle"/>
+          </a:ln>
+        </p:spPr>
+        <p:style>
+          <a:lnRef idx="2">
+            <a:schemeClr val="accent1"/>
+          </a:lnRef>
+          <a:fillRef idx="0">
+            <a:schemeClr val="accent1"/>
+          </a:fillRef>
+          <a:effectRef idx="1">
+            <a:schemeClr val="accent1"/>
+          </a:effectRef>
+          <a:fontRef idx="minor">
+            <a:schemeClr val="tx1"/>
+          </a:fontRef>
+        </p:style>
+      </p:cxnSp>
+      <p:sp>
+        <p:nvSpPr>
+          <p:cNvPr id="32" name="TextBox 31">
+            <a:extLst>
+              <a:ext uri="{FF2B5EF4-FFF2-40B4-BE49-F238E27FC236}">
+                <a16:creationId xmlns:a16="http://schemas.microsoft.com/office/drawing/2014/main" id="{08306A7D-3A7E-733F-3851-330EE3860218}"/>
+              </a:ext>
+            </a:extLst>
+          </p:cNvPr>
+          <p:cNvSpPr txBox="1"/>
+          <p:nvPr/>
+        </p:nvSpPr>
+        <p:spPr>
+          <a:xfrm>
+            <a:off x="7349815" y="170381"/>
+            <a:ext cx="1267698" cy="430887"/>
+          </a:xfrm>
+          <a:prstGeom prst="rect">
+            <a:avLst/>
+          </a:prstGeom>
+          <a:noFill/>
+        </p:spPr>
+        <p:txBody>
+          <a:bodyPr wrap="square" rtlCol="0">
+            <a:spAutoFit/>
+          </a:bodyPr>
+          <a:lstStyle/>
+          <a:p>
+            <a:r>
+              <a:rPr lang="en-US" sz="1100" b="1" dirty="0"/>
+              <a:t>Date &amp; Time Indicator </a:t>
+            </a:r>
+            <a:endParaRPr lang="en-SG" sz="1100" b="1" dirty="0"/>
+          </a:p>
+        </p:txBody>
+      </p:sp>
+      <p:cxnSp>
+        <p:nvCxnSpPr>
+          <p:cNvPr id="33" name="Straight Arrow Connector 32">
+            <a:extLst>
+              <a:ext uri="{FF2B5EF4-FFF2-40B4-BE49-F238E27FC236}">
+                <a16:creationId xmlns:a16="http://schemas.microsoft.com/office/drawing/2014/main" id="{DBC28BB2-5AAA-4C45-2A02-E6E03F264AE1}"/>
+              </a:ext>
+            </a:extLst>
+          </p:cNvPr>
+          <p:cNvCxnSpPr>
+            <a:cxnSpLocks/>
+          </p:cNvCxnSpPr>
+          <p:nvPr/>
+        </p:nvCxnSpPr>
+        <p:spPr>
+          <a:xfrm>
+            <a:off x="7650366" y="580797"/>
+            <a:ext cx="0" cy="418012"/>
+          </a:xfrm>
+          <a:prstGeom prst="straightConnector1">
+            <a:avLst/>
+          </a:prstGeom>
+          <a:ln w="19050">
+            <a:solidFill>
+              <a:srgbClr val="00B0F0"/>
+            </a:solidFill>
+            <a:prstDash val="sysDash"/>
+            <a:tailEnd type="triangle"/>
+          </a:ln>
+        </p:spPr>
+        <p:style>
+          <a:lnRef idx="1">
+            <a:schemeClr val="accent5"/>
+          </a:lnRef>
+          <a:fillRef idx="0">
+            <a:schemeClr val="accent5"/>
+          </a:fillRef>
+          <a:effectRef idx="0">
+            <a:schemeClr val="accent5"/>
+          </a:effectRef>
+          <a:fontRef idx="minor">
+            <a:schemeClr val="tx1"/>
+          </a:fontRef>
+        </p:style>
+      </p:cxnSp>
+      <p:sp>
+        <p:nvSpPr>
+          <p:cNvPr id="35" name="TextBox 34">
+            <a:extLst>
+              <a:ext uri="{FF2B5EF4-FFF2-40B4-BE49-F238E27FC236}">
+                <a16:creationId xmlns:a16="http://schemas.microsoft.com/office/drawing/2014/main" id="{1FA53DCB-A532-9B5A-8A7D-1166D41F15F6}"/>
+              </a:ext>
+            </a:extLst>
+          </p:cNvPr>
+          <p:cNvSpPr txBox="1"/>
+          <p:nvPr/>
+        </p:nvSpPr>
+        <p:spPr>
+          <a:xfrm>
+            <a:off x="8284215" y="154886"/>
+            <a:ext cx="1267698" cy="430887"/>
+          </a:xfrm>
+          <a:prstGeom prst="rect">
+            <a:avLst/>
+          </a:prstGeom>
+          <a:noFill/>
+        </p:spPr>
+        <p:txBody>
+          <a:bodyPr wrap="square" rtlCol="0">
+            <a:spAutoFit/>
+          </a:bodyPr>
+          <a:lstStyle/>
+          <a:p>
+            <a:r>
+              <a:rPr lang="en-US" sz="1100" b="1" dirty="0"/>
+              <a:t>Trains RTU Information </a:t>
+            </a:r>
+            <a:endParaRPr lang="en-SG" sz="1100" b="1" dirty="0"/>
+          </a:p>
+        </p:txBody>
+      </p:sp>
+      <p:cxnSp>
+        <p:nvCxnSpPr>
+          <p:cNvPr id="36" name="Straight Arrow Connector 35">
+            <a:extLst>
+              <a:ext uri="{FF2B5EF4-FFF2-40B4-BE49-F238E27FC236}">
+                <a16:creationId xmlns:a16="http://schemas.microsoft.com/office/drawing/2014/main" id="{B3AF8FF0-3A6E-08E8-E4CB-3819F5DCBB26}"/>
+              </a:ext>
+            </a:extLst>
+          </p:cNvPr>
+          <p:cNvCxnSpPr>
+            <a:cxnSpLocks/>
+          </p:cNvCxnSpPr>
+          <p:nvPr/>
+        </p:nvCxnSpPr>
+        <p:spPr>
+          <a:xfrm>
+            <a:off x="8518479" y="481843"/>
+            <a:ext cx="0" cy="822701"/>
+          </a:xfrm>
+          <a:prstGeom prst="straightConnector1">
+            <a:avLst/>
+          </a:prstGeom>
+          <a:ln w="19050">
+            <a:solidFill>
+              <a:srgbClr val="00B0F0"/>
+            </a:solidFill>
+            <a:prstDash val="sysDash"/>
+            <a:tailEnd type="triangle"/>
+          </a:ln>
+        </p:spPr>
+        <p:style>
+          <a:lnRef idx="1">
+            <a:schemeClr val="accent5"/>
+          </a:lnRef>
+          <a:fillRef idx="0">
+            <a:schemeClr val="accent5"/>
+          </a:fillRef>
+          <a:effectRef idx="0">
+            <a:schemeClr val="accent5"/>
+          </a:effectRef>
+          <a:fontRef idx="minor">
+            <a:schemeClr val="tx1"/>
+          </a:fontRef>
+        </p:style>
+      </p:cxnSp>
+      <p:cxnSp>
+        <p:nvCxnSpPr>
+          <p:cNvPr id="39" name="Straight Arrow Connector 38">
+            <a:extLst>
+              <a:ext uri="{FF2B5EF4-FFF2-40B4-BE49-F238E27FC236}">
+                <a16:creationId xmlns:a16="http://schemas.microsoft.com/office/drawing/2014/main" id="{684E1F65-9C13-AF1B-76CF-FD0081679713}"/>
+              </a:ext>
+            </a:extLst>
+          </p:cNvPr>
+          <p:cNvCxnSpPr>
+            <a:cxnSpLocks/>
+          </p:cNvCxnSpPr>
+          <p:nvPr/>
+        </p:nvCxnSpPr>
+        <p:spPr>
+          <a:xfrm>
+            <a:off x="9731583" y="542801"/>
+            <a:ext cx="0" cy="702460"/>
+          </a:xfrm>
+          <a:prstGeom prst="straightConnector1">
+            <a:avLst/>
+          </a:prstGeom>
+          <a:ln w="19050">
+            <a:solidFill>
+              <a:srgbClr val="00B0F0"/>
+            </a:solidFill>
+            <a:prstDash val="sysDash"/>
+            <a:tailEnd type="triangle"/>
+          </a:ln>
+        </p:spPr>
+        <p:style>
+          <a:lnRef idx="1">
+            <a:schemeClr val="accent5"/>
+          </a:lnRef>
+          <a:fillRef idx="0">
+            <a:schemeClr val="accent5"/>
+          </a:fillRef>
+          <a:effectRef idx="0">
+            <a:schemeClr val="accent5"/>
+          </a:effectRef>
+          <a:fontRef idx="minor">
+            <a:schemeClr val="tx1"/>
+          </a:fontRef>
+        </p:style>
+      </p:cxnSp>
+      <p:sp>
+        <p:nvSpPr>
+          <p:cNvPr id="41" name="TextBox 40">
+            <a:extLst>
+              <a:ext uri="{FF2B5EF4-FFF2-40B4-BE49-F238E27FC236}">
+                <a16:creationId xmlns:a16="http://schemas.microsoft.com/office/drawing/2014/main" id="{E26E45A2-ECD5-A5DD-94E6-9082FE952931}"/>
+              </a:ext>
+            </a:extLst>
+          </p:cNvPr>
+          <p:cNvSpPr txBox="1"/>
+          <p:nvPr/>
+        </p:nvSpPr>
+        <p:spPr>
+          <a:xfrm>
+            <a:off x="9251361" y="108500"/>
+            <a:ext cx="2674822" cy="600164"/>
+          </a:xfrm>
+          <a:prstGeom prst="rect">
+            <a:avLst/>
+          </a:prstGeom>
+          <a:noFill/>
+        </p:spPr>
+        <p:txBody>
+          <a:bodyPr wrap="square" rtlCol="0">
+            <a:spAutoFit/>
+          </a:bodyPr>
+          <a:lstStyle/>
+          <a:p>
+            <a:r>
+              <a:rPr lang="en-US" sz="1100" b="1" dirty="0"/>
+              <a:t>Trains current front radar detection state [</a:t>
+            </a:r>
+            <a:r>
+              <a:rPr lang="en-US" sz="1100" b="1" dirty="0">
+                <a:solidFill>
+                  <a:schemeClr val="accent6">
+                    <a:lumMod val="75000"/>
+                  </a:schemeClr>
+                </a:solidFill>
+              </a:rPr>
+              <a:t>Green: front clear, safe</a:t>
+            </a:r>
+            <a:r>
+              <a:rPr lang="en-US" sz="1100" b="1" dirty="0"/>
+              <a:t>] </a:t>
+            </a:r>
+            <a:endParaRPr lang="en-SG" sz="1100" b="1" dirty="0"/>
+          </a:p>
+          <a:p>
+            <a:endParaRPr lang="en-SG" sz="1100" b="1" dirty="0"/>
+          </a:p>
+        </p:txBody>
+      </p:sp>
+      <p:sp>
+        <p:nvSpPr>
+          <p:cNvPr id="45" name="TextBox 44">
+            <a:extLst>
+              <a:ext uri="{FF2B5EF4-FFF2-40B4-BE49-F238E27FC236}">
+                <a16:creationId xmlns:a16="http://schemas.microsoft.com/office/drawing/2014/main" id="{93EC7C5A-7FE9-48DC-BF63-497380B27357}"/>
+              </a:ext>
+            </a:extLst>
+          </p:cNvPr>
+          <p:cNvSpPr txBox="1"/>
+          <p:nvPr/>
+        </p:nvSpPr>
+        <p:spPr>
+          <a:xfrm>
+            <a:off x="10640400" y="620447"/>
+            <a:ext cx="1744639" cy="600164"/>
+          </a:xfrm>
+          <a:prstGeom prst="rect">
+            <a:avLst/>
+          </a:prstGeom>
+          <a:noFill/>
+        </p:spPr>
+        <p:txBody>
+          <a:bodyPr wrap="square" rtlCol="0">
+            <a:spAutoFit/>
+          </a:bodyPr>
+          <a:lstStyle/>
+          <a:p>
+            <a:r>
+              <a:rPr lang="en-US" sz="1100" b="1" dirty="0"/>
+              <a:t>Trains current front radar detection state [</a:t>
+            </a:r>
+            <a:r>
+              <a:rPr lang="en-US" sz="1100" b="1" dirty="0">
+                <a:solidFill>
+                  <a:schemeClr val="accent2">
+                    <a:lumMod val="50000"/>
+                  </a:schemeClr>
+                </a:solidFill>
+              </a:rPr>
+              <a:t>Brown: Detected </a:t>
+            </a:r>
+            <a:r>
+              <a:rPr lang="en-US" sz="1100" b="1" dirty="0"/>
+              <a:t>] </a:t>
+            </a:r>
+            <a:endParaRPr lang="en-SG" sz="1100" b="1" dirty="0"/>
+          </a:p>
+        </p:txBody>
+      </p:sp>
+      <p:cxnSp>
+        <p:nvCxnSpPr>
+          <p:cNvPr id="48" name="Connector: Elbow 47">
+            <a:extLst>
+              <a:ext uri="{FF2B5EF4-FFF2-40B4-BE49-F238E27FC236}">
+                <a16:creationId xmlns:a16="http://schemas.microsoft.com/office/drawing/2014/main" id="{69181475-6D69-F891-D16E-DB930E40B14E}"/>
+              </a:ext>
+            </a:extLst>
+          </p:cNvPr>
+          <p:cNvCxnSpPr>
+            <a:cxnSpLocks/>
+            <a:stCxn id="45" idx="2"/>
+          </p:cNvCxnSpPr>
+          <p:nvPr/>
+        </p:nvCxnSpPr>
+        <p:spPr>
+          <a:xfrm rot="5400000">
+            <a:off x="10857014" y="829907"/>
+            <a:ext cx="265003" cy="1046410"/>
+          </a:xfrm>
+          <a:prstGeom prst="bentConnector2">
+            <a:avLst/>
+          </a:prstGeom>
+          <a:ln>
+            <a:solidFill>
+              <a:schemeClr val="tx2">
+                <a:lumMod val="50000"/>
+                <a:lumOff val="50000"/>
+              </a:schemeClr>
+            </a:solidFill>
+            <a:prstDash val="sysDash"/>
+            <a:tailEnd type="triangle"/>
+          </a:ln>
+        </p:spPr>
+        <p:style>
+          <a:lnRef idx="2">
+            <a:schemeClr val="accent1"/>
+          </a:lnRef>
+          <a:fillRef idx="0">
+            <a:schemeClr val="accent1"/>
+          </a:fillRef>
+          <a:effectRef idx="1">
+            <a:schemeClr val="accent1"/>
+          </a:effectRef>
+          <a:fontRef idx="minor">
+            <a:schemeClr val="tx1"/>
+          </a:fontRef>
+        </p:style>
+      </p:cxnSp>
+      <p:sp>
+        <p:nvSpPr>
+          <p:cNvPr id="50" name="TextBox 49">
+            <a:extLst>
+              <a:ext uri="{FF2B5EF4-FFF2-40B4-BE49-F238E27FC236}">
+                <a16:creationId xmlns:a16="http://schemas.microsoft.com/office/drawing/2014/main" id="{3509190C-B7CD-96B8-7521-2485F9716CA3}"/>
+              </a:ext>
+            </a:extLst>
+          </p:cNvPr>
+          <p:cNvSpPr txBox="1"/>
+          <p:nvPr/>
+        </p:nvSpPr>
+        <p:spPr>
+          <a:xfrm>
+            <a:off x="10814735" y="1610207"/>
+            <a:ext cx="1313130" cy="1954381"/>
+          </a:xfrm>
+          <a:prstGeom prst="rect">
+            <a:avLst/>
+          </a:prstGeom>
+          <a:noFill/>
+        </p:spPr>
+        <p:txBody>
+          <a:bodyPr wrap="square" rtlCol="0">
+            <a:spAutoFit/>
+          </a:bodyPr>
+          <a:lstStyle/>
+          <a:p>
+            <a:r>
+              <a:rPr lang="en-US" sz="1100" b="1" dirty="0"/>
+              <a:t>Test Mode </a:t>
+            </a:r>
+            <a:r>
+              <a:rPr lang="en-US" sz="1100" b="1" dirty="0">
+                <a:solidFill>
+                  <a:srgbClr val="C00000"/>
+                </a:solidFill>
+              </a:rPr>
+              <a:t>OFF</a:t>
+            </a:r>
+            <a:r>
+              <a:rPr lang="en-US" sz="1100" b="1" dirty="0"/>
+              <a:t>:</a:t>
+            </a:r>
+          </a:p>
+          <a:p>
+            <a:r>
+              <a:rPr lang="en-US" sz="1100" b="1" dirty="0"/>
+              <a:t>- Display Trains RTU Raw Data: </a:t>
+            </a:r>
+          </a:p>
+          <a:p>
+            <a:endParaRPr lang="en-US" sz="1100" b="1" dirty="0"/>
+          </a:p>
+          <a:p>
+            <a:r>
+              <a:rPr lang="en-US" sz="1100" b="1" dirty="0"/>
+              <a:t>Test Mode </a:t>
+            </a:r>
+            <a:r>
+              <a:rPr lang="en-US" sz="1100" b="1" dirty="0">
+                <a:solidFill>
+                  <a:schemeClr val="accent6">
+                    <a:lumMod val="75000"/>
+                  </a:schemeClr>
+                </a:solidFill>
+              </a:rPr>
+              <a:t>ON</a:t>
+            </a:r>
+            <a:r>
+              <a:rPr lang="en-US" sz="1100" b="1" dirty="0"/>
+              <a:t>:</a:t>
+            </a:r>
+          </a:p>
+          <a:p>
+            <a:r>
+              <a:rPr lang="en-US" sz="1100" b="1" dirty="0"/>
+              <a:t>- Editable for user to input different value to test alert handler and filter function.</a:t>
+            </a:r>
+          </a:p>
+          <a:p>
+            <a:endParaRPr lang="en-SG" sz="1100" b="1" dirty="0"/>
+          </a:p>
+        </p:txBody>
+      </p:sp>
+      <p:sp>
+        <p:nvSpPr>
+          <p:cNvPr id="51" name="Right Brace 50">
+            <a:extLst>
+              <a:ext uri="{FF2B5EF4-FFF2-40B4-BE49-F238E27FC236}">
+                <a16:creationId xmlns:a16="http://schemas.microsoft.com/office/drawing/2014/main" id="{A3D072B4-43C8-8EAA-D60D-280AE6C0E508}"/>
+              </a:ext>
+            </a:extLst>
+          </p:cNvPr>
+          <p:cNvSpPr/>
+          <p:nvPr/>
+        </p:nvSpPr>
+        <p:spPr>
+          <a:xfrm>
+            <a:off x="10684043" y="1828800"/>
+            <a:ext cx="130692" cy="1380744"/>
+          </a:xfrm>
+          <a:prstGeom prst="rightBrace">
+            <a:avLst/>
+          </a:prstGeom>
+        </p:spPr>
+        <p:style>
+          <a:lnRef idx="2">
+            <a:schemeClr val="accent1"/>
+          </a:lnRef>
+          <a:fillRef idx="0">
+            <a:schemeClr val="accent1"/>
+          </a:fillRef>
+          <a:effectRef idx="1">
+            <a:schemeClr val="accent1"/>
+          </a:effectRef>
+          <a:fontRef idx="minor">
+            <a:schemeClr val="tx1"/>
+          </a:fontRef>
+        </p:style>
+        <p:txBody>
+          <a:bodyPr rtlCol="0" anchor="ctr"/>
+          <a:lstStyle/>
+          <a:p>
+            <a:pPr algn="ctr"/>
+            <a:endParaRPr lang="en-SG" dirty="0"/>
+          </a:p>
+        </p:txBody>
+      </p:sp>
+      <p:cxnSp>
+        <p:nvCxnSpPr>
+          <p:cNvPr id="62" name="Straight Arrow Connector 61">
+            <a:extLst>
+              <a:ext uri="{FF2B5EF4-FFF2-40B4-BE49-F238E27FC236}">
+                <a16:creationId xmlns:a16="http://schemas.microsoft.com/office/drawing/2014/main" id="{20584A0D-3541-5ADD-0B0B-47224BEBBB94}"/>
+              </a:ext>
+            </a:extLst>
+          </p:cNvPr>
+          <p:cNvCxnSpPr>
+            <a:cxnSpLocks/>
+          </p:cNvCxnSpPr>
+          <p:nvPr/>
+        </p:nvCxnSpPr>
+        <p:spPr>
+          <a:xfrm flipH="1">
+            <a:off x="10466310" y="3658355"/>
+            <a:ext cx="307331" cy="0"/>
+          </a:xfrm>
+          <a:prstGeom prst="straightConnector1">
+            <a:avLst/>
+          </a:prstGeom>
+          <a:ln w="19050">
+            <a:solidFill>
+              <a:schemeClr val="tx2">
+                <a:lumMod val="50000"/>
+                <a:lumOff val="50000"/>
+              </a:schemeClr>
+            </a:solidFill>
+            <a:prstDash val="sysDash"/>
+            <a:tailEnd type="triangle"/>
+          </a:ln>
+        </p:spPr>
+        <p:style>
+          <a:lnRef idx="1">
+            <a:schemeClr val="accent5"/>
+          </a:lnRef>
+          <a:fillRef idx="0">
+            <a:schemeClr val="accent5"/>
+          </a:fillRef>
+          <a:effectRef idx="0">
+            <a:schemeClr val="accent5"/>
+          </a:effectRef>
+          <a:fontRef idx="minor">
+            <a:schemeClr val="tx1"/>
+          </a:fontRef>
+        </p:style>
+      </p:cxnSp>
+      <p:sp>
+        <p:nvSpPr>
+          <p:cNvPr id="63" name="TextBox 62">
+            <a:extLst>
+              <a:ext uri="{FF2B5EF4-FFF2-40B4-BE49-F238E27FC236}">
+                <a16:creationId xmlns:a16="http://schemas.microsoft.com/office/drawing/2014/main" id="{0C6E9967-6B94-B0EF-E5CB-B776DCE62855}"/>
+              </a:ext>
+            </a:extLst>
+          </p:cNvPr>
+          <p:cNvSpPr txBox="1"/>
+          <p:nvPr/>
+        </p:nvSpPr>
+        <p:spPr>
+          <a:xfrm>
+            <a:off x="10813414" y="3432619"/>
+            <a:ext cx="1216075" cy="261610"/>
+          </a:xfrm>
+          <a:prstGeom prst="rect">
+            <a:avLst/>
+          </a:prstGeom>
+          <a:noFill/>
+        </p:spPr>
+        <p:txBody>
+          <a:bodyPr wrap="square" rtlCol="0">
+            <a:spAutoFit/>
+          </a:bodyPr>
+          <a:lstStyle/>
+          <a:p>
+            <a:r>
+              <a:rPr lang="en-US" sz="1100" b="1" dirty="0"/>
+              <a:t>PLC information </a:t>
+            </a:r>
+            <a:endParaRPr lang="en-SG" sz="1100" b="1" dirty="0"/>
+          </a:p>
+        </p:txBody>
+      </p:sp>
+      <p:cxnSp>
+        <p:nvCxnSpPr>
+          <p:cNvPr id="64" name="Straight Arrow Connector 63">
+            <a:extLst>
+              <a:ext uri="{FF2B5EF4-FFF2-40B4-BE49-F238E27FC236}">
+                <a16:creationId xmlns:a16="http://schemas.microsoft.com/office/drawing/2014/main" id="{67822999-F738-4027-6A8F-1BCE33498448}"/>
+              </a:ext>
+            </a:extLst>
+          </p:cNvPr>
+          <p:cNvCxnSpPr>
+            <a:cxnSpLocks/>
+          </p:cNvCxnSpPr>
+          <p:nvPr/>
+        </p:nvCxnSpPr>
+        <p:spPr>
+          <a:xfrm flipH="1">
+            <a:off x="10313316" y="3945332"/>
+            <a:ext cx="613317" cy="4498"/>
+          </a:xfrm>
+          <a:prstGeom prst="straightConnector1">
+            <a:avLst/>
+          </a:prstGeom>
+          <a:ln w="19050">
+            <a:solidFill>
+              <a:schemeClr val="tx2">
+                <a:lumMod val="50000"/>
+                <a:lumOff val="50000"/>
+              </a:schemeClr>
+            </a:solidFill>
+            <a:prstDash val="sysDash"/>
+            <a:tailEnd type="triangle"/>
+          </a:ln>
+        </p:spPr>
+        <p:style>
+          <a:lnRef idx="1">
+            <a:schemeClr val="accent5"/>
+          </a:lnRef>
+          <a:fillRef idx="0">
+            <a:schemeClr val="accent5"/>
+          </a:fillRef>
+          <a:effectRef idx="0">
+            <a:schemeClr val="accent5"/>
+          </a:effectRef>
+          <a:fontRef idx="minor">
+            <a:schemeClr val="tx1"/>
+          </a:fontRef>
+        </p:style>
+      </p:cxnSp>
+      <p:sp>
+        <p:nvSpPr>
+          <p:cNvPr id="65" name="TextBox 64">
+            <a:extLst>
+              <a:ext uri="{FF2B5EF4-FFF2-40B4-BE49-F238E27FC236}">
+                <a16:creationId xmlns:a16="http://schemas.microsoft.com/office/drawing/2014/main" id="{61C79163-D95A-140F-987F-2DC1DA122B82}"/>
+              </a:ext>
+            </a:extLst>
+          </p:cNvPr>
+          <p:cNvSpPr txBox="1"/>
+          <p:nvPr/>
+        </p:nvSpPr>
+        <p:spPr>
+          <a:xfrm>
+            <a:off x="10881360" y="3804832"/>
+            <a:ext cx="1288442" cy="430887"/>
+          </a:xfrm>
+          <a:prstGeom prst="rect">
+            <a:avLst/>
+          </a:prstGeom>
+          <a:noFill/>
+        </p:spPr>
+        <p:txBody>
+          <a:bodyPr wrap="square" rtlCol="0">
+            <a:spAutoFit/>
+          </a:bodyPr>
+          <a:lstStyle/>
+          <a:p>
+            <a:r>
+              <a:rPr lang="en-US" sz="1100" b="1" dirty="0"/>
+              <a:t>PLC coil state </a:t>
+            </a:r>
+          </a:p>
+          <a:p>
+            <a:r>
+              <a:rPr lang="en-US" sz="1100" b="1" dirty="0"/>
+              <a:t>[ voltage high]</a:t>
+            </a:r>
+            <a:endParaRPr lang="en-SG" sz="1100" b="1" dirty="0"/>
+          </a:p>
+        </p:txBody>
+      </p:sp>
+      <p:sp>
+        <p:nvSpPr>
+          <p:cNvPr id="66" name="TextBox 65">
+            <a:extLst>
+              <a:ext uri="{FF2B5EF4-FFF2-40B4-BE49-F238E27FC236}">
+                <a16:creationId xmlns:a16="http://schemas.microsoft.com/office/drawing/2014/main" id="{A0994154-EE3D-3AF1-F2D1-4C4110B0A18B}"/>
+              </a:ext>
+            </a:extLst>
+          </p:cNvPr>
+          <p:cNvSpPr txBox="1"/>
+          <p:nvPr/>
+        </p:nvSpPr>
+        <p:spPr>
+          <a:xfrm>
+            <a:off x="10869449" y="4859244"/>
+            <a:ext cx="1164305" cy="446276"/>
+          </a:xfrm>
+          <a:prstGeom prst="rect">
+            <a:avLst/>
+          </a:prstGeom>
+          <a:noFill/>
+        </p:spPr>
+        <p:txBody>
+          <a:bodyPr wrap="square" rtlCol="0">
+            <a:spAutoFit/>
+          </a:bodyPr>
+          <a:lstStyle/>
+          <a:p>
+            <a:r>
+              <a:rPr lang="en-US" sz="1100" b="1" dirty="0"/>
+              <a:t>PLC coil output [empty</a:t>
+            </a:r>
+            <a:r>
+              <a:rPr lang="en-US" sz="1200" b="1" dirty="0"/>
+              <a:t>]</a:t>
+            </a:r>
+            <a:endParaRPr lang="en-SG" sz="1200" b="1" dirty="0"/>
+          </a:p>
+        </p:txBody>
+      </p:sp>
+      <p:cxnSp>
+        <p:nvCxnSpPr>
+          <p:cNvPr id="67" name="Straight Arrow Connector 66">
+            <a:extLst>
+              <a:ext uri="{FF2B5EF4-FFF2-40B4-BE49-F238E27FC236}">
+                <a16:creationId xmlns:a16="http://schemas.microsoft.com/office/drawing/2014/main" id="{3C5750D7-83FA-E276-D9EC-D6A8F7D4CDCB}"/>
+              </a:ext>
+            </a:extLst>
+          </p:cNvPr>
+          <p:cNvCxnSpPr>
+            <a:cxnSpLocks/>
+          </p:cNvCxnSpPr>
+          <p:nvPr/>
+        </p:nvCxnSpPr>
+        <p:spPr>
+          <a:xfrm flipH="1">
+            <a:off x="8988552" y="4382527"/>
+            <a:ext cx="1880897" cy="0"/>
+          </a:xfrm>
+          <a:prstGeom prst="straightConnector1">
+            <a:avLst/>
+          </a:prstGeom>
+          <a:ln w="19050">
+            <a:solidFill>
+              <a:srgbClr val="00B0F0"/>
+            </a:solidFill>
+            <a:prstDash val="sysDash"/>
+            <a:tailEnd type="triangle"/>
+          </a:ln>
+        </p:spPr>
+        <p:style>
+          <a:lnRef idx="1">
+            <a:schemeClr val="accent5"/>
+          </a:lnRef>
+          <a:fillRef idx="0">
+            <a:schemeClr val="accent5"/>
+          </a:fillRef>
+          <a:effectRef idx="0">
+            <a:schemeClr val="accent5"/>
+          </a:effectRef>
+          <a:fontRef idx="minor">
+            <a:schemeClr val="tx1"/>
+          </a:fontRef>
+        </p:style>
+      </p:cxnSp>
+      <p:cxnSp>
+        <p:nvCxnSpPr>
+          <p:cNvPr id="68" name="Connector: Elbow 67">
+            <a:extLst>
+              <a:ext uri="{FF2B5EF4-FFF2-40B4-BE49-F238E27FC236}">
+                <a16:creationId xmlns:a16="http://schemas.microsoft.com/office/drawing/2014/main" id="{E238D886-8B34-AE3D-76FB-D19497AA1689}"/>
+              </a:ext>
+            </a:extLst>
+          </p:cNvPr>
+          <p:cNvCxnSpPr>
+            <a:cxnSpLocks/>
+            <a:stCxn id="66" idx="1"/>
+          </p:cNvCxnSpPr>
+          <p:nvPr/>
+        </p:nvCxnSpPr>
+        <p:spPr>
+          <a:xfrm rot="10800000">
+            <a:off x="10466311" y="4815226"/>
+            <a:ext cx="403139" cy="267157"/>
+          </a:xfrm>
+          <a:prstGeom prst="bentConnector3">
+            <a:avLst>
+              <a:gd name="adj1" fmla="val 104437"/>
+            </a:avLst>
+          </a:prstGeom>
+          <a:ln>
+            <a:solidFill>
+              <a:schemeClr val="tx2">
+                <a:lumMod val="50000"/>
+                <a:lumOff val="50000"/>
+              </a:schemeClr>
+            </a:solidFill>
+            <a:prstDash val="sysDash"/>
+            <a:tailEnd type="triangle"/>
+          </a:ln>
+        </p:spPr>
+        <p:style>
+          <a:lnRef idx="2">
+            <a:schemeClr val="accent1"/>
+          </a:lnRef>
+          <a:fillRef idx="0">
+            <a:schemeClr val="accent1"/>
+          </a:fillRef>
+          <a:effectRef idx="1">
+            <a:schemeClr val="accent1"/>
+          </a:effectRef>
+          <a:fontRef idx="minor">
+            <a:schemeClr val="tx1"/>
+          </a:fontRef>
+        </p:style>
+      </p:cxnSp>
+      <p:sp>
+        <p:nvSpPr>
+          <p:cNvPr id="69" name="TextBox 68">
+            <a:extLst>
+              <a:ext uri="{FF2B5EF4-FFF2-40B4-BE49-F238E27FC236}">
+                <a16:creationId xmlns:a16="http://schemas.microsoft.com/office/drawing/2014/main" id="{A50C2C74-97C9-75FB-5F5B-E4DCBC5EC339}"/>
+              </a:ext>
+            </a:extLst>
+          </p:cNvPr>
+          <p:cNvSpPr txBox="1"/>
+          <p:nvPr/>
+        </p:nvSpPr>
+        <p:spPr>
+          <a:xfrm>
+            <a:off x="10894307" y="5409082"/>
+            <a:ext cx="1216075" cy="430887"/>
+          </a:xfrm>
+          <a:prstGeom prst="rect">
+            <a:avLst/>
+          </a:prstGeom>
+          <a:noFill/>
+        </p:spPr>
+        <p:txBody>
+          <a:bodyPr wrap="square" rtlCol="0">
+            <a:spAutoFit/>
+          </a:bodyPr>
+          <a:lstStyle/>
+          <a:p>
+            <a:r>
+              <a:rPr lang="en-US" sz="1100" b="1" dirty="0"/>
+              <a:t>PLC Contact input [empty]</a:t>
+            </a:r>
+            <a:endParaRPr lang="en-SG" sz="1100" b="1" dirty="0"/>
+          </a:p>
+        </p:txBody>
+      </p:sp>
+      <p:cxnSp>
+        <p:nvCxnSpPr>
+          <p:cNvPr id="70" name="Straight Arrow Connector 69">
+            <a:extLst>
+              <a:ext uri="{FF2B5EF4-FFF2-40B4-BE49-F238E27FC236}">
+                <a16:creationId xmlns:a16="http://schemas.microsoft.com/office/drawing/2014/main" id="{06814B35-E5D2-299D-62C5-E1882D564D33}"/>
+              </a:ext>
+            </a:extLst>
+          </p:cNvPr>
+          <p:cNvCxnSpPr>
+            <a:cxnSpLocks/>
+          </p:cNvCxnSpPr>
+          <p:nvPr/>
+        </p:nvCxnSpPr>
+        <p:spPr>
+          <a:xfrm flipH="1">
+            <a:off x="9286113" y="5561121"/>
+            <a:ext cx="1595247" cy="0"/>
+          </a:xfrm>
+          <a:prstGeom prst="straightConnector1">
+            <a:avLst/>
+          </a:prstGeom>
+          <a:ln w="19050">
+            <a:solidFill>
+              <a:srgbClr val="00B0F0"/>
+            </a:solidFill>
+            <a:prstDash val="sysDash"/>
+            <a:tailEnd type="triangle"/>
+          </a:ln>
+        </p:spPr>
+        <p:style>
+          <a:lnRef idx="1">
+            <a:schemeClr val="accent5"/>
+          </a:lnRef>
+          <a:fillRef idx="0">
+            <a:schemeClr val="accent5"/>
+          </a:fillRef>
+          <a:effectRef idx="0">
+            <a:schemeClr val="accent5"/>
+          </a:effectRef>
+          <a:fontRef idx="minor">
+            <a:schemeClr val="tx1"/>
+          </a:fontRef>
+        </p:style>
+      </p:cxnSp>
+      <p:sp>
+        <p:nvSpPr>
+          <p:cNvPr id="72" name="TextBox 71">
+            <a:extLst>
+              <a:ext uri="{FF2B5EF4-FFF2-40B4-BE49-F238E27FC236}">
+                <a16:creationId xmlns:a16="http://schemas.microsoft.com/office/drawing/2014/main" id="{57B1BD26-04CA-4D94-D5C7-DD20BCBEA75D}"/>
+              </a:ext>
+            </a:extLst>
+          </p:cNvPr>
+          <p:cNvSpPr txBox="1"/>
+          <p:nvPr/>
+        </p:nvSpPr>
+        <p:spPr>
+          <a:xfrm>
+            <a:off x="10870684" y="4247399"/>
+            <a:ext cx="1201232" cy="600164"/>
+          </a:xfrm>
+          <a:prstGeom prst="rect">
+            <a:avLst/>
+          </a:prstGeom>
+          <a:noFill/>
+        </p:spPr>
+        <p:txBody>
+          <a:bodyPr wrap="square" rtlCol="0">
+            <a:spAutoFit/>
+          </a:bodyPr>
+          <a:lstStyle/>
+          <a:p>
+            <a:r>
+              <a:rPr lang="en-US" sz="1100" b="1" dirty="0"/>
+              <a:t>PLC coil output </a:t>
+            </a:r>
+          </a:p>
+          <a:p>
+            <a:r>
+              <a:rPr lang="en-US" sz="1100" b="1" dirty="0"/>
+              <a:t>[Physical World </a:t>
+            </a:r>
+          </a:p>
+          <a:p>
+            <a:r>
+              <a:rPr lang="en-US" sz="1100" b="1" dirty="0"/>
+              <a:t>Signal ID]</a:t>
+            </a:r>
+            <a:endParaRPr lang="en-SG" sz="1100" b="1" dirty="0"/>
+          </a:p>
+        </p:txBody>
+      </p:sp>
+      <p:sp>
+        <p:nvSpPr>
+          <p:cNvPr id="78" name="TextBox 77">
+            <a:extLst>
+              <a:ext uri="{FF2B5EF4-FFF2-40B4-BE49-F238E27FC236}">
+                <a16:creationId xmlns:a16="http://schemas.microsoft.com/office/drawing/2014/main" id="{53184D60-A27E-314B-ACAF-53E22DCD07D8}"/>
+              </a:ext>
+            </a:extLst>
+          </p:cNvPr>
+          <p:cNvSpPr txBox="1"/>
+          <p:nvPr/>
+        </p:nvSpPr>
+        <p:spPr>
+          <a:xfrm>
+            <a:off x="10190439" y="6148809"/>
+            <a:ext cx="2194600" cy="430887"/>
+          </a:xfrm>
+          <a:prstGeom prst="rect">
+            <a:avLst/>
+          </a:prstGeom>
+          <a:noFill/>
+        </p:spPr>
+        <p:txBody>
+          <a:bodyPr wrap="square" rtlCol="0">
+            <a:spAutoFit/>
+          </a:bodyPr>
+          <a:lstStyle/>
+          <a:p>
+            <a:r>
+              <a:rPr lang="en-US" sz="1100" b="1" dirty="0"/>
+              <a:t>PLC Contact input </a:t>
+            </a:r>
+          </a:p>
+          <a:p>
+            <a:r>
+              <a:rPr lang="en-US" sz="1100" b="1" dirty="0"/>
+              <a:t>[Physical World Sensor ID]</a:t>
+            </a:r>
+            <a:endParaRPr lang="en-SG" sz="1100" b="1" dirty="0"/>
+          </a:p>
+        </p:txBody>
+      </p:sp>
+      <p:cxnSp>
+        <p:nvCxnSpPr>
+          <p:cNvPr id="84" name="Straight Arrow Connector 83">
+            <a:extLst>
+              <a:ext uri="{FF2B5EF4-FFF2-40B4-BE49-F238E27FC236}">
+                <a16:creationId xmlns:a16="http://schemas.microsoft.com/office/drawing/2014/main" id="{45DA8AE3-5936-726D-C0C9-5A56A324C87D}"/>
+              </a:ext>
+            </a:extLst>
+          </p:cNvPr>
+          <p:cNvCxnSpPr>
+            <a:cxnSpLocks/>
+          </p:cNvCxnSpPr>
+          <p:nvPr/>
+        </p:nvCxnSpPr>
+        <p:spPr>
+          <a:xfrm flipV="1">
+            <a:off x="7758425" y="5961579"/>
+            <a:ext cx="0" cy="320040"/>
+          </a:xfrm>
+          <a:prstGeom prst="straightConnector1">
+            <a:avLst/>
+          </a:prstGeom>
+          <a:ln w="19050">
+            <a:solidFill>
+              <a:srgbClr val="00B0F0"/>
+            </a:solidFill>
+            <a:prstDash val="sysDash"/>
+            <a:tailEnd type="triangle"/>
+          </a:ln>
+        </p:spPr>
+        <p:style>
+          <a:lnRef idx="1">
+            <a:schemeClr val="accent5"/>
+          </a:lnRef>
+          <a:fillRef idx="0">
+            <a:schemeClr val="accent5"/>
+          </a:fillRef>
+          <a:effectRef idx="0">
+            <a:schemeClr val="accent5"/>
+          </a:effectRef>
+          <a:fontRef idx="minor">
+            <a:schemeClr val="tx1"/>
+          </a:fontRef>
+        </p:style>
+      </p:cxnSp>
+      <p:cxnSp>
+        <p:nvCxnSpPr>
+          <p:cNvPr id="87" name="Connector: Elbow 86">
+            <a:extLst>
+              <a:ext uri="{FF2B5EF4-FFF2-40B4-BE49-F238E27FC236}">
+                <a16:creationId xmlns:a16="http://schemas.microsoft.com/office/drawing/2014/main" id="{B32BC35F-3097-FF4D-DA43-434BD7D50865}"/>
+              </a:ext>
+            </a:extLst>
+          </p:cNvPr>
+          <p:cNvCxnSpPr>
+            <a:cxnSpLocks/>
+            <a:stCxn id="78" idx="1"/>
+          </p:cNvCxnSpPr>
+          <p:nvPr/>
+        </p:nvCxnSpPr>
+        <p:spPr>
+          <a:xfrm rot="10800000">
+            <a:off x="9251365" y="4181385"/>
+            <a:ext cx="939075" cy="2182868"/>
+          </a:xfrm>
+          <a:prstGeom prst="bentConnector2">
+            <a:avLst/>
+          </a:prstGeom>
+          <a:ln>
+            <a:solidFill>
+              <a:schemeClr val="tx2">
+                <a:lumMod val="50000"/>
+                <a:lumOff val="50000"/>
+              </a:schemeClr>
+            </a:solidFill>
+            <a:prstDash val="sysDash"/>
+            <a:tailEnd type="triangle"/>
+          </a:ln>
+        </p:spPr>
+        <p:style>
+          <a:lnRef idx="2">
+            <a:schemeClr val="accent1"/>
+          </a:lnRef>
+          <a:fillRef idx="0">
+            <a:schemeClr val="accent1"/>
+          </a:fillRef>
+          <a:effectRef idx="1">
+            <a:schemeClr val="accent1"/>
+          </a:effectRef>
+          <a:fontRef idx="minor">
+            <a:schemeClr val="tx1"/>
+          </a:fontRef>
+        </p:style>
+      </p:cxnSp>
+      <p:sp>
+        <p:nvSpPr>
+          <p:cNvPr id="91" name="TextBox 90">
+            <a:extLst>
+              <a:ext uri="{FF2B5EF4-FFF2-40B4-BE49-F238E27FC236}">
+                <a16:creationId xmlns:a16="http://schemas.microsoft.com/office/drawing/2014/main" id="{FF6CCD37-2AC8-2C3C-B029-E1DDFB1DC05F}"/>
+              </a:ext>
+            </a:extLst>
+          </p:cNvPr>
+          <p:cNvSpPr txBox="1"/>
+          <p:nvPr/>
+        </p:nvSpPr>
+        <p:spPr>
+          <a:xfrm>
+            <a:off x="7634879" y="6281619"/>
+            <a:ext cx="2555559" cy="430887"/>
+          </a:xfrm>
+          <a:prstGeom prst="rect">
+            <a:avLst/>
+          </a:prstGeom>
+          <a:noFill/>
+        </p:spPr>
+        <p:txBody>
+          <a:bodyPr wrap="square" rtlCol="0">
+            <a:spAutoFit/>
+          </a:bodyPr>
+          <a:lstStyle/>
+          <a:p>
+            <a:r>
+              <a:rPr lang="en-US" sz="1100" b="1" dirty="0"/>
+              <a:t>Train collision auto </a:t>
+            </a:r>
+          </a:p>
+          <a:p>
+            <a:r>
+              <a:rPr lang="en-US" sz="1100" b="1" dirty="0"/>
+              <a:t>avoidance enable backdoor control  </a:t>
+            </a:r>
+            <a:endParaRPr lang="en-SG" sz="1100" b="1" dirty="0"/>
+          </a:p>
+        </p:txBody>
+      </p:sp>
+      <p:cxnSp>
+        <p:nvCxnSpPr>
+          <p:cNvPr id="92" name="Straight Arrow Connector 91">
+            <a:extLst>
+              <a:ext uri="{FF2B5EF4-FFF2-40B4-BE49-F238E27FC236}">
+                <a16:creationId xmlns:a16="http://schemas.microsoft.com/office/drawing/2014/main" id="{F2AAFD27-21D1-AF2C-44EB-BF22D2E6AC4F}"/>
+              </a:ext>
+            </a:extLst>
+          </p:cNvPr>
+          <p:cNvCxnSpPr>
+            <a:cxnSpLocks/>
+          </p:cNvCxnSpPr>
+          <p:nvPr/>
+        </p:nvCxnSpPr>
+        <p:spPr>
+          <a:xfrm flipV="1">
+            <a:off x="1822366" y="5810703"/>
+            <a:ext cx="0" cy="479642"/>
+          </a:xfrm>
+          <a:prstGeom prst="straightConnector1">
+            <a:avLst/>
+          </a:prstGeom>
+          <a:ln w="19050">
+            <a:solidFill>
+              <a:srgbClr val="00B0F0"/>
+            </a:solidFill>
+            <a:prstDash val="sysDash"/>
+            <a:tailEnd type="triangle"/>
+          </a:ln>
+        </p:spPr>
+        <p:style>
+          <a:lnRef idx="1">
+            <a:schemeClr val="accent5"/>
+          </a:lnRef>
+          <a:fillRef idx="0">
+            <a:schemeClr val="accent5"/>
+          </a:fillRef>
+          <a:effectRef idx="0">
+            <a:schemeClr val="accent5"/>
+          </a:effectRef>
+          <a:fontRef idx="minor">
+            <a:schemeClr val="tx1"/>
+          </a:fontRef>
+        </p:style>
+      </p:cxnSp>
+      <p:sp>
+        <p:nvSpPr>
+          <p:cNvPr id="93" name="TextBox 92">
+            <a:extLst>
+              <a:ext uri="{FF2B5EF4-FFF2-40B4-BE49-F238E27FC236}">
+                <a16:creationId xmlns:a16="http://schemas.microsoft.com/office/drawing/2014/main" id="{C53CB1BB-EE39-E575-4C96-EC16CA040DE3}"/>
+              </a:ext>
+            </a:extLst>
+          </p:cNvPr>
+          <p:cNvSpPr txBox="1"/>
+          <p:nvPr/>
+        </p:nvSpPr>
+        <p:spPr>
+          <a:xfrm>
+            <a:off x="479659" y="6281201"/>
+            <a:ext cx="927343" cy="261610"/>
+          </a:xfrm>
+          <a:prstGeom prst="rect">
+            <a:avLst/>
+          </a:prstGeom>
+          <a:noFill/>
+        </p:spPr>
+        <p:txBody>
+          <a:bodyPr wrap="square" rtlCol="0">
+            <a:spAutoFit/>
+          </a:bodyPr>
+          <a:lstStyle/>
+          <a:p>
+            <a:r>
+              <a:rPr lang="en-US" sz="1100" b="1" dirty="0"/>
+              <a:t>Mode state</a:t>
+            </a:r>
+          </a:p>
+        </p:txBody>
+      </p:sp>
+      <p:cxnSp>
+        <p:nvCxnSpPr>
+          <p:cNvPr id="94" name="Straight Arrow Connector 93">
+            <a:extLst>
+              <a:ext uri="{FF2B5EF4-FFF2-40B4-BE49-F238E27FC236}">
+                <a16:creationId xmlns:a16="http://schemas.microsoft.com/office/drawing/2014/main" id="{4430BFF7-682E-E7A3-B8F0-CAD1185A9353}"/>
+              </a:ext>
+            </a:extLst>
+          </p:cNvPr>
+          <p:cNvCxnSpPr>
+            <a:cxnSpLocks/>
+          </p:cNvCxnSpPr>
+          <p:nvPr/>
+        </p:nvCxnSpPr>
+        <p:spPr>
+          <a:xfrm flipV="1">
+            <a:off x="525210" y="6228624"/>
+            <a:ext cx="0" cy="193139"/>
+          </a:xfrm>
+          <a:prstGeom prst="straightConnector1">
+            <a:avLst/>
+          </a:prstGeom>
+          <a:ln w="19050">
+            <a:solidFill>
+              <a:schemeClr val="tx2">
+                <a:lumMod val="50000"/>
+                <a:lumOff val="50000"/>
+              </a:schemeClr>
+            </a:solidFill>
+            <a:prstDash val="sysDash"/>
+            <a:tailEnd type="triangle"/>
+          </a:ln>
+        </p:spPr>
+        <p:style>
+          <a:lnRef idx="1">
+            <a:schemeClr val="accent5"/>
+          </a:lnRef>
+          <a:fillRef idx="0">
+            <a:schemeClr val="accent5"/>
+          </a:fillRef>
+          <a:effectRef idx="0">
+            <a:schemeClr val="accent5"/>
+          </a:effectRef>
+          <a:fontRef idx="minor">
+            <a:schemeClr val="tx1"/>
+          </a:fontRef>
+        </p:style>
+      </p:cxnSp>
+      <p:sp>
+        <p:nvSpPr>
+          <p:cNvPr id="96" name="TextBox 95">
+            <a:extLst>
+              <a:ext uri="{FF2B5EF4-FFF2-40B4-BE49-F238E27FC236}">
+                <a16:creationId xmlns:a16="http://schemas.microsoft.com/office/drawing/2014/main" id="{95EFAB62-65E9-E60D-D1C4-C8364FDE1FB8}"/>
+              </a:ext>
+            </a:extLst>
+          </p:cNvPr>
+          <p:cNvSpPr txBox="1"/>
+          <p:nvPr/>
+        </p:nvSpPr>
+        <p:spPr>
+          <a:xfrm>
+            <a:off x="1442703" y="6281201"/>
+            <a:ext cx="1580785" cy="430887"/>
+          </a:xfrm>
+          <a:prstGeom prst="rect">
+            <a:avLst/>
+          </a:prstGeom>
+          <a:noFill/>
+        </p:spPr>
+        <p:txBody>
+          <a:bodyPr wrap="square" rtlCol="0">
+            <a:spAutoFit/>
+          </a:bodyPr>
+          <a:lstStyle/>
+          <a:p>
+            <a:r>
+              <a:rPr lang="en-SG" sz="1100" b="1" dirty="0"/>
+              <a:t>Train 3</a:t>
+            </a:r>
+            <a:r>
+              <a:rPr lang="en-SG" sz="1100" b="1" baseline="30000" dirty="0"/>
+              <a:t>rd</a:t>
+            </a:r>
+            <a:r>
+              <a:rPr lang="en-SG" sz="1100" b="1" dirty="0"/>
+              <a:t> track Power turn </a:t>
+            </a:r>
+            <a:r>
+              <a:rPr lang="en-SG" sz="1100" b="1" dirty="0">
+                <a:solidFill>
+                  <a:schemeClr val="accent6">
+                    <a:lumMod val="75000"/>
+                  </a:schemeClr>
+                </a:solidFill>
+              </a:rPr>
+              <a:t>On</a:t>
+            </a:r>
+            <a:r>
+              <a:rPr lang="en-SG" sz="1100" b="1" dirty="0"/>
+              <a:t> button</a:t>
+            </a:r>
+          </a:p>
+        </p:txBody>
+      </p:sp>
+      <p:cxnSp>
+        <p:nvCxnSpPr>
+          <p:cNvPr id="97" name="Straight Arrow Connector 96">
+            <a:extLst>
+              <a:ext uri="{FF2B5EF4-FFF2-40B4-BE49-F238E27FC236}">
+                <a16:creationId xmlns:a16="http://schemas.microsoft.com/office/drawing/2014/main" id="{DDEDDEF1-C5E8-DBD9-2397-5BD0BA78AEAF}"/>
+              </a:ext>
+            </a:extLst>
+          </p:cNvPr>
+          <p:cNvCxnSpPr>
+            <a:cxnSpLocks/>
+          </p:cNvCxnSpPr>
+          <p:nvPr/>
+        </p:nvCxnSpPr>
+        <p:spPr>
+          <a:xfrm flipV="1">
+            <a:off x="3766537" y="5839969"/>
+            <a:ext cx="0" cy="479642"/>
+          </a:xfrm>
+          <a:prstGeom prst="straightConnector1">
+            <a:avLst/>
+          </a:prstGeom>
+          <a:ln w="19050">
+            <a:solidFill>
+              <a:srgbClr val="00B0F0"/>
+            </a:solidFill>
+            <a:prstDash val="sysDash"/>
+            <a:tailEnd type="triangle"/>
+          </a:ln>
+        </p:spPr>
+        <p:style>
+          <a:lnRef idx="1">
+            <a:schemeClr val="accent5"/>
+          </a:lnRef>
+          <a:fillRef idx="0">
+            <a:schemeClr val="accent5"/>
+          </a:fillRef>
+          <a:effectRef idx="0">
+            <a:schemeClr val="accent5"/>
+          </a:effectRef>
+          <a:fontRef idx="minor">
+            <a:schemeClr val="tx1"/>
+          </a:fontRef>
+        </p:style>
+      </p:cxnSp>
+      <p:sp>
+        <p:nvSpPr>
+          <p:cNvPr id="98" name="TextBox 97">
+            <a:extLst>
+              <a:ext uri="{FF2B5EF4-FFF2-40B4-BE49-F238E27FC236}">
+                <a16:creationId xmlns:a16="http://schemas.microsoft.com/office/drawing/2014/main" id="{93FC71D4-3D95-424D-08D1-4133A7ABD348}"/>
+              </a:ext>
+            </a:extLst>
+          </p:cNvPr>
+          <p:cNvSpPr txBox="1"/>
+          <p:nvPr/>
+        </p:nvSpPr>
+        <p:spPr>
+          <a:xfrm>
+            <a:off x="3081188" y="6272226"/>
+            <a:ext cx="1580785" cy="430887"/>
+          </a:xfrm>
+          <a:prstGeom prst="rect">
+            <a:avLst/>
+          </a:prstGeom>
+          <a:noFill/>
+        </p:spPr>
+        <p:txBody>
+          <a:bodyPr wrap="square" rtlCol="0">
+            <a:spAutoFit/>
+          </a:bodyPr>
+          <a:lstStyle/>
+          <a:p>
+            <a:r>
+              <a:rPr lang="en-SG" sz="1100" b="1" dirty="0"/>
+              <a:t>Train 3</a:t>
+            </a:r>
+            <a:r>
+              <a:rPr lang="en-SG" sz="1100" b="1" baseline="30000" dirty="0"/>
+              <a:t>rd</a:t>
+            </a:r>
+            <a:r>
+              <a:rPr lang="en-SG" sz="1100" b="1" dirty="0"/>
+              <a:t> track Power turn </a:t>
+            </a:r>
+            <a:r>
+              <a:rPr lang="en-SG" sz="1100" b="1" dirty="0">
+                <a:solidFill>
+                  <a:srgbClr val="C00000"/>
+                </a:solidFill>
+              </a:rPr>
+              <a:t>Off</a:t>
+            </a:r>
+            <a:r>
+              <a:rPr lang="en-SG" sz="1100" b="1" dirty="0"/>
+              <a:t> button</a:t>
+            </a:r>
+          </a:p>
+        </p:txBody>
+      </p:sp>
+      <p:cxnSp>
+        <p:nvCxnSpPr>
+          <p:cNvPr id="99" name="Straight Arrow Connector 98">
+            <a:extLst>
+              <a:ext uri="{FF2B5EF4-FFF2-40B4-BE49-F238E27FC236}">
+                <a16:creationId xmlns:a16="http://schemas.microsoft.com/office/drawing/2014/main" id="{E30CC92F-5467-7737-4266-CAFAF17D03D0}"/>
+              </a:ext>
+            </a:extLst>
+          </p:cNvPr>
+          <p:cNvCxnSpPr>
+            <a:cxnSpLocks/>
+          </p:cNvCxnSpPr>
+          <p:nvPr/>
+        </p:nvCxnSpPr>
+        <p:spPr>
+          <a:xfrm flipV="1">
+            <a:off x="4791458" y="5840962"/>
+            <a:ext cx="0" cy="478649"/>
+          </a:xfrm>
+          <a:prstGeom prst="straightConnector1">
+            <a:avLst/>
+          </a:prstGeom>
+          <a:ln w="19050">
+            <a:solidFill>
+              <a:srgbClr val="00B0F0"/>
+            </a:solidFill>
+            <a:prstDash val="sysDash"/>
+            <a:tailEnd type="triangle"/>
+          </a:ln>
+        </p:spPr>
+        <p:style>
+          <a:lnRef idx="1">
+            <a:schemeClr val="accent5"/>
+          </a:lnRef>
+          <a:fillRef idx="0">
+            <a:schemeClr val="accent5"/>
+          </a:fillRef>
+          <a:effectRef idx="0">
+            <a:schemeClr val="accent5"/>
+          </a:effectRef>
+          <a:fontRef idx="minor">
+            <a:schemeClr val="tx1"/>
+          </a:fontRef>
+        </p:style>
+      </p:cxnSp>
+      <p:sp>
+        <p:nvSpPr>
+          <p:cNvPr id="100" name="TextBox 99">
+            <a:extLst>
+              <a:ext uri="{FF2B5EF4-FFF2-40B4-BE49-F238E27FC236}">
+                <a16:creationId xmlns:a16="http://schemas.microsoft.com/office/drawing/2014/main" id="{A1E40A37-B2A0-35F0-6D30-05939554D963}"/>
+              </a:ext>
+            </a:extLst>
+          </p:cNvPr>
+          <p:cNvSpPr txBox="1"/>
+          <p:nvPr/>
+        </p:nvSpPr>
+        <p:spPr>
+          <a:xfrm>
+            <a:off x="4557122" y="6256731"/>
+            <a:ext cx="1200969" cy="430887"/>
+          </a:xfrm>
+          <a:prstGeom prst="rect">
+            <a:avLst/>
+          </a:prstGeom>
+          <a:noFill/>
+        </p:spPr>
+        <p:txBody>
+          <a:bodyPr wrap="square" rtlCol="0">
+            <a:spAutoFit/>
+          </a:bodyPr>
+          <a:lstStyle/>
+          <a:p>
+            <a:r>
+              <a:rPr lang="en-SG" sz="1100" b="1" dirty="0"/>
+              <a:t>Train average speed value </a:t>
+            </a:r>
+          </a:p>
+        </p:txBody>
+      </p:sp>
+      <p:cxnSp>
+        <p:nvCxnSpPr>
+          <p:cNvPr id="102" name="Straight Arrow Connector 101">
+            <a:extLst>
+              <a:ext uri="{FF2B5EF4-FFF2-40B4-BE49-F238E27FC236}">
+                <a16:creationId xmlns:a16="http://schemas.microsoft.com/office/drawing/2014/main" id="{4AEF0B2D-F9E4-AFA2-5DD8-6A81D025B94D}"/>
+              </a:ext>
+            </a:extLst>
+          </p:cNvPr>
+          <p:cNvCxnSpPr>
+            <a:cxnSpLocks/>
+          </p:cNvCxnSpPr>
+          <p:nvPr/>
+        </p:nvCxnSpPr>
+        <p:spPr>
+          <a:xfrm flipV="1">
+            <a:off x="6292826" y="5802552"/>
+            <a:ext cx="0" cy="478649"/>
+          </a:xfrm>
+          <a:prstGeom prst="straightConnector1">
+            <a:avLst/>
+          </a:prstGeom>
+          <a:ln w="19050">
+            <a:solidFill>
+              <a:srgbClr val="00B0F0"/>
+            </a:solidFill>
+            <a:prstDash val="sysDash"/>
+            <a:tailEnd type="triangle"/>
+          </a:ln>
+        </p:spPr>
+        <p:style>
+          <a:lnRef idx="1">
+            <a:schemeClr val="accent5"/>
+          </a:lnRef>
+          <a:fillRef idx="0">
+            <a:schemeClr val="accent5"/>
+          </a:fillRef>
+          <a:effectRef idx="0">
+            <a:schemeClr val="accent5"/>
+          </a:effectRef>
+          <a:fontRef idx="minor">
+            <a:schemeClr val="tx1"/>
+          </a:fontRef>
+        </p:style>
+      </p:cxnSp>
+      <p:sp>
+        <p:nvSpPr>
+          <p:cNvPr id="103" name="TextBox 102">
+            <a:extLst>
+              <a:ext uri="{FF2B5EF4-FFF2-40B4-BE49-F238E27FC236}">
+                <a16:creationId xmlns:a16="http://schemas.microsoft.com/office/drawing/2014/main" id="{9E83F54C-0D72-B6B3-87AE-05BA0F7412DC}"/>
+              </a:ext>
+            </a:extLst>
+          </p:cNvPr>
+          <p:cNvSpPr txBox="1"/>
+          <p:nvPr/>
+        </p:nvSpPr>
+        <p:spPr>
+          <a:xfrm>
+            <a:off x="5853167" y="6272225"/>
+            <a:ext cx="1896827" cy="430887"/>
+          </a:xfrm>
+          <a:prstGeom prst="rect">
+            <a:avLst/>
+          </a:prstGeom>
+          <a:noFill/>
+        </p:spPr>
+        <p:txBody>
+          <a:bodyPr wrap="square" rtlCol="0">
+            <a:spAutoFit/>
+          </a:bodyPr>
+          <a:lstStyle/>
+          <a:p>
+            <a:r>
+              <a:rPr lang="en-SG" sz="1100" b="1" dirty="0"/>
+              <a:t>Train state panel [colour]</a:t>
+            </a:r>
+          </a:p>
+          <a:p>
+            <a:r>
+              <a:rPr lang="en-SG" sz="1100" b="1" dirty="0"/>
+              <a:t>Place holder [Gray]</a:t>
+            </a:r>
+          </a:p>
+        </p:txBody>
+      </p:sp>
+    </p:spTree>
+    <p:extLst>
+      <p:ext uri="{BB962C8B-B14F-4D97-AF65-F5344CB8AC3E}">
+        <p14:creationId xmlns:p14="http://schemas.microsoft.com/office/powerpoint/2010/main" val="3707201461"/>
       </p:ext>
     </p:extLst>
   </p:cSld>

</xml_diff>

<commit_message>
Update the UI introduction section.
</commit_message>
<xml_diff>
--- a/OT_System_Attack_Case_Study/Railway_HMI_Usage/img/designDoc.pptx
+++ b/OT_System_Attack_Case_Study/Railway_HMI_Usage/img/designDoc.pptx
@@ -5,7 +5,7 @@
     <p:sldMasterId id="2147483648" r:id="rId1"/>
   </p:sldMasterIdLst>
   <p:notesMasterIdLst>
-    <p:notesMasterId r:id="rId7"/>
+    <p:notesMasterId r:id="rId8"/>
   </p:notesMasterIdLst>
   <p:sldIdLst>
     <p:sldId id="256" r:id="rId2"/>
@@ -13,6 +13,7 @@
     <p:sldId id="277" r:id="rId4"/>
     <p:sldId id="305" r:id="rId5"/>
     <p:sldId id="306" r:id="rId6"/>
+    <p:sldId id="307" r:id="rId7"/>
   </p:sldIdLst>
   <p:sldSz cx="12192000" cy="6858000"/>
   <p:notesSz cx="6858000" cy="9144000"/>
@@ -201,7 +202,7 @@
           <a:p>
             <a:fld id="{7F927686-0639-4705-A5BA-AA7EDAB93D84}" type="datetimeFigureOut">
               <a:rPr lang="en-SG" smtClean="0"/>
-              <a:t>21/6/2025</a:t>
+              <a:t>22/6/2025</a:t>
             </a:fld>
             <a:endParaRPr lang="en-SG"/>
           </a:p>
@@ -553,6 +554,90 @@
 </p:notes>
 </file>
 
+<file path=ppt/notesSlides/notesSlide2.xml><?xml version="1.0" encoding="utf-8"?>
+<p:notes xmlns:a="http://schemas.openxmlformats.org/drawingml/2006/main" xmlns:r="http://schemas.openxmlformats.org/officeDocument/2006/relationships" xmlns:p="http://schemas.openxmlformats.org/presentationml/2006/main">
+  <p:cSld>
+    <p:spTree>
+      <p:nvGrpSpPr>
+        <p:cNvPr id="1" name=""/>
+        <p:cNvGrpSpPr/>
+        <p:nvPr/>
+      </p:nvGrpSpPr>
+      <p:grpSpPr>
+        <a:xfrm>
+          <a:off x="0" y="0"/>
+          <a:ext cx="0" cy="0"/>
+          <a:chOff x="0" y="0"/>
+          <a:chExt cx="0" cy="0"/>
+        </a:xfrm>
+      </p:grpSpPr>
+      <p:sp>
+        <p:nvSpPr>
+          <p:cNvPr id="2" name="Slide Image Placeholder 1"/>
+          <p:cNvSpPr>
+            <a:spLocks noGrp="1" noRot="1" noChangeAspect="1"/>
+          </p:cNvSpPr>
+          <p:nvPr>
+            <p:ph type="sldImg"/>
+          </p:nvPr>
+        </p:nvSpPr>
+        <p:spPr/>
+      </p:sp>
+      <p:sp>
+        <p:nvSpPr>
+          <p:cNvPr id="3" name="Notes Placeholder 2"/>
+          <p:cNvSpPr>
+            <a:spLocks noGrp="1"/>
+          </p:cNvSpPr>
+          <p:nvPr>
+            <p:ph type="body" idx="1"/>
+          </p:nvPr>
+        </p:nvSpPr>
+        <p:spPr/>
+        <p:txBody>
+          <a:bodyPr/>
+          <a:lstStyle/>
+          <a:p>
+            <a:endParaRPr lang="en-SG" dirty="0"/>
+          </a:p>
+        </p:txBody>
+      </p:sp>
+      <p:sp>
+        <p:nvSpPr>
+          <p:cNvPr id="4" name="Slide Number Placeholder 3"/>
+          <p:cNvSpPr>
+            <a:spLocks noGrp="1"/>
+          </p:cNvSpPr>
+          <p:nvPr>
+            <p:ph type="sldNum" sz="quarter" idx="5"/>
+          </p:nvPr>
+        </p:nvSpPr>
+        <p:spPr/>
+        <p:txBody>
+          <a:bodyPr/>
+          <a:lstStyle/>
+          <a:p>
+            <a:fld id="{0C28B7A7-DA60-44F9-841D-F9802CF05E2F}" type="slidenum">
+              <a:rPr lang="en-SG" smtClean="0"/>
+              <a:t>6</a:t>
+            </a:fld>
+            <a:endParaRPr lang="en-SG"/>
+          </a:p>
+        </p:txBody>
+      </p:sp>
+    </p:spTree>
+    <p:extLst>
+      <p:ext uri="{BB962C8B-B14F-4D97-AF65-F5344CB8AC3E}">
+        <p14:creationId xmlns:p14="http://schemas.microsoft.com/office/powerpoint/2010/main" val="3156308275"/>
+      </p:ext>
+    </p:extLst>
+  </p:cSld>
+  <p:clrMapOvr>
+    <a:masterClrMapping/>
+  </p:clrMapOvr>
+</p:notes>
+</file>
+
 <file path=ppt/slideLayouts/slideLayout1.xml><?xml version="1.0" encoding="utf-8"?>
 <p:sldLayout xmlns:a="http://schemas.openxmlformats.org/drawingml/2006/main" xmlns:r="http://schemas.openxmlformats.org/officeDocument/2006/relationships" xmlns:p="http://schemas.openxmlformats.org/presentationml/2006/main" type="title" preserve="1">
   <p:cSld name="Title Slide">
@@ -702,7 +787,7 @@
           <a:p>
             <a:fld id="{87D5F1AA-6CA2-4487-AEBF-1827FADC72BF}" type="datetimeFigureOut">
               <a:rPr lang="en-SG" smtClean="0"/>
-              <a:t>21/6/2025</a:t>
+              <a:t>22/6/2025</a:t>
             </a:fld>
             <a:endParaRPr lang="en-SG"/>
           </a:p>
@@ -902,7 +987,7 @@
           <a:p>
             <a:fld id="{87D5F1AA-6CA2-4487-AEBF-1827FADC72BF}" type="datetimeFigureOut">
               <a:rPr lang="en-SG" smtClean="0"/>
-              <a:t>21/6/2025</a:t>
+              <a:t>22/6/2025</a:t>
             </a:fld>
             <a:endParaRPr lang="en-SG"/>
           </a:p>
@@ -1112,7 +1197,7 @@
           <a:p>
             <a:fld id="{87D5F1AA-6CA2-4487-AEBF-1827FADC72BF}" type="datetimeFigureOut">
               <a:rPr lang="en-SG" smtClean="0"/>
-              <a:t>21/6/2025</a:t>
+              <a:t>22/6/2025</a:t>
             </a:fld>
             <a:endParaRPr lang="en-SG"/>
           </a:p>
@@ -1312,7 +1397,7 @@
           <a:p>
             <a:fld id="{87D5F1AA-6CA2-4487-AEBF-1827FADC72BF}" type="datetimeFigureOut">
               <a:rPr lang="en-SG" smtClean="0"/>
-              <a:t>21/6/2025</a:t>
+              <a:t>22/6/2025</a:t>
             </a:fld>
             <a:endParaRPr lang="en-SG"/>
           </a:p>
@@ -1588,7 +1673,7 @@
           <a:p>
             <a:fld id="{87D5F1AA-6CA2-4487-AEBF-1827FADC72BF}" type="datetimeFigureOut">
               <a:rPr lang="en-SG" smtClean="0"/>
-              <a:t>21/6/2025</a:t>
+              <a:t>22/6/2025</a:t>
             </a:fld>
             <a:endParaRPr lang="en-SG"/>
           </a:p>
@@ -1856,7 +1941,7 @@
           <a:p>
             <a:fld id="{87D5F1AA-6CA2-4487-AEBF-1827FADC72BF}" type="datetimeFigureOut">
               <a:rPr lang="en-SG" smtClean="0"/>
-              <a:t>21/6/2025</a:t>
+              <a:t>22/6/2025</a:t>
             </a:fld>
             <a:endParaRPr lang="en-SG"/>
           </a:p>
@@ -2271,7 +2356,7 @@
           <a:p>
             <a:fld id="{87D5F1AA-6CA2-4487-AEBF-1827FADC72BF}" type="datetimeFigureOut">
               <a:rPr lang="en-SG" smtClean="0"/>
-              <a:t>21/6/2025</a:t>
+              <a:t>22/6/2025</a:t>
             </a:fld>
             <a:endParaRPr lang="en-SG"/>
           </a:p>
@@ -2413,7 +2498,7 @@
           <a:p>
             <a:fld id="{87D5F1AA-6CA2-4487-AEBF-1827FADC72BF}" type="datetimeFigureOut">
               <a:rPr lang="en-SG" smtClean="0"/>
-              <a:t>21/6/2025</a:t>
+              <a:t>22/6/2025</a:t>
             </a:fld>
             <a:endParaRPr lang="en-SG"/>
           </a:p>
@@ -2526,7 +2611,7 @@
           <a:p>
             <a:fld id="{87D5F1AA-6CA2-4487-AEBF-1827FADC72BF}" type="datetimeFigureOut">
               <a:rPr lang="en-SG" smtClean="0"/>
-              <a:t>21/6/2025</a:t>
+              <a:t>22/6/2025</a:t>
             </a:fld>
             <a:endParaRPr lang="en-SG"/>
           </a:p>
@@ -2839,7 +2924,7 @@
           <a:p>
             <a:fld id="{87D5F1AA-6CA2-4487-AEBF-1827FADC72BF}" type="datetimeFigureOut">
               <a:rPr lang="en-SG" smtClean="0"/>
-              <a:t>21/6/2025</a:t>
+              <a:t>22/6/2025</a:t>
             </a:fld>
             <a:endParaRPr lang="en-SG"/>
           </a:p>
@@ -3128,7 +3213,7 @@
           <a:p>
             <a:fld id="{87D5F1AA-6CA2-4487-AEBF-1827FADC72BF}" type="datetimeFigureOut">
               <a:rPr lang="en-SG" smtClean="0"/>
-              <a:t>21/6/2025</a:t>
+              <a:t>22/6/2025</a:t>
             </a:fld>
             <a:endParaRPr lang="en-SG"/>
           </a:p>
@@ -3371,7 +3456,7 @@
           <a:p>
             <a:fld id="{87D5F1AA-6CA2-4487-AEBF-1827FADC72BF}" type="datetimeFigureOut">
               <a:rPr lang="en-SG" smtClean="0"/>
-              <a:t>21/6/2025</a:t>
+              <a:t>22/6/2025</a:t>
             </a:fld>
             <a:endParaRPr lang="en-SG"/>
           </a:p>
@@ -15907,6 +15992,2343 @@
     <p:extLst>
       <p:ext uri="{BB962C8B-B14F-4D97-AF65-F5344CB8AC3E}">
         <p14:creationId xmlns:p14="http://schemas.microsoft.com/office/powerpoint/2010/main" val="3707201461"/>
+      </p:ext>
+    </p:extLst>
+  </p:cSld>
+  <p:clrMapOvr>
+    <a:masterClrMapping/>
+  </p:clrMapOvr>
+</p:sld>
+</file>
+
+<file path=ppt/slides/slide6.xml><?xml version="1.0" encoding="utf-8"?>
+<p:sld xmlns:a="http://schemas.openxmlformats.org/drawingml/2006/main" xmlns:r="http://schemas.openxmlformats.org/officeDocument/2006/relationships" xmlns:p="http://schemas.openxmlformats.org/presentationml/2006/main">
+  <p:cSld>
+    <p:spTree>
+      <p:nvGrpSpPr>
+        <p:cNvPr id="1" name=""/>
+        <p:cNvGrpSpPr/>
+        <p:nvPr/>
+      </p:nvGrpSpPr>
+      <p:grpSpPr>
+        <a:xfrm>
+          <a:off x="0" y="0"/>
+          <a:ext cx="0" cy="0"/>
+          <a:chOff x="0" y="0"/>
+          <a:chExt cx="0" cy="0"/>
+        </a:xfrm>
+      </p:grpSpPr>
+      <p:pic>
+        <p:nvPicPr>
+          <p:cNvPr id="28" name="Picture 27" descr="A computer screen shot of a diagram&#10;&#10;AI-generated content may be incorrect.">
+            <a:extLst>
+              <a:ext uri="{FF2B5EF4-FFF2-40B4-BE49-F238E27FC236}">
+                <a16:creationId xmlns:a16="http://schemas.microsoft.com/office/drawing/2014/main" id="{8177400C-81CA-2309-C486-E17544B1D3AC}"/>
+              </a:ext>
+            </a:extLst>
+          </p:cNvPr>
+          <p:cNvPicPr>
+            <a:picLocks noChangeAspect="1"/>
+          </p:cNvPicPr>
+          <p:nvPr/>
+        </p:nvPicPr>
+        <p:blipFill>
+          <a:blip r:embed="rId3">
+            <a:extLst>
+              <a:ext uri="{28A0092B-C50C-407E-A947-70E740481C1C}">
+                <a14:useLocalDpi xmlns:a14="http://schemas.microsoft.com/office/drawing/2010/main" val="0"/>
+              </a:ext>
+            </a:extLst>
+          </a:blip>
+          <a:stretch>
+            <a:fillRect/>
+          </a:stretch>
+        </p:blipFill>
+        <p:spPr>
+          <a:xfrm>
+            <a:off x="256163" y="608434"/>
+            <a:ext cx="11097638" cy="5964981"/>
+          </a:xfrm>
+          <a:prstGeom prst="rect">
+            <a:avLst/>
+          </a:prstGeom>
+          <a:ln w="9525">
+            <a:solidFill>
+              <a:schemeClr val="tx1"/>
+            </a:solidFill>
+          </a:ln>
+        </p:spPr>
+      </p:pic>
+      <p:pic>
+        <p:nvPicPr>
+          <p:cNvPr id="11" name="Picture 10">
+            <a:extLst>
+              <a:ext uri="{FF2B5EF4-FFF2-40B4-BE49-F238E27FC236}">
+                <a16:creationId xmlns:a16="http://schemas.microsoft.com/office/drawing/2014/main" id="{BCDC9B08-5DB8-705B-E830-89DD32B6149F}"/>
+              </a:ext>
+            </a:extLst>
+          </p:cNvPr>
+          <p:cNvPicPr>
+            <a:picLocks noChangeAspect="1"/>
+          </p:cNvPicPr>
+          <p:nvPr/>
+        </p:nvPicPr>
+        <p:blipFill>
+          <a:blip r:embed="rId4">
+            <a:extLst>
+              <a:ext uri="{28A0092B-C50C-407E-A947-70E740481C1C}">
+                <a14:useLocalDpi xmlns:a14="http://schemas.microsoft.com/office/drawing/2010/main" val="0"/>
+              </a:ext>
+            </a:extLst>
+          </a:blip>
+          <a:stretch>
+            <a:fillRect/>
+          </a:stretch>
+        </p:blipFill>
+        <p:spPr>
+          <a:xfrm flipH="1">
+            <a:off x="5352002" y="3358808"/>
+            <a:ext cx="252000" cy="80641"/>
+          </a:xfrm>
+          <a:prstGeom prst="rect">
+            <a:avLst/>
+          </a:prstGeom>
+        </p:spPr>
+      </p:pic>
+      <p:pic>
+        <p:nvPicPr>
+          <p:cNvPr id="13" name="Picture 12">
+            <a:extLst>
+              <a:ext uri="{FF2B5EF4-FFF2-40B4-BE49-F238E27FC236}">
+                <a16:creationId xmlns:a16="http://schemas.microsoft.com/office/drawing/2014/main" id="{73540CEF-226C-C57A-AF42-94D4F503BF2D}"/>
+              </a:ext>
+            </a:extLst>
+          </p:cNvPr>
+          <p:cNvPicPr>
+            <a:picLocks noChangeAspect="1"/>
+          </p:cNvPicPr>
+          <p:nvPr/>
+        </p:nvPicPr>
+        <p:blipFill>
+          <a:blip r:embed="rId4">
+            <a:extLst>
+              <a:ext uri="{28A0092B-C50C-407E-A947-70E740481C1C}">
+                <a14:useLocalDpi xmlns:a14="http://schemas.microsoft.com/office/drawing/2010/main" val="0"/>
+              </a:ext>
+            </a:extLst>
+          </a:blip>
+          <a:stretch>
+            <a:fillRect/>
+          </a:stretch>
+        </p:blipFill>
+        <p:spPr>
+          <a:xfrm flipH="1">
+            <a:off x="3622277" y="4522440"/>
+            <a:ext cx="252000" cy="80641"/>
+          </a:xfrm>
+          <a:prstGeom prst="rect">
+            <a:avLst/>
+          </a:prstGeom>
+        </p:spPr>
+      </p:pic>
+      <p:pic>
+        <p:nvPicPr>
+          <p:cNvPr id="14" name="Picture 13">
+            <a:extLst>
+              <a:ext uri="{FF2B5EF4-FFF2-40B4-BE49-F238E27FC236}">
+                <a16:creationId xmlns:a16="http://schemas.microsoft.com/office/drawing/2014/main" id="{CE0BE755-79B1-271E-B0D2-B0D0760D71C5}"/>
+              </a:ext>
+            </a:extLst>
+          </p:cNvPr>
+          <p:cNvPicPr>
+            <a:picLocks noChangeAspect="1"/>
+          </p:cNvPicPr>
+          <p:nvPr/>
+        </p:nvPicPr>
+        <p:blipFill>
+          <a:blip r:embed="rId4">
+            <a:extLst>
+              <a:ext uri="{28A0092B-C50C-407E-A947-70E740481C1C}">
+                <a14:useLocalDpi xmlns:a14="http://schemas.microsoft.com/office/drawing/2010/main" val="0"/>
+              </a:ext>
+            </a:extLst>
+          </a:blip>
+          <a:stretch>
+            <a:fillRect/>
+          </a:stretch>
+        </p:blipFill>
+        <p:spPr>
+          <a:xfrm>
+            <a:off x="2193566" y="4966596"/>
+            <a:ext cx="252000" cy="80641"/>
+          </a:xfrm>
+          <a:prstGeom prst="rect">
+            <a:avLst/>
+          </a:prstGeom>
+        </p:spPr>
+      </p:pic>
+      <p:pic>
+        <p:nvPicPr>
+          <p:cNvPr id="15" name="Picture 14">
+            <a:extLst>
+              <a:ext uri="{FF2B5EF4-FFF2-40B4-BE49-F238E27FC236}">
+                <a16:creationId xmlns:a16="http://schemas.microsoft.com/office/drawing/2014/main" id="{1BE5046E-1E00-1B6A-61C9-C23A05F12D15}"/>
+              </a:ext>
+            </a:extLst>
+          </p:cNvPr>
+          <p:cNvPicPr>
+            <a:picLocks noChangeAspect="1"/>
+          </p:cNvPicPr>
+          <p:nvPr/>
+        </p:nvPicPr>
+        <p:blipFill>
+          <a:blip r:embed="rId4">
+            <a:extLst>
+              <a:ext uri="{28A0092B-C50C-407E-A947-70E740481C1C}">
+                <a14:useLocalDpi xmlns:a14="http://schemas.microsoft.com/office/drawing/2010/main" val="0"/>
+              </a:ext>
+            </a:extLst>
+          </a:blip>
+          <a:stretch>
+            <a:fillRect/>
+          </a:stretch>
+        </p:blipFill>
+        <p:spPr>
+          <a:xfrm>
+            <a:off x="8298155" y="4966595"/>
+            <a:ext cx="252000" cy="80641"/>
+          </a:xfrm>
+          <a:prstGeom prst="rect">
+            <a:avLst/>
+          </a:prstGeom>
+        </p:spPr>
+      </p:pic>
+      <p:pic>
+        <p:nvPicPr>
+          <p:cNvPr id="16" name="Picture 15">
+            <a:extLst>
+              <a:ext uri="{FF2B5EF4-FFF2-40B4-BE49-F238E27FC236}">
+                <a16:creationId xmlns:a16="http://schemas.microsoft.com/office/drawing/2014/main" id="{FBB8416E-B9E6-935C-1208-5822809A2A7D}"/>
+              </a:ext>
+            </a:extLst>
+          </p:cNvPr>
+          <p:cNvPicPr>
+            <a:picLocks noChangeAspect="1"/>
+          </p:cNvPicPr>
+          <p:nvPr/>
+        </p:nvPicPr>
+        <p:blipFill>
+          <a:blip r:embed="rId4">
+            <a:extLst>
+              <a:ext uri="{28A0092B-C50C-407E-A947-70E740481C1C}">
+                <a14:useLocalDpi xmlns:a14="http://schemas.microsoft.com/office/drawing/2010/main" val="0"/>
+              </a:ext>
+            </a:extLst>
+          </a:blip>
+          <a:stretch>
+            <a:fillRect/>
+          </a:stretch>
+        </p:blipFill>
+        <p:spPr>
+          <a:xfrm flipH="1">
+            <a:off x="8835882" y="4507692"/>
+            <a:ext cx="252000" cy="80641"/>
+          </a:xfrm>
+          <a:prstGeom prst="rect">
+            <a:avLst/>
+          </a:prstGeom>
+        </p:spPr>
+      </p:pic>
+      <p:pic>
+        <p:nvPicPr>
+          <p:cNvPr id="17" name="Picture 16">
+            <a:extLst>
+              <a:ext uri="{FF2B5EF4-FFF2-40B4-BE49-F238E27FC236}">
+                <a16:creationId xmlns:a16="http://schemas.microsoft.com/office/drawing/2014/main" id="{0D8C6ADF-49DD-D10E-0E72-B60A3E8C9929}"/>
+              </a:ext>
+            </a:extLst>
+          </p:cNvPr>
+          <p:cNvPicPr>
+            <a:picLocks noChangeAspect="1"/>
+          </p:cNvPicPr>
+          <p:nvPr/>
+        </p:nvPicPr>
+        <p:blipFill>
+          <a:blip r:embed="rId4">
+            <a:extLst>
+              <a:ext uri="{28A0092B-C50C-407E-A947-70E740481C1C}">
+                <a14:useLocalDpi xmlns:a14="http://schemas.microsoft.com/office/drawing/2010/main" val="0"/>
+              </a:ext>
+            </a:extLst>
+          </a:blip>
+          <a:stretch>
+            <a:fillRect/>
+          </a:stretch>
+        </p:blipFill>
+        <p:spPr>
+          <a:xfrm flipH="1">
+            <a:off x="7220835" y="2207399"/>
+            <a:ext cx="252000" cy="80641"/>
+          </a:xfrm>
+          <a:prstGeom prst="rect">
+            <a:avLst/>
+          </a:prstGeom>
+        </p:spPr>
+      </p:pic>
+      <p:pic>
+        <p:nvPicPr>
+          <p:cNvPr id="18" name="Picture 17">
+            <a:extLst>
+              <a:ext uri="{FF2B5EF4-FFF2-40B4-BE49-F238E27FC236}">
+                <a16:creationId xmlns:a16="http://schemas.microsoft.com/office/drawing/2014/main" id="{7460DDD0-54AE-E0DA-E26B-68D1A9AE6D9C}"/>
+              </a:ext>
+            </a:extLst>
+          </p:cNvPr>
+          <p:cNvPicPr>
+            <a:picLocks noChangeAspect="1"/>
+          </p:cNvPicPr>
+          <p:nvPr/>
+        </p:nvPicPr>
+        <p:blipFill>
+          <a:blip r:embed="rId4">
+            <a:extLst>
+              <a:ext uri="{28A0092B-C50C-407E-A947-70E740481C1C}">
+                <a14:useLocalDpi xmlns:a14="http://schemas.microsoft.com/office/drawing/2010/main" val="0"/>
+              </a:ext>
+            </a:extLst>
+          </a:blip>
+          <a:stretch>
+            <a:fillRect/>
+          </a:stretch>
+        </p:blipFill>
+        <p:spPr>
+          <a:xfrm>
+            <a:off x="2513180" y="1500206"/>
+            <a:ext cx="252000" cy="80641"/>
+          </a:xfrm>
+          <a:prstGeom prst="rect">
+            <a:avLst/>
+          </a:prstGeom>
+        </p:spPr>
+      </p:pic>
+      <p:pic>
+        <p:nvPicPr>
+          <p:cNvPr id="20" name="Picture 19">
+            <a:extLst>
+              <a:ext uri="{FF2B5EF4-FFF2-40B4-BE49-F238E27FC236}">
+                <a16:creationId xmlns:a16="http://schemas.microsoft.com/office/drawing/2014/main" id="{CA7E2BD3-9525-2EFD-5B04-409691A64423}"/>
+              </a:ext>
+            </a:extLst>
+          </p:cNvPr>
+          <p:cNvPicPr>
+            <a:picLocks noChangeAspect="1"/>
+          </p:cNvPicPr>
+          <p:nvPr/>
+        </p:nvPicPr>
+        <p:blipFill>
+          <a:blip r:embed="rId4">
+            <a:extLst>
+              <a:ext uri="{28A0092B-C50C-407E-A947-70E740481C1C}">
+                <a14:useLocalDpi xmlns:a14="http://schemas.microsoft.com/office/drawing/2010/main" val="0"/>
+              </a:ext>
+            </a:extLst>
+          </a:blip>
+          <a:stretch>
+            <a:fillRect/>
+          </a:stretch>
+        </p:blipFill>
+        <p:spPr>
+          <a:xfrm>
+            <a:off x="7693481" y="2661858"/>
+            <a:ext cx="252000" cy="80641"/>
+          </a:xfrm>
+          <a:prstGeom prst="rect">
+            <a:avLst/>
+          </a:prstGeom>
+        </p:spPr>
+      </p:pic>
+      <p:pic>
+        <p:nvPicPr>
+          <p:cNvPr id="21" name="Picture 20">
+            <a:extLst>
+              <a:ext uri="{FF2B5EF4-FFF2-40B4-BE49-F238E27FC236}">
+                <a16:creationId xmlns:a16="http://schemas.microsoft.com/office/drawing/2014/main" id="{BEA0872A-CECB-863A-58B0-EC350256DB00}"/>
+              </a:ext>
+            </a:extLst>
+          </p:cNvPr>
+          <p:cNvPicPr>
+            <a:picLocks noChangeAspect="1"/>
+          </p:cNvPicPr>
+          <p:nvPr/>
+        </p:nvPicPr>
+        <p:blipFill>
+          <a:blip r:embed="rId4">
+            <a:extLst>
+              <a:ext uri="{28A0092B-C50C-407E-A947-70E740481C1C}">
+                <a14:useLocalDpi xmlns:a14="http://schemas.microsoft.com/office/drawing/2010/main" val="0"/>
+              </a:ext>
+            </a:extLst>
+          </a:blip>
+          <a:stretch>
+            <a:fillRect/>
+          </a:stretch>
+        </p:blipFill>
+        <p:spPr>
+          <a:xfrm>
+            <a:off x="6517521" y="3795085"/>
+            <a:ext cx="252000" cy="80641"/>
+          </a:xfrm>
+          <a:prstGeom prst="rect">
+            <a:avLst/>
+          </a:prstGeom>
+        </p:spPr>
+      </p:pic>
+      <p:pic>
+        <p:nvPicPr>
+          <p:cNvPr id="22" name="Picture 21">
+            <a:extLst>
+              <a:ext uri="{FF2B5EF4-FFF2-40B4-BE49-F238E27FC236}">
+                <a16:creationId xmlns:a16="http://schemas.microsoft.com/office/drawing/2014/main" id="{9AB42F64-2C4C-FFD2-5579-71C39C78C73F}"/>
+              </a:ext>
+            </a:extLst>
+          </p:cNvPr>
+          <p:cNvPicPr>
+            <a:picLocks noChangeAspect="1"/>
+          </p:cNvPicPr>
+          <p:nvPr/>
+        </p:nvPicPr>
+        <p:blipFill>
+          <a:blip r:embed="rId4">
+            <a:extLst>
+              <a:ext uri="{28A0092B-C50C-407E-A947-70E740481C1C}">
+                <a14:useLocalDpi xmlns:a14="http://schemas.microsoft.com/office/drawing/2010/main" val="0"/>
+              </a:ext>
+            </a:extLst>
+          </a:blip>
+          <a:stretch>
+            <a:fillRect/>
+          </a:stretch>
+        </p:blipFill>
+        <p:spPr>
+          <a:xfrm flipH="1">
+            <a:off x="6643521" y="5664633"/>
+            <a:ext cx="252000" cy="80641"/>
+          </a:xfrm>
+          <a:prstGeom prst="rect">
+            <a:avLst/>
+          </a:prstGeom>
+        </p:spPr>
+      </p:pic>
+      <p:sp>
+        <p:nvSpPr>
+          <p:cNvPr id="30" name="TextBox 29">
+            <a:extLst>
+              <a:ext uri="{FF2B5EF4-FFF2-40B4-BE49-F238E27FC236}">
+                <a16:creationId xmlns:a16="http://schemas.microsoft.com/office/drawing/2014/main" id="{391CE1C5-91A0-E636-C6E0-66B63621BC3D}"/>
+              </a:ext>
+            </a:extLst>
+          </p:cNvPr>
+          <p:cNvSpPr txBox="1"/>
+          <p:nvPr/>
+        </p:nvSpPr>
+        <p:spPr>
+          <a:xfrm>
+            <a:off x="570408" y="161925"/>
+            <a:ext cx="1110345" cy="430887"/>
+          </a:xfrm>
+          <a:prstGeom prst="rect">
+            <a:avLst/>
+          </a:prstGeom>
+          <a:noFill/>
+        </p:spPr>
+        <p:txBody>
+          <a:bodyPr wrap="square" rtlCol="0">
+            <a:spAutoFit/>
+          </a:bodyPr>
+          <a:lstStyle/>
+          <a:p>
+            <a:r>
+              <a:rPr lang="en-US" sz="1100" b="1" dirty="0"/>
+              <a:t>Railway track switch fork</a:t>
+            </a:r>
+            <a:endParaRPr lang="en-SG" sz="1100" b="1" dirty="0"/>
+          </a:p>
+        </p:txBody>
+      </p:sp>
+      <p:sp>
+        <p:nvSpPr>
+          <p:cNvPr id="31" name="TextBox 30">
+            <a:extLst>
+              <a:ext uri="{FF2B5EF4-FFF2-40B4-BE49-F238E27FC236}">
+                <a16:creationId xmlns:a16="http://schemas.microsoft.com/office/drawing/2014/main" id="{93382B10-8D6A-1BB5-4660-2FADB723B12B}"/>
+              </a:ext>
+            </a:extLst>
+          </p:cNvPr>
+          <p:cNvSpPr txBox="1"/>
+          <p:nvPr/>
+        </p:nvSpPr>
+        <p:spPr>
+          <a:xfrm>
+            <a:off x="1532707" y="161925"/>
+            <a:ext cx="791394" cy="430887"/>
+          </a:xfrm>
+          <a:prstGeom prst="rect">
+            <a:avLst/>
+          </a:prstGeom>
+          <a:noFill/>
+        </p:spPr>
+        <p:txBody>
+          <a:bodyPr wrap="square" rtlCol="0">
+            <a:spAutoFit/>
+          </a:bodyPr>
+          <a:lstStyle/>
+          <a:p>
+            <a:r>
+              <a:rPr lang="en-US" sz="1100" b="1" dirty="0"/>
+              <a:t>Station Indicator </a:t>
+            </a:r>
+            <a:endParaRPr lang="en-SG" sz="1100" b="1" dirty="0"/>
+          </a:p>
+        </p:txBody>
+      </p:sp>
+      <p:cxnSp>
+        <p:nvCxnSpPr>
+          <p:cNvPr id="32" name="Straight Arrow Connector 31">
+            <a:extLst>
+              <a:ext uri="{FF2B5EF4-FFF2-40B4-BE49-F238E27FC236}">
+                <a16:creationId xmlns:a16="http://schemas.microsoft.com/office/drawing/2014/main" id="{30C94613-DD23-E0E5-0A7A-0DEF7CE340F0}"/>
+              </a:ext>
+            </a:extLst>
+          </p:cNvPr>
+          <p:cNvCxnSpPr>
+            <a:cxnSpLocks/>
+          </p:cNvCxnSpPr>
+          <p:nvPr/>
+        </p:nvCxnSpPr>
+        <p:spPr>
+          <a:xfrm>
+            <a:off x="1783596" y="523836"/>
+            <a:ext cx="0" cy="857289"/>
+          </a:xfrm>
+          <a:prstGeom prst="straightConnector1">
+            <a:avLst/>
+          </a:prstGeom>
+          <a:ln w="19050">
+            <a:solidFill>
+              <a:schemeClr val="tx2">
+                <a:lumMod val="50000"/>
+                <a:lumOff val="50000"/>
+              </a:schemeClr>
+            </a:solidFill>
+            <a:prstDash val="sysDash"/>
+            <a:tailEnd type="triangle"/>
+          </a:ln>
+        </p:spPr>
+        <p:style>
+          <a:lnRef idx="1">
+            <a:schemeClr val="accent5"/>
+          </a:lnRef>
+          <a:fillRef idx="0">
+            <a:schemeClr val="accent5"/>
+          </a:fillRef>
+          <a:effectRef idx="0">
+            <a:schemeClr val="accent5"/>
+          </a:effectRef>
+          <a:fontRef idx="minor">
+            <a:schemeClr val="tx1"/>
+          </a:fontRef>
+        </p:style>
+      </p:cxnSp>
+      <p:cxnSp>
+        <p:nvCxnSpPr>
+          <p:cNvPr id="34" name="Straight Arrow Connector 33">
+            <a:extLst>
+              <a:ext uri="{FF2B5EF4-FFF2-40B4-BE49-F238E27FC236}">
+                <a16:creationId xmlns:a16="http://schemas.microsoft.com/office/drawing/2014/main" id="{07041865-EDC8-0203-1C5E-EC93A9FCC388}"/>
+              </a:ext>
+            </a:extLst>
+          </p:cNvPr>
+          <p:cNvCxnSpPr>
+            <a:cxnSpLocks/>
+          </p:cNvCxnSpPr>
+          <p:nvPr/>
+        </p:nvCxnSpPr>
+        <p:spPr>
+          <a:xfrm>
+            <a:off x="2597847" y="552411"/>
+            <a:ext cx="0" cy="857289"/>
+          </a:xfrm>
+          <a:prstGeom prst="straightConnector1">
+            <a:avLst/>
+          </a:prstGeom>
+          <a:ln w="19050">
+            <a:solidFill>
+              <a:schemeClr val="tx2">
+                <a:lumMod val="50000"/>
+                <a:lumOff val="50000"/>
+              </a:schemeClr>
+            </a:solidFill>
+            <a:prstDash val="sysDash"/>
+            <a:tailEnd type="triangle"/>
+          </a:ln>
+        </p:spPr>
+        <p:style>
+          <a:lnRef idx="1">
+            <a:schemeClr val="accent5"/>
+          </a:lnRef>
+          <a:fillRef idx="0">
+            <a:schemeClr val="accent5"/>
+          </a:fillRef>
+          <a:effectRef idx="0">
+            <a:schemeClr val="accent5"/>
+          </a:effectRef>
+          <a:fontRef idx="minor">
+            <a:schemeClr val="tx1"/>
+          </a:fontRef>
+        </p:style>
+      </p:cxnSp>
+      <p:sp>
+        <p:nvSpPr>
+          <p:cNvPr id="35" name="TextBox 34">
+            <a:extLst>
+              <a:ext uri="{FF2B5EF4-FFF2-40B4-BE49-F238E27FC236}">
+                <a16:creationId xmlns:a16="http://schemas.microsoft.com/office/drawing/2014/main" id="{C7D5B4B8-E73B-777A-3E80-F5C40307526B}"/>
+              </a:ext>
+            </a:extLst>
+          </p:cNvPr>
+          <p:cNvSpPr txBox="1"/>
+          <p:nvPr/>
+        </p:nvSpPr>
+        <p:spPr>
+          <a:xfrm>
+            <a:off x="2369483" y="177547"/>
+            <a:ext cx="791394" cy="430887"/>
+          </a:xfrm>
+          <a:prstGeom prst="rect">
+            <a:avLst/>
+          </a:prstGeom>
+          <a:noFill/>
+        </p:spPr>
+        <p:txBody>
+          <a:bodyPr wrap="square" rtlCol="0">
+            <a:spAutoFit/>
+          </a:bodyPr>
+          <a:lstStyle/>
+          <a:p>
+            <a:r>
+              <a:rPr lang="en-US" sz="1100" b="1" dirty="0"/>
+              <a:t>Train Indicator </a:t>
+            </a:r>
+            <a:endParaRPr lang="en-SG" sz="1100" b="1" dirty="0"/>
+          </a:p>
+        </p:txBody>
+      </p:sp>
+      <p:cxnSp>
+        <p:nvCxnSpPr>
+          <p:cNvPr id="36" name="Straight Arrow Connector 35">
+            <a:extLst>
+              <a:ext uri="{FF2B5EF4-FFF2-40B4-BE49-F238E27FC236}">
+                <a16:creationId xmlns:a16="http://schemas.microsoft.com/office/drawing/2014/main" id="{DE06453F-90E8-AE15-37AE-61A31240C850}"/>
+              </a:ext>
+            </a:extLst>
+          </p:cNvPr>
+          <p:cNvCxnSpPr>
+            <a:cxnSpLocks/>
+          </p:cNvCxnSpPr>
+          <p:nvPr/>
+        </p:nvCxnSpPr>
+        <p:spPr>
+          <a:xfrm>
+            <a:off x="4026597" y="552410"/>
+            <a:ext cx="0" cy="857289"/>
+          </a:xfrm>
+          <a:prstGeom prst="straightConnector1">
+            <a:avLst/>
+          </a:prstGeom>
+          <a:ln w="19050">
+            <a:solidFill>
+              <a:schemeClr val="tx2">
+                <a:lumMod val="50000"/>
+                <a:lumOff val="50000"/>
+              </a:schemeClr>
+            </a:solidFill>
+            <a:prstDash val="sysDash"/>
+            <a:tailEnd type="triangle"/>
+          </a:ln>
+        </p:spPr>
+        <p:style>
+          <a:lnRef idx="1">
+            <a:schemeClr val="accent5"/>
+          </a:lnRef>
+          <a:fillRef idx="0">
+            <a:schemeClr val="accent5"/>
+          </a:fillRef>
+          <a:effectRef idx="0">
+            <a:schemeClr val="accent5"/>
+          </a:effectRef>
+          <a:fontRef idx="minor">
+            <a:schemeClr val="tx1"/>
+          </a:fontRef>
+        </p:style>
+      </p:cxnSp>
+      <p:sp>
+        <p:nvSpPr>
+          <p:cNvPr id="37" name="TextBox 36">
+            <a:extLst>
+              <a:ext uri="{FF2B5EF4-FFF2-40B4-BE49-F238E27FC236}">
+                <a16:creationId xmlns:a16="http://schemas.microsoft.com/office/drawing/2014/main" id="{E6C12B89-D7D6-1DFE-DD89-4E67EABE2BFC}"/>
+              </a:ext>
+            </a:extLst>
+          </p:cNvPr>
+          <p:cNvSpPr txBox="1"/>
+          <p:nvPr/>
+        </p:nvSpPr>
+        <p:spPr>
+          <a:xfrm>
+            <a:off x="3424877" y="177547"/>
+            <a:ext cx="1203440" cy="430887"/>
+          </a:xfrm>
+          <a:prstGeom prst="rect">
+            <a:avLst/>
+          </a:prstGeom>
+          <a:noFill/>
+        </p:spPr>
+        <p:txBody>
+          <a:bodyPr wrap="square" rtlCol="0">
+            <a:spAutoFit/>
+          </a:bodyPr>
+          <a:lstStyle/>
+          <a:p>
+            <a:r>
+              <a:rPr lang="en-US" sz="1100" b="1" dirty="0"/>
+              <a:t>Junction entrance signal </a:t>
+            </a:r>
+            <a:endParaRPr lang="en-SG" sz="1100" b="1" dirty="0"/>
+          </a:p>
+        </p:txBody>
+      </p:sp>
+      <p:cxnSp>
+        <p:nvCxnSpPr>
+          <p:cNvPr id="38" name="Straight Arrow Connector 37">
+            <a:extLst>
+              <a:ext uri="{FF2B5EF4-FFF2-40B4-BE49-F238E27FC236}">
+                <a16:creationId xmlns:a16="http://schemas.microsoft.com/office/drawing/2014/main" id="{9AE1C916-DF64-4243-5E1A-EFB942BEC68A}"/>
+              </a:ext>
+            </a:extLst>
+          </p:cNvPr>
+          <p:cNvCxnSpPr>
+            <a:cxnSpLocks/>
+          </p:cNvCxnSpPr>
+          <p:nvPr/>
+        </p:nvCxnSpPr>
+        <p:spPr>
+          <a:xfrm>
+            <a:off x="4998147" y="552390"/>
+            <a:ext cx="0" cy="857289"/>
+          </a:xfrm>
+          <a:prstGeom prst="straightConnector1">
+            <a:avLst/>
+          </a:prstGeom>
+          <a:ln w="19050">
+            <a:solidFill>
+              <a:schemeClr val="tx2">
+                <a:lumMod val="50000"/>
+                <a:lumOff val="50000"/>
+              </a:schemeClr>
+            </a:solidFill>
+            <a:prstDash val="sysDash"/>
+            <a:tailEnd type="triangle"/>
+          </a:ln>
+        </p:spPr>
+        <p:style>
+          <a:lnRef idx="1">
+            <a:schemeClr val="accent5"/>
+          </a:lnRef>
+          <a:fillRef idx="0">
+            <a:schemeClr val="accent5"/>
+          </a:fillRef>
+          <a:effectRef idx="0">
+            <a:schemeClr val="accent5"/>
+          </a:effectRef>
+          <a:fontRef idx="minor">
+            <a:schemeClr val="tx1"/>
+          </a:fontRef>
+        </p:style>
+      </p:cxnSp>
+      <p:cxnSp>
+        <p:nvCxnSpPr>
+          <p:cNvPr id="39" name="Straight Arrow Connector 38">
+            <a:extLst>
+              <a:ext uri="{FF2B5EF4-FFF2-40B4-BE49-F238E27FC236}">
+                <a16:creationId xmlns:a16="http://schemas.microsoft.com/office/drawing/2014/main" id="{4B3EF89A-0104-F564-1814-48AED4ADCC55}"/>
+              </a:ext>
+            </a:extLst>
+          </p:cNvPr>
+          <p:cNvCxnSpPr>
+            <a:cxnSpLocks/>
+          </p:cNvCxnSpPr>
+          <p:nvPr/>
+        </p:nvCxnSpPr>
+        <p:spPr>
+          <a:xfrm>
+            <a:off x="5406674" y="542886"/>
+            <a:ext cx="0" cy="857289"/>
+          </a:xfrm>
+          <a:prstGeom prst="straightConnector1">
+            <a:avLst/>
+          </a:prstGeom>
+          <a:ln w="19050">
+            <a:solidFill>
+              <a:schemeClr val="tx2">
+                <a:lumMod val="50000"/>
+                <a:lumOff val="50000"/>
+              </a:schemeClr>
+            </a:solidFill>
+            <a:prstDash val="sysDash"/>
+            <a:tailEnd type="triangle"/>
+          </a:ln>
+        </p:spPr>
+        <p:style>
+          <a:lnRef idx="1">
+            <a:schemeClr val="accent5"/>
+          </a:lnRef>
+          <a:fillRef idx="0">
+            <a:schemeClr val="accent5"/>
+          </a:fillRef>
+          <a:effectRef idx="0">
+            <a:schemeClr val="accent5"/>
+          </a:effectRef>
+          <a:fontRef idx="minor">
+            <a:schemeClr val="tx1"/>
+          </a:fontRef>
+        </p:style>
+      </p:cxnSp>
+      <p:sp>
+        <p:nvSpPr>
+          <p:cNvPr id="40" name="TextBox 39">
+            <a:extLst>
+              <a:ext uri="{FF2B5EF4-FFF2-40B4-BE49-F238E27FC236}">
+                <a16:creationId xmlns:a16="http://schemas.microsoft.com/office/drawing/2014/main" id="{0F33AB98-484D-0880-9C6D-891D092E6BC7}"/>
+              </a:ext>
+            </a:extLst>
+          </p:cNvPr>
+          <p:cNvSpPr txBox="1"/>
+          <p:nvPr/>
+        </p:nvSpPr>
+        <p:spPr>
+          <a:xfrm>
+            <a:off x="4750282" y="184567"/>
+            <a:ext cx="1440968" cy="430887"/>
+          </a:xfrm>
+          <a:prstGeom prst="rect">
+            <a:avLst/>
+          </a:prstGeom>
+          <a:noFill/>
+        </p:spPr>
+        <p:txBody>
+          <a:bodyPr wrap="square" rtlCol="0">
+            <a:spAutoFit/>
+          </a:bodyPr>
+          <a:lstStyle/>
+          <a:p>
+            <a:r>
+              <a:rPr lang="en-US" sz="1100" b="1" dirty="0"/>
+              <a:t>Station entrance and exit signals</a:t>
+            </a:r>
+            <a:endParaRPr lang="en-SG" sz="1100" b="1" dirty="0"/>
+          </a:p>
+        </p:txBody>
+      </p:sp>
+      <p:sp>
+        <p:nvSpPr>
+          <p:cNvPr id="41" name="TextBox 40">
+            <a:extLst>
+              <a:ext uri="{FF2B5EF4-FFF2-40B4-BE49-F238E27FC236}">
+                <a16:creationId xmlns:a16="http://schemas.microsoft.com/office/drawing/2014/main" id="{AF2EC66E-8B88-9770-ADA3-252CBA5F50F7}"/>
+              </a:ext>
+            </a:extLst>
+          </p:cNvPr>
+          <p:cNvSpPr txBox="1"/>
+          <p:nvPr/>
+        </p:nvSpPr>
+        <p:spPr>
+          <a:xfrm>
+            <a:off x="6097885" y="215607"/>
+            <a:ext cx="1226567" cy="430887"/>
+          </a:xfrm>
+          <a:prstGeom prst="rect">
+            <a:avLst/>
+          </a:prstGeom>
+          <a:noFill/>
+        </p:spPr>
+        <p:txBody>
+          <a:bodyPr wrap="square" rtlCol="0">
+            <a:spAutoFit/>
+          </a:bodyPr>
+          <a:lstStyle/>
+          <a:p>
+            <a:r>
+              <a:rPr lang="en-US" sz="1100" b="1" dirty="0"/>
+              <a:t>Track direction indicator </a:t>
+            </a:r>
+            <a:endParaRPr lang="en-SG" sz="1100" b="1" dirty="0"/>
+          </a:p>
+        </p:txBody>
+      </p:sp>
+      <p:cxnSp>
+        <p:nvCxnSpPr>
+          <p:cNvPr id="42" name="Connector: Elbow 41">
+            <a:extLst>
+              <a:ext uri="{FF2B5EF4-FFF2-40B4-BE49-F238E27FC236}">
+                <a16:creationId xmlns:a16="http://schemas.microsoft.com/office/drawing/2014/main" id="{A3D32AF9-2248-7CBC-7697-35CE52B14C3F}"/>
+              </a:ext>
+            </a:extLst>
+          </p:cNvPr>
+          <p:cNvCxnSpPr>
+            <a:cxnSpLocks/>
+          </p:cNvCxnSpPr>
+          <p:nvPr/>
+        </p:nvCxnSpPr>
+        <p:spPr>
+          <a:xfrm rot="5400000">
+            <a:off x="5717087" y="861045"/>
+            <a:ext cx="972413" cy="467191"/>
+          </a:xfrm>
+          <a:prstGeom prst="bentConnector3">
+            <a:avLst>
+              <a:gd name="adj1" fmla="val 50000"/>
+            </a:avLst>
+          </a:prstGeom>
+          <a:ln>
+            <a:solidFill>
+              <a:schemeClr val="tx2">
+                <a:lumMod val="50000"/>
+                <a:lumOff val="50000"/>
+              </a:schemeClr>
+            </a:solidFill>
+            <a:prstDash val="sysDash"/>
+            <a:tailEnd type="triangle"/>
+          </a:ln>
+        </p:spPr>
+        <p:style>
+          <a:lnRef idx="2">
+            <a:schemeClr val="accent1"/>
+          </a:lnRef>
+          <a:fillRef idx="0">
+            <a:schemeClr val="accent1"/>
+          </a:fillRef>
+          <a:effectRef idx="1">
+            <a:schemeClr val="accent1"/>
+          </a:effectRef>
+          <a:fontRef idx="minor">
+            <a:schemeClr val="tx1"/>
+          </a:fontRef>
+        </p:style>
+      </p:cxnSp>
+      <p:sp>
+        <p:nvSpPr>
+          <p:cNvPr id="45" name="TextBox 44">
+            <a:extLst>
+              <a:ext uri="{FF2B5EF4-FFF2-40B4-BE49-F238E27FC236}">
+                <a16:creationId xmlns:a16="http://schemas.microsoft.com/office/drawing/2014/main" id="{562BA4B2-9FDD-525B-63CD-3F1C12381793}"/>
+              </a:ext>
+            </a:extLst>
+          </p:cNvPr>
+          <p:cNvSpPr txBox="1"/>
+          <p:nvPr/>
+        </p:nvSpPr>
+        <p:spPr>
+          <a:xfrm>
+            <a:off x="7346835" y="196577"/>
+            <a:ext cx="1203440" cy="430887"/>
+          </a:xfrm>
+          <a:prstGeom prst="rect">
+            <a:avLst/>
+          </a:prstGeom>
+          <a:noFill/>
+        </p:spPr>
+        <p:txBody>
+          <a:bodyPr wrap="square" rtlCol="0">
+            <a:spAutoFit/>
+          </a:bodyPr>
+          <a:lstStyle/>
+          <a:p>
+            <a:r>
+              <a:rPr lang="en-US" sz="1100" b="1" dirty="0"/>
+              <a:t>Junction track block signal </a:t>
+            </a:r>
+            <a:endParaRPr lang="en-SG" sz="1100" b="1" dirty="0"/>
+          </a:p>
+        </p:txBody>
+      </p:sp>
+      <p:cxnSp>
+        <p:nvCxnSpPr>
+          <p:cNvPr id="46" name="Straight Arrow Connector 45">
+            <a:extLst>
+              <a:ext uri="{FF2B5EF4-FFF2-40B4-BE49-F238E27FC236}">
+                <a16:creationId xmlns:a16="http://schemas.microsoft.com/office/drawing/2014/main" id="{B7F1DAE0-8419-838C-17B2-C86DD04E073A}"/>
+              </a:ext>
+            </a:extLst>
+          </p:cNvPr>
+          <p:cNvCxnSpPr>
+            <a:cxnSpLocks/>
+          </p:cNvCxnSpPr>
+          <p:nvPr/>
+        </p:nvCxnSpPr>
+        <p:spPr>
+          <a:xfrm>
+            <a:off x="7868737" y="608434"/>
+            <a:ext cx="0" cy="857289"/>
+          </a:xfrm>
+          <a:prstGeom prst="straightConnector1">
+            <a:avLst/>
+          </a:prstGeom>
+          <a:ln w="19050">
+            <a:solidFill>
+              <a:schemeClr val="tx2">
+                <a:lumMod val="50000"/>
+                <a:lumOff val="50000"/>
+              </a:schemeClr>
+            </a:solidFill>
+            <a:prstDash val="sysDash"/>
+            <a:tailEnd type="triangle"/>
+          </a:ln>
+        </p:spPr>
+        <p:style>
+          <a:lnRef idx="1">
+            <a:schemeClr val="accent5"/>
+          </a:lnRef>
+          <a:fillRef idx="0">
+            <a:schemeClr val="accent5"/>
+          </a:fillRef>
+          <a:effectRef idx="0">
+            <a:schemeClr val="accent5"/>
+          </a:effectRef>
+          <a:fontRef idx="minor">
+            <a:schemeClr val="tx1"/>
+          </a:fontRef>
+        </p:style>
+      </p:cxnSp>
+      <p:cxnSp>
+        <p:nvCxnSpPr>
+          <p:cNvPr id="47" name="Straight Arrow Connector 46">
+            <a:extLst>
+              <a:ext uri="{FF2B5EF4-FFF2-40B4-BE49-F238E27FC236}">
+                <a16:creationId xmlns:a16="http://schemas.microsoft.com/office/drawing/2014/main" id="{693187A9-6C4B-C040-664D-2986F35C3C32}"/>
+              </a:ext>
+            </a:extLst>
+          </p:cNvPr>
+          <p:cNvCxnSpPr>
+            <a:cxnSpLocks/>
+          </p:cNvCxnSpPr>
+          <p:nvPr/>
+        </p:nvCxnSpPr>
+        <p:spPr>
+          <a:xfrm>
+            <a:off x="7617522" y="618934"/>
+            <a:ext cx="0" cy="857289"/>
+          </a:xfrm>
+          <a:prstGeom prst="straightConnector1">
+            <a:avLst/>
+          </a:prstGeom>
+          <a:ln w="19050">
+            <a:solidFill>
+              <a:schemeClr val="tx2">
+                <a:lumMod val="50000"/>
+                <a:lumOff val="50000"/>
+              </a:schemeClr>
+            </a:solidFill>
+            <a:prstDash val="sysDash"/>
+            <a:tailEnd type="triangle"/>
+          </a:ln>
+        </p:spPr>
+        <p:style>
+          <a:lnRef idx="1">
+            <a:schemeClr val="accent5"/>
+          </a:lnRef>
+          <a:fillRef idx="0">
+            <a:schemeClr val="accent5"/>
+          </a:fillRef>
+          <a:effectRef idx="0">
+            <a:schemeClr val="accent5"/>
+          </a:effectRef>
+          <a:fontRef idx="minor">
+            <a:schemeClr val="tx1"/>
+          </a:fontRef>
+        </p:style>
+      </p:cxnSp>
+      <p:sp>
+        <p:nvSpPr>
+          <p:cNvPr id="48" name="TextBox 47">
+            <a:extLst>
+              <a:ext uri="{FF2B5EF4-FFF2-40B4-BE49-F238E27FC236}">
+                <a16:creationId xmlns:a16="http://schemas.microsoft.com/office/drawing/2014/main" id="{897D03C3-F154-ED25-C873-D2C777A85535}"/>
+              </a:ext>
+            </a:extLst>
+          </p:cNvPr>
+          <p:cNvSpPr txBox="1"/>
+          <p:nvPr/>
+        </p:nvSpPr>
+        <p:spPr>
+          <a:xfrm>
+            <a:off x="8480037" y="184567"/>
+            <a:ext cx="1267698" cy="430887"/>
+          </a:xfrm>
+          <a:prstGeom prst="rect">
+            <a:avLst/>
+          </a:prstGeom>
+          <a:noFill/>
+        </p:spPr>
+        <p:txBody>
+          <a:bodyPr wrap="square" rtlCol="0">
+            <a:spAutoFit/>
+          </a:bodyPr>
+          <a:lstStyle/>
+          <a:p>
+            <a:r>
+              <a:rPr lang="en-US" sz="1100" b="1" dirty="0"/>
+              <a:t>Date &amp; Time Indicator </a:t>
+            </a:r>
+            <a:endParaRPr lang="en-SG" sz="1100" b="1" dirty="0"/>
+          </a:p>
+        </p:txBody>
+      </p:sp>
+      <p:cxnSp>
+        <p:nvCxnSpPr>
+          <p:cNvPr id="49" name="Straight Arrow Connector 48">
+            <a:extLst>
+              <a:ext uri="{FF2B5EF4-FFF2-40B4-BE49-F238E27FC236}">
+                <a16:creationId xmlns:a16="http://schemas.microsoft.com/office/drawing/2014/main" id="{702A224A-0096-2B3E-2C0A-779431380029}"/>
+              </a:ext>
+            </a:extLst>
+          </p:cNvPr>
+          <p:cNvCxnSpPr>
+            <a:cxnSpLocks/>
+          </p:cNvCxnSpPr>
+          <p:nvPr/>
+        </p:nvCxnSpPr>
+        <p:spPr>
+          <a:xfrm>
+            <a:off x="8841592" y="569046"/>
+            <a:ext cx="0" cy="470275"/>
+          </a:xfrm>
+          <a:prstGeom prst="straightConnector1">
+            <a:avLst/>
+          </a:prstGeom>
+          <a:ln w="19050">
+            <a:solidFill>
+              <a:srgbClr val="00B0F0"/>
+            </a:solidFill>
+            <a:prstDash val="sysDash"/>
+            <a:tailEnd type="triangle"/>
+          </a:ln>
+        </p:spPr>
+        <p:style>
+          <a:lnRef idx="1">
+            <a:schemeClr val="accent5"/>
+          </a:lnRef>
+          <a:fillRef idx="0">
+            <a:schemeClr val="accent5"/>
+          </a:fillRef>
+          <a:effectRef idx="0">
+            <a:schemeClr val="accent5"/>
+          </a:effectRef>
+          <a:fontRef idx="minor">
+            <a:schemeClr val="tx1"/>
+          </a:fontRef>
+        </p:style>
+      </p:cxnSp>
+      <p:sp>
+        <p:nvSpPr>
+          <p:cNvPr id="51" name="TextBox 50">
+            <a:extLst>
+              <a:ext uri="{FF2B5EF4-FFF2-40B4-BE49-F238E27FC236}">
+                <a16:creationId xmlns:a16="http://schemas.microsoft.com/office/drawing/2014/main" id="{C30EE7D6-E603-0FC7-B89A-B033BF89E5C9}"/>
+              </a:ext>
+            </a:extLst>
+          </p:cNvPr>
+          <p:cNvSpPr txBox="1"/>
+          <p:nvPr/>
+        </p:nvSpPr>
+        <p:spPr>
+          <a:xfrm>
+            <a:off x="9547349" y="196577"/>
+            <a:ext cx="2070452" cy="430887"/>
+          </a:xfrm>
+          <a:prstGeom prst="rect">
+            <a:avLst/>
+          </a:prstGeom>
+          <a:noFill/>
+        </p:spPr>
+        <p:txBody>
+          <a:bodyPr wrap="square" rtlCol="0">
+            <a:spAutoFit/>
+          </a:bodyPr>
+          <a:lstStyle/>
+          <a:p>
+            <a:r>
+              <a:rPr lang="en-US" sz="1100" b="1" dirty="0"/>
+              <a:t>Station platform door state indictor [</a:t>
+            </a:r>
+            <a:r>
+              <a:rPr lang="en-US" sz="1100" b="1" dirty="0">
+                <a:solidFill>
+                  <a:srgbClr val="FF0000"/>
+                </a:solidFill>
+              </a:rPr>
+              <a:t>Red: door lock</a:t>
+            </a:r>
+            <a:r>
+              <a:rPr lang="en-US" sz="1100" b="1" dirty="0"/>
+              <a:t>]</a:t>
+            </a:r>
+            <a:endParaRPr lang="en-SG" sz="1100" b="1" dirty="0"/>
+          </a:p>
+        </p:txBody>
+      </p:sp>
+      <p:cxnSp>
+        <p:nvCxnSpPr>
+          <p:cNvPr id="52" name="Connector: Elbow 51">
+            <a:extLst>
+              <a:ext uri="{FF2B5EF4-FFF2-40B4-BE49-F238E27FC236}">
+                <a16:creationId xmlns:a16="http://schemas.microsoft.com/office/drawing/2014/main" id="{23ECBD55-2AB1-4473-113F-10E43E328F1A}"/>
+              </a:ext>
+            </a:extLst>
+          </p:cNvPr>
+          <p:cNvCxnSpPr>
+            <a:cxnSpLocks/>
+          </p:cNvCxnSpPr>
+          <p:nvPr/>
+        </p:nvCxnSpPr>
+        <p:spPr>
+          <a:xfrm rot="5400000">
+            <a:off x="9256988" y="921574"/>
+            <a:ext cx="955131" cy="342895"/>
+          </a:xfrm>
+          <a:prstGeom prst="bentConnector3">
+            <a:avLst>
+              <a:gd name="adj1" fmla="val 50000"/>
+            </a:avLst>
+          </a:prstGeom>
+          <a:ln>
+            <a:solidFill>
+              <a:schemeClr val="tx2">
+                <a:lumMod val="50000"/>
+                <a:lumOff val="50000"/>
+              </a:schemeClr>
+            </a:solidFill>
+            <a:prstDash val="sysDash"/>
+            <a:tailEnd type="triangle"/>
+          </a:ln>
+        </p:spPr>
+        <p:style>
+          <a:lnRef idx="2">
+            <a:schemeClr val="accent1"/>
+          </a:lnRef>
+          <a:fillRef idx="0">
+            <a:schemeClr val="accent1"/>
+          </a:fillRef>
+          <a:effectRef idx="1">
+            <a:schemeClr val="accent1"/>
+          </a:effectRef>
+          <a:fontRef idx="minor">
+            <a:schemeClr val="tx1"/>
+          </a:fontRef>
+        </p:style>
+      </p:cxnSp>
+      <p:sp>
+        <p:nvSpPr>
+          <p:cNvPr id="59" name="TextBox 58">
+            <a:extLst>
+              <a:ext uri="{FF2B5EF4-FFF2-40B4-BE49-F238E27FC236}">
+                <a16:creationId xmlns:a16="http://schemas.microsoft.com/office/drawing/2014/main" id="{CDB7BDE5-1933-C370-3608-75E49AED4095}"/>
+              </a:ext>
+            </a:extLst>
+          </p:cNvPr>
+          <p:cNvSpPr txBox="1"/>
+          <p:nvPr/>
+        </p:nvSpPr>
+        <p:spPr>
+          <a:xfrm>
+            <a:off x="10955235" y="834182"/>
+            <a:ext cx="1360156" cy="430887"/>
+          </a:xfrm>
+          <a:prstGeom prst="rect">
+            <a:avLst/>
+          </a:prstGeom>
+          <a:noFill/>
+        </p:spPr>
+        <p:txBody>
+          <a:bodyPr wrap="square" rtlCol="0">
+            <a:spAutoFit/>
+          </a:bodyPr>
+          <a:lstStyle/>
+          <a:p>
+            <a:r>
+              <a:rPr lang="en-US" sz="1100" b="1" dirty="0"/>
+              <a:t>Track continuous  section indicator </a:t>
+            </a:r>
+            <a:endParaRPr lang="en-SG" sz="1100" b="1" dirty="0"/>
+          </a:p>
+        </p:txBody>
+      </p:sp>
+      <p:cxnSp>
+        <p:nvCxnSpPr>
+          <p:cNvPr id="60" name="Connector: Elbow 59">
+            <a:extLst>
+              <a:ext uri="{FF2B5EF4-FFF2-40B4-BE49-F238E27FC236}">
+                <a16:creationId xmlns:a16="http://schemas.microsoft.com/office/drawing/2014/main" id="{F48C25C7-F56A-DD5C-F0F9-371ADB669644}"/>
+              </a:ext>
+            </a:extLst>
+          </p:cNvPr>
+          <p:cNvCxnSpPr>
+            <a:cxnSpLocks/>
+            <a:stCxn id="59" idx="2"/>
+          </p:cNvCxnSpPr>
+          <p:nvPr/>
+        </p:nvCxnSpPr>
+        <p:spPr>
+          <a:xfrm rot="5400000">
+            <a:off x="10993113" y="1015697"/>
+            <a:ext cx="392829" cy="891573"/>
+          </a:xfrm>
+          <a:prstGeom prst="bentConnector2">
+            <a:avLst/>
+          </a:prstGeom>
+          <a:ln>
+            <a:solidFill>
+              <a:schemeClr val="tx2">
+                <a:lumMod val="50000"/>
+                <a:lumOff val="50000"/>
+              </a:schemeClr>
+            </a:solidFill>
+            <a:prstDash val="sysDash"/>
+            <a:tailEnd type="triangle"/>
+          </a:ln>
+        </p:spPr>
+        <p:style>
+          <a:lnRef idx="2">
+            <a:schemeClr val="accent1"/>
+          </a:lnRef>
+          <a:fillRef idx="0">
+            <a:schemeClr val="accent1"/>
+          </a:fillRef>
+          <a:effectRef idx="1">
+            <a:schemeClr val="accent1"/>
+          </a:effectRef>
+          <a:fontRef idx="minor">
+            <a:schemeClr val="tx1"/>
+          </a:fontRef>
+        </p:style>
+      </p:cxnSp>
+      <p:sp>
+        <p:nvSpPr>
+          <p:cNvPr id="63" name="TextBox 62">
+            <a:extLst>
+              <a:ext uri="{FF2B5EF4-FFF2-40B4-BE49-F238E27FC236}">
+                <a16:creationId xmlns:a16="http://schemas.microsoft.com/office/drawing/2014/main" id="{53202BEB-017B-EFD6-F271-25AD0C780492}"/>
+              </a:ext>
+            </a:extLst>
+          </p:cNvPr>
+          <p:cNvSpPr txBox="1"/>
+          <p:nvPr/>
+        </p:nvSpPr>
+        <p:spPr>
+          <a:xfrm>
+            <a:off x="10949911" y="1835281"/>
+            <a:ext cx="1142566" cy="430887"/>
+          </a:xfrm>
+          <a:prstGeom prst="rect">
+            <a:avLst/>
+          </a:prstGeom>
+          <a:noFill/>
+        </p:spPr>
+        <p:txBody>
+          <a:bodyPr wrap="square" rtlCol="0">
+            <a:spAutoFit/>
+          </a:bodyPr>
+          <a:lstStyle/>
+          <a:p>
+            <a:r>
+              <a:rPr lang="en-US" sz="1100" b="1" dirty="0"/>
+              <a:t>Train passing junction block</a:t>
+            </a:r>
+            <a:endParaRPr lang="en-SG" sz="1100" b="1" dirty="0"/>
+          </a:p>
+        </p:txBody>
+      </p:sp>
+      <p:cxnSp>
+        <p:nvCxnSpPr>
+          <p:cNvPr id="64" name="Connector: Elbow 63">
+            <a:extLst>
+              <a:ext uri="{FF2B5EF4-FFF2-40B4-BE49-F238E27FC236}">
+                <a16:creationId xmlns:a16="http://schemas.microsoft.com/office/drawing/2014/main" id="{15A7388B-0DC4-C90F-48E8-3C5EEE95590A}"/>
+              </a:ext>
+            </a:extLst>
+          </p:cNvPr>
+          <p:cNvCxnSpPr>
+            <a:cxnSpLocks/>
+            <a:stCxn id="63" idx="2"/>
+            <a:endCxn id="20" idx="0"/>
+          </p:cNvCxnSpPr>
+          <p:nvPr/>
+        </p:nvCxnSpPr>
+        <p:spPr>
+          <a:xfrm rot="5400000">
+            <a:off x="9472493" y="613157"/>
+            <a:ext cx="395690" cy="3701713"/>
+          </a:xfrm>
+          <a:prstGeom prst="bentConnector3">
+            <a:avLst>
+              <a:gd name="adj1" fmla="val 50000"/>
+            </a:avLst>
+          </a:prstGeom>
+          <a:ln>
+            <a:solidFill>
+              <a:schemeClr val="tx2">
+                <a:lumMod val="50000"/>
+                <a:lumOff val="50000"/>
+              </a:schemeClr>
+            </a:solidFill>
+            <a:prstDash val="sysDash"/>
+            <a:tailEnd type="triangle"/>
+          </a:ln>
+        </p:spPr>
+        <p:style>
+          <a:lnRef idx="2">
+            <a:schemeClr val="accent1"/>
+          </a:lnRef>
+          <a:fillRef idx="0">
+            <a:schemeClr val="accent1"/>
+          </a:fillRef>
+          <a:effectRef idx="1">
+            <a:schemeClr val="accent1"/>
+          </a:effectRef>
+          <a:fontRef idx="minor">
+            <a:schemeClr val="tx1"/>
+          </a:fontRef>
+        </p:style>
+      </p:cxnSp>
+      <p:sp>
+        <p:nvSpPr>
+          <p:cNvPr id="71" name="TextBox 70">
+            <a:extLst>
+              <a:ext uri="{FF2B5EF4-FFF2-40B4-BE49-F238E27FC236}">
+                <a16:creationId xmlns:a16="http://schemas.microsoft.com/office/drawing/2014/main" id="{7A3D6873-C06C-DBCC-FD48-37D815F3E117}"/>
+              </a:ext>
+            </a:extLst>
+          </p:cNvPr>
+          <p:cNvSpPr txBox="1"/>
+          <p:nvPr/>
+        </p:nvSpPr>
+        <p:spPr>
+          <a:xfrm>
+            <a:off x="10949911" y="2757275"/>
+            <a:ext cx="1142559" cy="600164"/>
+          </a:xfrm>
+          <a:prstGeom prst="rect">
+            <a:avLst/>
+          </a:prstGeom>
+          <a:noFill/>
+        </p:spPr>
+        <p:txBody>
+          <a:bodyPr wrap="square" rtlCol="0">
+            <a:spAutoFit/>
+          </a:bodyPr>
+          <a:lstStyle/>
+          <a:p>
+            <a:r>
+              <a:rPr lang="en-US" sz="1100" b="1" dirty="0"/>
+              <a:t>Railway track switch fork signals </a:t>
+            </a:r>
+            <a:endParaRPr lang="en-SG" sz="1100" b="1" dirty="0"/>
+          </a:p>
+        </p:txBody>
+      </p:sp>
+      <p:cxnSp>
+        <p:nvCxnSpPr>
+          <p:cNvPr id="72" name="Connector: Elbow 71">
+            <a:extLst>
+              <a:ext uri="{FF2B5EF4-FFF2-40B4-BE49-F238E27FC236}">
+                <a16:creationId xmlns:a16="http://schemas.microsoft.com/office/drawing/2014/main" id="{6679717B-7FDF-947D-C50E-1EA37BC430CF}"/>
+              </a:ext>
+            </a:extLst>
+          </p:cNvPr>
+          <p:cNvCxnSpPr>
+            <a:cxnSpLocks/>
+            <a:stCxn id="113" idx="0"/>
+          </p:cNvCxnSpPr>
+          <p:nvPr/>
+        </p:nvCxnSpPr>
+        <p:spPr>
+          <a:xfrm rot="16200000" flipV="1">
+            <a:off x="11187940" y="4639382"/>
+            <a:ext cx="40321" cy="775388"/>
+          </a:xfrm>
+          <a:prstGeom prst="bentConnector2">
+            <a:avLst/>
+          </a:prstGeom>
+          <a:ln>
+            <a:solidFill>
+              <a:schemeClr val="tx2">
+                <a:lumMod val="50000"/>
+                <a:lumOff val="50000"/>
+              </a:schemeClr>
+            </a:solidFill>
+            <a:prstDash val="sysDash"/>
+            <a:tailEnd type="triangle"/>
+          </a:ln>
+        </p:spPr>
+        <p:style>
+          <a:lnRef idx="2">
+            <a:schemeClr val="accent1"/>
+          </a:lnRef>
+          <a:fillRef idx="0">
+            <a:schemeClr val="accent1"/>
+          </a:fillRef>
+          <a:effectRef idx="1">
+            <a:schemeClr val="accent1"/>
+          </a:effectRef>
+          <a:fontRef idx="minor">
+            <a:schemeClr val="tx1"/>
+          </a:fontRef>
+        </p:style>
+      </p:cxnSp>
+      <p:cxnSp>
+        <p:nvCxnSpPr>
+          <p:cNvPr id="75" name="Connector: Elbow 74">
+            <a:extLst>
+              <a:ext uri="{FF2B5EF4-FFF2-40B4-BE49-F238E27FC236}">
+                <a16:creationId xmlns:a16="http://schemas.microsoft.com/office/drawing/2014/main" id="{0A59088D-2BA1-93E8-E2C9-08945DC8FBB0}"/>
+              </a:ext>
+            </a:extLst>
+          </p:cNvPr>
+          <p:cNvCxnSpPr>
+            <a:cxnSpLocks/>
+            <a:stCxn id="71" idx="2"/>
+          </p:cNvCxnSpPr>
+          <p:nvPr/>
+        </p:nvCxnSpPr>
+        <p:spPr>
+          <a:xfrm rot="5400000">
+            <a:off x="10902204" y="2833868"/>
+            <a:ext cx="95417" cy="1142558"/>
+          </a:xfrm>
+          <a:prstGeom prst="bentConnector2">
+            <a:avLst/>
+          </a:prstGeom>
+          <a:ln>
+            <a:solidFill>
+              <a:schemeClr val="tx2">
+                <a:lumMod val="50000"/>
+                <a:lumOff val="50000"/>
+              </a:schemeClr>
+            </a:solidFill>
+            <a:prstDash val="sysDash"/>
+            <a:tailEnd type="triangle"/>
+          </a:ln>
+        </p:spPr>
+        <p:style>
+          <a:lnRef idx="2">
+            <a:schemeClr val="accent1"/>
+          </a:lnRef>
+          <a:fillRef idx="0">
+            <a:schemeClr val="accent1"/>
+          </a:fillRef>
+          <a:effectRef idx="1">
+            <a:schemeClr val="accent1"/>
+          </a:effectRef>
+          <a:fontRef idx="minor">
+            <a:schemeClr val="tx1"/>
+          </a:fontRef>
+        </p:style>
+      </p:cxnSp>
+      <p:sp>
+        <p:nvSpPr>
+          <p:cNvPr id="79" name="TextBox 78">
+            <a:extLst>
+              <a:ext uri="{FF2B5EF4-FFF2-40B4-BE49-F238E27FC236}">
+                <a16:creationId xmlns:a16="http://schemas.microsoft.com/office/drawing/2014/main" id="{DFDD030E-FF96-1EAD-52E9-D5832CCD81EF}"/>
+              </a:ext>
+            </a:extLst>
+          </p:cNvPr>
+          <p:cNvSpPr txBox="1"/>
+          <p:nvPr/>
+        </p:nvSpPr>
+        <p:spPr>
+          <a:xfrm>
+            <a:off x="1150320" y="6351193"/>
+            <a:ext cx="927343" cy="261610"/>
+          </a:xfrm>
+          <a:prstGeom prst="rect">
+            <a:avLst/>
+          </a:prstGeom>
+          <a:noFill/>
+        </p:spPr>
+        <p:txBody>
+          <a:bodyPr wrap="square" rtlCol="0">
+            <a:spAutoFit/>
+          </a:bodyPr>
+          <a:lstStyle/>
+          <a:p>
+            <a:r>
+              <a:rPr lang="en-US" sz="1100" b="1" dirty="0"/>
+              <a:t>Mode state</a:t>
+            </a:r>
+          </a:p>
+        </p:txBody>
+      </p:sp>
+      <p:cxnSp>
+        <p:nvCxnSpPr>
+          <p:cNvPr id="80" name="Straight Arrow Connector 79">
+            <a:extLst>
+              <a:ext uri="{FF2B5EF4-FFF2-40B4-BE49-F238E27FC236}">
+                <a16:creationId xmlns:a16="http://schemas.microsoft.com/office/drawing/2014/main" id="{8E596514-76BD-DF6F-FFE8-52894EDA2710}"/>
+              </a:ext>
+            </a:extLst>
+          </p:cNvPr>
+          <p:cNvCxnSpPr>
+            <a:cxnSpLocks/>
+          </p:cNvCxnSpPr>
+          <p:nvPr/>
+        </p:nvCxnSpPr>
+        <p:spPr>
+          <a:xfrm flipH="1">
+            <a:off x="885825" y="6491755"/>
+            <a:ext cx="310046" cy="0"/>
+          </a:xfrm>
+          <a:prstGeom prst="straightConnector1">
+            <a:avLst/>
+          </a:prstGeom>
+          <a:ln w="19050">
+            <a:solidFill>
+              <a:schemeClr val="tx2">
+                <a:lumMod val="50000"/>
+                <a:lumOff val="50000"/>
+              </a:schemeClr>
+            </a:solidFill>
+            <a:prstDash val="sysDash"/>
+            <a:tailEnd type="triangle"/>
+          </a:ln>
+        </p:spPr>
+        <p:style>
+          <a:lnRef idx="1">
+            <a:schemeClr val="accent5"/>
+          </a:lnRef>
+          <a:fillRef idx="0">
+            <a:schemeClr val="accent5"/>
+          </a:fillRef>
+          <a:effectRef idx="0">
+            <a:schemeClr val="accent5"/>
+          </a:effectRef>
+          <a:fontRef idx="minor">
+            <a:schemeClr val="tx1"/>
+          </a:fontRef>
+        </p:style>
+      </p:cxnSp>
+      <p:sp>
+        <p:nvSpPr>
+          <p:cNvPr id="82" name="TextBox 81">
+            <a:extLst>
+              <a:ext uri="{FF2B5EF4-FFF2-40B4-BE49-F238E27FC236}">
+                <a16:creationId xmlns:a16="http://schemas.microsoft.com/office/drawing/2014/main" id="{B9C16DE5-1D1D-5657-299C-1A64867030CD}"/>
+              </a:ext>
+            </a:extLst>
+          </p:cNvPr>
+          <p:cNvSpPr txBox="1"/>
+          <p:nvPr/>
+        </p:nvSpPr>
+        <p:spPr>
+          <a:xfrm>
+            <a:off x="2324102" y="6208076"/>
+            <a:ext cx="1100776" cy="430887"/>
+          </a:xfrm>
+          <a:prstGeom prst="rect">
+            <a:avLst/>
+          </a:prstGeom>
+          <a:noFill/>
+        </p:spPr>
+        <p:txBody>
+          <a:bodyPr wrap="square" rtlCol="0">
+            <a:spAutoFit/>
+          </a:bodyPr>
+          <a:lstStyle/>
+          <a:p>
+            <a:r>
+              <a:rPr lang="en-US" sz="1100" b="1" dirty="0"/>
+              <a:t>Train docking in station</a:t>
+            </a:r>
+            <a:endParaRPr lang="en-SG" sz="1100" b="1" dirty="0"/>
+          </a:p>
+        </p:txBody>
+      </p:sp>
+      <p:cxnSp>
+        <p:nvCxnSpPr>
+          <p:cNvPr id="83" name="Connector: Elbow 82">
+            <a:extLst>
+              <a:ext uri="{FF2B5EF4-FFF2-40B4-BE49-F238E27FC236}">
+                <a16:creationId xmlns:a16="http://schemas.microsoft.com/office/drawing/2014/main" id="{1C6F3234-64AF-20EC-607A-52FAE412738A}"/>
+              </a:ext>
+            </a:extLst>
+          </p:cNvPr>
+          <p:cNvCxnSpPr>
+            <a:cxnSpLocks/>
+            <a:stCxn id="82" idx="1"/>
+          </p:cNvCxnSpPr>
+          <p:nvPr/>
+        </p:nvCxnSpPr>
+        <p:spPr>
+          <a:xfrm rot="10800000">
+            <a:off x="2218420" y="5112790"/>
+            <a:ext cx="105682" cy="1310731"/>
+          </a:xfrm>
+          <a:prstGeom prst="bentConnector2">
+            <a:avLst/>
+          </a:prstGeom>
+          <a:ln>
+            <a:solidFill>
+              <a:schemeClr val="tx2">
+                <a:lumMod val="50000"/>
+                <a:lumOff val="50000"/>
+              </a:schemeClr>
+            </a:solidFill>
+            <a:prstDash val="sysDash"/>
+            <a:tailEnd type="triangle"/>
+          </a:ln>
+        </p:spPr>
+        <p:style>
+          <a:lnRef idx="2">
+            <a:schemeClr val="accent1"/>
+          </a:lnRef>
+          <a:fillRef idx="0">
+            <a:schemeClr val="accent1"/>
+          </a:fillRef>
+          <a:effectRef idx="1">
+            <a:schemeClr val="accent1"/>
+          </a:effectRef>
+          <a:fontRef idx="minor">
+            <a:schemeClr val="tx1"/>
+          </a:fontRef>
+        </p:style>
+      </p:cxnSp>
+      <p:sp>
+        <p:nvSpPr>
+          <p:cNvPr id="89" name="TextBox 88">
+            <a:extLst>
+              <a:ext uri="{FF2B5EF4-FFF2-40B4-BE49-F238E27FC236}">
+                <a16:creationId xmlns:a16="http://schemas.microsoft.com/office/drawing/2014/main" id="{CF6F5FCD-80A7-4C4A-6CDE-C4A9D2B052EE}"/>
+              </a:ext>
+            </a:extLst>
+          </p:cNvPr>
+          <p:cNvSpPr txBox="1"/>
+          <p:nvPr/>
+        </p:nvSpPr>
+        <p:spPr>
+          <a:xfrm>
+            <a:off x="3673076" y="6208077"/>
+            <a:ext cx="2060974" cy="430887"/>
+          </a:xfrm>
+          <a:prstGeom prst="rect">
+            <a:avLst/>
+          </a:prstGeom>
+          <a:noFill/>
+        </p:spPr>
+        <p:txBody>
+          <a:bodyPr wrap="square" rtlCol="0">
+            <a:spAutoFit/>
+          </a:bodyPr>
+          <a:lstStyle/>
+          <a:p>
+            <a:r>
+              <a:rPr lang="en-US" sz="1100" b="1" dirty="0"/>
+              <a:t>Double tracks junction</a:t>
+            </a:r>
+          </a:p>
+          <a:p>
+            <a:r>
+              <a:rPr lang="en-US" sz="1100" b="1" dirty="0"/>
+              <a:t>[CC-Line cross NS-Linex2 ]</a:t>
+            </a:r>
+            <a:endParaRPr lang="en-SG" sz="1100" b="1" dirty="0"/>
+          </a:p>
+        </p:txBody>
+      </p:sp>
+      <p:cxnSp>
+        <p:nvCxnSpPr>
+          <p:cNvPr id="90" name="Connector: Elbow 89">
+            <a:extLst>
+              <a:ext uri="{FF2B5EF4-FFF2-40B4-BE49-F238E27FC236}">
+                <a16:creationId xmlns:a16="http://schemas.microsoft.com/office/drawing/2014/main" id="{86DF5CA7-EAB6-1ACB-D16C-0B4D6748710C}"/>
+              </a:ext>
+            </a:extLst>
+          </p:cNvPr>
+          <p:cNvCxnSpPr>
+            <a:cxnSpLocks/>
+            <a:stCxn id="89" idx="1"/>
+          </p:cNvCxnSpPr>
+          <p:nvPr/>
+        </p:nvCxnSpPr>
+        <p:spPr>
+          <a:xfrm rot="10800000">
+            <a:off x="3340210" y="5857879"/>
+            <a:ext cx="332866" cy="565642"/>
+          </a:xfrm>
+          <a:prstGeom prst="bentConnector2">
+            <a:avLst/>
+          </a:prstGeom>
+          <a:ln>
+            <a:solidFill>
+              <a:schemeClr val="tx2">
+                <a:lumMod val="50000"/>
+                <a:lumOff val="50000"/>
+              </a:schemeClr>
+            </a:solidFill>
+            <a:prstDash val="sysDash"/>
+            <a:tailEnd type="triangle"/>
+          </a:ln>
+        </p:spPr>
+        <p:style>
+          <a:lnRef idx="2">
+            <a:schemeClr val="accent1"/>
+          </a:lnRef>
+          <a:fillRef idx="0">
+            <a:schemeClr val="accent1"/>
+          </a:fillRef>
+          <a:effectRef idx="1">
+            <a:schemeClr val="accent1"/>
+          </a:effectRef>
+          <a:fontRef idx="minor">
+            <a:schemeClr val="tx1"/>
+          </a:fontRef>
+        </p:style>
+      </p:cxnSp>
+      <p:cxnSp>
+        <p:nvCxnSpPr>
+          <p:cNvPr id="96" name="Straight Arrow Connector 95">
+            <a:extLst>
+              <a:ext uri="{FF2B5EF4-FFF2-40B4-BE49-F238E27FC236}">
+                <a16:creationId xmlns:a16="http://schemas.microsoft.com/office/drawing/2014/main" id="{7D0E69AD-95F0-5C96-7463-D2A9DD4C4691}"/>
+              </a:ext>
+            </a:extLst>
+          </p:cNvPr>
+          <p:cNvCxnSpPr>
+            <a:cxnSpLocks/>
+          </p:cNvCxnSpPr>
+          <p:nvPr/>
+        </p:nvCxnSpPr>
+        <p:spPr>
+          <a:xfrm flipV="1">
+            <a:off x="7000331" y="4322482"/>
+            <a:ext cx="0" cy="1885593"/>
+          </a:xfrm>
+          <a:prstGeom prst="straightConnector1">
+            <a:avLst/>
+          </a:prstGeom>
+          <a:ln w="19050">
+            <a:solidFill>
+              <a:schemeClr val="tx2">
+                <a:lumMod val="50000"/>
+                <a:lumOff val="50000"/>
+              </a:schemeClr>
+            </a:solidFill>
+            <a:prstDash val="sysDash"/>
+            <a:tailEnd type="triangle"/>
+          </a:ln>
+        </p:spPr>
+        <p:style>
+          <a:lnRef idx="1">
+            <a:schemeClr val="accent5"/>
+          </a:lnRef>
+          <a:fillRef idx="0">
+            <a:schemeClr val="accent5"/>
+          </a:fillRef>
+          <a:effectRef idx="0">
+            <a:schemeClr val="accent5"/>
+          </a:effectRef>
+          <a:fontRef idx="minor">
+            <a:schemeClr val="tx1"/>
+          </a:fontRef>
+        </p:style>
+      </p:cxnSp>
+      <p:sp>
+        <p:nvSpPr>
+          <p:cNvPr id="102" name="TextBox 101">
+            <a:extLst>
+              <a:ext uri="{FF2B5EF4-FFF2-40B4-BE49-F238E27FC236}">
+                <a16:creationId xmlns:a16="http://schemas.microsoft.com/office/drawing/2014/main" id="{09B6A9D8-F5AB-FAB3-DB65-7EDDBFF6413D}"/>
+              </a:ext>
+            </a:extLst>
+          </p:cNvPr>
+          <p:cNvSpPr txBox="1"/>
+          <p:nvPr/>
+        </p:nvSpPr>
+        <p:spPr>
+          <a:xfrm>
+            <a:off x="5896114" y="6198741"/>
+            <a:ext cx="1746814" cy="430887"/>
+          </a:xfrm>
+          <a:prstGeom prst="rect">
+            <a:avLst/>
+          </a:prstGeom>
+          <a:noFill/>
+        </p:spPr>
+        <p:txBody>
+          <a:bodyPr wrap="square" rtlCol="0">
+            <a:spAutoFit/>
+          </a:bodyPr>
+          <a:lstStyle/>
+          <a:p>
+            <a:r>
+              <a:rPr lang="en-US" sz="1100" b="1" dirty="0"/>
+              <a:t>Singal track junction</a:t>
+            </a:r>
+          </a:p>
+          <a:p>
+            <a:r>
+              <a:rPr lang="en-US" sz="1100" b="1" dirty="0"/>
+              <a:t>NS-Line cross CC-Line]</a:t>
+            </a:r>
+            <a:endParaRPr lang="en-SG" sz="1100" b="1" dirty="0"/>
+          </a:p>
+        </p:txBody>
+      </p:sp>
+      <p:sp>
+        <p:nvSpPr>
+          <p:cNvPr id="104" name="TextBox 103">
+            <a:extLst>
+              <a:ext uri="{FF2B5EF4-FFF2-40B4-BE49-F238E27FC236}">
+                <a16:creationId xmlns:a16="http://schemas.microsoft.com/office/drawing/2014/main" id="{484AB718-E971-9DCE-7236-059A5C531EFA}"/>
+              </a:ext>
+            </a:extLst>
+          </p:cNvPr>
+          <p:cNvSpPr txBox="1"/>
+          <p:nvPr/>
+        </p:nvSpPr>
+        <p:spPr>
+          <a:xfrm>
+            <a:off x="10949911" y="3717391"/>
+            <a:ext cx="1440968" cy="600164"/>
+          </a:xfrm>
+          <a:prstGeom prst="rect">
+            <a:avLst/>
+          </a:prstGeom>
+          <a:noFill/>
+        </p:spPr>
+        <p:txBody>
+          <a:bodyPr wrap="square" rtlCol="0">
+            <a:spAutoFit/>
+          </a:bodyPr>
+          <a:lstStyle/>
+          <a:p>
+            <a:r>
+              <a:rPr lang="en-US" sz="1100" b="1" dirty="0"/>
+              <a:t>Station entrance and exit signals</a:t>
+            </a:r>
+          </a:p>
+          <a:p>
+            <a:r>
+              <a:rPr lang="en-US" sz="1100" b="1" dirty="0"/>
+              <a:t>[</a:t>
+            </a:r>
+            <a:r>
+              <a:rPr lang="en-US" sz="1100" b="1" dirty="0">
+                <a:solidFill>
+                  <a:srgbClr val="FF0000"/>
+                </a:solidFill>
+              </a:rPr>
+              <a:t>Red: docking</a:t>
+            </a:r>
+            <a:r>
+              <a:rPr lang="en-US" sz="1100" b="1" dirty="0"/>
+              <a:t>]</a:t>
+            </a:r>
+            <a:endParaRPr lang="en-SG" sz="1100" b="1" dirty="0"/>
+          </a:p>
+        </p:txBody>
+      </p:sp>
+      <p:cxnSp>
+        <p:nvCxnSpPr>
+          <p:cNvPr id="109" name="Connector: Elbow 108">
+            <a:extLst>
+              <a:ext uri="{FF2B5EF4-FFF2-40B4-BE49-F238E27FC236}">
+                <a16:creationId xmlns:a16="http://schemas.microsoft.com/office/drawing/2014/main" id="{9392E599-890F-A598-570B-004FB07F9D9E}"/>
+              </a:ext>
+            </a:extLst>
+          </p:cNvPr>
+          <p:cNvCxnSpPr>
+            <a:cxnSpLocks/>
+            <a:stCxn id="104" idx="2"/>
+          </p:cNvCxnSpPr>
+          <p:nvPr/>
+        </p:nvCxnSpPr>
+        <p:spPr>
+          <a:xfrm rot="5400000">
+            <a:off x="10313135" y="3324083"/>
+            <a:ext cx="363788" cy="2350732"/>
+          </a:xfrm>
+          <a:prstGeom prst="bentConnector2">
+            <a:avLst/>
+          </a:prstGeom>
+          <a:ln>
+            <a:solidFill>
+              <a:schemeClr val="tx2">
+                <a:lumMod val="50000"/>
+                <a:lumOff val="50000"/>
+              </a:schemeClr>
+            </a:solidFill>
+            <a:prstDash val="sysDash"/>
+            <a:tailEnd type="triangle"/>
+          </a:ln>
+        </p:spPr>
+        <p:style>
+          <a:lnRef idx="2">
+            <a:schemeClr val="accent1"/>
+          </a:lnRef>
+          <a:fillRef idx="0">
+            <a:schemeClr val="accent1"/>
+          </a:fillRef>
+          <a:effectRef idx="1">
+            <a:schemeClr val="accent1"/>
+          </a:effectRef>
+          <a:fontRef idx="minor">
+            <a:schemeClr val="tx1"/>
+          </a:fontRef>
+        </p:style>
+      </p:cxnSp>
+      <p:sp>
+        <p:nvSpPr>
+          <p:cNvPr id="113" name="TextBox 112">
+            <a:extLst>
+              <a:ext uri="{FF2B5EF4-FFF2-40B4-BE49-F238E27FC236}">
+                <a16:creationId xmlns:a16="http://schemas.microsoft.com/office/drawing/2014/main" id="{F9FE5812-A150-884C-CA93-82140B8D55BF}"/>
+              </a:ext>
+            </a:extLst>
+          </p:cNvPr>
+          <p:cNvSpPr txBox="1"/>
+          <p:nvPr/>
+        </p:nvSpPr>
+        <p:spPr>
+          <a:xfrm>
+            <a:off x="11099117" y="5047236"/>
+            <a:ext cx="993354" cy="600164"/>
+          </a:xfrm>
+          <a:prstGeom prst="rect">
+            <a:avLst/>
+          </a:prstGeom>
+          <a:noFill/>
+        </p:spPr>
+        <p:txBody>
+          <a:bodyPr wrap="square" rtlCol="0">
+            <a:spAutoFit/>
+          </a:bodyPr>
+          <a:lstStyle/>
+          <a:p>
+            <a:r>
+              <a:rPr lang="en-US" sz="1100" b="1" dirty="0"/>
+              <a:t>Tracks end buffer area indicators</a:t>
+            </a:r>
+            <a:endParaRPr lang="en-SG" sz="1100" b="1" dirty="0"/>
+          </a:p>
+        </p:txBody>
+      </p:sp>
+      <p:cxnSp>
+        <p:nvCxnSpPr>
+          <p:cNvPr id="114" name="Connector: Elbow 113">
+            <a:extLst>
+              <a:ext uri="{FF2B5EF4-FFF2-40B4-BE49-F238E27FC236}">
+                <a16:creationId xmlns:a16="http://schemas.microsoft.com/office/drawing/2014/main" id="{5910AF71-DEB1-2380-CDBA-08AC4CBA13B8}"/>
+              </a:ext>
+            </a:extLst>
+          </p:cNvPr>
+          <p:cNvCxnSpPr>
+            <a:cxnSpLocks/>
+            <a:stCxn id="71" idx="0"/>
+          </p:cNvCxnSpPr>
+          <p:nvPr/>
+        </p:nvCxnSpPr>
+        <p:spPr>
+          <a:xfrm rot="16200000" flipV="1">
+            <a:off x="10936550" y="2172634"/>
+            <a:ext cx="143122" cy="1026160"/>
+          </a:xfrm>
+          <a:prstGeom prst="bentConnector2">
+            <a:avLst/>
+          </a:prstGeom>
+          <a:ln>
+            <a:solidFill>
+              <a:schemeClr val="tx2">
+                <a:lumMod val="50000"/>
+                <a:lumOff val="50000"/>
+              </a:schemeClr>
+            </a:solidFill>
+            <a:prstDash val="sysDash"/>
+            <a:tailEnd type="triangle"/>
+          </a:ln>
+        </p:spPr>
+        <p:style>
+          <a:lnRef idx="2">
+            <a:schemeClr val="accent1"/>
+          </a:lnRef>
+          <a:fillRef idx="0">
+            <a:schemeClr val="accent1"/>
+          </a:fillRef>
+          <a:effectRef idx="1">
+            <a:schemeClr val="accent1"/>
+          </a:effectRef>
+          <a:fontRef idx="minor">
+            <a:schemeClr val="tx1"/>
+          </a:fontRef>
+        </p:style>
+      </p:cxnSp>
+      <p:cxnSp>
+        <p:nvCxnSpPr>
+          <p:cNvPr id="118" name="Connector: Elbow 117">
+            <a:extLst>
+              <a:ext uri="{FF2B5EF4-FFF2-40B4-BE49-F238E27FC236}">
+                <a16:creationId xmlns:a16="http://schemas.microsoft.com/office/drawing/2014/main" id="{76997295-0249-9A22-9553-F35180E69E62}"/>
+              </a:ext>
+            </a:extLst>
+          </p:cNvPr>
+          <p:cNvCxnSpPr>
+            <a:cxnSpLocks/>
+            <a:stCxn id="113" idx="2"/>
+          </p:cNvCxnSpPr>
+          <p:nvPr/>
+        </p:nvCxnSpPr>
+        <p:spPr>
+          <a:xfrm rot="5400000">
+            <a:off x="11175325" y="5292481"/>
+            <a:ext cx="65550" cy="775388"/>
+          </a:xfrm>
+          <a:prstGeom prst="bentConnector2">
+            <a:avLst/>
+          </a:prstGeom>
+          <a:ln>
+            <a:solidFill>
+              <a:schemeClr val="tx2">
+                <a:lumMod val="50000"/>
+                <a:lumOff val="50000"/>
+              </a:schemeClr>
+            </a:solidFill>
+            <a:prstDash val="sysDash"/>
+            <a:tailEnd type="triangle"/>
+          </a:ln>
+        </p:spPr>
+        <p:style>
+          <a:lnRef idx="2">
+            <a:schemeClr val="accent1"/>
+          </a:lnRef>
+          <a:fillRef idx="0">
+            <a:schemeClr val="accent1"/>
+          </a:fillRef>
+          <a:effectRef idx="1">
+            <a:schemeClr val="accent1"/>
+          </a:effectRef>
+          <a:fontRef idx="minor">
+            <a:schemeClr val="tx1"/>
+          </a:fontRef>
+        </p:style>
+      </p:cxnSp>
+      <p:cxnSp>
+        <p:nvCxnSpPr>
+          <p:cNvPr id="121" name="Straight Arrow Connector 120">
+            <a:extLst>
+              <a:ext uri="{FF2B5EF4-FFF2-40B4-BE49-F238E27FC236}">
+                <a16:creationId xmlns:a16="http://schemas.microsoft.com/office/drawing/2014/main" id="{705F346E-5015-83E7-D1A7-676FA2531A3D}"/>
+              </a:ext>
+            </a:extLst>
+          </p:cNvPr>
+          <p:cNvCxnSpPr>
+            <a:cxnSpLocks/>
+          </p:cNvCxnSpPr>
+          <p:nvPr/>
+        </p:nvCxnSpPr>
+        <p:spPr>
+          <a:xfrm flipV="1">
+            <a:off x="8921063" y="4404521"/>
+            <a:ext cx="0" cy="1885593"/>
+          </a:xfrm>
+          <a:prstGeom prst="straightConnector1">
+            <a:avLst/>
+          </a:prstGeom>
+          <a:ln w="19050">
+            <a:solidFill>
+              <a:schemeClr val="tx2">
+                <a:lumMod val="50000"/>
+                <a:lumOff val="50000"/>
+              </a:schemeClr>
+            </a:solidFill>
+            <a:prstDash val="sysDash"/>
+            <a:tailEnd type="triangle"/>
+          </a:ln>
+        </p:spPr>
+        <p:style>
+          <a:lnRef idx="1">
+            <a:schemeClr val="accent5"/>
+          </a:lnRef>
+          <a:fillRef idx="0">
+            <a:schemeClr val="accent5"/>
+          </a:fillRef>
+          <a:effectRef idx="0">
+            <a:schemeClr val="accent5"/>
+          </a:effectRef>
+          <a:fontRef idx="minor">
+            <a:schemeClr val="tx1"/>
+          </a:fontRef>
+        </p:style>
+      </p:cxnSp>
+      <p:sp>
+        <p:nvSpPr>
+          <p:cNvPr id="122" name="TextBox 121">
+            <a:extLst>
+              <a:ext uri="{FF2B5EF4-FFF2-40B4-BE49-F238E27FC236}">
+                <a16:creationId xmlns:a16="http://schemas.microsoft.com/office/drawing/2014/main" id="{F78532C6-5A8D-BF4A-95E9-DCC74E37F557}"/>
+              </a:ext>
+            </a:extLst>
+          </p:cNvPr>
+          <p:cNvSpPr txBox="1"/>
+          <p:nvPr/>
+        </p:nvSpPr>
+        <p:spPr>
+          <a:xfrm>
+            <a:off x="8017537" y="6214105"/>
+            <a:ext cx="1746814" cy="430887"/>
+          </a:xfrm>
+          <a:prstGeom prst="rect">
+            <a:avLst/>
+          </a:prstGeom>
+          <a:noFill/>
+        </p:spPr>
+        <p:txBody>
+          <a:bodyPr wrap="square" rtlCol="0">
+            <a:spAutoFit/>
+          </a:bodyPr>
+          <a:lstStyle/>
+          <a:p>
+            <a:r>
+              <a:rPr lang="en-US" sz="1100" b="1" dirty="0"/>
+              <a:t>Platford door indicator </a:t>
+            </a:r>
+          </a:p>
+          <a:p>
+            <a:r>
+              <a:rPr lang="en-US" sz="1100" b="1" dirty="0">
+                <a:solidFill>
+                  <a:schemeClr val="accent6">
+                    <a:lumMod val="75000"/>
+                  </a:schemeClr>
+                </a:solidFill>
+              </a:rPr>
+              <a:t>[Green: door open]</a:t>
+            </a:r>
+            <a:endParaRPr lang="en-SG" sz="1100" b="1" dirty="0">
+              <a:solidFill>
+                <a:schemeClr val="accent6">
+                  <a:lumMod val="75000"/>
+                </a:schemeClr>
+              </a:solidFill>
+            </a:endParaRPr>
+          </a:p>
+        </p:txBody>
+      </p:sp>
+      <p:sp>
+        <p:nvSpPr>
+          <p:cNvPr id="125" name="Rectangle 124">
+            <a:extLst>
+              <a:ext uri="{FF2B5EF4-FFF2-40B4-BE49-F238E27FC236}">
+                <a16:creationId xmlns:a16="http://schemas.microsoft.com/office/drawing/2014/main" id="{71A69ABA-F869-95BE-A348-ADE3AB09397C}"/>
+              </a:ext>
+            </a:extLst>
+          </p:cNvPr>
+          <p:cNvSpPr/>
+          <p:nvPr/>
+        </p:nvSpPr>
+        <p:spPr>
+          <a:xfrm>
+            <a:off x="570408" y="608434"/>
+            <a:ext cx="665873" cy="124932"/>
+          </a:xfrm>
+          <a:prstGeom prst="rect">
+            <a:avLst/>
+          </a:prstGeom>
+        </p:spPr>
+        <p:style>
+          <a:lnRef idx="2">
+            <a:schemeClr val="accent1">
+              <a:shade val="15000"/>
+            </a:schemeClr>
+          </a:lnRef>
+          <a:fillRef idx="1">
+            <a:schemeClr val="accent1"/>
+          </a:fillRef>
+          <a:effectRef idx="0">
+            <a:schemeClr val="accent1"/>
+          </a:effectRef>
+          <a:fontRef idx="minor">
+            <a:schemeClr val="lt1"/>
+          </a:fontRef>
+        </p:style>
+        <p:txBody>
+          <a:bodyPr rtlCol="0" anchor="ctr"/>
+          <a:lstStyle/>
+          <a:p>
+            <a:pPr algn="ctr"/>
+            <a:endParaRPr lang="en-SG"/>
+          </a:p>
+        </p:txBody>
+      </p:sp>
+      <p:cxnSp>
+        <p:nvCxnSpPr>
+          <p:cNvPr id="29" name="Straight Arrow Connector 28">
+            <a:extLst>
+              <a:ext uri="{FF2B5EF4-FFF2-40B4-BE49-F238E27FC236}">
+                <a16:creationId xmlns:a16="http://schemas.microsoft.com/office/drawing/2014/main" id="{3767F249-578D-4E12-98D6-CBFDDD06386D}"/>
+              </a:ext>
+            </a:extLst>
+          </p:cNvPr>
+          <p:cNvCxnSpPr>
+            <a:cxnSpLocks/>
+          </p:cNvCxnSpPr>
+          <p:nvPr/>
+        </p:nvCxnSpPr>
+        <p:spPr>
+          <a:xfrm>
+            <a:off x="969345" y="514311"/>
+            <a:ext cx="0" cy="1066536"/>
+          </a:xfrm>
+          <a:prstGeom prst="straightConnector1">
+            <a:avLst/>
+          </a:prstGeom>
+          <a:ln w="19050">
+            <a:solidFill>
+              <a:schemeClr val="tx2">
+                <a:lumMod val="50000"/>
+                <a:lumOff val="50000"/>
+              </a:schemeClr>
+            </a:solidFill>
+            <a:prstDash val="sysDash"/>
+            <a:tailEnd type="triangle"/>
+          </a:ln>
+        </p:spPr>
+        <p:style>
+          <a:lnRef idx="1">
+            <a:schemeClr val="accent5"/>
+          </a:lnRef>
+          <a:fillRef idx="0">
+            <a:schemeClr val="accent5"/>
+          </a:fillRef>
+          <a:effectRef idx="0">
+            <a:schemeClr val="accent5"/>
+          </a:effectRef>
+          <a:fontRef idx="minor">
+            <a:schemeClr val="tx1"/>
+          </a:fontRef>
+        </p:style>
+      </p:cxnSp>
+    </p:spTree>
+    <p:extLst>
+      <p:ext uri="{BB962C8B-B14F-4D97-AF65-F5344CB8AC3E}">
+        <p14:creationId xmlns:p14="http://schemas.microsoft.com/office/powerpoint/2010/main" val="212458288"/>
       </p:ext>
     </p:extLst>
   </p:cSld>

</xml_diff>

<commit_message>
Update the attack detection section.
</commit_message>
<xml_diff>
--- a/OT_System_Attack_Case_Study/Railway_HMI_Usage/img/designDoc.pptx
+++ b/OT_System_Attack_Case_Study/Railway_HMI_Usage/img/designDoc.pptx
@@ -5,15 +5,18 @@
     <p:sldMasterId id="2147483648" r:id="rId1"/>
   </p:sldMasterIdLst>
   <p:notesMasterIdLst>
-    <p:notesMasterId r:id="rId8"/>
+    <p:notesMasterId r:id="rId11"/>
   </p:notesMasterIdLst>
   <p:sldIdLst>
     <p:sldId id="256" r:id="rId2"/>
     <p:sldId id="257" r:id="rId3"/>
-    <p:sldId id="277" r:id="rId4"/>
-    <p:sldId id="305" r:id="rId5"/>
-    <p:sldId id="306" r:id="rId6"/>
-    <p:sldId id="307" r:id="rId7"/>
+    <p:sldId id="308" r:id="rId4"/>
+    <p:sldId id="277" r:id="rId5"/>
+    <p:sldId id="305" r:id="rId6"/>
+    <p:sldId id="306" r:id="rId7"/>
+    <p:sldId id="307" r:id="rId8"/>
+    <p:sldId id="309" r:id="rId9"/>
+    <p:sldId id="310" r:id="rId10"/>
   </p:sldIdLst>
   <p:sldSz cx="12192000" cy="6858000"/>
   <p:notesSz cx="6858000" cy="9144000"/>
@@ -619,7 +622,7 @@
           <a:p>
             <a:fld id="{0C28B7A7-DA60-44F9-841D-F9802CF05E2F}" type="slidenum">
               <a:rPr lang="en-SG" smtClean="0"/>
-              <a:t>6</a:t>
+              <a:t>7</a:t>
             </a:fld>
             <a:endParaRPr lang="en-SG"/>
           </a:p>
@@ -10323,6 +10326,1710 @@
       </p:grpSpPr>
       <p:pic>
         <p:nvPicPr>
+          <p:cNvPr id="5" name="Picture 4">
+            <a:extLst>
+              <a:ext uri="{FF2B5EF4-FFF2-40B4-BE49-F238E27FC236}">
+                <a16:creationId xmlns:a16="http://schemas.microsoft.com/office/drawing/2014/main" id="{0E4686E8-7539-BD1C-D35D-38D5B5907F2E}"/>
+              </a:ext>
+            </a:extLst>
+          </p:cNvPr>
+          <p:cNvPicPr>
+            <a:picLocks noChangeAspect="1"/>
+          </p:cNvPicPr>
+          <p:nvPr/>
+        </p:nvPicPr>
+        <p:blipFill>
+          <a:blip r:embed="rId2"/>
+          <a:stretch>
+            <a:fillRect/>
+          </a:stretch>
+        </p:blipFill>
+        <p:spPr>
+          <a:xfrm>
+            <a:off x="962644" y="839341"/>
+            <a:ext cx="2619048" cy="1619048"/>
+          </a:xfrm>
+          <a:prstGeom prst="rect">
+            <a:avLst/>
+          </a:prstGeom>
+        </p:spPr>
+      </p:pic>
+      <p:pic>
+        <p:nvPicPr>
+          <p:cNvPr id="7" name="Picture 6">
+            <a:extLst>
+              <a:ext uri="{FF2B5EF4-FFF2-40B4-BE49-F238E27FC236}">
+                <a16:creationId xmlns:a16="http://schemas.microsoft.com/office/drawing/2014/main" id="{4ECFD9E7-373E-3FB6-8509-711EB8F21495}"/>
+              </a:ext>
+            </a:extLst>
+          </p:cNvPr>
+          <p:cNvPicPr>
+            <a:picLocks noChangeAspect="1"/>
+          </p:cNvPicPr>
+          <p:nvPr/>
+        </p:nvPicPr>
+        <p:blipFill>
+          <a:blip r:embed="rId3"/>
+          <a:stretch>
+            <a:fillRect/>
+          </a:stretch>
+        </p:blipFill>
+        <p:spPr>
+          <a:xfrm>
+            <a:off x="2890489" y="3610018"/>
+            <a:ext cx="3466667" cy="2114286"/>
+          </a:xfrm>
+          <a:prstGeom prst="rect">
+            <a:avLst/>
+          </a:prstGeom>
+        </p:spPr>
+      </p:pic>
+      <p:cxnSp>
+        <p:nvCxnSpPr>
+          <p:cNvPr id="8" name="Connector: Elbow 7">
+            <a:extLst>
+              <a:ext uri="{FF2B5EF4-FFF2-40B4-BE49-F238E27FC236}">
+                <a16:creationId xmlns:a16="http://schemas.microsoft.com/office/drawing/2014/main" id="{23445F55-CEED-721D-27E7-D4A320FE2985}"/>
+              </a:ext>
+            </a:extLst>
+          </p:cNvPr>
+          <p:cNvCxnSpPr>
+            <a:cxnSpLocks/>
+            <a:stCxn id="31" idx="1"/>
+          </p:cNvCxnSpPr>
+          <p:nvPr/>
+        </p:nvCxnSpPr>
+        <p:spPr>
+          <a:xfrm rot="10800000">
+            <a:off x="1559857" y="1904697"/>
+            <a:ext cx="1564080" cy="3439132"/>
+          </a:xfrm>
+          <a:prstGeom prst="bentConnector2">
+            <a:avLst/>
+          </a:prstGeom>
+          <a:ln>
+            <a:solidFill>
+              <a:schemeClr val="tx2">
+                <a:lumMod val="50000"/>
+                <a:lumOff val="50000"/>
+              </a:schemeClr>
+            </a:solidFill>
+            <a:prstDash val="sysDash"/>
+            <a:tailEnd type="triangle"/>
+          </a:ln>
+        </p:spPr>
+        <p:style>
+          <a:lnRef idx="2">
+            <a:schemeClr val="accent1"/>
+          </a:lnRef>
+          <a:fillRef idx="0">
+            <a:schemeClr val="accent1"/>
+          </a:fillRef>
+          <a:effectRef idx="1">
+            <a:schemeClr val="accent1"/>
+          </a:effectRef>
+          <a:fontRef idx="minor">
+            <a:schemeClr val="tx1"/>
+          </a:fontRef>
+        </p:style>
+      </p:cxnSp>
+      <p:cxnSp>
+        <p:nvCxnSpPr>
+          <p:cNvPr id="14" name="Connector: Elbow 13">
+            <a:extLst>
+              <a:ext uri="{FF2B5EF4-FFF2-40B4-BE49-F238E27FC236}">
+                <a16:creationId xmlns:a16="http://schemas.microsoft.com/office/drawing/2014/main" id="{371414A9-A62B-D9AC-E541-8EF879B9751D}"/>
+              </a:ext>
+            </a:extLst>
+          </p:cNvPr>
+          <p:cNvCxnSpPr>
+            <a:cxnSpLocks/>
+            <a:stCxn id="33" idx="0"/>
+          </p:cNvCxnSpPr>
+          <p:nvPr/>
+        </p:nvCxnSpPr>
+        <p:spPr>
+          <a:xfrm rot="16200000" flipV="1">
+            <a:off x="2221302" y="2050833"/>
+            <a:ext cx="3318519" cy="2829393"/>
+          </a:xfrm>
+          <a:prstGeom prst="bentConnector3">
+            <a:avLst>
+              <a:gd name="adj1" fmla="val 50000"/>
+            </a:avLst>
+          </a:prstGeom>
+          <a:ln>
+            <a:solidFill>
+              <a:schemeClr val="tx2">
+                <a:lumMod val="50000"/>
+                <a:lumOff val="50000"/>
+              </a:schemeClr>
+            </a:solidFill>
+            <a:prstDash val="sysDash"/>
+            <a:tailEnd type="triangle"/>
+          </a:ln>
+        </p:spPr>
+        <p:style>
+          <a:lnRef idx="2">
+            <a:schemeClr val="accent1"/>
+          </a:lnRef>
+          <a:fillRef idx="0">
+            <a:schemeClr val="accent1"/>
+          </a:fillRef>
+          <a:effectRef idx="1">
+            <a:schemeClr val="accent1"/>
+          </a:effectRef>
+          <a:fontRef idx="minor">
+            <a:schemeClr val="tx1"/>
+          </a:fontRef>
+        </p:style>
+      </p:cxnSp>
+      <p:cxnSp>
+        <p:nvCxnSpPr>
+          <p:cNvPr id="17" name="Connector: Elbow 16">
+            <a:extLst>
+              <a:ext uri="{FF2B5EF4-FFF2-40B4-BE49-F238E27FC236}">
+                <a16:creationId xmlns:a16="http://schemas.microsoft.com/office/drawing/2014/main" id="{3A2AA8B1-E609-46FC-484C-7FE30E64DD98}"/>
+              </a:ext>
+            </a:extLst>
+          </p:cNvPr>
+          <p:cNvCxnSpPr>
+            <a:cxnSpLocks/>
+            <a:endCxn id="20" idx="3"/>
+          </p:cNvCxnSpPr>
+          <p:nvPr/>
+        </p:nvCxnSpPr>
+        <p:spPr>
+          <a:xfrm rot="16200000" flipV="1">
+            <a:off x="1560239" y="1578281"/>
+            <a:ext cx="2384622" cy="2161295"/>
+          </a:xfrm>
+          <a:prstGeom prst="bentConnector2">
+            <a:avLst/>
+          </a:prstGeom>
+          <a:ln>
+            <a:solidFill>
+              <a:schemeClr val="tx2">
+                <a:lumMod val="50000"/>
+                <a:lumOff val="50000"/>
+              </a:schemeClr>
+            </a:solidFill>
+            <a:prstDash val="sysDash"/>
+            <a:tailEnd type="triangle"/>
+          </a:ln>
+        </p:spPr>
+        <p:style>
+          <a:lnRef idx="2">
+            <a:schemeClr val="accent1"/>
+          </a:lnRef>
+          <a:fillRef idx="0">
+            <a:schemeClr val="accent1"/>
+          </a:fillRef>
+          <a:effectRef idx="1">
+            <a:schemeClr val="accent1"/>
+          </a:effectRef>
+          <a:fontRef idx="minor">
+            <a:schemeClr val="tx1"/>
+          </a:fontRef>
+        </p:style>
+      </p:cxnSp>
+      <p:sp>
+        <p:nvSpPr>
+          <p:cNvPr id="20" name="Rectangle 19">
+            <a:extLst>
+              <a:ext uri="{FF2B5EF4-FFF2-40B4-BE49-F238E27FC236}">
+                <a16:creationId xmlns:a16="http://schemas.microsoft.com/office/drawing/2014/main" id="{A9BDB30C-FA46-1A6F-AEE0-8072301FEEA3}"/>
+              </a:ext>
+            </a:extLst>
+          </p:cNvPr>
+          <p:cNvSpPr/>
+          <p:nvPr/>
+        </p:nvSpPr>
+        <p:spPr>
+          <a:xfrm>
+            <a:off x="1214147" y="1247578"/>
+            <a:ext cx="457755" cy="438080"/>
+          </a:xfrm>
+          <a:prstGeom prst="rect">
+            <a:avLst/>
+          </a:prstGeom>
+          <a:noFill/>
+          <a:ln>
+            <a:solidFill>
+              <a:srgbClr val="00B0F0"/>
+            </a:solidFill>
+            <a:prstDash val="sysDash"/>
+          </a:ln>
+        </p:spPr>
+        <p:style>
+          <a:lnRef idx="2">
+            <a:schemeClr val="accent1">
+              <a:shade val="15000"/>
+            </a:schemeClr>
+          </a:lnRef>
+          <a:fillRef idx="1">
+            <a:schemeClr val="accent1"/>
+          </a:fillRef>
+          <a:effectRef idx="0">
+            <a:schemeClr val="accent1"/>
+          </a:effectRef>
+          <a:fontRef idx="minor">
+            <a:schemeClr val="lt1"/>
+          </a:fontRef>
+        </p:style>
+        <p:txBody>
+          <a:bodyPr rtlCol="0" anchor="ctr"/>
+          <a:lstStyle/>
+          <a:p>
+            <a:pPr algn="ctr"/>
+            <a:endParaRPr lang="en-SG" dirty="0"/>
+          </a:p>
+        </p:txBody>
+      </p:sp>
+      <p:sp>
+        <p:nvSpPr>
+          <p:cNvPr id="23" name="Rectangle 22">
+            <a:extLst>
+              <a:ext uri="{FF2B5EF4-FFF2-40B4-BE49-F238E27FC236}">
+                <a16:creationId xmlns:a16="http://schemas.microsoft.com/office/drawing/2014/main" id="{6F6AE0CD-5F3B-84A6-739F-E3D5EB52FB60}"/>
+              </a:ext>
+            </a:extLst>
+          </p:cNvPr>
+          <p:cNvSpPr/>
+          <p:nvPr/>
+        </p:nvSpPr>
+        <p:spPr>
+          <a:xfrm>
+            <a:off x="3581692" y="3851240"/>
+            <a:ext cx="457755" cy="329564"/>
+          </a:xfrm>
+          <a:prstGeom prst="rect">
+            <a:avLst/>
+          </a:prstGeom>
+          <a:noFill/>
+          <a:ln>
+            <a:solidFill>
+              <a:srgbClr val="00B0F0"/>
+            </a:solidFill>
+            <a:prstDash val="sysDash"/>
+          </a:ln>
+        </p:spPr>
+        <p:style>
+          <a:lnRef idx="2">
+            <a:schemeClr val="accent1">
+              <a:shade val="15000"/>
+            </a:schemeClr>
+          </a:lnRef>
+          <a:fillRef idx="1">
+            <a:schemeClr val="accent1"/>
+          </a:fillRef>
+          <a:effectRef idx="0">
+            <a:schemeClr val="accent1"/>
+          </a:effectRef>
+          <a:fontRef idx="minor">
+            <a:schemeClr val="lt1"/>
+          </a:fontRef>
+        </p:style>
+        <p:txBody>
+          <a:bodyPr rtlCol="0" anchor="ctr"/>
+          <a:lstStyle/>
+          <a:p>
+            <a:pPr algn="ctr"/>
+            <a:endParaRPr lang="en-SG" dirty="0"/>
+          </a:p>
+        </p:txBody>
+      </p:sp>
+      <p:sp>
+        <p:nvSpPr>
+          <p:cNvPr id="31" name="Rectangle 30">
+            <a:extLst>
+              <a:ext uri="{FF2B5EF4-FFF2-40B4-BE49-F238E27FC236}">
+                <a16:creationId xmlns:a16="http://schemas.microsoft.com/office/drawing/2014/main" id="{7AB5C8EB-67E5-65A8-0F57-D3A0C9D8A81E}"/>
+              </a:ext>
+            </a:extLst>
+          </p:cNvPr>
+          <p:cNvSpPr/>
+          <p:nvPr/>
+        </p:nvSpPr>
+        <p:spPr>
+          <a:xfrm>
+            <a:off x="3123937" y="5124789"/>
+            <a:ext cx="457755" cy="438080"/>
+          </a:xfrm>
+          <a:prstGeom prst="rect">
+            <a:avLst/>
+          </a:prstGeom>
+          <a:noFill/>
+          <a:ln>
+            <a:solidFill>
+              <a:srgbClr val="00B0F0"/>
+            </a:solidFill>
+            <a:prstDash val="sysDash"/>
+          </a:ln>
+        </p:spPr>
+        <p:style>
+          <a:lnRef idx="2">
+            <a:schemeClr val="accent1">
+              <a:shade val="15000"/>
+            </a:schemeClr>
+          </a:lnRef>
+          <a:fillRef idx="1">
+            <a:schemeClr val="accent1"/>
+          </a:fillRef>
+          <a:effectRef idx="0">
+            <a:schemeClr val="accent1"/>
+          </a:effectRef>
+          <a:fontRef idx="minor">
+            <a:schemeClr val="lt1"/>
+          </a:fontRef>
+        </p:style>
+        <p:txBody>
+          <a:bodyPr rtlCol="0" anchor="ctr"/>
+          <a:lstStyle/>
+          <a:p>
+            <a:pPr algn="ctr"/>
+            <a:endParaRPr lang="en-SG" dirty="0"/>
+          </a:p>
+        </p:txBody>
+      </p:sp>
+      <p:sp>
+        <p:nvSpPr>
+          <p:cNvPr id="33" name="Rectangle 32">
+            <a:extLst>
+              <a:ext uri="{FF2B5EF4-FFF2-40B4-BE49-F238E27FC236}">
+                <a16:creationId xmlns:a16="http://schemas.microsoft.com/office/drawing/2014/main" id="{C94C5284-F6D3-2547-54DD-075E469B18CD}"/>
+              </a:ext>
+            </a:extLst>
+          </p:cNvPr>
+          <p:cNvSpPr/>
+          <p:nvPr/>
+        </p:nvSpPr>
+        <p:spPr>
+          <a:xfrm>
+            <a:off x="5066379" y="5124789"/>
+            <a:ext cx="457755" cy="438080"/>
+          </a:xfrm>
+          <a:prstGeom prst="rect">
+            <a:avLst/>
+          </a:prstGeom>
+          <a:noFill/>
+          <a:ln>
+            <a:solidFill>
+              <a:srgbClr val="00B0F0"/>
+            </a:solidFill>
+            <a:prstDash val="sysDash"/>
+          </a:ln>
+        </p:spPr>
+        <p:style>
+          <a:lnRef idx="2">
+            <a:schemeClr val="accent1">
+              <a:shade val="15000"/>
+            </a:schemeClr>
+          </a:lnRef>
+          <a:fillRef idx="1">
+            <a:schemeClr val="accent1"/>
+          </a:fillRef>
+          <a:effectRef idx="0">
+            <a:schemeClr val="accent1"/>
+          </a:effectRef>
+          <a:fontRef idx="minor">
+            <a:schemeClr val="lt1"/>
+          </a:fontRef>
+        </p:style>
+        <p:txBody>
+          <a:bodyPr rtlCol="0" anchor="ctr"/>
+          <a:lstStyle/>
+          <a:p>
+            <a:pPr algn="ctr"/>
+            <a:endParaRPr lang="en-SG" dirty="0"/>
+          </a:p>
+        </p:txBody>
+      </p:sp>
+      <p:pic>
+        <p:nvPicPr>
+          <p:cNvPr id="39" name="Picture 38">
+            <a:extLst>
+              <a:ext uri="{FF2B5EF4-FFF2-40B4-BE49-F238E27FC236}">
+                <a16:creationId xmlns:a16="http://schemas.microsoft.com/office/drawing/2014/main" id="{7AB755C9-4AE3-2E6C-66D1-0069E777276C}"/>
+              </a:ext>
+            </a:extLst>
+          </p:cNvPr>
+          <p:cNvPicPr>
+            <a:picLocks noChangeAspect="1"/>
+          </p:cNvPicPr>
+          <p:nvPr/>
+        </p:nvPicPr>
+        <p:blipFill>
+          <a:blip r:embed="rId4"/>
+          <a:stretch>
+            <a:fillRect/>
+          </a:stretch>
+        </p:blipFill>
+        <p:spPr>
+          <a:xfrm>
+            <a:off x="4375654" y="851888"/>
+            <a:ext cx="2361905" cy="1542857"/>
+          </a:xfrm>
+          <a:prstGeom prst="rect">
+            <a:avLst/>
+          </a:prstGeom>
+        </p:spPr>
+      </p:pic>
+      <p:sp>
+        <p:nvSpPr>
+          <p:cNvPr id="40" name="Rectangle 39">
+            <a:extLst>
+              <a:ext uri="{FF2B5EF4-FFF2-40B4-BE49-F238E27FC236}">
+                <a16:creationId xmlns:a16="http://schemas.microsoft.com/office/drawing/2014/main" id="{3A4080DB-4F1B-E594-6571-C86191FFBCDF}"/>
+              </a:ext>
+            </a:extLst>
+          </p:cNvPr>
+          <p:cNvSpPr/>
+          <p:nvPr/>
+        </p:nvSpPr>
+        <p:spPr>
+          <a:xfrm>
+            <a:off x="4734602" y="1038625"/>
+            <a:ext cx="457755" cy="438080"/>
+          </a:xfrm>
+          <a:prstGeom prst="rect">
+            <a:avLst/>
+          </a:prstGeom>
+          <a:noFill/>
+          <a:ln>
+            <a:solidFill>
+              <a:srgbClr val="00B0F0"/>
+            </a:solidFill>
+            <a:prstDash val="sysDash"/>
+          </a:ln>
+        </p:spPr>
+        <p:style>
+          <a:lnRef idx="2">
+            <a:schemeClr val="accent1">
+              <a:shade val="15000"/>
+            </a:schemeClr>
+          </a:lnRef>
+          <a:fillRef idx="1">
+            <a:schemeClr val="accent1"/>
+          </a:fillRef>
+          <a:effectRef idx="0">
+            <a:schemeClr val="accent1"/>
+          </a:effectRef>
+          <a:fontRef idx="minor">
+            <a:schemeClr val="lt1"/>
+          </a:fontRef>
+        </p:style>
+        <p:txBody>
+          <a:bodyPr rtlCol="0" anchor="ctr"/>
+          <a:lstStyle/>
+          <a:p>
+            <a:pPr algn="ctr"/>
+            <a:endParaRPr lang="en-SG" dirty="0"/>
+          </a:p>
+        </p:txBody>
+      </p:sp>
+      <p:cxnSp>
+        <p:nvCxnSpPr>
+          <p:cNvPr id="41" name="Connector: Elbow 40">
+            <a:extLst>
+              <a:ext uri="{FF2B5EF4-FFF2-40B4-BE49-F238E27FC236}">
+                <a16:creationId xmlns:a16="http://schemas.microsoft.com/office/drawing/2014/main" id="{F4DAFB7B-795C-A3D9-DA8E-8357A819F5A2}"/>
+              </a:ext>
+            </a:extLst>
+          </p:cNvPr>
+          <p:cNvCxnSpPr>
+            <a:cxnSpLocks/>
+            <a:endCxn id="40" idx="1"/>
+          </p:cNvCxnSpPr>
+          <p:nvPr/>
+        </p:nvCxnSpPr>
+        <p:spPr>
+          <a:xfrm flipV="1">
+            <a:off x="3810569" y="1257665"/>
+            <a:ext cx="924033" cy="208952"/>
+          </a:xfrm>
+          <a:prstGeom prst="bentConnector3">
+            <a:avLst>
+              <a:gd name="adj1" fmla="val 50000"/>
+            </a:avLst>
+          </a:prstGeom>
+          <a:ln>
+            <a:solidFill>
+              <a:schemeClr val="tx2">
+                <a:lumMod val="50000"/>
+                <a:lumOff val="50000"/>
+              </a:schemeClr>
+            </a:solidFill>
+            <a:prstDash val="sysDash"/>
+            <a:tailEnd type="triangle"/>
+          </a:ln>
+        </p:spPr>
+        <p:style>
+          <a:lnRef idx="2">
+            <a:schemeClr val="accent1"/>
+          </a:lnRef>
+          <a:fillRef idx="0">
+            <a:schemeClr val="accent1"/>
+          </a:fillRef>
+          <a:effectRef idx="1">
+            <a:schemeClr val="accent1"/>
+          </a:effectRef>
+          <a:fontRef idx="minor">
+            <a:schemeClr val="tx1"/>
+          </a:fontRef>
+        </p:style>
+      </p:cxnSp>
+      <p:sp>
+        <p:nvSpPr>
+          <p:cNvPr id="45" name="TextBox 44">
+            <a:extLst>
+              <a:ext uri="{FF2B5EF4-FFF2-40B4-BE49-F238E27FC236}">
+                <a16:creationId xmlns:a16="http://schemas.microsoft.com/office/drawing/2014/main" id="{28E93172-7158-5DCC-9314-AD5B95896FD7}"/>
+              </a:ext>
+            </a:extLst>
+          </p:cNvPr>
+          <p:cNvSpPr txBox="1"/>
+          <p:nvPr/>
+        </p:nvSpPr>
+        <p:spPr>
+          <a:xfrm>
+            <a:off x="3880561" y="2571774"/>
+            <a:ext cx="854041" cy="646331"/>
+          </a:xfrm>
+          <a:prstGeom prst="rect">
+            <a:avLst/>
+          </a:prstGeom>
+          <a:noFill/>
+        </p:spPr>
+        <p:txBody>
+          <a:bodyPr wrap="square" rtlCol="0">
+            <a:spAutoFit/>
+          </a:bodyPr>
+          <a:lstStyle/>
+          <a:p>
+            <a:r>
+              <a:rPr lang="en-US" sz="1200" b="1" dirty="0"/>
+              <a:t>Junction entrance </a:t>
+            </a:r>
+          </a:p>
+          <a:p>
+            <a:r>
+              <a:rPr lang="en-US" sz="1200" b="1" dirty="0"/>
+              <a:t>signal </a:t>
+            </a:r>
+            <a:endParaRPr lang="en-SG" sz="1200" b="1" dirty="0"/>
+          </a:p>
+        </p:txBody>
+      </p:sp>
+      <p:sp>
+        <p:nvSpPr>
+          <p:cNvPr id="46" name="TextBox 45">
+            <a:extLst>
+              <a:ext uri="{FF2B5EF4-FFF2-40B4-BE49-F238E27FC236}">
+                <a16:creationId xmlns:a16="http://schemas.microsoft.com/office/drawing/2014/main" id="{ADAEF44D-E609-E2EF-3895-BA982D7FF8FA}"/>
+              </a:ext>
+            </a:extLst>
+          </p:cNvPr>
+          <p:cNvSpPr txBox="1"/>
+          <p:nvPr/>
+        </p:nvSpPr>
+        <p:spPr>
+          <a:xfrm>
+            <a:off x="886737" y="599533"/>
+            <a:ext cx="3420844" cy="307777"/>
+          </a:xfrm>
+          <a:prstGeom prst="rect">
+            <a:avLst/>
+          </a:prstGeom>
+          <a:noFill/>
+        </p:spPr>
+        <p:txBody>
+          <a:bodyPr wrap="square" rtlCol="0">
+            <a:spAutoFit/>
+          </a:bodyPr>
+          <a:lstStyle/>
+          <a:p>
+            <a:r>
+              <a:rPr lang="en-US" sz="1400" b="1" dirty="0">
+                <a:solidFill>
+                  <a:schemeClr val="accent1">
+                    <a:lumMod val="75000"/>
+                  </a:schemeClr>
+                </a:solidFill>
+              </a:rPr>
+              <a:t>Physical World Simulation Junction</a:t>
+            </a:r>
+          </a:p>
+        </p:txBody>
+      </p:sp>
+      <p:sp>
+        <p:nvSpPr>
+          <p:cNvPr id="47" name="TextBox 46">
+            <a:extLst>
+              <a:ext uri="{FF2B5EF4-FFF2-40B4-BE49-F238E27FC236}">
+                <a16:creationId xmlns:a16="http://schemas.microsoft.com/office/drawing/2014/main" id="{81332DE2-A00C-8E86-F290-BC405E75A828}"/>
+              </a:ext>
+            </a:extLst>
+          </p:cNvPr>
+          <p:cNvSpPr txBox="1"/>
+          <p:nvPr/>
+        </p:nvSpPr>
+        <p:spPr>
+          <a:xfrm>
+            <a:off x="4307581" y="587219"/>
+            <a:ext cx="2351463" cy="307777"/>
+          </a:xfrm>
+          <a:prstGeom prst="rect">
+            <a:avLst/>
+          </a:prstGeom>
+          <a:noFill/>
+        </p:spPr>
+        <p:txBody>
+          <a:bodyPr wrap="square" rtlCol="0">
+            <a:spAutoFit/>
+          </a:bodyPr>
+          <a:lstStyle/>
+          <a:p>
+            <a:r>
+              <a:rPr lang="en-US" sz="1400" b="1" dirty="0">
+                <a:solidFill>
+                  <a:schemeClr val="accent1">
+                    <a:lumMod val="75000"/>
+                  </a:schemeClr>
+                </a:solidFill>
+              </a:rPr>
+              <a:t>Management HMI</a:t>
+            </a:r>
+          </a:p>
+        </p:txBody>
+      </p:sp>
+      <p:sp>
+        <p:nvSpPr>
+          <p:cNvPr id="48" name="TextBox 47">
+            <a:extLst>
+              <a:ext uri="{FF2B5EF4-FFF2-40B4-BE49-F238E27FC236}">
+                <a16:creationId xmlns:a16="http://schemas.microsoft.com/office/drawing/2014/main" id="{C5780874-ED35-AA16-1ADD-1463FD61D4B2}"/>
+              </a:ext>
+            </a:extLst>
+          </p:cNvPr>
+          <p:cNvSpPr txBox="1"/>
+          <p:nvPr/>
+        </p:nvSpPr>
+        <p:spPr>
+          <a:xfrm>
+            <a:off x="5375271" y="3364454"/>
+            <a:ext cx="1165290" cy="307777"/>
+          </a:xfrm>
+          <a:prstGeom prst="rect">
+            <a:avLst/>
+          </a:prstGeom>
+          <a:noFill/>
+        </p:spPr>
+        <p:txBody>
+          <a:bodyPr wrap="square" rtlCol="0">
+            <a:spAutoFit/>
+          </a:bodyPr>
+          <a:lstStyle/>
+          <a:p>
+            <a:r>
+              <a:rPr lang="en-US" sz="1400" b="1" dirty="0">
+                <a:solidFill>
+                  <a:schemeClr val="accent1">
+                    <a:lumMod val="75000"/>
+                  </a:schemeClr>
+                </a:solidFill>
+              </a:rPr>
+              <a:t>Signal HMI</a:t>
+            </a:r>
+          </a:p>
+        </p:txBody>
+      </p:sp>
+      <p:sp>
+        <p:nvSpPr>
+          <p:cNvPr id="49" name="TextBox 48">
+            <a:extLst>
+              <a:ext uri="{FF2B5EF4-FFF2-40B4-BE49-F238E27FC236}">
+                <a16:creationId xmlns:a16="http://schemas.microsoft.com/office/drawing/2014/main" id="{F1E5B99D-8AFF-7513-BFB3-4B95A5BC38AA}"/>
+              </a:ext>
+            </a:extLst>
+          </p:cNvPr>
+          <p:cNvSpPr txBox="1"/>
+          <p:nvPr/>
+        </p:nvSpPr>
+        <p:spPr>
+          <a:xfrm>
+            <a:off x="2465864" y="3017696"/>
+            <a:ext cx="1266999" cy="461665"/>
+          </a:xfrm>
+          <a:prstGeom prst="rect">
+            <a:avLst/>
+          </a:prstGeom>
+          <a:noFill/>
+        </p:spPr>
+        <p:txBody>
+          <a:bodyPr wrap="square" rtlCol="0">
+            <a:spAutoFit/>
+          </a:bodyPr>
+          <a:lstStyle/>
+          <a:p>
+            <a:r>
+              <a:rPr lang="en-US" sz="1200" b="1" dirty="0"/>
+              <a:t>Junction lock sensor </a:t>
+            </a:r>
+            <a:endParaRPr lang="en-SG" sz="1200" b="1" dirty="0"/>
+          </a:p>
+        </p:txBody>
+      </p:sp>
+      <p:sp>
+        <p:nvSpPr>
+          <p:cNvPr id="50" name="TextBox 49">
+            <a:extLst>
+              <a:ext uri="{FF2B5EF4-FFF2-40B4-BE49-F238E27FC236}">
+                <a16:creationId xmlns:a16="http://schemas.microsoft.com/office/drawing/2014/main" id="{63E67E2C-EF90-B12F-CE4A-D0BF9C3607AA}"/>
+              </a:ext>
+            </a:extLst>
+          </p:cNvPr>
+          <p:cNvSpPr txBox="1"/>
+          <p:nvPr/>
+        </p:nvSpPr>
+        <p:spPr>
+          <a:xfrm>
+            <a:off x="1006777" y="5370353"/>
+            <a:ext cx="2047250" cy="276999"/>
+          </a:xfrm>
+          <a:prstGeom prst="rect">
+            <a:avLst/>
+          </a:prstGeom>
+          <a:noFill/>
+        </p:spPr>
+        <p:txBody>
+          <a:bodyPr wrap="square" rtlCol="0">
+            <a:spAutoFit/>
+          </a:bodyPr>
+          <a:lstStyle/>
+          <a:p>
+            <a:r>
+              <a:rPr lang="en-US" sz="1200" b="1" dirty="0"/>
+              <a:t>Junction Release sensor </a:t>
+            </a:r>
+            <a:endParaRPr lang="en-SG" sz="1200" b="1" dirty="0"/>
+          </a:p>
+        </p:txBody>
+      </p:sp>
+      <p:pic>
+        <p:nvPicPr>
+          <p:cNvPr id="52" name="Picture 51">
+            <a:extLst>
+              <a:ext uri="{FF2B5EF4-FFF2-40B4-BE49-F238E27FC236}">
+                <a16:creationId xmlns:a16="http://schemas.microsoft.com/office/drawing/2014/main" id="{516DA43C-8B7F-BADC-3DD8-CB7661AA83FD}"/>
+              </a:ext>
+            </a:extLst>
+          </p:cNvPr>
+          <p:cNvPicPr>
+            <a:picLocks noChangeAspect="1"/>
+          </p:cNvPicPr>
+          <p:nvPr/>
+        </p:nvPicPr>
+        <p:blipFill>
+          <a:blip r:embed="rId5"/>
+          <a:stretch>
+            <a:fillRect/>
+          </a:stretch>
+        </p:blipFill>
+        <p:spPr>
+          <a:xfrm>
+            <a:off x="7143409" y="2870291"/>
+            <a:ext cx="2733333" cy="1190476"/>
+          </a:xfrm>
+          <a:prstGeom prst="rect">
+            <a:avLst/>
+          </a:prstGeom>
+        </p:spPr>
+      </p:pic>
+      <p:sp>
+        <p:nvSpPr>
+          <p:cNvPr id="53" name="TextBox 52">
+            <a:extLst>
+              <a:ext uri="{FF2B5EF4-FFF2-40B4-BE49-F238E27FC236}">
+                <a16:creationId xmlns:a16="http://schemas.microsoft.com/office/drawing/2014/main" id="{19981A53-FA86-57F2-F438-F2F3BA4AA74E}"/>
+              </a:ext>
+            </a:extLst>
+          </p:cNvPr>
+          <p:cNvSpPr txBox="1"/>
+          <p:nvPr/>
+        </p:nvSpPr>
+        <p:spPr>
+          <a:xfrm>
+            <a:off x="8385729" y="2310164"/>
+            <a:ext cx="2134369" cy="523220"/>
+          </a:xfrm>
+          <a:prstGeom prst="rect">
+            <a:avLst/>
+          </a:prstGeom>
+          <a:noFill/>
+        </p:spPr>
+        <p:txBody>
+          <a:bodyPr wrap="square" rtlCol="0">
+            <a:spAutoFit/>
+          </a:bodyPr>
+          <a:lstStyle/>
+          <a:p>
+            <a:r>
+              <a:rPr lang="en-US" sz="1400" b="1" dirty="0">
+                <a:solidFill>
+                  <a:schemeClr val="accent1">
+                    <a:lumMod val="75000"/>
+                  </a:schemeClr>
+                </a:solidFill>
+              </a:rPr>
+              <a:t>Physical World Simulation Station</a:t>
+            </a:r>
+          </a:p>
+        </p:txBody>
+      </p:sp>
+      <p:sp>
+        <p:nvSpPr>
+          <p:cNvPr id="54" name="Rectangle 53">
+            <a:extLst>
+              <a:ext uri="{FF2B5EF4-FFF2-40B4-BE49-F238E27FC236}">
+                <a16:creationId xmlns:a16="http://schemas.microsoft.com/office/drawing/2014/main" id="{271316E5-0339-7BFB-A519-1BB4035AAF74}"/>
+              </a:ext>
+            </a:extLst>
+          </p:cNvPr>
+          <p:cNvSpPr/>
+          <p:nvPr/>
+        </p:nvSpPr>
+        <p:spPr>
+          <a:xfrm>
+            <a:off x="8156852" y="3314555"/>
+            <a:ext cx="228878" cy="438080"/>
+          </a:xfrm>
+          <a:prstGeom prst="rect">
+            <a:avLst/>
+          </a:prstGeom>
+          <a:noFill/>
+          <a:ln>
+            <a:solidFill>
+              <a:srgbClr val="00B0F0"/>
+            </a:solidFill>
+            <a:prstDash val="sysDash"/>
+          </a:ln>
+        </p:spPr>
+        <p:style>
+          <a:lnRef idx="2">
+            <a:schemeClr val="accent1">
+              <a:shade val="15000"/>
+            </a:schemeClr>
+          </a:lnRef>
+          <a:fillRef idx="1">
+            <a:schemeClr val="accent1"/>
+          </a:fillRef>
+          <a:effectRef idx="0">
+            <a:schemeClr val="accent1"/>
+          </a:effectRef>
+          <a:fontRef idx="minor">
+            <a:schemeClr val="lt1"/>
+          </a:fontRef>
+        </p:style>
+        <p:txBody>
+          <a:bodyPr rtlCol="0" anchor="ctr"/>
+          <a:lstStyle/>
+          <a:p>
+            <a:pPr algn="ctr"/>
+            <a:endParaRPr lang="en-SG" dirty="0"/>
+          </a:p>
+        </p:txBody>
+      </p:sp>
+      <p:cxnSp>
+        <p:nvCxnSpPr>
+          <p:cNvPr id="55" name="Connector: Elbow 54">
+            <a:extLst>
+              <a:ext uri="{FF2B5EF4-FFF2-40B4-BE49-F238E27FC236}">
+                <a16:creationId xmlns:a16="http://schemas.microsoft.com/office/drawing/2014/main" id="{7FCB7612-8BDF-4686-5FDD-CAAD4FFBED14}"/>
+              </a:ext>
+            </a:extLst>
+          </p:cNvPr>
+          <p:cNvCxnSpPr>
+            <a:cxnSpLocks/>
+            <a:stCxn id="54" idx="2"/>
+          </p:cNvCxnSpPr>
+          <p:nvPr/>
+        </p:nvCxnSpPr>
+        <p:spPr>
+          <a:xfrm rot="5400000">
+            <a:off x="6320277" y="3513871"/>
+            <a:ext cx="1712250" cy="2189779"/>
+          </a:xfrm>
+          <a:prstGeom prst="bentConnector2">
+            <a:avLst/>
+          </a:prstGeom>
+          <a:ln>
+            <a:solidFill>
+              <a:schemeClr val="tx2">
+                <a:lumMod val="50000"/>
+                <a:lumOff val="50000"/>
+              </a:schemeClr>
+            </a:solidFill>
+            <a:prstDash val="sysDash"/>
+            <a:tailEnd type="triangle"/>
+          </a:ln>
+        </p:spPr>
+        <p:style>
+          <a:lnRef idx="2">
+            <a:schemeClr val="accent1"/>
+          </a:lnRef>
+          <a:fillRef idx="0">
+            <a:schemeClr val="accent1"/>
+          </a:fillRef>
+          <a:effectRef idx="1">
+            <a:schemeClr val="accent1"/>
+          </a:effectRef>
+          <a:fontRef idx="minor">
+            <a:schemeClr val="tx1"/>
+          </a:fontRef>
+        </p:style>
+      </p:cxnSp>
+      <p:cxnSp>
+        <p:nvCxnSpPr>
+          <p:cNvPr id="58" name="Connector: Elbow 57">
+            <a:extLst>
+              <a:ext uri="{FF2B5EF4-FFF2-40B4-BE49-F238E27FC236}">
+                <a16:creationId xmlns:a16="http://schemas.microsoft.com/office/drawing/2014/main" id="{F1C5B03A-ABCF-A8D1-6DEF-9E507F3C5AF2}"/>
+              </a:ext>
+            </a:extLst>
+          </p:cNvPr>
+          <p:cNvCxnSpPr>
+            <a:cxnSpLocks/>
+            <a:stCxn id="54" idx="0"/>
+          </p:cNvCxnSpPr>
+          <p:nvPr/>
+        </p:nvCxnSpPr>
+        <p:spPr>
+          <a:xfrm rot="16200000" flipV="1">
+            <a:off x="6509615" y="1552879"/>
+            <a:ext cx="2066975" cy="1456378"/>
+          </a:xfrm>
+          <a:prstGeom prst="bentConnector3">
+            <a:avLst>
+              <a:gd name="adj1" fmla="val 100484"/>
+            </a:avLst>
+          </a:prstGeom>
+          <a:ln>
+            <a:solidFill>
+              <a:schemeClr val="tx2">
+                <a:lumMod val="50000"/>
+                <a:lumOff val="50000"/>
+              </a:schemeClr>
+            </a:solidFill>
+            <a:prstDash val="sysDash"/>
+            <a:tailEnd type="triangle"/>
+          </a:ln>
+        </p:spPr>
+        <p:style>
+          <a:lnRef idx="2">
+            <a:schemeClr val="accent1"/>
+          </a:lnRef>
+          <a:fillRef idx="0">
+            <a:schemeClr val="accent1"/>
+          </a:fillRef>
+          <a:effectRef idx="1">
+            <a:schemeClr val="accent1"/>
+          </a:effectRef>
+          <a:fontRef idx="minor">
+            <a:schemeClr val="tx1"/>
+          </a:fontRef>
+        </p:style>
+      </p:cxnSp>
+      <p:sp>
+        <p:nvSpPr>
+          <p:cNvPr id="62" name="TextBox 61">
+            <a:extLst>
+              <a:ext uri="{FF2B5EF4-FFF2-40B4-BE49-F238E27FC236}">
+                <a16:creationId xmlns:a16="http://schemas.microsoft.com/office/drawing/2014/main" id="{7BFA6E5C-1B58-8B88-CD05-5C9C392157B2}"/>
+              </a:ext>
+            </a:extLst>
+          </p:cNvPr>
+          <p:cNvSpPr txBox="1"/>
+          <p:nvPr/>
+        </p:nvSpPr>
+        <p:spPr>
+          <a:xfrm>
+            <a:off x="6886175" y="4950329"/>
+            <a:ext cx="1442336" cy="461665"/>
+          </a:xfrm>
+          <a:prstGeom prst="rect">
+            <a:avLst/>
+          </a:prstGeom>
+          <a:noFill/>
+        </p:spPr>
+        <p:txBody>
+          <a:bodyPr wrap="square" rtlCol="0">
+            <a:spAutoFit/>
+          </a:bodyPr>
+          <a:lstStyle/>
+          <a:p>
+            <a:r>
+              <a:rPr lang="en-US" sz="1200" b="1" dirty="0"/>
+              <a:t>Station entrance signal</a:t>
+            </a:r>
+            <a:endParaRPr lang="en-SG" sz="1200" b="1" dirty="0"/>
+          </a:p>
+        </p:txBody>
+      </p:sp>
+      <p:sp>
+        <p:nvSpPr>
+          <p:cNvPr id="63" name="TextBox 62">
+            <a:extLst>
+              <a:ext uri="{FF2B5EF4-FFF2-40B4-BE49-F238E27FC236}">
+                <a16:creationId xmlns:a16="http://schemas.microsoft.com/office/drawing/2014/main" id="{1376D29D-A6FB-3D65-9DAC-9F9227A65BA3}"/>
+              </a:ext>
+            </a:extLst>
+          </p:cNvPr>
+          <p:cNvSpPr txBox="1"/>
+          <p:nvPr/>
+        </p:nvSpPr>
+        <p:spPr>
+          <a:xfrm>
+            <a:off x="5922195" y="2703678"/>
+            <a:ext cx="974548" cy="461665"/>
+          </a:xfrm>
+          <a:prstGeom prst="rect">
+            <a:avLst/>
+          </a:prstGeom>
+          <a:noFill/>
+        </p:spPr>
+        <p:txBody>
+          <a:bodyPr wrap="square" rtlCol="0">
+            <a:spAutoFit/>
+          </a:bodyPr>
+          <a:lstStyle/>
+          <a:p>
+            <a:r>
+              <a:rPr lang="en-US" sz="1200" b="1" dirty="0"/>
+              <a:t>Station exit signal</a:t>
+            </a:r>
+            <a:endParaRPr lang="en-SG" sz="1200" b="1" dirty="0"/>
+          </a:p>
+        </p:txBody>
+      </p:sp>
+      <p:sp>
+        <p:nvSpPr>
+          <p:cNvPr id="64" name="Rectangle 63">
+            <a:extLst>
+              <a:ext uri="{FF2B5EF4-FFF2-40B4-BE49-F238E27FC236}">
+                <a16:creationId xmlns:a16="http://schemas.microsoft.com/office/drawing/2014/main" id="{B9576E90-39B2-C59F-A472-CF4E6821E231}"/>
+              </a:ext>
+            </a:extLst>
+          </p:cNvPr>
+          <p:cNvSpPr/>
+          <p:nvPr/>
+        </p:nvSpPr>
+        <p:spPr>
+          <a:xfrm>
+            <a:off x="7370599" y="3338191"/>
+            <a:ext cx="228878" cy="438080"/>
+          </a:xfrm>
+          <a:prstGeom prst="rect">
+            <a:avLst/>
+          </a:prstGeom>
+          <a:noFill/>
+          <a:ln>
+            <a:solidFill>
+              <a:srgbClr val="00B0F0"/>
+            </a:solidFill>
+            <a:prstDash val="sysDash"/>
+          </a:ln>
+        </p:spPr>
+        <p:style>
+          <a:lnRef idx="2">
+            <a:schemeClr val="accent1">
+              <a:shade val="15000"/>
+            </a:schemeClr>
+          </a:lnRef>
+          <a:fillRef idx="1">
+            <a:schemeClr val="accent1"/>
+          </a:fillRef>
+          <a:effectRef idx="0">
+            <a:schemeClr val="accent1"/>
+          </a:effectRef>
+          <a:fontRef idx="minor">
+            <a:schemeClr val="lt1"/>
+          </a:fontRef>
+        </p:style>
+        <p:txBody>
+          <a:bodyPr rtlCol="0" anchor="ctr"/>
+          <a:lstStyle/>
+          <a:p>
+            <a:pPr algn="ctr"/>
+            <a:endParaRPr lang="en-SG" dirty="0"/>
+          </a:p>
+        </p:txBody>
+      </p:sp>
+      <p:cxnSp>
+        <p:nvCxnSpPr>
+          <p:cNvPr id="65" name="Connector: Elbow 64">
+            <a:extLst>
+              <a:ext uri="{FF2B5EF4-FFF2-40B4-BE49-F238E27FC236}">
+                <a16:creationId xmlns:a16="http://schemas.microsoft.com/office/drawing/2014/main" id="{FEA08738-EF8A-ABB9-EFF3-0B329AD88EB7}"/>
+              </a:ext>
+            </a:extLst>
+          </p:cNvPr>
+          <p:cNvCxnSpPr>
+            <a:cxnSpLocks/>
+            <a:stCxn id="64" idx="0"/>
+          </p:cNvCxnSpPr>
+          <p:nvPr/>
+        </p:nvCxnSpPr>
+        <p:spPr>
+          <a:xfrm rot="16200000" flipV="1">
+            <a:off x="5757492" y="1610644"/>
+            <a:ext cx="1849645" cy="1605449"/>
+          </a:xfrm>
+          <a:prstGeom prst="bentConnector3">
+            <a:avLst>
+              <a:gd name="adj1" fmla="val 8706"/>
+            </a:avLst>
+          </a:prstGeom>
+          <a:ln>
+            <a:solidFill>
+              <a:schemeClr val="tx2">
+                <a:lumMod val="50000"/>
+                <a:lumOff val="50000"/>
+              </a:schemeClr>
+            </a:solidFill>
+            <a:prstDash val="sysDash"/>
+            <a:tailEnd type="triangle"/>
+          </a:ln>
+        </p:spPr>
+        <p:style>
+          <a:lnRef idx="2">
+            <a:schemeClr val="accent1"/>
+          </a:lnRef>
+          <a:fillRef idx="0">
+            <a:schemeClr val="accent1"/>
+          </a:fillRef>
+          <a:effectRef idx="1">
+            <a:schemeClr val="accent1"/>
+          </a:effectRef>
+          <a:fontRef idx="minor">
+            <a:schemeClr val="tx1"/>
+          </a:fontRef>
+        </p:style>
+      </p:cxnSp>
+      <p:sp>
+        <p:nvSpPr>
+          <p:cNvPr id="70" name="TextBox 69">
+            <a:extLst>
+              <a:ext uri="{FF2B5EF4-FFF2-40B4-BE49-F238E27FC236}">
+                <a16:creationId xmlns:a16="http://schemas.microsoft.com/office/drawing/2014/main" id="{AC73108B-F9A9-A7D5-0D74-1ED3A28D4B5F}"/>
+              </a:ext>
+            </a:extLst>
+          </p:cNvPr>
+          <p:cNvSpPr txBox="1"/>
+          <p:nvPr/>
+        </p:nvSpPr>
+        <p:spPr>
+          <a:xfrm>
+            <a:off x="7497161" y="1223945"/>
+            <a:ext cx="854041" cy="646331"/>
+          </a:xfrm>
+          <a:prstGeom prst="rect">
+            <a:avLst/>
+          </a:prstGeom>
+          <a:noFill/>
+        </p:spPr>
+        <p:txBody>
+          <a:bodyPr wrap="square" rtlCol="0">
+            <a:spAutoFit/>
+          </a:bodyPr>
+          <a:lstStyle/>
+          <a:p>
+            <a:r>
+              <a:rPr lang="en-US" sz="1200" b="1" dirty="0"/>
+              <a:t>Station entrance signal</a:t>
+            </a:r>
+            <a:endParaRPr lang="en-SG" sz="1200" b="1" dirty="0"/>
+          </a:p>
+        </p:txBody>
+      </p:sp>
+      <p:cxnSp>
+        <p:nvCxnSpPr>
+          <p:cNvPr id="71" name="Connector: Elbow 70">
+            <a:extLst>
+              <a:ext uri="{FF2B5EF4-FFF2-40B4-BE49-F238E27FC236}">
+                <a16:creationId xmlns:a16="http://schemas.microsoft.com/office/drawing/2014/main" id="{AB0C488F-53A6-E4B9-D182-75BB4824B0E3}"/>
+              </a:ext>
+            </a:extLst>
+          </p:cNvPr>
+          <p:cNvCxnSpPr>
+            <a:cxnSpLocks/>
+          </p:cNvCxnSpPr>
+          <p:nvPr/>
+        </p:nvCxnSpPr>
+        <p:spPr>
+          <a:xfrm rot="16200000" flipV="1">
+            <a:off x="6127095" y="1840602"/>
+            <a:ext cx="1768375" cy="1440848"/>
+          </a:xfrm>
+          <a:prstGeom prst="bentConnector3">
+            <a:avLst>
+              <a:gd name="adj1" fmla="val 50000"/>
+            </a:avLst>
+          </a:prstGeom>
+          <a:ln>
+            <a:solidFill>
+              <a:schemeClr val="tx2">
+                <a:lumMod val="50000"/>
+                <a:lumOff val="50000"/>
+              </a:schemeClr>
+            </a:solidFill>
+            <a:prstDash val="sysDash"/>
+            <a:tailEnd type="triangle"/>
+          </a:ln>
+        </p:spPr>
+        <p:style>
+          <a:lnRef idx="2">
+            <a:schemeClr val="accent1"/>
+          </a:lnRef>
+          <a:fillRef idx="0">
+            <a:schemeClr val="accent1"/>
+          </a:fillRef>
+          <a:effectRef idx="1">
+            <a:schemeClr val="accent1"/>
+          </a:effectRef>
+          <a:fontRef idx="minor">
+            <a:schemeClr val="tx1"/>
+          </a:fontRef>
+        </p:style>
+      </p:cxnSp>
+      <p:sp>
+        <p:nvSpPr>
+          <p:cNvPr id="74" name="TextBox 73">
+            <a:extLst>
+              <a:ext uri="{FF2B5EF4-FFF2-40B4-BE49-F238E27FC236}">
+                <a16:creationId xmlns:a16="http://schemas.microsoft.com/office/drawing/2014/main" id="{FE9CD78C-6F95-8405-35B4-9C2CD8FEE7BD}"/>
+              </a:ext>
+            </a:extLst>
+          </p:cNvPr>
+          <p:cNvSpPr txBox="1"/>
+          <p:nvPr/>
+        </p:nvSpPr>
+        <p:spPr>
+          <a:xfrm>
+            <a:off x="6701706" y="2134990"/>
+            <a:ext cx="1590910" cy="461665"/>
+          </a:xfrm>
+          <a:prstGeom prst="rect">
+            <a:avLst/>
+          </a:prstGeom>
+          <a:noFill/>
+        </p:spPr>
+        <p:txBody>
+          <a:bodyPr wrap="square" rtlCol="0">
+            <a:spAutoFit/>
+          </a:bodyPr>
+          <a:lstStyle/>
+          <a:p>
+            <a:r>
+              <a:rPr lang="en-US" sz="1200" b="1" dirty="0"/>
+              <a:t>Station platform door state indicator </a:t>
+            </a:r>
+            <a:endParaRPr lang="en-SG" sz="1200" b="1" dirty="0"/>
+          </a:p>
+        </p:txBody>
+      </p:sp>
+      <p:cxnSp>
+        <p:nvCxnSpPr>
+          <p:cNvPr id="76" name="Connector: Elbow 75">
+            <a:extLst>
+              <a:ext uri="{FF2B5EF4-FFF2-40B4-BE49-F238E27FC236}">
+                <a16:creationId xmlns:a16="http://schemas.microsoft.com/office/drawing/2014/main" id="{127E8C0E-F151-01CD-E1A2-75E9363F7300}"/>
+              </a:ext>
+            </a:extLst>
+          </p:cNvPr>
+          <p:cNvCxnSpPr>
+            <a:cxnSpLocks/>
+            <a:stCxn id="81" idx="2"/>
+            <a:endCxn id="84" idx="0"/>
+          </p:cNvCxnSpPr>
+          <p:nvPr/>
+        </p:nvCxnSpPr>
+        <p:spPr>
+          <a:xfrm rot="5400000">
+            <a:off x="6303941" y="3365192"/>
+            <a:ext cx="1211020" cy="2059722"/>
+          </a:xfrm>
+          <a:prstGeom prst="bentConnector3">
+            <a:avLst>
+              <a:gd name="adj1" fmla="val 50000"/>
+            </a:avLst>
+          </a:prstGeom>
+          <a:ln>
+            <a:solidFill>
+              <a:schemeClr val="tx2">
+                <a:lumMod val="50000"/>
+                <a:lumOff val="50000"/>
+              </a:schemeClr>
+            </a:solidFill>
+            <a:prstDash val="sysDash"/>
+            <a:tailEnd type="triangle"/>
+          </a:ln>
+        </p:spPr>
+        <p:style>
+          <a:lnRef idx="2">
+            <a:schemeClr val="accent1"/>
+          </a:lnRef>
+          <a:fillRef idx="0">
+            <a:schemeClr val="accent1"/>
+          </a:fillRef>
+          <a:effectRef idx="1">
+            <a:schemeClr val="accent1"/>
+          </a:effectRef>
+          <a:fontRef idx="minor">
+            <a:schemeClr val="tx1"/>
+          </a:fontRef>
+        </p:style>
+      </p:cxnSp>
+      <p:sp>
+        <p:nvSpPr>
+          <p:cNvPr id="81" name="Rectangle 80">
+            <a:extLst>
+              <a:ext uri="{FF2B5EF4-FFF2-40B4-BE49-F238E27FC236}">
+                <a16:creationId xmlns:a16="http://schemas.microsoft.com/office/drawing/2014/main" id="{762C2CE6-ADA2-8282-3880-9E1B618FEBAC}"/>
+              </a:ext>
+            </a:extLst>
+          </p:cNvPr>
+          <p:cNvSpPr/>
+          <p:nvPr/>
+        </p:nvSpPr>
+        <p:spPr>
+          <a:xfrm>
+            <a:off x="7824873" y="3351463"/>
+            <a:ext cx="228878" cy="438080"/>
+          </a:xfrm>
+          <a:prstGeom prst="rect">
+            <a:avLst/>
+          </a:prstGeom>
+          <a:noFill/>
+          <a:ln>
+            <a:solidFill>
+              <a:srgbClr val="00B0F0"/>
+            </a:solidFill>
+            <a:prstDash val="sysDash"/>
+          </a:ln>
+        </p:spPr>
+        <p:style>
+          <a:lnRef idx="2">
+            <a:schemeClr val="accent1">
+              <a:shade val="15000"/>
+            </a:schemeClr>
+          </a:lnRef>
+          <a:fillRef idx="1">
+            <a:schemeClr val="accent1"/>
+          </a:fillRef>
+          <a:effectRef idx="0">
+            <a:schemeClr val="accent1"/>
+          </a:effectRef>
+          <a:fontRef idx="minor">
+            <a:schemeClr val="lt1"/>
+          </a:fontRef>
+        </p:style>
+        <p:txBody>
+          <a:bodyPr rtlCol="0" anchor="ctr"/>
+          <a:lstStyle/>
+          <a:p>
+            <a:pPr algn="ctr"/>
+            <a:endParaRPr lang="en-SG" dirty="0"/>
+          </a:p>
+        </p:txBody>
+      </p:sp>
+      <p:sp>
+        <p:nvSpPr>
+          <p:cNvPr id="84" name="Rectangle 83">
+            <a:extLst>
+              <a:ext uri="{FF2B5EF4-FFF2-40B4-BE49-F238E27FC236}">
+                <a16:creationId xmlns:a16="http://schemas.microsoft.com/office/drawing/2014/main" id="{66DBFB3C-E1BA-93B2-E775-F60B89BA4F31}"/>
+              </a:ext>
+            </a:extLst>
+          </p:cNvPr>
+          <p:cNvSpPr/>
+          <p:nvPr/>
+        </p:nvSpPr>
+        <p:spPr>
+          <a:xfrm>
+            <a:off x="5765151" y="5000563"/>
+            <a:ext cx="228878" cy="438080"/>
+          </a:xfrm>
+          <a:prstGeom prst="rect">
+            <a:avLst/>
+          </a:prstGeom>
+          <a:noFill/>
+          <a:ln>
+            <a:solidFill>
+              <a:srgbClr val="00B0F0"/>
+            </a:solidFill>
+            <a:prstDash val="sysDash"/>
+          </a:ln>
+        </p:spPr>
+        <p:style>
+          <a:lnRef idx="2">
+            <a:schemeClr val="accent1">
+              <a:shade val="15000"/>
+            </a:schemeClr>
+          </a:lnRef>
+          <a:fillRef idx="1">
+            <a:schemeClr val="accent1"/>
+          </a:fillRef>
+          <a:effectRef idx="0">
+            <a:schemeClr val="accent1"/>
+          </a:effectRef>
+          <a:fontRef idx="minor">
+            <a:schemeClr val="lt1"/>
+          </a:fontRef>
+        </p:style>
+        <p:txBody>
+          <a:bodyPr rtlCol="0" anchor="ctr"/>
+          <a:lstStyle/>
+          <a:p>
+            <a:pPr algn="ctr"/>
+            <a:endParaRPr lang="en-SG" dirty="0"/>
+          </a:p>
+        </p:txBody>
+      </p:sp>
+      <p:sp>
+        <p:nvSpPr>
+          <p:cNvPr id="87" name="TextBox 86">
+            <a:extLst>
+              <a:ext uri="{FF2B5EF4-FFF2-40B4-BE49-F238E27FC236}">
+                <a16:creationId xmlns:a16="http://schemas.microsoft.com/office/drawing/2014/main" id="{0E6B05A7-6F87-F359-D7E7-16A181E01DC6}"/>
+              </a:ext>
+            </a:extLst>
+          </p:cNvPr>
+          <p:cNvSpPr txBox="1"/>
+          <p:nvPr/>
+        </p:nvSpPr>
+        <p:spPr>
+          <a:xfrm>
+            <a:off x="6357156" y="4358328"/>
+            <a:ext cx="1442336" cy="461665"/>
+          </a:xfrm>
+          <a:prstGeom prst="rect">
+            <a:avLst/>
+          </a:prstGeom>
+          <a:noFill/>
+        </p:spPr>
+        <p:txBody>
+          <a:bodyPr wrap="square" rtlCol="0">
+            <a:spAutoFit/>
+          </a:bodyPr>
+          <a:lstStyle/>
+          <a:p>
+            <a:r>
+              <a:rPr lang="en-US" sz="1200" b="1" dirty="0"/>
+              <a:t>Station train position sensor</a:t>
+            </a:r>
+            <a:endParaRPr lang="en-SG" sz="1200" b="1" dirty="0"/>
+          </a:p>
+        </p:txBody>
+      </p:sp>
+      <p:sp>
+        <p:nvSpPr>
+          <p:cNvPr id="88" name="TextBox 87">
+            <a:extLst>
+              <a:ext uri="{FF2B5EF4-FFF2-40B4-BE49-F238E27FC236}">
+                <a16:creationId xmlns:a16="http://schemas.microsoft.com/office/drawing/2014/main" id="{7376F4E4-54EB-D7A3-3F47-55B7C9CAF32E}"/>
+              </a:ext>
+            </a:extLst>
+          </p:cNvPr>
+          <p:cNvSpPr txBox="1"/>
+          <p:nvPr/>
+        </p:nvSpPr>
+        <p:spPr>
+          <a:xfrm>
+            <a:off x="1603542" y="3356887"/>
+            <a:ext cx="1229371" cy="646331"/>
+          </a:xfrm>
+          <a:prstGeom prst="rect">
+            <a:avLst/>
+          </a:prstGeom>
+          <a:noFill/>
+        </p:spPr>
+        <p:txBody>
+          <a:bodyPr wrap="square" rtlCol="0">
+            <a:spAutoFit/>
+          </a:bodyPr>
+          <a:lstStyle/>
+          <a:p>
+            <a:r>
+              <a:rPr lang="en-US" sz="1200" b="1" dirty="0"/>
+              <a:t>Junction entrance lock trigger on link</a:t>
+            </a:r>
+            <a:endParaRPr lang="en-SG" sz="1200" b="1" dirty="0"/>
+          </a:p>
+        </p:txBody>
+      </p:sp>
+      <p:cxnSp>
+        <p:nvCxnSpPr>
+          <p:cNvPr id="89" name="Connector: Elbow 88">
+            <a:extLst>
+              <a:ext uri="{FF2B5EF4-FFF2-40B4-BE49-F238E27FC236}">
+                <a16:creationId xmlns:a16="http://schemas.microsoft.com/office/drawing/2014/main" id="{568D51F2-A0B0-C451-04AC-8530C66BD34D}"/>
+              </a:ext>
+            </a:extLst>
+          </p:cNvPr>
+          <p:cNvCxnSpPr>
+            <a:cxnSpLocks/>
+            <a:stCxn id="88" idx="2"/>
+          </p:cNvCxnSpPr>
+          <p:nvPr/>
+        </p:nvCxnSpPr>
+        <p:spPr>
+          <a:xfrm rot="16200000" flipH="1">
+            <a:off x="3111065" y="3110381"/>
+            <a:ext cx="371754" cy="2157428"/>
+          </a:xfrm>
+          <a:prstGeom prst="bentConnector2">
+            <a:avLst/>
+          </a:prstGeom>
+          <a:ln>
+            <a:solidFill>
+              <a:schemeClr val="tx2">
+                <a:lumMod val="50000"/>
+                <a:lumOff val="50000"/>
+              </a:schemeClr>
+            </a:solidFill>
+            <a:prstDash val="sysDash"/>
+            <a:tailEnd type="triangle"/>
+          </a:ln>
+        </p:spPr>
+        <p:style>
+          <a:lnRef idx="2">
+            <a:schemeClr val="accent1"/>
+          </a:lnRef>
+          <a:fillRef idx="0">
+            <a:schemeClr val="accent1"/>
+          </a:fillRef>
+          <a:effectRef idx="1">
+            <a:schemeClr val="accent1"/>
+          </a:effectRef>
+          <a:fontRef idx="minor">
+            <a:schemeClr val="tx1"/>
+          </a:fontRef>
+        </p:style>
+      </p:cxnSp>
+      <p:sp>
+        <p:nvSpPr>
+          <p:cNvPr id="94" name="TextBox 93">
+            <a:extLst>
+              <a:ext uri="{FF2B5EF4-FFF2-40B4-BE49-F238E27FC236}">
+                <a16:creationId xmlns:a16="http://schemas.microsoft.com/office/drawing/2014/main" id="{118A50D6-C172-F9A9-EFE8-09AA56EBBD69}"/>
+              </a:ext>
+            </a:extLst>
+          </p:cNvPr>
+          <p:cNvSpPr txBox="1"/>
+          <p:nvPr/>
+        </p:nvSpPr>
+        <p:spPr>
+          <a:xfrm>
+            <a:off x="1666877" y="4410547"/>
+            <a:ext cx="1229371" cy="646331"/>
+          </a:xfrm>
+          <a:prstGeom prst="rect">
+            <a:avLst/>
+          </a:prstGeom>
+          <a:noFill/>
+        </p:spPr>
+        <p:txBody>
+          <a:bodyPr wrap="square" rtlCol="0">
+            <a:spAutoFit/>
+          </a:bodyPr>
+          <a:lstStyle/>
+          <a:p>
+            <a:r>
+              <a:rPr lang="en-US" sz="1200" b="1" dirty="0"/>
+              <a:t>Junction entrance lock trigger off link</a:t>
+            </a:r>
+            <a:endParaRPr lang="en-SG" sz="1200" b="1" dirty="0"/>
+          </a:p>
+        </p:txBody>
+      </p:sp>
+      <p:cxnSp>
+        <p:nvCxnSpPr>
+          <p:cNvPr id="95" name="Straight Arrow Connector 94">
+            <a:extLst>
+              <a:ext uri="{FF2B5EF4-FFF2-40B4-BE49-F238E27FC236}">
+                <a16:creationId xmlns:a16="http://schemas.microsoft.com/office/drawing/2014/main" id="{0517499D-4F0D-C629-5216-65AB900C0064}"/>
+              </a:ext>
+            </a:extLst>
+          </p:cNvPr>
+          <p:cNvCxnSpPr>
+            <a:cxnSpLocks/>
+          </p:cNvCxnSpPr>
+          <p:nvPr/>
+        </p:nvCxnSpPr>
+        <p:spPr>
+          <a:xfrm>
+            <a:off x="2750669" y="4733820"/>
+            <a:ext cx="797892" cy="0"/>
+          </a:xfrm>
+          <a:prstGeom prst="straightConnector1">
+            <a:avLst/>
+          </a:prstGeom>
+          <a:ln w="19050">
+            <a:solidFill>
+              <a:srgbClr val="00B0F0"/>
+            </a:solidFill>
+            <a:prstDash val="sysDash"/>
+            <a:tailEnd type="triangle"/>
+          </a:ln>
+        </p:spPr>
+        <p:style>
+          <a:lnRef idx="1">
+            <a:schemeClr val="accent5"/>
+          </a:lnRef>
+          <a:fillRef idx="0">
+            <a:schemeClr val="accent5"/>
+          </a:fillRef>
+          <a:effectRef idx="0">
+            <a:schemeClr val="accent5"/>
+          </a:effectRef>
+          <a:fontRef idx="minor">
+            <a:schemeClr val="tx1"/>
+          </a:fontRef>
+        </p:style>
+      </p:cxnSp>
+    </p:spTree>
+    <p:extLst>
+      <p:ext uri="{BB962C8B-B14F-4D97-AF65-F5344CB8AC3E}">
+        <p14:creationId xmlns:p14="http://schemas.microsoft.com/office/powerpoint/2010/main" val="2080749798"/>
+      </p:ext>
+    </p:extLst>
+  </p:cSld>
+  <p:clrMapOvr>
+    <a:masterClrMapping/>
+  </p:clrMapOvr>
+</p:sld>
+</file>
+
+<file path=ppt/slides/slide4.xml><?xml version="1.0" encoding="utf-8"?>
+<p:sld xmlns:a="http://schemas.openxmlformats.org/drawingml/2006/main" xmlns:r="http://schemas.openxmlformats.org/officeDocument/2006/relationships" xmlns:p="http://schemas.openxmlformats.org/presentationml/2006/main">
+  <p:cSld>
+    <p:spTree>
+      <p:nvGrpSpPr>
+        <p:cNvPr id="1" name=""/>
+        <p:cNvGrpSpPr/>
+        <p:nvPr/>
+      </p:nvGrpSpPr>
+      <p:grpSpPr>
+        <a:xfrm>
+          <a:off x="0" y="0"/>
+          <a:ext cx="0" cy="0"/>
+          <a:chOff x="0" y="0"/>
+          <a:chExt cx="0" cy="0"/>
+        </a:xfrm>
+      </p:grpSpPr>
+      <p:pic>
+        <p:nvPicPr>
           <p:cNvPr id="28" name="Picture 27" descr="A screenshot of a computer&#10;&#10;AI-generated content may be incorrect.">
             <a:extLst>
               <a:ext uri="{FF2B5EF4-FFF2-40B4-BE49-F238E27FC236}">
@@ -12364,7 +14071,7 @@
 </p:sld>
 </file>
 
-<file path=ppt/slides/slide4.xml><?xml version="1.0" encoding="utf-8"?>
+<file path=ppt/slides/slide5.xml><?xml version="1.0" encoding="utf-8"?>
 <p:sld xmlns:a="http://schemas.openxmlformats.org/drawingml/2006/main" xmlns:r="http://schemas.openxmlformats.org/officeDocument/2006/relationships" xmlns:p="http://schemas.openxmlformats.org/presentationml/2006/main">
   <p:cSld>
     <p:spTree>
@@ -13825,7 +15532,7 @@
 </p:sld>
 </file>
 
-<file path=ppt/slides/slide5.xml><?xml version="1.0" encoding="utf-8"?>
+<file path=ppt/slides/slide6.xml><?xml version="1.0" encoding="utf-8"?>
 <p:sld xmlns:a="http://schemas.openxmlformats.org/drawingml/2006/main" xmlns:r="http://schemas.openxmlformats.org/officeDocument/2006/relationships" xmlns:p="http://schemas.openxmlformats.org/presentationml/2006/main">
   <p:cSld>
     <p:spTree>
@@ -16001,7 +17708,7 @@
 </p:sld>
 </file>
 
-<file path=ppt/slides/slide6.xml><?xml version="1.0" encoding="utf-8"?>
+<file path=ppt/slides/slide7.xml><?xml version="1.0" encoding="utf-8"?>
 <p:sld xmlns:a="http://schemas.openxmlformats.org/drawingml/2006/main" xmlns:r="http://schemas.openxmlformats.org/officeDocument/2006/relationships" xmlns:p="http://schemas.openxmlformats.org/presentationml/2006/main">
   <p:cSld>
     <p:spTree>
@@ -18329,6 +20036,1981 @@
     <p:extLst>
       <p:ext uri="{BB962C8B-B14F-4D97-AF65-F5344CB8AC3E}">
         <p14:creationId xmlns:p14="http://schemas.microsoft.com/office/powerpoint/2010/main" val="212458288"/>
+      </p:ext>
+    </p:extLst>
+  </p:cSld>
+  <p:clrMapOvr>
+    <a:masterClrMapping/>
+  </p:clrMapOvr>
+</p:sld>
+</file>
+
+<file path=ppt/slides/slide8.xml><?xml version="1.0" encoding="utf-8"?>
+<p:sld xmlns:a="http://schemas.openxmlformats.org/drawingml/2006/main" xmlns:r="http://schemas.openxmlformats.org/officeDocument/2006/relationships" xmlns:p="http://schemas.openxmlformats.org/presentationml/2006/main">
+  <p:cSld>
+    <p:spTree>
+      <p:nvGrpSpPr>
+        <p:cNvPr id="1" name=""/>
+        <p:cNvGrpSpPr/>
+        <p:nvPr/>
+      </p:nvGrpSpPr>
+      <p:grpSpPr>
+        <a:xfrm>
+          <a:off x="0" y="0"/>
+          <a:ext cx="0" cy="0"/>
+          <a:chOff x="0" y="0"/>
+          <a:chExt cx="0" cy="0"/>
+        </a:xfrm>
+      </p:grpSpPr>
+      <p:pic>
+        <p:nvPicPr>
+          <p:cNvPr id="5" name="Picture 4">
+            <a:extLst>
+              <a:ext uri="{FF2B5EF4-FFF2-40B4-BE49-F238E27FC236}">
+                <a16:creationId xmlns:a16="http://schemas.microsoft.com/office/drawing/2014/main" id="{9CF63E40-3765-A500-3A16-83C539ECBBF3}"/>
+              </a:ext>
+            </a:extLst>
+          </p:cNvPr>
+          <p:cNvPicPr>
+            <a:picLocks noChangeAspect="1"/>
+          </p:cNvPicPr>
+          <p:nvPr/>
+        </p:nvPicPr>
+        <p:blipFill>
+          <a:blip r:embed="rId2"/>
+          <a:stretch>
+            <a:fillRect/>
+          </a:stretch>
+        </p:blipFill>
+        <p:spPr>
+          <a:xfrm>
+            <a:off x="2563881" y="459542"/>
+            <a:ext cx="7666667" cy="4838095"/>
+          </a:xfrm>
+          <a:prstGeom prst="rect">
+            <a:avLst/>
+          </a:prstGeom>
+          <a:ln w="9525">
+            <a:solidFill>
+              <a:schemeClr val="tx1"/>
+            </a:solidFill>
+          </a:ln>
+        </p:spPr>
+      </p:pic>
+      <p:sp>
+        <p:nvSpPr>
+          <p:cNvPr id="6" name="TextBox 5">
+            <a:extLst>
+              <a:ext uri="{FF2B5EF4-FFF2-40B4-BE49-F238E27FC236}">
+                <a16:creationId xmlns:a16="http://schemas.microsoft.com/office/drawing/2014/main" id="{57BF9608-9111-493B-2D49-75AEDED8F378}"/>
+              </a:ext>
+            </a:extLst>
+          </p:cNvPr>
+          <p:cNvSpPr txBox="1"/>
+          <p:nvPr/>
+        </p:nvSpPr>
+        <p:spPr>
+          <a:xfrm>
+            <a:off x="519929" y="3943212"/>
+            <a:ext cx="1792964" cy="1200329"/>
+          </a:xfrm>
+          <a:prstGeom prst="rect">
+            <a:avLst/>
+          </a:prstGeom>
+          <a:solidFill>
+            <a:schemeClr val="bg1">
+              <a:lumMod val="95000"/>
+            </a:schemeClr>
+          </a:solidFill>
+          <a:ln w="6350">
+            <a:solidFill>
+              <a:schemeClr val="tx1"/>
+            </a:solidFill>
+          </a:ln>
+        </p:spPr>
+        <p:txBody>
+          <a:bodyPr wrap="square" rtlCol="0">
+            <a:spAutoFit/>
+          </a:bodyPr>
+          <a:lstStyle/>
+          <a:p>
+            <a:r>
+              <a:rPr lang="en-US" sz="1200" b="1" dirty="0"/>
+              <a:t>Step 1 : In physical world simulator, train triggered the junction entrance sensor, PLC contact input changes the register’s state</a:t>
+            </a:r>
+          </a:p>
+        </p:txBody>
+      </p:sp>
+      <p:cxnSp>
+        <p:nvCxnSpPr>
+          <p:cNvPr id="7" name="Connector: Elbow 6">
+            <a:extLst>
+              <a:ext uri="{FF2B5EF4-FFF2-40B4-BE49-F238E27FC236}">
+                <a16:creationId xmlns:a16="http://schemas.microsoft.com/office/drawing/2014/main" id="{99FDFA51-D14E-A947-0A09-54D40A7FDB5F}"/>
+              </a:ext>
+            </a:extLst>
+          </p:cNvPr>
+          <p:cNvCxnSpPr>
+            <a:cxnSpLocks/>
+          </p:cNvCxnSpPr>
+          <p:nvPr/>
+        </p:nvCxnSpPr>
+        <p:spPr>
+          <a:xfrm flipV="1">
+            <a:off x="2312893" y="4033605"/>
+            <a:ext cx="2969110" cy="509601"/>
+          </a:xfrm>
+          <a:prstGeom prst="bentConnector3">
+            <a:avLst>
+              <a:gd name="adj1" fmla="val 50000"/>
+            </a:avLst>
+          </a:prstGeom>
+          <a:ln>
+            <a:solidFill>
+              <a:schemeClr val="tx2">
+                <a:lumMod val="75000"/>
+                <a:lumOff val="25000"/>
+              </a:schemeClr>
+            </a:solidFill>
+            <a:prstDash val="sysDash"/>
+            <a:tailEnd type="triangle"/>
+          </a:ln>
+        </p:spPr>
+        <p:style>
+          <a:lnRef idx="2">
+            <a:schemeClr val="accent1"/>
+          </a:lnRef>
+          <a:fillRef idx="0">
+            <a:schemeClr val="accent1"/>
+          </a:fillRef>
+          <a:effectRef idx="1">
+            <a:schemeClr val="accent1"/>
+          </a:effectRef>
+          <a:fontRef idx="minor">
+            <a:schemeClr val="tx1"/>
+          </a:fontRef>
+        </p:style>
+      </p:cxnSp>
+      <p:sp>
+        <p:nvSpPr>
+          <p:cNvPr id="12" name="Oval 11">
+            <a:extLst>
+              <a:ext uri="{FF2B5EF4-FFF2-40B4-BE49-F238E27FC236}">
+                <a16:creationId xmlns:a16="http://schemas.microsoft.com/office/drawing/2014/main" id="{0D233742-2728-C06D-68F4-D9E36781BE84}"/>
+              </a:ext>
+            </a:extLst>
+          </p:cNvPr>
+          <p:cNvSpPr/>
+          <p:nvPr/>
+        </p:nvSpPr>
+        <p:spPr>
+          <a:xfrm>
+            <a:off x="5001985" y="3819478"/>
+            <a:ext cx="198642" cy="214127"/>
+          </a:xfrm>
+          <a:prstGeom prst="ellipse">
+            <a:avLst/>
+          </a:prstGeom>
+          <a:solidFill>
+            <a:srgbClr val="FFC000"/>
+          </a:solidFill>
+        </p:spPr>
+        <p:style>
+          <a:lnRef idx="2">
+            <a:schemeClr val="accent1">
+              <a:shade val="15000"/>
+            </a:schemeClr>
+          </a:lnRef>
+          <a:fillRef idx="1">
+            <a:schemeClr val="accent1"/>
+          </a:fillRef>
+          <a:effectRef idx="0">
+            <a:schemeClr val="accent1"/>
+          </a:effectRef>
+          <a:fontRef idx="minor">
+            <a:schemeClr val="lt1"/>
+          </a:fontRef>
+        </p:style>
+        <p:txBody>
+          <a:bodyPr rtlCol="0" anchor="ctr"/>
+          <a:lstStyle/>
+          <a:p>
+            <a:pPr algn="ctr"/>
+            <a:r>
+              <a:rPr lang="en-SG" sz="1600" b="1" dirty="0">
+                <a:solidFill>
+                  <a:srgbClr val="C00000"/>
+                </a:solidFill>
+              </a:rPr>
+              <a:t>1</a:t>
+            </a:r>
+          </a:p>
+        </p:txBody>
+      </p:sp>
+      <p:cxnSp>
+        <p:nvCxnSpPr>
+          <p:cNvPr id="13" name="Connector: Elbow 12">
+            <a:extLst>
+              <a:ext uri="{FF2B5EF4-FFF2-40B4-BE49-F238E27FC236}">
+                <a16:creationId xmlns:a16="http://schemas.microsoft.com/office/drawing/2014/main" id="{1C0C31CB-8777-80B5-5CAD-D955BE63084F}"/>
+              </a:ext>
+            </a:extLst>
+          </p:cNvPr>
+          <p:cNvCxnSpPr>
+            <a:cxnSpLocks/>
+            <a:stCxn id="18" idx="2"/>
+            <a:endCxn id="20" idx="0"/>
+          </p:cNvCxnSpPr>
+          <p:nvPr/>
+        </p:nvCxnSpPr>
+        <p:spPr>
+          <a:xfrm rot="16200000" flipV="1">
+            <a:off x="3603139" y="2053865"/>
+            <a:ext cx="1744083" cy="2022437"/>
+          </a:xfrm>
+          <a:prstGeom prst="bentConnector3">
+            <a:avLst>
+              <a:gd name="adj1" fmla="val 50000"/>
+            </a:avLst>
+          </a:prstGeom>
+          <a:ln>
+            <a:solidFill>
+              <a:schemeClr val="tx2">
+                <a:lumMod val="75000"/>
+                <a:lumOff val="25000"/>
+              </a:schemeClr>
+            </a:solidFill>
+            <a:prstDash val="sysDash"/>
+            <a:tailEnd type="triangle"/>
+          </a:ln>
+        </p:spPr>
+        <p:style>
+          <a:lnRef idx="2">
+            <a:schemeClr val="accent1"/>
+          </a:lnRef>
+          <a:fillRef idx="0">
+            <a:schemeClr val="accent1"/>
+          </a:fillRef>
+          <a:effectRef idx="1">
+            <a:schemeClr val="accent1"/>
+          </a:effectRef>
+          <a:fontRef idx="minor">
+            <a:schemeClr val="tx1"/>
+          </a:fontRef>
+        </p:style>
+      </p:cxnSp>
+      <p:sp>
+        <p:nvSpPr>
+          <p:cNvPr id="18" name="Rectangle 17">
+            <a:extLst>
+              <a:ext uri="{FF2B5EF4-FFF2-40B4-BE49-F238E27FC236}">
+                <a16:creationId xmlns:a16="http://schemas.microsoft.com/office/drawing/2014/main" id="{17709860-777B-30BD-37E1-93C7E4C604F8}"/>
+              </a:ext>
+            </a:extLst>
+          </p:cNvPr>
+          <p:cNvSpPr/>
+          <p:nvPr/>
+        </p:nvSpPr>
+        <p:spPr>
+          <a:xfrm flipH="1" flipV="1">
+            <a:off x="5282003" y="3937125"/>
+            <a:ext cx="408791" cy="193302"/>
+          </a:xfrm>
+          <a:prstGeom prst="rect">
+            <a:avLst/>
+          </a:prstGeom>
+          <a:noFill/>
+          <a:ln>
+            <a:solidFill>
+              <a:srgbClr val="00B0F0"/>
+            </a:solidFill>
+            <a:prstDash val="sysDash"/>
+          </a:ln>
+        </p:spPr>
+        <p:style>
+          <a:lnRef idx="2">
+            <a:schemeClr val="accent1">
+              <a:shade val="15000"/>
+            </a:schemeClr>
+          </a:lnRef>
+          <a:fillRef idx="1">
+            <a:schemeClr val="accent1"/>
+          </a:fillRef>
+          <a:effectRef idx="0">
+            <a:schemeClr val="accent1"/>
+          </a:effectRef>
+          <a:fontRef idx="minor">
+            <a:schemeClr val="lt1"/>
+          </a:fontRef>
+        </p:style>
+        <p:txBody>
+          <a:bodyPr rtlCol="0" anchor="ctr"/>
+          <a:lstStyle/>
+          <a:p>
+            <a:pPr algn="ctr"/>
+            <a:endParaRPr lang="en-SG" dirty="0"/>
+          </a:p>
+        </p:txBody>
+      </p:sp>
+      <p:sp>
+        <p:nvSpPr>
+          <p:cNvPr id="20" name="Rectangle 19">
+            <a:extLst>
+              <a:ext uri="{FF2B5EF4-FFF2-40B4-BE49-F238E27FC236}">
+                <a16:creationId xmlns:a16="http://schemas.microsoft.com/office/drawing/2014/main" id="{5A736F91-F84E-FB48-D845-0CA675F5FA95}"/>
+              </a:ext>
+            </a:extLst>
+          </p:cNvPr>
+          <p:cNvSpPr/>
+          <p:nvPr/>
+        </p:nvSpPr>
+        <p:spPr>
+          <a:xfrm flipH="1" flipV="1">
+            <a:off x="3259566" y="1999740"/>
+            <a:ext cx="408791" cy="193302"/>
+          </a:xfrm>
+          <a:prstGeom prst="rect">
+            <a:avLst/>
+          </a:prstGeom>
+          <a:noFill/>
+          <a:ln>
+            <a:solidFill>
+              <a:srgbClr val="00B0F0"/>
+            </a:solidFill>
+            <a:prstDash val="sysDash"/>
+          </a:ln>
+        </p:spPr>
+        <p:style>
+          <a:lnRef idx="2">
+            <a:schemeClr val="accent1">
+              <a:shade val="15000"/>
+            </a:schemeClr>
+          </a:lnRef>
+          <a:fillRef idx="1">
+            <a:schemeClr val="accent1"/>
+          </a:fillRef>
+          <a:effectRef idx="0">
+            <a:schemeClr val="accent1"/>
+          </a:effectRef>
+          <a:fontRef idx="minor">
+            <a:schemeClr val="lt1"/>
+          </a:fontRef>
+        </p:style>
+        <p:txBody>
+          <a:bodyPr rtlCol="0" anchor="ctr"/>
+          <a:lstStyle/>
+          <a:p>
+            <a:pPr algn="ctr"/>
+            <a:endParaRPr lang="en-SG" dirty="0"/>
+          </a:p>
+        </p:txBody>
+      </p:sp>
+      <p:sp>
+        <p:nvSpPr>
+          <p:cNvPr id="22" name="Oval 21">
+            <a:extLst>
+              <a:ext uri="{FF2B5EF4-FFF2-40B4-BE49-F238E27FC236}">
+                <a16:creationId xmlns:a16="http://schemas.microsoft.com/office/drawing/2014/main" id="{6D330087-286E-DC02-1E55-3D4D04F5324C}"/>
+              </a:ext>
+            </a:extLst>
+          </p:cNvPr>
+          <p:cNvSpPr/>
+          <p:nvPr/>
+        </p:nvSpPr>
+        <p:spPr>
+          <a:xfrm>
+            <a:off x="5408593" y="3371946"/>
+            <a:ext cx="198642" cy="214127"/>
+          </a:xfrm>
+          <a:prstGeom prst="ellipse">
+            <a:avLst/>
+          </a:prstGeom>
+          <a:solidFill>
+            <a:srgbClr val="FFC000"/>
+          </a:solidFill>
+        </p:spPr>
+        <p:style>
+          <a:lnRef idx="2">
+            <a:schemeClr val="accent1">
+              <a:shade val="15000"/>
+            </a:schemeClr>
+          </a:lnRef>
+          <a:fillRef idx="1">
+            <a:schemeClr val="accent1"/>
+          </a:fillRef>
+          <a:effectRef idx="0">
+            <a:schemeClr val="accent1"/>
+          </a:effectRef>
+          <a:fontRef idx="minor">
+            <a:schemeClr val="lt1"/>
+          </a:fontRef>
+        </p:style>
+        <p:txBody>
+          <a:bodyPr rtlCol="0" anchor="ctr"/>
+          <a:lstStyle/>
+          <a:p>
+            <a:pPr algn="ctr"/>
+            <a:r>
+              <a:rPr lang="en-SG" sz="1600" b="1" dirty="0">
+                <a:solidFill>
+                  <a:srgbClr val="C00000"/>
+                </a:solidFill>
+              </a:rPr>
+              <a:t>2</a:t>
+            </a:r>
+          </a:p>
+        </p:txBody>
+      </p:sp>
+      <p:sp>
+        <p:nvSpPr>
+          <p:cNvPr id="23" name="TextBox 22">
+            <a:extLst>
+              <a:ext uri="{FF2B5EF4-FFF2-40B4-BE49-F238E27FC236}">
+                <a16:creationId xmlns:a16="http://schemas.microsoft.com/office/drawing/2014/main" id="{7D8FE0FF-FBC0-F0FA-AA5E-DB013E87F656}"/>
+              </a:ext>
+            </a:extLst>
+          </p:cNvPr>
+          <p:cNvSpPr txBox="1"/>
+          <p:nvPr/>
+        </p:nvSpPr>
+        <p:spPr>
+          <a:xfrm>
+            <a:off x="519928" y="2096391"/>
+            <a:ext cx="1839557" cy="1015663"/>
+          </a:xfrm>
+          <a:prstGeom prst="rect">
+            <a:avLst/>
+          </a:prstGeom>
+          <a:solidFill>
+            <a:schemeClr val="bg1">
+              <a:lumMod val="95000"/>
+            </a:schemeClr>
+          </a:solidFill>
+          <a:ln w="6350">
+            <a:solidFill>
+              <a:schemeClr val="tx1"/>
+            </a:solidFill>
+          </a:ln>
+        </p:spPr>
+        <p:txBody>
+          <a:bodyPr wrap="square" rtlCol="0">
+            <a:spAutoFit/>
+          </a:bodyPr>
+          <a:lstStyle/>
+          <a:p>
+            <a:r>
+              <a:rPr lang="en-US" sz="1200" b="1" dirty="0"/>
+              <a:t>Step 2: In the Sensor-Signal Relationship Diagram,  the sensor will show triggered state (yellow color)</a:t>
+            </a:r>
+          </a:p>
+        </p:txBody>
+      </p:sp>
+      <p:cxnSp>
+        <p:nvCxnSpPr>
+          <p:cNvPr id="24" name="Straight Arrow Connector 23">
+            <a:extLst>
+              <a:ext uri="{FF2B5EF4-FFF2-40B4-BE49-F238E27FC236}">
+                <a16:creationId xmlns:a16="http://schemas.microsoft.com/office/drawing/2014/main" id="{B03C640A-E1F1-A584-A89E-886BF0E19AC0}"/>
+              </a:ext>
+            </a:extLst>
+          </p:cNvPr>
+          <p:cNvCxnSpPr>
+            <a:cxnSpLocks/>
+          </p:cNvCxnSpPr>
+          <p:nvPr/>
+        </p:nvCxnSpPr>
+        <p:spPr>
+          <a:xfrm>
+            <a:off x="2359486" y="2498069"/>
+            <a:ext cx="1104476" cy="0"/>
+          </a:xfrm>
+          <a:prstGeom prst="straightConnector1">
+            <a:avLst/>
+          </a:prstGeom>
+          <a:ln w="19050">
+            <a:solidFill>
+              <a:schemeClr val="tx2">
+                <a:lumMod val="50000"/>
+                <a:lumOff val="50000"/>
+              </a:schemeClr>
+            </a:solidFill>
+            <a:prstDash val="sysDash"/>
+            <a:tailEnd type="triangle"/>
+          </a:ln>
+        </p:spPr>
+        <p:style>
+          <a:lnRef idx="1">
+            <a:schemeClr val="accent5"/>
+          </a:lnRef>
+          <a:fillRef idx="0">
+            <a:schemeClr val="accent5"/>
+          </a:fillRef>
+          <a:effectRef idx="0">
+            <a:schemeClr val="accent5"/>
+          </a:effectRef>
+          <a:fontRef idx="minor">
+            <a:schemeClr val="tx1"/>
+          </a:fontRef>
+        </p:style>
+      </p:cxnSp>
+      <p:sp>
+        <p:nvSpPr>
+          <p:cNvPr id="32" name="Oval 31">
+            <a:extLst>
+              <a:ext uri="{FF2B5EF4-FFF2-40B4-BE49-F238E27FC236}">
+                <a16:creationId xmlns:a16="http://schemas.microsoft.com/office/drawing/2014/main" id="{AC9EE3B7-302F-2A1C-991F-FD532CCD9DC9}"/>
+              </a:ext>
+            </a:extLst>
+          </p:cNvPr>
+          <p:cNvSpPr/>
+          <p:nvPr/>
+        </p:nvSpPr>
+        <p:spPr>
+          <a:xfrm>
+            <a:off x="3569036" y="818964"/>
+            <a:ext cx="198642" cy="214127"/>
+          </a:xfrm>
+          <a:prstGeom prst="ellipse">
+            <a:avLst/>
+          </a:prstGeom>
+          <a:solidFill>
+            <a:srgbClr val="FFC000"/>
+          </a:solidFill>
+        </p:spPr>
+        <p:style>
+          <a:lnRef idx="2">
+            <a:schemeClr val="accent1">
+              <a:shade val="15000"/>
+            </a:schemeClr>
+          </a:lnRef>
+          <a:fillRef idx="1">
+            <a:schemeClr val="accent1"/>
+          </a:fillRef>
+          <a:effectRef idx="0">
+            <a:schemeClr val="accent1"/>
+          </a:effectRef>
+          <a:fontRef idx="minor">
+            <a:schemeClr val="lt1"/>
+          </a:fontRef>
+        </p:style>
+        <p:txBody>
+          <a:bodyPr rtlCol="0" anchor="ctr"/>
+          <a:lstStyle/>
+          <a:p>
+            <a:pPr algn="ctr"/>
+            <a:r>
+              <a:rPr lang="en-SG" sz="1600" b="1" dirty="0">
+                <a:solidFill>
+                  <a:srgbClr val="C00000"/>
+                </a:solidFill>
+              </a:rPr>
+              <a:t>3</a:t>
+            </a:r>
+          </a:p>
+        </p:txBody>
+      </p:sp>
+      <p:cxnSp>
+        <p:nvCxnSpPr>
+          <p:cNvPr id="33" name="Straight Arrow Connector 32">
+            <a:extLst>
+              <a:ext uri="{FF2B5EF4-FFF2-40B4-BE49-F238E27FC236}">
+                <a16:creationId xmlns:a16="http://schemas.microsoft.com/office/drawing/2014/main" id="{AE9F22B8-30A3-2BC1-0B46-4BC68407BC88}"/>
+              </a:ext>
+            </a:extLst>
+          </p:cNvPr>
+          <p:cNvCxnSpPr>
+            <a:cxnSpLocks/>
+          </p:cNvCxnSpPr>
+          <p:nvPr/>
+        </p:nvCxnSpPr>
+        <p:spPr>
+          <a:xfrm>
+            <a:off x="2441986" y="818964"/>
+            <a:ext cx="1226371" cy="0"/>
+          </a:xfrm>
+          <a:prstGeom prst="straightConnector1">
+            <a:avLst/>
+          </a:prstGeom>
+          <a:ln w="19050">
+            <a:solidFill>
+              <a:schemeClr val="tx2">
+                <a:lumMod val="50000"/>
+                <a:lumOff val="50000"/>
+              </a:schemeClr>
+            </a:solidFill>
+            <a:prstDash val="sysDash"/>
+            <a:tailEnd type="triangle"/>
+          </a:ln>
+        </p:spPr>
+        <p:style>
+          <a:lnRef idx="1">
+            <a:schemeClr val="accent5"/>
+          </a:lnRef>
+          <a:fillRef idx="0">
+            <a:schemeClr val="accent5"/>
+          </a:fillRef>
+          <a:effectRef idx="0">
+            <a:schemeClr val="accent5"/>
+          </a:effectRef>
+          <a:fontRef idx="minor">
+            <a:schemeClr val="tx1"/>
+          </a:fontRef>
+        </p:style>
+      </p:cxnSp>
+      <p:sp>
+        <p:nvSpPr>
+          <p:cNvPr id="35" name="TextBox 34">
+            <a:extLst>
+              <a:ext uri="{FF2B5EF4-FFF2-40B4-BE49-F238E27FC236}">
+                <a16:creationId xmlns:a16="http://schemas.microsoft.com/office/drawing/2014/main" id="{FE4B31D1-2A3A-79EC-B29F-DA7DA85817AF}"/>
+              </a:ext>
+            </a:extLst>
+          </p:cNvPr>
+          <p:cNvSpPr txBox="1"/>
+          <p:nvPr/>
+        </p:nvSpPr>
+        <p:spPr>
+          <a:xfrm>
+            <a:off x="595231" y="562089"/>
+            <a:ext cx="1792965" cy="830997"/>
+          </a:xfrm>
+          <a:prstGeom prst="rect">
+            <a:avLst/>
+          </a:prstGeom>
+          <a:solidFill>
+            <a:schemeClr val="bg1">
+              <a:lumMod val="95000"/>
+            </a:schemeClr>
+          </a:solidFill>
+          <a:ln w="6350">
+            <a:solidFill>
+              <a:schemeClr val="tx1"/>
+            </a:solidFill>
+          </a:ln>
+        </p:spPr>
+        <p:txBody>
+          <a:bodyPr wrap="square" rtlCol="0">
+            <a:spAutoFit/>
+          </a:bodyPr>
+          <a:lstStyle/>
+          <a:p>
+            <a:r>
+              <a:rPr lang="en-US" sz="1200" b="1" dirty="0"/>
+              <a:t>Step 3: HMI execute the ladder logic, calculate change the coil sate [Signal Red]</a:t>
+            </a:r>
+          </a:p>
+        </p:txBody>
+      </p:sp>
+      <p:cxnSp>
+        <p:nvCxnSpPr>
+          <p:cNvPr id="36" name="Straight Arrow Connector 35">
+            <a:extLst>
+              <a:ext uri="{FF2B5EF4-FFF2-40B4-BE49-F238E27FC236}">
+                <a16:creationId xmlns:a16="http://schemas.microsoft.com/office/drawing/2014/main" id="{C52111CD-715F-AF75-0BAB-8C0A02DE9DD2}"/>
+              </a:ext>
+            </a:extLst>
+          </p:cNvPr>
+          <p:cNvCxnSpPr>
+            <a:cxnSpLocks/>
+          </p:cNvCxnSpPr>
+          <p:nvPr/>
+        </p:nvCxnSpPr>
+        <p:spPr>
+          <a:xfrm flipV="1">
+            <a:off x="6736448" y="4704682"/>
+            <a:ext cx="0" cy="727930"/>
+          </a:xfrm>
+          <a:prstGeom prst="straightConnector1">
+            <a:avLst/>
+          </a:prstGeom>
+          <a:ln w="19050">
+            <a:solidFill>
+              <a:schemeClr val="tx2">
+                <a:lumMod val="50000"/>
+                <a:lumOff val="50000"/>
+              </a:schemeClr>
+            </a:solidFill>
+            <a:prstDash val="sysDash"/>
+            <a:tailEnd type="triangle"/>
+          </a:ln>
+        </p:spPr>
+        <p:style>
+          <a:lnRef idx="1">
+            <a:schemeClr val="accent5"/>
+          </a:lnRef>
+          <a:fillRef idx="0">
+            <a:schemeClr val="accent5"/>
+          </a:fillRef>
+          <a:effectRef idx="0">
+            <a:schemeClr val="accent5"/>
+          </a:effectRef>
+          <a:fontRef idx="minor">
+            <a:schemeClr val="tx1"/>
+          </a:fontRef>
+        </p:style>
+      </p:cxnSp>
+      <p:cxnSp>
+        <p:nvCxnSpPr>
+          <p:cNvPr id="37" name="Connector: Elbow 36">
+            <a:extLst>
+              <a:ext uri="{FF2B5EF4-FFF2-40B4-BE49-F238E27FC236}">
+                <a16:creationId xmlns:a16="http://schemas.microsoft.com/office/drawing/2014/main" id="{09F87E1E-0CCF-8FA3-54FC-37B3F1A45F4A}"/>
+              </a:ext>
+            </a:extLst>
+          </p:cNvPr>
+          <p:cNvCxnSpPr>
+            <a:cxnSpLocks/>
+            <a:stCxn id="32" idx="6"/>
+            <a:endCxn id="39" idx="2"/>
+          </p:cNvCxnSpPr>
+          <p:nvPr/>
+        </p:nvCxnSpPr>
+        <p:spPr>
+          <a:xfrm>
+            <a:off x="3767678" y="926028"/>
+            <a:ext cx="3228558" cy="3520591"/>
+          </a:xfrm>
+          <a:prstGeom prst="bentConnector2">
+            <a:avLst/>
+          </a:prstGeom>
+          <a:ln>
+            <a:solidFill>
+              <a:schemeClr val="tx2">
+                <a:lumMod val="50000"/>
+                <a:lumOff val="50000"/>
+              </a:schemeClr>
+            </a:solidFill>
+            <a:prstDash val="sysDash"/>
+            <a:tailEnd type="triangle"/>
+          </a:ln>
+        </p:spPr>
+        <p:style>
+          <a:lnRef idx="2">
+            <a:schemeClr val="accent1"/>
+          </a:lnRef>
+          <a:fillRef idx="0">
+            <a:schemeClr val="accent1"/>
+          </a:fillRef>
+          <a:effectRef idx="1">
+            <a:schemeClr val="accent1"/>
+          </a:effectRef>
+          <a:fontRef idx="minor">
+            <a:schemeClr val="tx1"/>
+          </a:fontRef>
+        </p:style>
+      </p:cxnSp>
+      <p:sp>
+        <p:nvSpPr>
+          <p:cNvPr id="39" name="Rectangle 38">
+            <a:extLst>
+              <a:ext uri="{FF2B5EF4-FFF2-40B4-BE49-F238E27FC236}">
+                <a16:creationId xmlns:a16="http://schemas.microsoft.com/office/drawing/2014/main" id="{6BB5019A-C65E-BFE4-C29F-E023FB7547E2}"/>
+              </a:ext>
+            </a:extLst>
+          </p:cNvPr>
+          <p:cNvSpPr/>
+          <p:nvPr/>
+        </p:nvSpPr>
+        <p:spPr>
+          <a:xfrm flipH="1" flipV="1">
+            <a:off x="6719231" y="4446619"/>
+            <a:ext cx="554011" cy="258063"/>
+          </a:xfrm>
+          <a:prstGeom prst="rect">
+            <a:avLst/>
+          </a:prstGeom>
+          <a:noFill/>
+          <a:ln>
+            <a:solidFill>
+              <a:srgbClr val="00B0F0"/>
+            </a:solidFill>
+            <a:prstDash val="sysDash"/>
+          </a:ln>
+        </p:spPr>
+        <p:style>
+          <a:lnRef idx="2">
+            <a:schemeClr val="accent1">
+              <a:shade val="15000"/>
+            </a:schemeClr>
+          </a:lnRef>
+          <a:fillRef idx="1">
+            <a:schemeClr val="accent1"/>
+          </a:fillRef>
+          <a:effectRef idx="0">
+            <a:schemeClr val="accent1"/>
+          </a:effectRef>
+          <a:fontRef idx="minor">
+            <a:schemeClr val="lt1"/>
+          </a:fontRef>
+        </p:style>
+        <p:txBody>
+          <a:bodyPr rtlCol="0" anchor="ctr"/>
+          <a:lstStyle/>
+          <a:p>
+            <a:pPr algn="ctr"/>
+            <a:endParaRPr lang="en-SG" dirty="0"/>
+          </a:p>
+        </p:txBody>
+      </p:sp>
+      <p:sp>
+        <p:nvSpPr>
+          <p:cNvPr id="45" name="Oval 44">
+            <a:extLst>
+              <a:ext uri="{FF2B5EF4-FFF2-40B4-BE49-F238E27FC236}">
+                <a16:creationId xmlns:a16="http://schemas.microsoft.com/office/drawing/2014/main" id="{A44B1DE3-664C-8965-1432-6564FA1FCA18}"/>
+              </a:ext>
+            </a:extLst>
+          </p:cNvPr>
+          <p:cNvSpPr/>
+          <p:nvPr/>
+        </p:nvSpPr>
+        <p:spPr>
+          <a:xfrm>
+            <a:off x="6896915" y="1332627"/>
+            <a:ext cx="198642" cy="214127"/>
+          </a:xfrm>
+          <a:prstGeom prst="ellipse">
+            <a:avLst/>
+          </a:prstGeom>
+          <a:solidFill>
+            <a:srgbClr val="FFC000"/>
+          </a:solidFill>
+        </p:spPr>
+        <p:style>
+          <a:lnRef idx="2">
+            <a:schemeClr val="accent1">
+              <a:shade val="15000"/>
+            </a:schemeClr>
+          </a:lnRef>
+          <a:fillRef idx="1">
+            <a:schemeClr val="accent1"/>
+          </a:fillRef>
+          <a:effectRef idx="0">
+            <a:schemeClr val="accent1"/>
+          </a:effectRef>
+          <a:fontRef idx="minor">
+            <a:schemeClr val="lt1"/>
+          </a:fontRef>
+        </p:style>
+        <p:txBody>
+          <a:bodyPr rtlCol="0" anchor="ctr"/>
+          <a:lstStyle/>
+          <a:p>
+            <a:pPr algn="ctr"/>
+            <a:r>
+              <a:rPr lang="en-SG" sz="1600" b="1" dirty="0">
+                <a:solidFill>
+                  <a:srgbClr val="C00000"/>
+                </a:solidFill>
+              </a:rPr>
+              <a:t>4</a:t>
+            </a:r>
+          </a:p>
+        </p:txBody>
+      </p:sp>
+      <p:sp>
+        <p:nvSpPr>
+          <p:cNvPr id="49" name="TextBox 48">
+            <a:extLst>
+              <a:ext uri="{FF2B5EF4-FFF2-40B4-BE49-F238E27FC236}">
+                <a16:creationId xmlns:a16="http://schemas.microsoft.com/office/drawing/2014/main" id="{5728E22B-CF0F-F552-BF0D-A1F89EB7199E}"/>
+              </a:ext>
+            </a:extLst>
+          </p:cNvPr>
+          <p:cNvSpPr txBox="1"/>
+          <p:nvPr/>
+        </p:nvSpPr>
+        <p:spPr>
+          <a:xfrm>
+            <a:off x="5001985" y="5426217"/>
+            <a:ext cx="5696731" cy="461665"/>
+          </a:xfrm>
+          <a:prstGeom prst="rect">
+            <a:avLst/>
+          </a:prstGeom>
+          <a:noFill/>
+        </p:spPr>
+        <p:txBody>
+          <a:bodyPr wrap="square" rtlCol="0">
+            <a:spAutoFit/>
+          </a:bodyPr>
+          <a:lstStyle/>
+          <a:p>
+            <a:r>
+              <a:rPr lang="en-US" sz="1200" b="1" dirty="0">
+                <a:solidFill>
+                  <a:srgbClr val="C00000"/>
+                </a:solidFill>
+              </a:rPr>
+              <a:t>Step 4: Compare the S-CC-0 Signal state (calculated ) with the PLC Display Panel Scc00 (fetch from PLC directly), if same, verification pass, raise alert.  </a:t>
+            </a:r>
+            <a:endParaRPr lang="en-SG" sz="1200" b="1" dirty="0">
+              <a:solidFill>
+                <a:srgbClr val="C00000"/>
+              </a:solidFill>
+            </a:endParaRPr>
+          </a:p>
+        </p:txBody>
+      </p:sp>
+    </p:spTree>
+    <p:extLst>
+      <p:ext uri="{BB962C8B-B14F-4D97-AF65-F5344CB8AC3E}">
+        <p14:creationId xmlns:p14="http://schemas.microsoft.com/office/powerpoint/2010/main" val="243900536"/>
+      </p:ext>
+    </p:extLst>
+  </p:cSld>
+  <p:clrMapOvr>
+    <a:masterClrMapping/>
+  </p:clrMapOvr>
+</p:sld>
+</file>
+
+<file path=ppt/slides/slide9.xml><?xml version="1.0" encoding="utf-8"?>
+<p:sld xmlns:a="http://schemas.openxmlformats.org/drawingml/2006/main" xmlns:r="http://schemas.openxmlformats.org/officeDocument/2006/relationships" xmlns:p="http://schemas.openxmlformats.org/presentationml/2006/main">
+  <p:cSld>
+    <p:spTree>
+      <p:nvGrpSpPr>
+        <p:cNvPr id="1" name=""/>
+        <p:cNvGrpSpPr/>
+        <p:nvPr/>
+      </p:nvGrpSpPr>
+      <p:grpSpPr>
+        <a:xfrm>
+          <a:off x="0" y="0"/>
+          <a:ext cx="0" cy="0"/>
+          <a:chOff x="0" y="0"/>
+          <a:chExt cx="0" cy="0"/>
+        </a:xfrm>
+      </p:grpSpPr>
+      <p:pic>
+        <p:nvPicPr>
+          <p:cNvPr id="5" name="Picture 4">
+            <a:extLst>
+              <a:ext uri="{FF2B5EF4-FFF2-40B4-BE49-F238E27FC236}">
+                <a16:creationId xmlns:a16="http://schemas.microsoft.com/office/drawing/2014/main" id="{A056994F-6AF7-F589-0AB5-0C1DF9E350FB}"/>
+              </a:ext>
+            </a:extLst>
+          </p:cNvPr>
+          <p:cNvPicPr>
+            <a:picLocks noChangeAspect="1"/>
+          </p:cNvPicPr>
+          <p:nvPr/>
+        </p:nvPicPr>
+        <p:blipFill>
+          <a:blip r:embed="rId2"/>
+          <a:stretch>
+            <a:fillRect/>
+          </a:stretch>
+        </p:blipFill>
+        <p:spPr>
+          <a:xfrm>
+            <a:off x="7846939" y="1202932"/>
+            <a:ext cx="2685714" cy="2019048"/>
+          </a:xfrm>
+          <a:prstGeom prst="rect">
+            <a:avLst/>
+          </a:prstGeom>
+        </p:spPr>
+      </p:pic>
+      <p:pic>
+        <p:nvPicPr>
+          <p:cNvPr id="6" name="Picture 5">
+            <a:extLst>
+              <a:ext uri="{FF2B5EF4-FFF2-40B4-BE49-F238E27FC236}">
+                <a16:creationId xmlns:a16="http://schemas.microsoft.com/office/drawing/2014/main" id="{9667201D-81FC-C688-7D2A-74323DFCF26D}"/>
+              </a:ext>
+            </a:extLst>
+          </p:cNvPr>
+          <p:cNvPicPr>
+            <a:picLocks noChangeAspect="1"/>
+          </p:cNvPicPr>
+          <p:nvPr/>
+        </p:nvPicPr>
+        <p:blipFill>
+          <a:blip r:embed="rId3">
+            <a:extLst>
+              <a:ext uri="{28A0092B-C50C-407E-A947-70E740481C1C}">
+                <a14:useLocalDpi xmlns:a14="http://schemas.microsoft.com/office/drawing/2010/main" val="0"/>
+              </a:ext>
+            </a:extLst>
+          </a:blip>
+          <a:stretch>
+            <a:fillRect/>
+          </a:stretch>
+        </p:blipFill>
+        <p:spPr>
+          <a:xfrm>
+            <a:off x="8097939" y="1545868"/>
+            <a:ext cx="481382" cy="154044"/>
+          </a:xfrm>
+          <a:prstGeom prst="rect">
+            <a:avLst/>
+          </a:prstGeom>
+        </p:spPr>
+      </p:pic>
+      <p:pic>
+        <p:nvPicPr>
+          <p:cNvPr id="8" name="Picture 7">
+            <a:extLst>
+              <a:ext uri="{FF2B5EF4-FFF2-40B4-BE49-F238E27FC236}">
+                <a16:creationId xmlns:a16="http://schemas.microsoft.com/office/drawing/2014/main" id="{6DDDB903-30AC-4C99-31B5-47FB37089009}"/>
+              </a:ext>
+            </a:extLst>
+          </p:cNvPr>
+          <p:cNvPicPr>
+            <a:picLocks noChangeAspect="1"/>
+          </p:cNvPicPr>
+          <p:nvPr/>
+        </p:nvPicPr>
+        <p:blipFill>
+          <a:blip r:embed="rId4"/>
+          <a:stretch>
+            <a:fillRect/>
+          </a:stretch>
+        </p:blipFill>
+        <p:spPr>
+          <a:xfrm>
+            <a:off x="2398700" y="1207010"/>
+            <a:ext cx="5171429" cy="3885714"/>
+          </a:xfrm>
+          <a:prstGeom prst="rect">
+            <a:avLst/>
+          </a:prstGeom>
+        </p:spPr>
+      </p:pic>
+      <p:sp>
+        <p:nvSpPr>
+          <p:cNvPr id="10" name="Oval 9">
+            <a:extLst>
+              <a:ext uri="{FF2B5EF4-FFF2-40B4-BE49-F238E27FC236}">
+                <a16:creationId xmlns:a16="http://schemas.microsoft.com/office/drawing/2014/main" id="{03B1C224-D721-9062-2E02-84214B7496A0}"/>
+              </a:ext>
+            </a:extLst>
+          </p:cNvPr>
+          <p:cNvSpPr/>
+          <p:nvPr/>
+        </p:nvSpPr>
+        <p:spPr>
+          <a:xfrm>
+            <a:off x="2498021" y="3864456"/>
+            <a:ext cx="198642" cy="214127"/>
+          </a:xfrm>
+          <a:prstGeom prst="ellipse">
+            <a:avLst/>
+          </a:prstGeom>
+          <a:solidFill>
+            <a:srgbClr val="FFC000"/>
+          </a:solidFill>
+        </p:spPr>
+        <p:style>
+          <a:lnRef idx="2">
+            <a:schemeClr val="accent1">
+              <a:shade val="15000"/>
+            </a:schemeClr>
+          </a:lnRef>
+          <a:fillRef idx="1">
+            <a:schemeClr val="accent1"/>
+          </a:fillRef>
+          <a:effectRef idx="0">
+            <a:schemeClr val="accent1"/>
+          </a:effectRef>
+          <a:fontRef idx="minor">
+            <a:schemeClr val="lt1"/>
+          </a:fontRef>
+        </p:style>
+        <p:txBody>
+          <a:bodyPr rtlCol="0" anchor="ctr"/>
+          <a:lstStyle/>
+          <a:p>
+            <a:pPr algn="ctr"/>
+            <a:r>
+              <a:rPr lang="en-SG" sz="1600" b="1" dirty="0">
+                <a:solidFill>
+                  <a:srgbClr val="C00000"/>
+                </a:solidFill>
+              </a:rPr>
+              <a:t>1</a:t>
+            </a:r>
+          </a:p>
+        </p:txBody>
+      </p:sp>
+      <p:sp>
+        <p:nvSpPr>
+          <p:cNvPr id="13" name="TextBox 12">
+            <a:extLst>
+              <a:ext uri="{FF2B5EF4-FFF2-40B4-BE49-F238E27FC236}">
+                <a16:creationId xmlns:a16="http://schemas.microsoft.com/office/drawing/2014/main" id="{D226E6CC-BD39-0C71-19AA-42BD6224DCD3}"/>
+              </a:ext>
+            </a:extLst>
+          </p:cNvPr>
+          <p:cNvSpPr txBox="1"/>
+          <p:nvPr/>
+        </p:nvSpPr>
+        <p:spPr>
+          <a:xfrm>
+            <a:off x="653647" y="3971520"/>
+            <a:ext cx="1632016" cy="830997"/>
+          </a:xfrm>
+          <a:prstGeom prst="rect">
+            <a:avLst/>
+          </a:prstGeom>
+          <a:solidFill>
+            <a:schemeClr val="bg1">
+              <a:lumMod val="95000"/>
+            </a:schemeClr>
+          </a:solidFill>
+          <a:ln w="6350">
+            <a:solidFill>
+              <a:schemeClr val="tx1"/>
+            </a:solidFill>
+          </a:ln>
+        </p:spPr>
+        <p:txBody>
+          <a:bodyPr wrap="square" rtlCol="0">
+            <a:spAutoFit/>
+          </a:bodyPr>
+          <a:lstStyle/>
+          <a:p>
+            <a:r>
+              <a:rPr lang="en-US" sz="1200" b="1" dirty="0"/>
+              <a:t>Step 1 : If the PLC display panel shows the station sensor is triggered </a:t>
+            </a:r>
+          </a:p>
+        </p:txBody>
+      </p:sp>
+      <p:cxnSp>
+        <p:nvCxnSpPr>
+          <p:cNvPr id="14" name="Connector: Elbow 13">
+            <a:extLst>
+              <a:ext uri="{FF2B5EF4-FFF2-40B4-BE49-F238E27FC236}">
+                <a16:creationId xmlns:a16="http://schemas.microsoft.com/office/drawing/2014/main" id="{837A224A-07CE-15B9-03F6-DF398444B115}"/>
+              </a:ext>
+            </a:extLst>
+          </p:cNvPr>
+          <p:cNvCxnSpPr>
+            <a:cxnSpLocks/>
+            <a:stCxn id="13" idx="3"/>
+          </p:cNvCxnSpPr>
+          <p:nvPr/>
+        </p:nvCxnSpPr>
+        <p:spPr>
+          <a:xfrm flipV="1">
+            <a:off x="2285663" y="4042611"/>
+            <a:ext cx="311679" cy="344408"/>
+          </a:xfrm>
+          <a:prstGeom prst="bentConnector2">
+            <a:avLst/>
+          </a:prstGeom>
+          <a:ln>
+            <a:solidFill>
+              <a:schemeClr val="tx2">
+                <a:lumMod val="75000"/>
+                <a:lumOff val="25000"/>
+              </a:schemeClr>
+            </a:solidFill>
+            <a:prstDash val="sysDash"/>
+            <a:tailEnd type="triangle"/>
+          </a:ln>
+        </p:spPr>
+        <p:style>
+          <a:lnRef idx="2">
+            <a:schemeClr val="accent1"/>
+          </a:lnRef>
+          <a:fillRef idx="0">
+            <a:schemeClr val="accent1"/>
+          </a:fillRef>
+          <a:effectRef idx="1">
+            <a:schemeClr val="accent1"/>
+          </a:effectRef>
+          <a:fontRef idx="minor">
+            <a:schemeClr val="tx1"/>
+          </a:fontRef>
+        </p:style>
+      </p:cxnSp>
+      <p:cxnSp>
+        <p:nvCxnSpPr>
+          <p:cNvPr id="17" name="Connector: Elbow 16">
+            <a:extLst>
+              <a:ext uri="{FF2B5EF4-FFF2-40B4-BE49-F238E27FC236}">
+                <a16:creationId xmlns:a16="http://schemas.microsoft.com/office/drawing/2014/main" id="{417F8D83-0A3A-9079-E2C9-644E63567EA7}"/>
+              </a:ext>
+            </a:extLst>
+          </p:cNvPr>
+          <p:cNvCxnSpPr>
+            <a:cxnSpLocks/>
+          </p:cNvCxnSpPr>
+          <p:nvPr/>
+        </p:nvCxnSpPr>
+        <p:spPr>
+          <a:xfrm flipV="1">
+            <a:off x="2810577" y="2127183"/>
+            <a:ext cx="2261937" cy="1844337"/>
+          </a:xfrm>
+          <a:prstGeom prst="bentConnector3">
+            <a:avLst>
+              <a:gd name="adj1" fmla="val 50000"/>
+            </a:avLst>
+          </a:prstGeom>
+          <a:ln>
+            <a:solidFill>
+              <a:schemeClr val="tx2">
+                <a:lumMod val="75000"/>
+                <a:lumOff val="25000"/>
+              </a:schemeClr>
+            </a:solidFill>
+            <a:prstDash val="sysDash"/>
+            <a:tailEnd type="triangle"/>
+          </a:ln>
+        </p:spPr>
+        <p:style>
+          <a:lnRef idx="2">
+            <a:schemeClr val="accent1"/>
+          </a:lnRef>
+          <a:fillRef idx="0">
+            <a:schemeClr val="accent1"/>
+          </a:fillRef>
+          <a:effectRef idx="1">
+            <a:schemeClr val="accent1"/>
+          </a:effectRef>
+          <a:fontRef idx="minor">
+            <a:schemeClr val="tx1"/>
+          </a:fontRef>
+        </p:style>
+      </p:cxnSp>
+      <p:sp>
+        <p:nvSpPr>
+          <p:cNvPr id="20" name="TextBox 19">
+            <a:extLst>
+              <a:ext uri="{FF2B5EF4-FFF2-40B4-BE49-F238E27FC236}">
+                <a16:creationId xmlns:a16="http://schemas.microsoft.com/office/drawing/2014/main" id="{3A940F8A-CAB0-BB39-41B6-4914080CE88D}"/>
+              </a:ext>
+            </a:extLst>
+          </p:cNvPr>
+          <p:cNvSpPr txBox="1"/>
+          <p:nvPr/>
+        </p:nvSpPr>
+        <p:spPr>
+          <a:xfrm>
+            <a:off x="603504" y="2096391"/>
+            <a:ext cx="1681985" cy="1015663"/>
+          </a:xfrm>
+          <a:prstGeom prst="rect">
+            <a:avLst/>
+          </a:prstGeom>
+          <a:solidFill>
+            <a:schemeClr val="bg1">
+              <a:lumMod val="95000"/>
+            </a:schemeClr>
+          </a:solidFill>
+          <a:ln w="6350">
+            <a:solidFill>
+              <a:schemeClr val="tx1"/>
+            </a:solidFill>
+          </a:ln>
+        </p:spPr>
+        <p:txBody>
+          <a:bodyPr wrap="square" rtlCol="0">
+            <a:spAutoFit/>
+          </a:bodyPr>
+          <a:lstStyle/>
+          <a:p>
+            <a:r>
+              <a:rPr lang="en-US" sz="1200" b="1" dirty="0"/>
+              <a:t>Step 2: Check the calculated signal’s state from the Sensor-Signal Relationship Diagram</a:t>
+            </a:r>
+          </a:p>
+        </p:txBody>
+      </p:sp>
+      <p:cxnSp>
+        <p:nvCxnSpPr>
+          <p:cNvPr id="21" name="Straight Arrow Connector 20">
+            <a:extLst>
+              <a:ext uri="{FF2B5EF4-FFF2-40B4-BE49-F238E27FC236}">
+                <a16:creationId xmlns:a16="http://schemas.microsoft.com/office/drawing/2014/main" id="{27C14EDD-E4B6-659C-0B1C-69E9E86B31FF}"/>
+              </a:ext>
+            </a:extLst>
+          </p:cNvPr>
+          <p:cNvCxnSpPr>
+            <a:cxnSpLocks/>
+          </p:cNvCxnSpPr>
+          <p:nvPr/>
+        </p:nvCxnSpPr>
+        <p:spPr>
+          <a:xfrm>
+            <a:off x="2285489" y="2498069"/>
+            <a:ext cx="1593492" cy="0"/>
+          </a:xfrm>
+          <a:prstGeom prst="straightConnector1">
+            <a:avLst/>
+          </a:prstGeom>
+          <a:ln w="19050">
+            <a:solidFill>
+              <a:schemeClr val="tx2">
+                <a:lumMod val="50000"/>
+                <a:lumOff val="50000"/>
+              </a:schemeClr>
+            </a:solidFill>
+            <a:prstDash val="sysDash"/>
+            <a:tailEnd type="triangle"/>
+          </a:ln>
+        </p:spPr>
+        <p:style>
+          <a:lnRef idx="1">
+            <a:schemeClr val="accent5"/>
+          </a:lnRef>
+          <a:fillRef idx="0">
+            <a:schemeClr val="accent5"/>
+          </a:fillRef>
+          <a:effectRef idx="0">
+            <a:schemeClr val="accent5"/>
+          </a:effectRef>
+          <a:fontRef idx="minor">
+            <a:schemeClr val="tx1"/>
+          </a:fontRef>
+        </p:style>
+      </p:cxnSp>
+      <p:sp>
+        <p:nvSpPr>
+          <p:cNvPr id="24" name="Oval 23">
+            <a:extLst>
+              <a:ext uri="{FF2B5EF4-FFF2-40B4-BE49-F238E27FC236}">
+                <a16:creationId xmlns:a16="http://schemas.microsoft.com/office/drawing/2014/main" id="{591D9AC3-382C-335C-EFB7-2D545940A7B1}"/>
+              </a:ext>
+            </a:extLst>
+          </p:cNvPr>
+          <p:cNvSpPr/>
+          <p:nvPr/>
+        </p:nvSpPr>
+        <p:spPr>
+          <a:xfrm>
+            <a:off x="4021175" y="2283942"/>
+            <a:ext cx="198642" cy="214127"/>
+          </a:xfrm>
+          <a:prstGeom prst="ellipse">
+            <a:avLst/>
+          </a:prstGeom>
+          <a:solidFill>
+            <a:srgbClr val="FFC000"/>
+          </a:solidFill>
+        </p:spPr>
+        <p:style>
+          <a:lnRef idx="2">
+            <a:schemeClr val="accent1">
+              <a:shade val="15000"/>
+            </a:schemeClr>
+          </a:lnRef>
+          <a:fillRef idx="1">
+            <a:schemeClr val="accent1"/>
+          </a:fillRef>
+          <a:effectRef idx="0">
+            <a:schemeClr val="accent1"/>
+          </a:effectRef>
+          <a:fontRef idx="minor">
+            <a:schemeClr val="lt1"/>
+          </a:fontRef>
+        </p:style>
+        <p:txBody>
+          <a:bodyPr rtlCol="0" anchor="ctr"/>
+          <a:lstStyle/>
+          <a:p>
+            <a:pPr algn="ctr"/>
+            <a:r>
+              <a:rPr lang="en-SG" sz="1600" b="1" dirty="0">
+                <a:solidFill>
+                  <a:srgbClr val="C00000"/>
+                </a:solidFill>
+              </a:rPr>
+              <a:t>2</a:t>
+            </a:r>
+          </a:p>
+        </p:txBody>
+      </p:sp>
+      <p:cxnSp>
+        <p:nvCxnSpPr>
+          <p:cNvPr id="25" name="Connector: Elbow 24">
+            <a:extLst>
+              <a:ext uri="{FF2B5EF4-FFF2-40B4-BE49-F238E27FC236}">
+                <a16:creationId xmlns:a16="http://schemas.microsoft.com/office/drawing/2014/main" id="{E0FE29C6-C5A4-84F0-B8D7-E356B3C480C4}"/>
+              </a:ext>
+            </a:extLst>
+          </p:cNvPr>
+          <p:cNvCxnSpPr>
+            <a:cxnSpLocks/>
+          </p:cNvCxnSpPr>
+          <p:nvPr/>
+        </p:nvCxnSpPr>
+        <p:spPr>
+          <a:xfrm rot="5400000">
+            <a:off x="3895202" y="2563201"/>
+            <a:ext cx="1875128" cy="941509"/>
+          </a:xfrm>
+          <a:prstGeom prst="bentConnector3">
+            <a:avLst>
+              <a:gd name="adj1" fmla="val 50000"/>
+            </a:avLst>
+          </a:prstGeom>
+          <a:ln>
+            <a:solidFill>
+              <a:schemeClr val="tx2">
+                <a:lumMod val="75000"/>
+                <a:lumOff val="25000"/>
+              </a:schemeClr>
+            </a:solidFill>
+            <a:prstDash val="sysDash"/>
+            <a:tailEnd type="triangle"/>
+          </a:ln>
+        </p:spPr>
+        <p:style>
+          <a:lnRef idx="2">
+            <a:schemeClr val="accent1"/>
+          </a:lnRef>
+          <a:fillRef idx="0">
+            <a:schemeClr val="accent1"/>
+          </a:fillRef>
+          <a:effectRef idx="1">
+            <a:schemeClr val="accent1"/>
+          </a:effectRef>
+          <a:fontRef idx="minor">
+            <a:schemeClr val="tx1"/>
+          </a:fontRef>
+        </p:style>
+      </p:cxnSp>
+      <p:cxnSp>
+        <p:nvCxnSpPr>
+          <p:cNvPr id="28" name="Straight Arrow Connector 27">
+            <a:extLst>
+              <a:ext uri="{FF2B5EF4-FFF2-40B4-BE49-F238E27FC236}">
+                <a16:creationId xmlns:a16="http://schemas.microsoft.com/office/drawing/2014/main" id="{BC206A76-625D-5D3C-307D-9127BA0CA4D9}"/>
+              </a:ext>
+            </a:extLst>
+          </p:cNvPr>
+          <p:cNvCxnSpPr>
+            <a:cxnSpLocks/>
+          </p:cNvCxnSpPr>
+          <p:nvPr/>
+        </p:nvCxnSpPr>
+        <p:spPr>
+          <a:xfrm flipV="1">
+            <a:off x="4219817" y="4204764"/>
+            <a:ext cx="0" cy="988639"/>
+          </a:xfrm>
+          <a:prstGeom prst="straightConnector1">
+            <a:avLst/>
+          </a:prstGeom>
+          <a:ln w="19050">
+            <a:solidFill>
+              <a:schemeClr val="tx2">
+                <a:lumMod val="50000"/>
+                <a:lumOff val="50000"/>
+              </a:schemeClr>
+            </a:solidFill>
+            <a:prstDash val="sysDash"/>
+            <a:tailEnd type="triangle"/>
+          </a:ln>
+        </p:spPr>
+        <p:style>
+          <a:lnRef idx="1">
+            <a:schemeClr val="accent5"/>
+          </a:lnRef>
+          <a:fillRef idx="0">
+            <a:schemeClr val="accent5"/>
+          </a:fillRef>
+          <a:effectRef idx="0">
+            <a:schemeClr val="accent5"/>
+          </a:effectRef>
+          <a:fontRef idx="minor">
+            <a:schemeClr val="tx1"/>
+          </a:fontRef>
+        </p:style>
+      </p:cxnSp>
+      <p:sp>
+        <p:nvSpPr>
+          <p:cNvPr id="29" name="Rectangle 28">
+            <a:extLst>
+              <a:ext uri="{FF2B5EF4-FFF2-40B4-BE49-F238E27FC236}">
+                <a16:creationId xmlns:a16="http://schemas.microsoft.com/office/drawing/2014/main" id="{1151D757-10DE-4210-FC7D-042B4760491A}"/>
+              </a:ext>
+            </a:extLst>
+          </p:cNvPr>
+          <p:cNvSpPr/>
+          <p:nvPr/>
+        </p:nvSpPr>
+        <p:spPr>
+          <a:xfrm flipH="1" flipV="1">
+            <a:off x="4003958" y="3946701"/>
+            <a:ext cx="554011" cy="258063"/>
+          </a:xfrm>
+          <a:prstGeom prst="rect">
+            <a:avLst/>
+          </a:prstGeom>
+          <a:noFill/>
+          <a:ln>
+            <a:solidFill>
+              <a:srgbClr val="00B0F0"/>
+            </a:solidFill>
+            <a:prstDash val="sysDash"/>
+          </a:ln>
+        </p:spPr>
+        <p:style>
+          <a:lnRef idx="2">
+            <a:schemeClr val="accent1">
+              <a:shade val="15000"/>
+            </a:schemeClr>
+          </a:lnRef>
+          <a:fillRef idx="1">
+            <a:schemeClr val="accent1"/>
+          </a:fillRef>
+          <a:effectRef idx="0">
+            <a:schemeClr val="accent1"/>
+          </a:effectRef>
+          <a:fontRef idx="minor">
+            <a:schemeClr val="lt1"/>
+          </a:fontRef>
+        </p:style>
+        <p:txBody>
+          <a:bodyPr rtlCol="0" anchor="ctr"/>
+          <a:lstStyle/>
+          <a:p>
+            <a:pPr algn="ctr"/>
+            <a:endParaRPr lang="en-SG" dirty="0"/>
+          </a:p>
+        </p:txBody>
+      </p:sp>
+      <p:sp>
+        <p:nvSpPr>
+          <p:cNvPr id="30" name="TextBox 29">
+            <a:extLst>
+              <a:ext uri="{FF2B5EF4-FFF2-40B4-BE49-F238E27FC236}">
+                <a16:creationId xmlns:a16="http://schemas.microsoft.com/office/drawing/2014/main" id="{F71F7D3B-CF10-8601-B4E6-D26A53098679}"/>
+              </a:ext>
+            </a:extLst>
+          </p:cNvPr>
+          <p:cNvSpPr txBox="1"/>
+          <p:nvPr/>
+        </p:nvSpPr>
+        <p:spPr>
+          <a:xfrm>
+            <a:off x="2285489" y="5193403"/>
+            <a:ext cx="5459479" cy="461665"/>
+          </a:xfrm>
+          <a:prstGeom prst="rect">
+            <a:avLst/>
+          </a:prstGeom>
+          <a:noFill/>
+        </p:spPr>
+        <p:txBody>
+          <a:bodyPr wrap="square" rtlCol="0">
+            <a:spAutoFit/>
+          </a:bodyPr>
+          <a:lstStyle/>
+          <a:p>
+            <a:r>
+              <a:rPr lang="en-US" sz="1200" b="1" dirty="0"/>
+              <a:t>Step 3: Compare the ST[0] Signal state (calculated ) with the PLC Display Panel STns00 (fetch from PLC directly), if same, verification pass, raise alert.  </a:t>
+            </a:r>
+            <a:endParaRPr lang="en-SG" sz="1200" b="1" dirty="0"/>
+          </a:p>
+        </p:txBody>
+      </p:sp>
+      <p:cxnSp>
+        <p:nvCxnSpPr>
+          <p:cNvPr id="34" name="Connector: Elbow 33">
+            <a:extLst>
+              <a:ext uri="{FF2B5EF4-FFF2-40B4-BE49-F238E27FC236}">
+                <a16:creationId xmlns:a16="http://schemas.microsoft.com/office/drawing/2014/main" id="{7F79C94C-E612-B0C0-EC9D-6DC02B44D56B}"/>
+              </a:ext>
+            </a:extLst>
+          </p:cNvPr>
+          <p:cNvCxnSpPr>
+            <a:cxnSpLocks/>
+            <a:stCxn id="30" idx="3"/>
+          </p:cNvCxnSpPr>
+          <p:nvPr/>
+        </p:nvCxnSpPr>
+        <p:spPr>
+          <a:xfrm flipV="1">
+            <a:off x="7744968" y="1892808"/>
+            <a:ext cx="1132456" cy="3531428"/>
+          </a:xfrm>
+          <a:prstGeom prst="bentConnector2">
+            <a:avLst/>
+          </a:prstGeom>
+          <a:ln>
+            <a:solidFill>
+              <a:schemeClr val="tx2">
+                <a:lumMod val="75000"/>
+                <a:lumOff val="25000"/>
+              </a:schemeClr>
+            </a:solidFill>
+            <a:prstDash val="sysDash"/>
+            <a:tailEnd type="triangle"/>
+          </a:ln>
+        </p:spPr>
+        <p:style>
+          <a:lnRef idx="2">
+            <a:schemeClr val="accent1"/>
+          </a:lnRef>
+          <a:fillRef idx="0">
+            <a:schemeClr val="accent1"/>
+          </a:fillRef>
+          <a:effectRef idx="1">
+            <a:schemeClr val="accent1"/>
+          </a:effectRef>
+          <a:fontRef idx="minor">
+            <a:schemeClr val="tx1"/>
+          </a:fontRef>
+        </p:style>
+      </p:cxnSp>
+      <p:sp>
+        <p:nvSpPr>
+          <p:cNvPr id="35" name="Oval 34">
+            <a:extLst>
+              <a:ext uri="{FF2B5EF4-FFF2-40B4-BE49-F238E27FC236}">
+                <a16:creationId xmlns:a16="http://schemas.microsoft.com/office/drawing/2014/main" id="{F091F5F4-60DF-B811-EEA4-213C2C6F4DEC}"/>
+              </a:ext>
+            </a:extLst>
+          </p:cNvPr>
+          <p:cNvSpPr/>
+          <p:nvPr/>
+        </p:nvSpPr>
+        <p:spPr>
+          <a:xfrm>
+            <a:off x="5072514" y="2604222"/>
+            <a:ext cx="198642" cy="214127"/>
+          </a:xfrm>
+          <a:prstGeom prst="ellipse">
+            <a:avLst/>
+          </a:prstGeom>
+          <a:solidFill>
+            <a:srgbClr val="FFC000"/>
+          </a:solidFill>
+        </p:spPr>
+        <p:style>
+          <a:lnRef idx="2">
+            <a:schemeClr val="accent1">
+              <a:shade val="15000"/>
+            </a:schemeClr>
+          </a:lnRef>
+          <a:fillRef idx="1">
+            <a:schemeClr val="accent1"/>
+          </a:fillRef>
+          <a:effectRef idx="0">
+            <a:schemeClr val="accent1"/>
+          </a:effectRef>
+          <a:fontRef idx="minor">
+            <a:schemeClr val="lt1"/>
+          </a:fontRef>
+        </p:style>
+        <p:txBody>
+          <a:bodyPr rtlCol="0" anchor="ctr"/>
+          <a:lstStyle/>
+          <a:p>
+            <a:pPr algn="ctr"/>
+            <a:r>
+              <a:rPr lang="en-SG" sz="1600" b="1" dirty="0">
+                <a:solidFill>
+                  <a:srgbClr val="C00000"/>
+                </a:solidFill>
+              </a:rPr>
+              <a:t>3</a:t>
+            </a:r>
+          </a:p>
+        </p:txBody>
+      </p:sp>
+      <p:sp>
+        <p:nvSpPr>
+          <p:cNvPr id="39" name="Rectangle 38">
+            <a:extLst>
+              <a:ext uri="{FF2B5EF4-FFF2-40B4-BE49-F238E27FC236}">
+                <a16:creationId xmlns:a16="http://schemas.microsoft.com/office/drawing/2014/main" id="{BA98729F-63CE-A987-90D6-276B333CB181}"/>
+              </a:ext>
+            </a:extLst>
+          </p:cNvPr>
+          <p:cNvSpPr/>
+          <p:nvPr/>
+        </p:nvSpPr>
+        <p:spPr>
+          <a:xfrm flipH="1" flipV="1">
+            <a:off x="8635784" y="1416835"/>
+            <a:ext cx="554011" cy="475972"/>
+          </a:xfrm>
+          <a:prstGeom prst="rect">
+            <a:avLst/>
+          </a:prstGeom>
+          <a:noFill/>
+          <a:ln>
+            <a:solidFill>
+              <a:srgbClr val="00B0F0"/>
+            </a:solidFill>
+            <a:prstDash val="sysDash"/>
+          </a:ln>
+        </p:spPr>
+        <p:style>
+          <a:lnRef idx="2">
+            <a:schemeClr val="accent1">
+              <a:shade val="15000"/>
+            </a:schemeClr>
+          </a:lnRef>
+          <a:fillRef idx="1">
+            <a:schemeClr val="accent1"/>
+          </a:fillRef>
+          <a:effectRef idx="0">
+            <a:schemeClr val="accent1"/>
+          </a:effectRef>
+          <a:fontRef idx="minor">
+            <a:schemeClr val="lt1"/>
+          </a:fontRef>
+        </p:style>
+        <p:txBody>
+          <a:bodyPr rtlCol="0" anchor="ctr"/>
+          <a:lstStyle/>
+          <a:p>
+            <a:pPr algn="ctr"/>
+            <a:endParaRPr lang="en-SG" dirty="0"/>
+          </a:p>
+        </p:txBody>
+      </p:sp>
+      <p:sp>
+        <p:nvSpPr>
+          <p:cNvPr id="40" name="TextBox 39">
+            <a:extLst>
+              <a:ext uri="{FF2B5EF4-FFF2-40B4-BE49-F238E27FC236}">
+                <a16:creationId xmlns:a16="http://schemas.microsoft.com/office/drawing/2014/main" id="{AF14C6D6-BD4D-8D28-230C-524A740A629C}"/>
+              </a:ext>
+            </a:extLst>
+          </p:cNvPr>
+          <p:cNvSpPr txBox="1"/>
+          <p:nvPr/>
+        </p:nvSpPr>
+        <p:spPr>
+          <a:xfrm>
+            <a:off x="8912789" y="4368094"/>
+            <a:ext cx="1811748" cy="830997"/>
+          </a:xfrm>
+          <a:prstGeom prst="rect">
+            <a:avLst/>
+          </a:prstGeom>
+          <a:noFill/>
+        </p:spPr>
+        <p:txBody>
+          <a:bodyPr wrap="square" rtlCol="0">
+            <a:spAutoFit/>
+          </a:bodyPr>
+          <a:lstStyle/>
+          <a:p>
+            <a:r>
+              <a:rPr lang="en-US" sz="1200" b="1" dirty="0"/>
+              <a:t>Mapping to the management HMI to confirm data update correctly in data base</a:t>
+            </a:r>
+            <a:endParaRPr lang="en-SG" sz="1200" b="1" dirty="0"/>
+          </a:p>
+        </p:txBody>
+      </p:sp>
+      <p:sp>
+        <p:nvSpPr>
+          <p:cNvPr id="41" name="Oval 40">
+            <a:extLst>
+              <a:ext uri="{FF2B5EF4-FFF2-40B4-BE49-F238E27FC236}">
+                <a16:creationId xmlns:a16="http://schemas.microsoft.com/office/drawing/2014/main" id="{EC3A2BAE-33C5-5F9B-20FD-607E9250D003}"/>
+              </a:ext>
+            </a:extLst>
+          </p:cNvPr>
+          <p:cNvSpPr/>
+          <p:nvPr/>
+        </p:nvSpPr>
+        <p:spPr>
+          <a:xfrm>
+            <a:off x="8767067" y="2176878"/>
+            <a:ext cx="198642" cy="214127"/>
+          </a:xfrm>
+          <a:prstGeom prst="ellipse">
+            <a:avLst/>
+          </a:prstGeom>
+          <a:solidFill>
+            <a:srgbClr val="FFC000"/>
+          </a:solidFill>
+        </p:spPr>
+        <p:style>
+          <a:lnRef idx="2">
+            <a:schemeClr val="accent1">
+              <a:shade val="15000"/>
+            </a:schemeClr>
+          </a:lnRef>
+          <a:fillRef idx="1">
+            <a:schemeClr val="accent1"/>
+          </a:fillRef>
+          <a:effectRef idx="0">
+            <a:schemeClr val="accent1"/>
+          </a:effectRef>
+          <a:fontRef idx="minor">
+            <a:schemeClr val="lt1"/>
+          </a:fontRef>
+        </p:style>
+        <p:txBody>
+          <a:bodyPr rtlCol="0" anchor="ctr"/>
+          <a:lstStyle/>
+          <a:p>
+            <a:pPr algn="ctr"/>
+            <a:r>
+              <a:rPr lang="en-SG" sz="1600" b="1" dirty="0">
+                <a:solidFill>
+                  <a:srgbClr val="C00000"/>
+                </a:solidFill>
+              </a:rPr>
+              <a:t>4</a:t>
+            </a:r>
+          </a:p>
+        </p:txBody>
+      </p:sp>
+      <p:sp>
+        <p:nvSpPr>
+          <p:cNvPr id="44" name="Oval 43">
+            <a:extLst>
+              <a:ext uri="{FF2B5EF4-FFF2-40B4-BE49-F238E27FC236}">
+                <a16:creationId xmlns:a16="http://schemas.microsoft.com/office/drawing/2014/main" id="{0A6157A2-8165-3B12-7C77-8D98585B1D7E}"/>
+              </a:ext>
+            </a:extLst>
+          </p:cNvPr>
+          <p:cNvSpPr/>
+          <p:nvPr/>
+        </p:nvSpPr>
+        <p:spPr>
+          <a:xfrm>
+            <a:off x="8160332" y="1785743"/>
+            <a:ext cx="198642" cy="214127"/>
+          </a:xfrm>
+          <a:prstGeom prst="ellipse">
+            <a:avLst/>
+          </a:prstGeom>
+          <a:solidFill>
+            <a:srgbClr val="FFC000"/>
+          </a:solidFill>
+        </p:spPr>
+        <p:style>
+          <a:lnRef idx="2">
+            <a:schemeClr val="accent1">
+              <a:shade val="15000"/>
+            </a:schemeClr>
+          </a:lnRef>
+          <a:fillRef idx="1">
+            <a:schemeClr val="accent1"/>
+          </a:fillRef>
+          <a:effectRef idx="0">
+            <a:schemeClr val="accent1"/>
+          </a:effectRef>
+          <a:fontRef idx="minor">
+            <a:schemeClr val="lt1"/>
+          </a:fontRef>
+        </p:style>
+        <p:txBody>
+          <a:bodyPr rtlCol="0" anchor="ctr"/>
+          <a:lstStyle/>
+          <a:p>
+            <a:pPr algn="ctr"/>
+            <a:r>
+              <a:rPr lang="en-US" sz="1600" b="1" dirty="0">
+                <a:solidFill>
+                  <a:srgbClr val="C00000"/>
+                </a:solidFill>
+              </a:rPr>
+              <a:t>5</a:t>
+            </a:r>
+            <a:endParaRPr lang="en-SG" sz="1600" b="1" dirty="0">
+              <a:solidFill>
+                <a:srgbClr val="C00000"/>
+              </a:solidFill>
+            </a:endParaRPr>
+          </a:p>
+        </p:txBody>
+      </p:sp>
+      <p:cxnSp>
+        <p:nvCxnSpPr>
+          <p:cNvPr id="45" name="Straight Arrow Connector 44">
+            <a:extLst>
+              <a:ext uri="{FF2B5EF4-FFF2-40B4-BE49-F238E27FC236}">
+                <a16:creationId xmlns:a16="http://schemas.microsoft.com/office/drawing/2014/main" id="{FFC3C6DA-13DA-D9FD-F2A0-70FE45F7A08B}"/>
+              </a:ext>
+            </a:extLst>
+          </p:cNvPr>
+          <p:cNvCxnSpPr>
+            <a:cxnSpLocks/>
+          </p:cNvCxnSpPr>
+          <p:nvPr/>
+        </p:nvCxnSpPr>
+        <p:spPr>
+          <a:xfrm>
+            <a:off x="8180007" y="1140967"/>
+            <a:ext cx="0" cy="404901"/>
+          </a:xfrm>
+          <a:prstGeom prst="straightConnector1">
+            <a:avLst/>
+          </a:prstGeom>
+          <a:ln w="19050">
+            <a:solidFill>
+              <a:schemeClr val="tx2">
+                <a:lumMod val="50000"/>
+                <a:lumOff val="50000"/>
+              </a:schemeClr>
+            </a:solidFill>
+            <a:prstDash val="sysDash"/>
+            <a:tailEnd type="triangle"/>
+          </a:ln>
+        </p:spPr>
+        <p:style>
+          <a:lnRef idx="1">
+            <a:schemeClr val="accent5"/>
+          </a:lnRef>
+          <a:fillRef idx="0">
+            <a:schemeClr val="accent5"/>
+          </a:fillRef>
+          <a:effectRef idx="0">
+            <a:schemeClr val="accent5"/>
+          </a:effectRef>
+          <a:fontRef idx="minor">
+            <a:schemeClr val="tx1"/>
+          </a:fontRef>
+        </p:style>
+      </p:cxnSp>
+      <p:sp>
+        <p:nvSpPr>
+          <p:cNvPr id="47" name="TextBox 46">
+            <a:extLst>
+              <a:ext uri="{FF2B5EF4-FFF2-40B4-BE49-F238E27FC236}">
+                <a16:creationId xmlns:a16="http://schemas.microsoft.com/office/drawing/2014/main" id="{B1BFD027-9B76-C9BA-35A9-AC8A08BB7768}"/>
+              </a:ext>
+            </a:extLst>
+          </p:cNvPr>
+          <p:cNvSpPr txBox="1"/>
+          <p:nvPr/>
+        </p:nvSpPr>
+        <p:spPr>
+          <a:xfrm>
+            <a:off x="2886963" y="714692"/>
+            <a:ext cx="7225065" cy="461665"/>
+          </a:xfrm>
+          <a:prstGeom prst="rect">
+            <a:avLst/>
+          </a:prstGeom>
+          <a:noFill/>
+        </p:spPr>
+        <p:txBody>
+          <a:bodyPr wrap="square" rtlCol="0">
+            <a:spAutoFit/>
+          </a:bodyPr>
+          <a:lstStyle/>
+          <a:p>
+            <a:r>
+              <a:rPr lang="en-US" sz="1200" b="1" dirty="0"/>
+              <a:t>Step 5 : check the position of the train on the fixed block if the train position not in the station block, means the RTU data is abnormal, there may be false data injection attack on the RTU memory </a:t>
+            </a:r>
+            <a:endParaRPr lang="en-SG" sz="1200" b="1" dirty="0"/>
+          </a:p>
+        </p:txBody>
+      </p:sp>
+    </p:spTree>
+    <p:extLst>
+      <p:ext uri="{BB962C8B-B14F-4D97-AF65-F5344CB8AC3E}">
+        <p14:creationId xmlns:p14="http://schemas.microsoft.com/office/powerpoint/2010/main" val="951825812"/>
       </p:ext>
     </p:extLst>
   </p:cSld>

</xml_diff>